<commit_message>
Progress Report: UML diagram
</commit_message>
<xml_diff>
--- a/Documents/Original Gantt.pptx
+++ b/Documents/Original Gantt.pptx
@@ -262,7 +262,7 @@
           <a:p>
             <a:fld id="{B1F104C1-3154-4358-B985-C4707E178012}" type="datetimeFigureOut">
               <a:rPr lang="en-GB" smtClean="0"/>
-              <a:t>28/11/2019</a:t>
+              <a:t>29/11/2019</a:t>
             </a:fld>
             <a:endParaRPr lang="en-GB"/>
           </a:p>
@@ -462,7 +462,7 @@
           <a:p>
             <a:fld id="{B1F104C1-3154-4358-B985-C4707E178012}" type="datetimeFigureOut">
               <a:rPr lang="en-GB" smtClean="0"/>
-              <a:t>28/11/2019</a:t>
+              <a:t>29/11/2019</a:t>
             </a:fld>
             <a:endParaRPr lang="en-GB"/>
           </a:p>
@@ -672,7 +672,7 @@
           <a:p>
             <a:fld id="{B1F104C1-3154-4358-B985-C4707E178012}" type="datetimeFigureOut">
               <a:rPr lang="en-GB" smtClean="0"/>
-              <a:t>28/11/2019</a:t>
+              <a:t>29/11/2019</a:t>
             </a:fld>
             <a:endParaRPr lang="en-GB"/>
           </a:p>
@@ -872,7 +872,7 @@
           <a:p>
             <a:fld id="{B1F104C1-3154-4358-B985-C4707E178012}" type="datetimeFigureOut">
               <a:rPr lang="en-GB" smtClean="0"/>
-              <a:t>28/11/2019</a:t>
+              <a:t>29/11/2019</a:t>
             </a:fld>
             <a:endParaRPr lang="en-GB"/>
           </a:p>
@@ -1148,7 +1148,7 @@
           <a:p>
             <a:fld id="{B1F104C1-3154-4358-B985-C4707E178012}" type="datetimeFigureOut">
               <a:rPr lang="en-GB" smtClean="0"/>
-              <a:t>28/11/2019</a:t>
+              <a:t>29/11/2019</a:t>
             </a:fld>
             <a:endParaRPr lang="en-GB"/>
           </a:p>
@@ -1416,7 +1416,7 @@
           <a:p>
             <a:fld id="{B1F104C1-3154-4358-B985-C4707E178012}" type="datetimeFigureOut">
               <a:rPr lang="en-GB" smtClean="0"/>
-              <a:t>28/11/2019</a:t>
+              <a:t>29/11/2019</a:t>
             </a:fld>
             <a:endParaRPr lang="en-GB"/>
           </a:p>
@@ -1831,7 +1831,7 @@
           <a:p>
             <a:fld id="{B1F104C1-3154-4358-B985-C4707E178012}" type="datetimeFigureOut">
               <a:rPr lang="en-GB" smtClean="0"/>
-              <a:t>28/11/2019</a:t>
+              <a:t>29/11/2019</a:t>
             </a:fld>
             <a:endParaRPr lang="en-GB"/>
           </a:p>
@@ -1973,7 +1973,7 @@
           <a:p>
             <a:fld id="{B1F104C1-3154-4358-B985-C4707E178012}" type="datetimeFigureOut">
               <a:rPr lang="en-GB" smtClean="0"/>
-              <a:t>28/11/2019</a:t>
+              <a:t>29/11/2019</a:t>
             </a:fld>
             <a:endParaRPr lang="en-GB"/>
           </a:p>
@@ -2086,7 +2086,7 @@
           <a:p>
             <a:fld id="{B1F104C1-3154-4358-B985-C4707E178012}" type="datetimeFigureOut">
               <a:rPr lang="en-GB" smtClean="0"/>
-              <a:t>28/11/2019</a:t>
+              <a:t>29/11/2019</a:t>
             </a:fld>
             <a:endParaRPr lang="en-GB"/>
           </a:p>
@@ -2399,7 +2399,7 @@
           <a:p>
             <a:fld id="{B1F104C1-3154-4358-B985-C4707E178012}" type="datetimeFigureOut">
               <a:rPr lang="en-GB" smtClean="0"/>
-              <a:t>28/11/2019</a:t>
+              <a:t>29/11/2019</a:t>
             </a:fld>
             <a:endParaRPr lang="en-GB"/>
           </a:p>
@@ -2688,7 +2688,7 @@
           <a:p>
             <a:fld id="{B1F104C1-3154-4358-B985-C4707E178012}" type="datetimeFigureOut">
               <a:rPr lang="en-GB" smtClean="0"/>
-              <a:t>28/11/2019</a:t>
+              <a:t>29/11/2019</a:t>
             </a:fld>
             <a:endParaRPr lang="en-GB"/>
           </a:p>
@@ -2931,7 +2931,7 @@
           <a:p>
             <a:fld id="{B1F104C1-3154-4358-B985-C4707E178012}" type="datetimeFigureOut">
               <a:rPr lang="en-GB" smtClean="0"/>
-              <a:t>28/11/2019</a:t>
+              <a:t>29/11/2019</a:t>
             </a:fld>
             <a:endParaRPr lang="en-GB"/>
           </a:p>
@@ -9438,8 +9438,8 @@
         </p:nvSpPr>
         <p:spPr>
           <a:xfrm>
-            <a:off x="63500" y="2993717"/>
-            <a:ext cx="11125200" cy="925216"/>
+            <a:off x="63500" y="2993718"/>
+            <a:ext cx="11125200" cy="714756"/>
           </a:xfrm>
           <a:prstGeom prst="rect">
             <a:avLst/>
@@ -9512,7 +9512,7 @@
         </p:nvSpPr>
         <p:spPr>
           <a:xfrm>
-            <a:off x="63500" y="4525866"/>
+            <a:off x="63500" y="3771974"/>
             <a:ext cx="11125200" cy="546100"/>
           </a:xfrm>
           <a:prstGeom prst="rect">
@@ -9586,7 +9586,7 @@
         </p:nvSpPr>
         <p:spPr>
           <a:xfrm>
-            <a:off x="63500" y="5135466"/>
+            <a:off x="63500" y="4381574"/>
             <a:ext cx="11125200" cy="279400"/>
           </a:xfrm>
           <a:prstGeom prst="rect">
@@ -9660,7 +9660,7 @@
         </p:nvSpPr>
         <p:spPr>
           <a:xfrm>
-            <a:off x="63500" y="5478366"/>
+            <a:off x="63500" y="4724474"/>
             <a:ext cx="11125200" cy="546100"/>
           </a:xfrm>
           <a:prstGeom prst="rect">
@@ -9816,12 +9816,12 @@
         </p:nvSpPr>
         <p:spPr>
           <a:xfrm>
-            <a:off x="844465" y="1865281"/>
-            <a:ext cx="10515600" cy="381000"/>
+            <a:off x="888999" y="1865281"/>
+            <a:ext cx="10297045" cy="381000"/>
           </a:xfrm>
           <a:prstGeom prst="roundRect">
             <a:avLst>
-              <a:gd name="adj" fmla="val 100000"/>
+              <a:gd name="adj" fmla="val 2000"/>
             </a:avLst>
           </a:prstGeom>
           <a:solidFill>
@@ -9964,8 +9964,8 @@
         </p:nvSpPr>
         <p:spPr>
           <a:xfrm>
-            <a:off x="63500" y="2993717"/>
-            <a:ext cx="825500" cy="925215"/>
+            <a:off x="63500" y="2993718"/>
+            <a:ext cx="825500" cy="714756"/>
           </a:xfrm>
           <a:prstGeom prst="rect">
             <a:avLst/>
@@ -10038,7 +10038,7 @@
         </p:nvSpPr>
         <p:spPr>
           <a:xfrm>
-            <a:off x="63500" y="4525866"/>
+            <a:off x="63500" y="3771974"/>
             <a:ext cx="825500" cy="546100"/>
           </a:xfrm>
           <a:prstGeom prst="rect">
@@ -10112,7 +10112,7 @@
         </p:nvSpPr>
         <p:spPr>
           <a:xfrm>
-            <a:off x="63500" y="5135466"/>
+            <a:off x="63500" y="4381574"/>
             <a:ext cx="825500" cy="279400"/>
           </a:xfrm>
           <a:prstGeom prst="rect">
@@ -10186,7 +10186,7 @@
         </p:nvSpPr>
         <p:spPr>
           <a:xfrm>
-            <a:off x="63500" y="5478366"/>
+            <a:off x="63500" y="4724474"/>
             <a:ext cx="825500" cy="546100"/>
           </a:xfrm>
           <a:prstGeom prst="rect">
@@ -10566,8 +10566,8 @@
         </p:nvSpPr>
         <p:spPr>
           <a:xfrm>
-            <a:off x="2346844" y="2509340"/>
-            <a:ext cx="292100" cy="127000"/>
+            <a:off x="2346844" y="2495328"/>
+            <a:ext cx="292100" cy="155025"/>
           </a:xfrm>
           <a:prstGeom prst="roundRect">
             <a:avLst/>
@@ -10651,8 +10651,8 @@
         </p:nvSpPr>
         <p:spPr>
           <a:xfrm>
-            <a:off x="2633404" y="2743359"/>
-            <a:ext cx="1003300" cy="127000"/>
+            <a:off x="2633404" y="2729347"/>
+            <a:ext cx="1003300" cy="155025"/>
           </a:xfrm>
           <a:prstGeom prst="roundRect">
             <a:avLst/>
@@ -10736,8 +10736,8 @@
         </p:nvSpPr>
         <p:spPr>
           <a:xfrm>
-            <a:off x="2346844" y="3053578"/>
-            <a:ext cx="1587500" cy="127000"/>
+            <a:off x="2346844" y="3039565"/>
+            <a:ext cx="1587500" cy="155025"/>
           </a:xfrm>
           <a:prstGeom prst="roundRect">
             <a:avLst/>
@@ -10821,8 +10821,8 @@
         </p:nvSpPr>
         <p:spPr>
           <a:xfrm>
-            <a:off x="3922923" y="3287596"/>
-            <a:ext cx="1485900" cy="127000"/>
+            <a:off x="3922923" y="3273584"/>
+            <a:ext cx="1485900" cy="155025"/>
           </a:xfrm>
           <a:prstGeom prst="roundRect">
             <a:avLst/>
@@ -10906,8 +10906,8 @@
         </p:nvSpPr>
         <p:spPr>
           <a:xfrm>
-            <a:off x="3922923" y="3521615"/>
-            <a:ext cx="1485900" cy="127000"/>
+            <a:off x="3922923" y="3507603"/>
+            <a:ext cx="1485900" cy="155025"/>
           </a:xfrm>
           <a:prstGeom prst="roundRect">
             <a:avLst/>
@@ -10991,7 +10991,7 @@
         </p:nvSpPr>
         <p:spPr>
           <a:xfrm>
-            <a:off x="5451241" y="4563966"/>
+            <a:off x="5451241" y="3810074"/>
             <a:ext cx="5740400" cy="203200"/>
           </a:xfrm>
           <a:prstGeom prst="roundRect">
@@ -11076,7 +11076,7 @@
         </p:nvSpPr>
         <p:spPr>
           <a:xfrm>
-            <a:off x="5451241" y="4830666"/>
+            <a:off x="5451241" y="4076774"/>
             <a:ext cx="5740400" cy="203200"/>
           </a:xfrm>
           <a:prstGeom prst="roundRect">
@@ -11161,7 +11161,7 @@
         </p:nvSpPr>
         <p:spPr>
           <a:xfrm>
-            <a:off x="6836280" y="5173566"/>
+            <a:off x="6836280" y="4419674"/>
             <a:ext cx="4356100" cy="203200"/>
           </a:xfrm>
           <a:prstGeom prst="roundRect">
@@ -11246,7 +11246,7 @@
         </p:nvSpPr>
         <p:spPr>
           <a:xfrm>
-            <a:off x="2346844" y="5516466"/>
+            <a:off x="2346844" y="4762574"/>
             <a:ext cx="3632200" cy="203200"/>
           </a:xfrm>
           <a:prstGeom prst="roundRect">
@@ -11331,7 +11331,7 @@
         </p:nvSpPr>
         <p:spPr>
           <a:xfrm>
-            <a:off x="2346844" y="5783166"/>
+            <a:off x="2346844" y="5029274"/>
             <a:ext cx="8839200" cy="203200"/>
           </a:xfrm>
           <a:prstGeom prst="roundRect">
@@ -11400,7 +11400,7 @@
       </p:sp>
       <p:sp>
         <p:nvSpPr>
-          <p:cNvPr id="27" name="OTLSHAPE_SLT_7a5e0ac462b74501964bce89cf5ce5e5_ShapePercentage" hidden="1">
+          <p:cNvPr id="27" name="OTLSHAPE_SLT_7a5e0ac462b74501964bce89cf5ce5e5_ShapePercentage">
             <a:extLst>
               <a:ext uri="{FF2B5EF4-FFF2-40B4-BE49-F238E27FC236}">
                 <a16:creationId xmlns:a16="http://schemas.microsoft.com/office/drawing/2014/main" id="{0AEDD0CF-AEDF-4F45-BC7C-5F78D508754D}"/>
@@ -11416,8 +11416,8 @@
         </p:nvSpPr>
         <p:spPr>
           <a:xfrm>
-            <a:off x="2225151" y="1459569"/>
-            <a:ext cx="304800" cy="155025"/>
+            <a:off x="2346844" y="2495328"/>
+            <a:ext cx="292100" cy="155025"/>
           </a:xfrm>
           <a:prstGeom prst="roundRect">
             <a:avLst/>
@@ -11474,7 +11474,7 @@
       </p:sp>
       <p:sp>
         <p:nvSpPr>
-          <p:cNvPr id="35" name="OTLSHAPE_SLT_58399bc4623e4f579a756e9c995a58b7_ShapePercentage" hidden="1">
+          <p:cNvPr id="35" name="OTLSHAPE_SLT_58399bc4623e4f579a756e9c995a58b7_ShapePercentage">
             <a:extLst>
               <a:ext uri="{FF2B5EF4-FFF2-40B4-BE49-F238E27FC236}">
                 <a16:creationId xmlns:a16="http://schemas.microsoft.com/office/drawing/2014/main" id="{D98736BA-9B33-4772-8B77-7E8A1A8F3208}"/>
@@ -11490,8 +11490,8 @@
         </p:nvSpPr>
         <p:spPr>
           <a:xfrm>
-            <a:off x="2521012" y="1693587"/>
-            <a:ext cx="1041400" cy="155025"/>
+            <a:off x="2633404" y="2729347"/>
+            <a:ext cx="1003300" cy="155025"/>
           </a:xfrm>
           <a:prstGeom prst="roundRect">
             <a:avLst/>
@@ -11548,7 +11548,7 @@
       </p:sp>
       <p:sp>
         <p:nvSpPr>
-          <p:cNvPr id="43" name="OTLSHAPE_SLT_d8778b79f5b5490899decb925da4eb15_ShapePercentage" hidden="1">
+          <p:cNvPr id="43" name="OTLSHAPE_SLT_d8778b79f5b5490899decb925da4eb15_ShapePercentage">
             <a:extLst>
               <a:ext uri="{FF2B5EF4-FFF2-40B4-BE49-F238E27FC236}">
                 <a16:creationId xmlns:a16="http://schemas.microsoft.com/office/drawing/2014/main" id="{D7A64BAE-4271-47B6-B9D1-B2D787E7208A}"/>
@@ -11564,8 +11564,8 @@
         </p:nvSpPr>
         <p:spPr>
           <a:xfrm>
-            <a:off x="2225151" y="2003806"/>
-            <a:ext cx="177800" cy="155025"/>
+            <a:off x="2346844" y="3039565"/>
+            <a:ext cx="1587500" cy="155025"/>
           </a:xfrm>
           <a:prstGeom prst="roundRect">
             <a:avLst/>
@@ -11622,7 +11622,7 @@
       </p:sp>
       <p:sp>
         <p:nvSpPr>
-          <p:cNvPr id="51" name="OTLSHAPE_SLT_3c695fc6758e4b24ad7c0bcef40b8593_ShapePercentage" hidden="1">
+          <p:cNvPr id="51" name="OTLSHAPE_SLT_3c695fc6758e4b24ad7c0bcef40b8593_ShapePercentage">
             <a:extLst>
               <a:ext uri="{FF2B5EF4-FFF2-40B4-BE49-F238E27FC236}">
                 <a16:creationId xmlns:a16="http://schemas.microsoft.com/office/drawing/2014/main" id="{26EDCC57-C568-4A2C-9558-4AE59F5A9176}"/>
@@ -11638,8 +11638,8 @@
         </p:nvSpPr>
         <p:spPr>
           <a:xfrm>
-            <a:off x="3852387" y="2237825"/>
-            <a:ext cx="177800" cy="155025"/>
+            <a:off x="3922923" y="3273584"/>
+            <a:ext cx="1485900" cy="155025"/>
           </a:xfrm>
           <a:prstGeom prst="roundRect">
             <a:avLst/>
@@ -11696,7 +11696,7 @@
       </p:sp>
       <p:sp>
         <p:nvSpPr>
-          <p:cNvPr id="59" name="OTLSHAPE_SLT_10e909a896d14618b53863625d69ab6f_ShapePercentage" hidden="1">
+          <p:cNvPr id="59" name="OTLSHAPE_SLT_10e909a896d14618b53863625d69ab6f_ShapePercentage">
             <a:extLst>
               <a:ext uri="{FF2B5EF4-FFF2-40B4-BE49-F238E27FC236}">
                 <a16:creationId xmlns:a16="http://schemas.microsoft.com/office/drawing/2014/main" id="{990F03B2-294E-4059-B1BB-55184E3A1CB6}"/>
@@ -11712,8 +11712,8 @@
         </p:nvSpPr>
         <p:spPr>
           <a:xfrm>
-            <a:off x="3852387" y="2471843"/>
-            <a:ext cx="177800" cy="155025"/>
+            <a:off x="3922923" y="3507603"/>
+            <a:ext cx="1485900" cy="155025"/>
           </a:xfrm>
           <a:prstGeom prst="roundRect">
             <a:avLst/>
@@ -12036,12 +12036,12 @@
         </p:nvSpPr>
         <p:spPr>
           <a:xfrm>
-            <a:off x="844465" y="1865281"/>
-            <a:ext cx="4483100" cy="381000"/>
+            <a:off x="888999" y="1865281"/>
+            <a:ext cx="4476665" cy="381000"/>
           </a:xfrm>
           <a:prstGeom prst="roundRect">
             <a:avLst>
-              <a:gd name="adj" fmla="val 10000000"/>
+              <a:gd name="adj" fmla="val 7053"/>
             </a:avLst>
           </a:prstGeom>
           <a:solidFill>
@@ -12202,7 +12202,7 @@
         </p:nvSpPr>
         <p:spPr>
           <a:xfrm>
-            <a:off x="63500" y="4612861"/>
+            <a:off x="63500" y="3858969"/>
             <a:ext cx="825500" cy="372110"/>
           </a:xfrm>
           <a:prstGeom prst="rect">
@@ -12247,7 +12247,7 @@
         </p:nvSpPr>
         <p:spPr>
           <a:xfrm>
-            <a:off x="63500" y="5182139"/>
+            <a:off x="63500" y="4428247"/>
             <a:ext cx="825500" cy="186055"/>
           </a:xfrm>
           <a:prstGeom prst="rect">
@@ -12292,7 +12292,7 @@
         </p:nvSpPr>
         <p:spPr>
           <a:xfrm>
-            <a:off x="63500" y="5658389"/>
+            <a:off x="63500" y="4904497"/>
             <a:ext cx="825500" cy="186055"/>
           </a:xfrm>
           <a:prstGeom prst="rect">
@@ -12321,89 +12321,17 @@
       </p:sp>
       <p:sp>
         <p:nvSpPr>
-          <p:cNvPr id="170" name="OTLSHAPE_TB_00000000000000000000000000000000_TodayMarkerShape">
-            <a:extLst>
-              <a:ext uri="{FF2B5EF4-FFF2-40B4-BE49-F238E27FC236}">
-                <a16:creationId xmlns:a16="http://schemas.microsoft.com/office/drawing/2014/main" id="{22B9BF34-F934-4AF4-82BA-7A7597D581D5}"/>
-              </a:ext>
-            </a:extLst>
-          </p:cNvPr>
-          <p:cNvSpPr/>
+          <p:cNvPr id="8" name="OTLSHAPE_TB_00000000000000000000000000000000_TimescaleInterval1">
+            <a:extLst>
+              <a:ext uri="{FF2B5EF4-FFF2-40B4-BE49-F238E27FC236}">
+                <a16:creationId xmlns:a16="http://schemas.microsoft.com/office/drawing/2014/main" id="{C6CD358D-21C6-4EE2-BE4E-D9E858DAC43D}"/>
+              </a:ext>
+            </a:extLst>
+          </p:cNvPr>
+          <p:cNvSpPr txBox="1"/>
           <p:nvPr>
             <p:custDataLst>
               <p:tags r:id="rId47"/>
-            </p:custDataLst>
-          </p:nvPr>
-        </p:nvSpPr>
-        <p:spPr>
-          <a:xfrm flipV="1">
-            <a:off x="5267433" y="1738281"/>
-            <a:ext cx="114300" cy="127000"/>
-          </a:xfrm>
-          <a:prstGeom prst="triangle">
-            <a:avLst/>
-          </a:prstGeom>
-          <a:solidFill>
-            <a:srgbClr val="FF0000"/>
-          </a:solidFill>
-          <a:ln w="12700" cap="flat" cmpd="sng" algn="ctr">
-            <a:noFill/>
-            <a:prstDash val="solid"/>
-            <a:miter lim="800000"/>
-          </a:ln>
-          <a:effectLst/>
-          <a:extLst>
-            <a:ext uri="{91240B29-F687-4F45-9708-019B960494DF}">
-              <a14:hiddenLine xmlns:a14="http://schemas.microsoft.com/office/drawing/2010/main" w="12700" cap="flat" cmpd="sng" algn="ctr">
-                <a:solidFill>
-                  <a:schemeClr val="accent1">
-                    <a:shade val="50000"/>
-                  </a:schemeClr>
-                </a:solidFill>
-                <a:prstDash val="solid"/>
-                <a:miter lim="800000"/>
-              </a14:hiddenLine>
-            </a:ext>
-          </a:extLst>
-        </p:spPr>
-        <p:style>
-          <a:lnRef idx="2">
-            <a:schemeClr val="accent1">
-              <a:shade val="50000"/>
-            </a:schemeClr>
-          </a:lnRef>
-          <a:fillRef idx="1">
-            <a:schemeClr val="accent1"/>
-          </a:fillRef>
-          <a:effectRef idx="0">
-            <a:schemeClr val="accent1"/>
-          </a:effectRef>
-          <a:fontRef idx="minor">
-            <a:schemeClr val="lt1"/>
-          </a:fontRef>
-        </p:style>
-        <p:txBody>
-          <a:bodyPr rtlCol="0" anchor="ctr"/>
-          <a:lstStyle/>
-          <a:p>
-            <a:pPr algn="ctr"/>
-            <a:endParaRPr lang="en-GB"/>
-          </a:p>
-        </p:txBody>
-      </p:sp>
-      <p:sp>
-        <p:nvSpPr>
-          <p:cNvPr id="8" name="OTLSHAPE_TB_00000000000000000000000000000000_TimescaleInterval1">
-            <a:extLst>
-              <a:ext uri="{FF2B5EF4-FFF2-40B4-BE49-F238E27FC236}">
-                <a16:creationId xmlns:a16="http://schemas.microsoft.com/office/drawing/2014/main" id="{C6CD358D-21C6-4EE2-BE4E-D9E858DAC43D}"/>
-              </a:ext>
-            </a:extLst>
-          </p:cNvPr>
-          <p:cNvSpPr txBox="1"/>
-          <p:nvPr>
-            <p:custDataLst>
-              <p:tags r:id="rId48"/>
             </p:custDataLst>
           </p:nvPr>
         </p:nvSpPr>
@@ -12453,7 +12381,7 @@
           <p:cNvSpPr txBox="1"/>
           <p:nvPr>
             <p:custDataLst>
-              <p:tags r:id="rId49"/>
+              <p:tags r:id="rId48"/>
             </p:custDataLst>
           </p:nvPr>
         </p:nvSpPr>
@@ -12497,7 +12425,7 @@
           <p:cNvSpPr txBox="1"/>
           <p:nvPr>
             <p:custDataLst>
-              <p:tags r:id="rId50"/>
+              <p:tags r:id="rId49"/>
             </p:custDataLst>
           </p:nvPr>
         </p:nvSpPr>
@@ -12541,7 +12469,7 @@
           <p:cNvSpPr txBox="1"/>
           <p:nvPr>
             <p:custDataLst>
-              <p:tags r:id="rId51"/>
+              <p:tags r:id="rId50"/>
             </p:custDataLst>
           </p:nvPr>
         </p:nvSpPr>
@@ -12585,7 +12513,7 @@
           <p:cNvSpPr txBox="1"/>
           <p:nvPr>
             <p:custDataLst>
-              <p:tags r:id="rId52"/>
+              <p:tags r:id="rId51"/>
             </p:custDataLst>
           </p:nvPr>
         </p:nvSpPr>
@@ -12612,7 +12540,7 @@
       </p:sp>
       <p:sp>
         <p:nvSpPr>
-          <p:cNvPr id="29" name="OTLSHAPE_SLT_7a5e0ac462b74501964bce89cf5ce5e5_TextPercentage" hidden="1">
+          <p:cNvPr id="29" name="OTLSHAPE_SLT_7a5e0ac462b74501964bce89cf5ce5e5_TextPercentage">
             <a:extLst>
               <a:ext uri="{FF2B5EF4-FFF2-40B4-BE49-F238E27FC236}">
                 <a16:creationId xmlns:a16="http://schemas.microsoft.com/office/drawing/2014/main" id="{7CE45091-34D0-4C0A-9998-3AA36A2F0D0D}"/>
@@ -12622,14 +12550,14 @@
           <p:cNvSpPr txBox="1"/>
           <p:nvPr>
             <p:custDataLst>
-              <p:tags r:id="rId53"/>
-            </p:custDataLst>
-          </p:nvPr>
-        </p:nvSpPr>
-        <p:spPr>
-          <a:xfrm>
-            <a:off x="2327810" y="1459569"/>
-            <a:ext cx="203200" cy="155025"/>
+              <p:tags r:id="rId52"/>
+            </p:custDataLst>
+          </p:nvPr>
+        </p:nvSpPr>
+        <p:spPr>
+          <a:xfrm>
+            <a:off x="2339134" y="2495896"/>
+            <a:ext cx="304569" cy="153888"/>
           </a:xfrm>
           <a:prstGeom prst="rect">
             <a:avLst/>
@@ -12644,13 +12572,13 @@
           <a:p>
             <a:pPr algn="ctr"/>
             <a:r>
-              <a:rPr lang="en-GB" sz="1000" spc="-12">
+              <a:rPr lang="en-GB" sz="1000" spc="-12" dirty="0">
                 <a:solidFill>
                   <a:schemeClr val="accent2"/>
                 </a:solidFill>
                 <a:latin typeface="Calibri" panose="020F0502020204030204" pitchFamily="34" charset="0"/>
               </a:rPr>
-              <a:t>100</a:t>
+              <a:t>100%</a:t>
             </a:r>
           </a:p>
         </p:txBody>
@@ -12667,7 +12595,7 @@
           <p:cNvSpPr txBox="1"/>
           <p:nvPr>
             <p:custDataLst>
-              <p:tags r:id="rId54"/>
+              <p:tags r:id="rId53"/>
             </p:custDataLst>
           </p:nvPr>
         </p:nvSpPr>
@@ -12704,7 +12632,7 @@
           <p:cNvSpPr txBox="1"/>
           <p:nvPr>
             <p:custDataLst>
-              <p:tags r:id="rId55"/>
+              <p:tags r:id="rId54"/>
             </p:custDataLst>
           </p:nvPr>
         </p:nvSpPr>
@@ -12741,7 +12669,7 @@
           <p:cNvSpPr txBox="1"/>
           <p:nvPr>
             <p:custDataLst>
-              <p:tags r:id="rId56"/>
+              <p:tags r:id="rId55"/>
             </p:custDataLst>
           </p:nvPr>
         </p:nvSpPr>
@@ -12786,7 +12714,7 @@
           <p:cNvSpPr txBox="1"/>
           <p:nvPr>
             <p:custDataLst>
-              <p:tags r:id="rId57"/>
+              <p:tags r:id="rId56"/>
             </p:custDataLst>
           </p:nvPr>
         </p:nvSpPr>
@@ -12830,7 +12758,7 @@
           <p:cNvSpPr txBox="1"/>
           <p:nvPr>
             <p:custDataLst>
-              <p:tags r:id="rId58"/>
+              <p:tags r:id="rId57"/>
             </p:custDataLst>
           </p:nvPr>
         </p:nvSpPr>
@@ -12857,7 +12785,7 @@
       </p:sp>
       <p:sp>
         <p:nvSpPr>
-          <p:cNvPr id="37" name="OTLSHAPE_SLT_58399bc4623e4f579a756e9c995a58b7_TextPercentage" hidden="1">
+          <p:cNvPr id="37" name="OTLSHAPE_SLT_58399bc4623e4f579a756e9c995a58b7_TextPercentage">
             <a:extLst>
               <a:ext uri="{FF2B5EF4-FFF2-40B4-BE49-F238E27FC236}">
                 <a16:creationId xmlns:a16="http://schemas.microsoft.com/office/drawing/2014/main" id="{09FEBF7A-F53E-4E24-8A02-A3F62174A423}"/>
@@ -12867,13 +12795,13 @@
           <p:cNvSpPr txBox="1"/>
           <p:nvPr>
             <p:custDataLst>
-              <p:tags r:id="rId59"/>
-            </p:custDataLst>
-          </p:nvPr>
-        </p:nvSpPr>
-        <p:spPr>
-          <a:xfrm>
-            <a:off x="3272519" y="1693587"/>
+              <p:tags r:id="rId58"/>
+            </p:custDataLst>
+          </p:nvPr>
+        </p:nvSpPr>
+        <p:spPr>
+          <a:xfrm>
+            <a:off x="3352357" y="2729347"/>
             <a:ext cx="292100" cy="155025"/>
           </a:xfrm>
           <a:prstGeom prst="rect">
@@ -12912,7 +12840,7 @@
           <p:cNvSpPr txBox="1"/>
           <p:nvPr>
             <p:custDataLst>
-              <p:tags r:id="rId60"/>
+              <p:tags r:id="rId59"/>
             </p:custDataLst>
           </p:nvPr>
         </p:nvSpPr>
@@ -12949,7 +12877,7 @@
           <p:cNvSpPr txBox="1"/>
           <p:nvPr>
             <p:custDataLst>
-              <p:tags r:id="rId61"/>
+              <p:tags r:id="rId60"/>
             </p:custDataLst>
           </p:nvPr>
         </p:nvSpPr>
@@ -12986,7 +12914,7 @@
           <p:cNvSpPr txBox="1"/>
           <p:nvPr>
             <p:custDataLst>
-              <p:tags r:id="rId62"/>
+              <p:tags r:id="rId61"/>
             </p:custDataLst>
           </p:nvPr>
         </p:nvSpPr>
@@ -13031,7 +12959,7 @@
           <p:cNvSpPr txBox="1"/>
           <p:nvPr>
             <p:custDataLst>
-              <p:tags r:id="rId63"/>
+              <p:tags r:id="rId62"/>
             </p:custDataLst>
           </p:nvPr>
         </p:nvSpPr>
@@ -13075,7 +13003,7 @@
           <p:cNvSpPr txBox="1"/>
           <p:nvPr>
             <p:custDataLst>
-              <p:tags r:id="rId64"/>
+              <p:tags r:id="rId63"/>
             </p:custDataLst>
           </p:nvPr>
         </p:nvSpPr>
@@ -13102,7 +13030,7 @@
       </p:sp>
       <p:sp>
         <p:nvSpPr>
-          <p:cNvPr id="45" name="OTLSHAPE_SLT_d8778b79f5b5490899decb925da4eb15_TextPercentage" hidden="1">
+          <p:cNvPr id="45" name="OTLSHAPE_SLT_d8778b79f5b5490899decb925da4eb15_TextPercentage">
             <a:extLst>
               <a:ext uri="{FF2B5EF4-FFF2-40B4-BE49-F238E27FC236}">
                 <a16:creationId xmlns:a16="http://schemas.microsoft.com/office/drawing/2014/main" id="{1B92FA97-E9AA-4CBC-AE68-B05FDA80F23A}"/>
@@ -13112,14 +13040,14 @@
           <p:cNvSpPr txBox="1"/>
           <p:nvPr>
             <p:custDataLst>
-              <p:tags r:id="rId65"/>
-            </p:custDataLst>
-          </p:nvPr>
-        </p:nvSpPr>
-        <p:spPr>
-          <a:xfrm>
-            <a:off x="2237851" y="2003806"/>
-            <a:ext cx="165100" cy="155025"/>
+              <p:tags r:id="rId64"/>
+            </p:custDataLst>
+          </p:nvPr>
+        </p:nvSpPr>
+        <p:spPr>
+          <a:xfrm>
+            <a:off x="3638917" y="3039565"/>
+            <a:ext cx="292100" cy="155025"/>
           </a:xfrm>
           <a:prstGeom prst="rect">
             <a:avLst/>
@@ -13134,13 +13062,13 @@
           <a:p>
             <a:pPr algn="ctr"/>
             <a:r>
-              <a:rPr lang="en-GB" sz="1000" spc="-10">
+              <a:rPr lang="en-GB" sz="1000" spc="-8">
                 <a:solidFill>
                   <a:schemeClr val="accent2"/>
                 </a:solidFill>
                 <a:latin typeface="Calibri" panose="020F0502020204030204" pitchFamily="34" charset="0"/>
               </a:rPr>
-              <a:t>0%</a:t>
+              <a:t>100%</a:t>
             </a:r>
           </a:p>
         </p:txBody>
@@ -13157,7 +13085,7 @@
           <p:cNvSpPr txBox="1"/>
           <p:nvPr>
             <p:custDataLst>
-              <p:tags r:id="rId66"/>
+              <p:tags r:id="rId65"/>
             </p:custDataLst>
           </p:nvPr>
         </p:nvSpPr>
@@ -13194,7 +13122,7 @@
           <p:cNvSpPr txBox="1"/>
           <p:nvPr>
             <p:custDataLst>
-              <p:tags r:id="rId67"/>
+              <p:tags r:id="rId66"/>
             </p:custDataLst>
           </p:nvPr>
         </p:nvSpPr>
@@ -13231,7 +13159,7 @@
           <p:cNvSpPr txBox="1"/>
           <p:nvPr>
             <p:custDataLst>
-              <p:tags r:id="rId68"/>
+              <p:tags r:id="rId67"/>
             </p:custDataLst>
           </p:nvPr>
         </p:nvSpPr>
@@ -13276,7 +13204,7 @@
           <p:cNvSpPr txBox="1"/>
           <p:nvPr>
             <p:custDataLst>
-              <p:tags r:id="rId69"/>
+              <p:tags r:id="rId68"/>
             </p:custDataLst>
           </p:nvPr>
         </p:nvSpPr>
@@ -13320,7 +13248,7 @@
           <p:cNvSpPr txBox="1"/>
           <p:nvPr>
             <p:custDataLst>
-              <p:tags r:id="rId70"/>
+              <p:tags r:id="rId69"/>
             </p:custDataLst>
           </p:nvPr>
         </p:nvSpPr>
@@ -13347,7 +13275,7 @@
       </p:sp>
       <p:sp>
         <p:nvSpPr>
-          <p:cNvPr id="53" name="OTLSHAPE_SLT_3c695fc6758e4b24ad7c0bcef40b8593_TextPercentage" hidden="1">
+          <p:cNvPr id="53" name="OTLSHAPE_SLT_3c695fc6758e4b24ad7c0bcef40b8593_TextPercentage">
             <a:extLst>
               <a:ext uri="{FF2B5EF4-FFF2-40B4-BE49-F238E27FC236}">
                 <a16:creationId xmlns:a16="http://schemas.microsoft.com/office/drawing/2014/main" id="{A8B52637-B89E-4F0F-B208-41E573BA7B4E}"/>
@@ -13357,14 +13285,14 @@
           <p:cNvSpPr txBox="1"/>
           <p:nvPr>
             <p:custDataLst>
-              <p:tags r:id="rId71"/>
-            </p:custDataLst>
-          </p:nvPr>
-        </p:nvSpPr>
-        <p:spPr>
-          <a:xfrm>
-            <a:off x="3865087" y="2237825"/>
-            <a:ext cx="165100" cy="155025"/>
+              <p:tags r:id="rId70"/>
+            </p:custDataLst>
+          </p:nvPr>
+        </p:nvSpPr>
+        <p:spPr>
+          <a:xfrm>
+            <a:off x="5119476" y="3273584"/>
+            <a:ext cx="292100" cy="155025"/>
           </a:xfrm>
           <a:prstGeom prst="rect">
             <a:avLst/>
@@ -13379,13 +13307,13 @@
           <a:p>
             <a:pPr algn="ctr"/>
             <a:r>
-              <a:rPr lang="en-GB" sz="1000" spc="-10">
+              <a:rPr lang="en-GB" sz="1000" spc="-8">
                 <a:solidFill>
                   <a:schemeClr val="accent2"/>
                 </a:solidFill>
                 <a:latin typeface="Calibri" panose="020F0502020204030204" pitchFamily="34" charset="0"/>
               </a:rPr>
-              <a:t>0%</a:t>
+              <a:t>100%</a:t>
             </a:r>
           </a:p>
         </p:txBody>
@@ -13402,7 +13330,7 @@
           <p:cNvSpPr txBox="1"/>
           <p:nvPr>
             <p:custDataLst>
-              <p:tags r:id="rId72"/>
+              <p:tags r:id="rId71"/>
             </p:custDataLst>
           </p:nvPr>
         </p:nvSpPr>
@@ -13439,7 +13367,7 @@
           <p:cNvSpPr txBox="1"/>
           <p:nvPr>
             <p:custDataLst>
-              <p:tags r:id="rId73"/>
+              <p:tags r:id="rId72"/>
             </p:custDataLst>
           </p:nvPr>
         </p:nvSpPr>
@@ -13476,7 +13404,7 @@
           <p:cNvSpPr txBox="1"/>
           <p:nvPr>
             <p:custDataLst>
-              <p:tags r:id="rId74"/>
+              <p:tags r:id="rId73"/>
             </p:custDataLst>
           </p:nvPr>
         </p:nvSpPr>
@@ -13521,7 +13449,7 @@
           <p:cNvSpPr txBox="1"/>
           <p:nvPr>
             <p:custDataLst>
-              <p:tags r:id="rId75"/>
+              <p:tags r:id="rId74"/>
             </p:custDataLst>
           </p:nvPr>
         </p:nvSpPr>
@@ -13565,7 +13493,7 @@
           <p:cNvSpPr txBox="1"/>
           <p:nvPr>
             <p:custDataLst>
-              <p:tags r:id="rId76"/>
+              <p:tags r:id="rId75"/>
             </p:custDataLst>
           </p:nvPr>
         </p:nvSpPr>
@@ -13592,7 +13520,7 @@
       </p:sp>
       <p:sp>
         <p:nvSpPr>
-          <p:cNvPr id="61" name="OTLSHAPE_SLT_10e909a896d14618b53863625d69ab6f_TextPercentage" hidden="1">
+          <p:cNvPr id="61" name="OTLSHAPE_SLT_10e909a896d14618b53863625d69ab6f_TextPercentage">
             <a:extLst>
               <a:ext uri="{FF2B5EF4-FFF2-40B4-BE49-F238E27FC236}">
                 <a16:creationId xmlns:a16="http://schemas.microsoft.com/office/drawing/2014/main" id="{2A679A17-A0C1-48D3-BCE9-10FFE26F0392}"/>
@@ -13602,14 +13530,14 @@
           <p:cNvSpPr txBox="1"/>
           <p:nvPr>
             <p:custDataLst>
-              <p:tags r:id="rId77"/>
-            </p:custDataLst>
-          </p:nvPr>
-        </p:nvSpPr>
-        <p:spPr>
-          <a:xfrm>
-            <a:off x="3865087" y="2471843"/>
-            <a:ext cx="165100" cy="155025"/>
+              <p:tags r:id="rId76"/>
+            </p:custDataLst>
+          </p:nvPr>
+        </p:nvSpPr>
+        <p:spPr>
+          <a:xfrm>
+            <a:off x="5119476" y="3507603"/>
+            <a:ext cx="292100" cy="155025"/>
           </a:xfrm>
           <a:prstGeom prst="rect">
             <a:avLst/>
@@ -13624,13 +13552,13 @@
           <a:p>
             <a:pPr algn="ctr"/>
             <a:r>
-              <a:rPr lang="en-GB" sz="1000" spc="-10">
+              <a:rPr lang="en-GB" sz="1000" spc="-8">
                 <a:solidFill>
                   <a:schemeClr val="accent2"/>
                 </a:solidFill>
                 <a:latin typeface="Calibri" panose="020F0502020204030204" pitchFamily="34" charset="0"/>
               </a:rPr>
-              <a:t>0%</a:t>
+              <a:t>100%</a:t>
             </a:r>
           </a:p>
         </p:txBody>
@@ -13647,7 +13575,7 @@
           <p:cNvSpPr txBox="1"/>
           <p:nvPr>
             <p:custDataLst>
-              <p:tags r:id="rId78"/>
+              <p:tags r:id="rId77"/>
             </p:custDataLst>
           </p:nvPr>
         </p:nvSpPr>
@@ -13684,7 +13612,7 @@
           <p:cNvSpPr txBox="1"/>
           <p:nvPr>
             <p:custDataLst>
-              <p:tags r:id="rId79"/>
+              <p:tags r:id="rId78"/>
             </p:custDataLst>
           </p:nvPr>
         </p:nvSpPr>
@@ -13721,7 +13649,7 @@
           <p:cNvSpPr txBox="1"/>
           <p:nvPr>
             <p:custDataLst>
-              <p:tags r:id="rId80"/>
+              <p:tags r:id="rId79"/>
             </p:custDataLst>
           </p:nvPr>
         </p:nvSpPr>
@@ -13766,7 +13694,7 @@
           <p:cNvSpPr txBox="1"/>
           <p:nvPr>
             <p:custDataLst>
-              <p:tags r:id="rId81"/>
+              <p:tags r:id="rId80"/>
             </p:custDataLst>
           </p:nvPr>
         </p:nvSpPr>
@@ -13810,7 +13738,7 @@
           <p:cNvSpPr txBox="1"/>
           <p:nvPr>
             <p:custDataLst>
-              <p:tags r:id="rId82"/>
+              <p:tags r:id="rId81"/>
             </p:custDataLst>
           </p:nvPr>
         </p:nvSpPr>
@@ -13860,7 +13788,7 @@
           <p:cNvSpPr txBox="1"/>
           <p:nvPr>
             <p:custDataLst>
-              <p:tags r:id="rId83"/>
+              <p:tags r:id="rId82"/>
             </p:custDataLst>
           </p:nvPr>
         </p:nvSpPr>
@@ -13904,7 +13832,7 @@
           <p:cNvSpPr txBox="1"/>
           <p:nvPr>
             <p:custDataLst>
-              <p:tags r:id="rId84"/>
+              <p:tags r:id="rId83"/>
             </p:custDataLst>
           </p:nvPr>
         </p:nvSpPr>
@@ -13925,7 +13853,7 @@
           <a:lstStyle/>
           <a:p>
             <a:r>
-              <a:rPr lang="en-GB" sz="1200" spc="-18">
+              <a:rPr lang="en-GB" sz="1200" spc="-18" dirty="0">
                 <a:solidFill>
                   <a:schemeClr val="dk1"/>
                 </a:solidFill>
@@ -13948,7 +13876,7 @@
           <p:cNvSpPr txBox="1"/>
           <p:nvPr>
             <p:custDataLst>
-              <p:tags r:id="rId85"/>
+              <p:tags r:id="rId84"/>
             </p:custDataLst>
           </p:nvPr>
         </p:nvSpPr>
@@ -13985,7 +13913,7 @@
           <p:cNvSpPr txBox="1"/>
           <p:nvPr>
             <p:custDataLst>
-              <p:tags r:id="rId86"/>
+              <p:tags r:id="rId85"/>
             </p:custDataLst>
           </p:nvPr>
         </p:nvSpPr>
@@ -14026,7 +13954,7 @@
           <p:cNvSpPr txBox="1"/>
           <p:nvPr>
             <p:custDataLst>
-              <p:tags r:id="rId87"/>
+              <p:tags r:id="rId86"/>
             </p:custDataLst>
           </p:nvPr>
         </p:nvSpPr>
@@ -14067,13 +13995,13 @@
           <p:cNvSpPr txBox="1"/>
           <p:nvPr>
             <p:custDataLst>
-              <p:tags r:id="rId88"/>
-            </p:custDataLst>
-          </p:nvPr>
-        </p:nvSpPr>
-        <p:spPr>
-          <a:xfrm>
-            <a:off x="4504329" y="4580307"/>
+              <p:tags r:id="rId87"/>
+            </p:custDataLst>
+          </p:nvPr>
+        </p:nvSpPr>
+        <p:spPr>
+          <a:xfrm>
+            <a:off x="4504329" y="3826415"/>
             <a:ext cx="901700" cy="170519"/>
           </a:xfrm>
           <a:prstGeom prst="rect">
@@ -14112,13 +14040,13 @@
           <p:cNvSpPr txBox="1"/>
           <p:nvPr>
             <p:custDataLst>
-              <p:tags r:id="rId89"/>
-            </p:custDataLst>
-          </p:nvPr>
-        </p:nvSpPr>
-        <p:spPr>
-          <a:xfrm>
-            <a:off x="7939018" y="4588054"/>
+              <p:tags r:id="rId88"/>
+            </p:custDataLst>
+          </p:nvPr>
+        </p:nvSpPr>
+        <p:spPr>
+          <a:xfrm>
+            <a:off x="7939018" y="3834162"/>
             <a:ext cx="762000" cy="155025"/>
           </a:xfrm>
           <a:prstGeom prst="rect">
@@ -14157,7 +14085,7 @@
           <p:cNvSpPr txBox="1"/>
           <p:nvPr>
             <p:custDataLst>
-              <p:tags r:id="rId90"/>
+              <p:tags r:id="rId89"/>
             </p:custDataLst>
           </p:nvPr>
         </p:nvSpPr>
@@ -14194,7 +14122,7 @@
           <p:cNvSpPr txBox="1"/>
           <p:nvPr>
             <p:custDataLst>
-              <p:tags r:id="rId91"/>
+              <p:tags r:id="rId90"/>
             </p:custDataLst>
           </p:nvPr>
         </p:nvSpPr>
@@ -14231,7 +14159,7 @@
           <p:cNvSpPr txBox="1"/>
           <p:nvPr>
             <p:custDataLst>
-              <p:tags r:id="rId92"/>
+              <p:tags r:id="rId91"/>
             </p:custDataLst>
           </p:nvPr>
         </p:nvSpPr>
@@ -14272,7 +14200,7 @@
           <p:cNvSpPr txBox="1"/>
           <p:nvPr>
             <p:custDataLst>
-              <p:tags r:id="rId93"/>
+              <p:tags r:id="rId92"/>
             </p:custDataLst>
           </p:nvPr>
         </p:nvSpPr>
@@ -14313,13 +14241,13 @@
           <p:cNvSpPr txBox="1"/>
           <p:nvPr>
             <p:custDataLst>
-              <p:tags r:id="rId94"/>
-            </p:custDataLst>
-          </p:nvPr>
-        </p:nvSpPr>
-        <p:spPr>
-          <a:xfrm>
-            <a:off x="4462419" y="4847007"/>
+              <p:tags r:id="rId93"/>
+            </p:custDataLst>
+          </p:nvPr>
+        </p:nvSpPr>
+        <p:spPr>
+          <a:xfrm>
+            <a:off x="4462419" y="4093115"/>
             <a:ext cx="939800" cy="170519"/>
           </a:xfrm>
           <a:prstGeom prst="rect">
@@ -14358,13 +14286,13 @@
           <p:cNvSpPr txBox="1"/>
           <p:nvPr>
             <p:custDataLst>
-              <p:tags r:id="rId95"/>
-            </p:custDataLst>
-          </p:nvPr>
-        </p:nvSpPr>
-        <p:spPr>
-          <a:xfrm>
-            <a:off x="7939018" y="4854754"/>
+              <p:tags r:id="rId94"/>
+            </p:custDataLst>
+          </p:nvPr>
+        </p:nvSpPr>
+        <p:spPr>
+          <a:xfrm>
+            <a:off x="7939018" y="4100862"/>
             <a:ext cx="762000" cy="155025"/>
           </a:xfrm>
           <a:prstGeom prst="rect">
@@ -14403,7 +14331,7 @@
           <p:cNvSpPr txBox="1"/>
           <p:nvPr>
             <p:custDataLst>
-              <p:tags r:id="rId96"/>
+              <p:tags r:id="rId95"/>
             </p:custDataLst>
           </p:nvPr>
         </p:nvSpPr>
@@ -14440,7 +14368,7 @@
           <p:cNvSpPr txBox="1"/>
           <p:nvPr>
             <p:custDataLst>
-              <p:tags r:id="rId97"/>
+              <p:tags r:id="rId96"/>
             </p:custDataLst>
           </p:nvPr>
         </p:nvSpPr>
@@ -14477,7 +14405,7 @@
           <p:cNvSpPr txBox="1"/>
           <p:nvPr>
             <p:custDataLst>
-              <p:tags r:id="rId98"/>
+              <p:tags r:id="rId97"/>
             </p:custDataLst>
           </p:nvPr>
         </p:nvSpPr>
@@ -14518,7 +14446,7 @@
           <p:cNvSpPr txBox="1"/>
           <p:nvPr>
             <p:custDataLst>
-              <p:tags r:id="rId99"/>
+              <p:tags r:id="rId98"/>
             </p:custDataLst>
           </p:nvPr>
         </p:nvSpPr>
@@ -14559,13 +14487,13 @@
           <p:cNvSpPr txBox="1"/>
           <p:nvPr>
             <p:custDataLst>
-              <p:tags r:id="rId100"/>
-            </p:custDataLst>
-          </p:nvPr>
-        </p:nvSpPr>
-        <p:spPr>
-          <a:xfrm>
-            <a:off x="5960699" y="5189907"/>
+              <p:tags r:id="rId99"/>
+            </p:custDataLst>
+          </p:nvPr>
+        </p:nvSpPr>
+        <p:spPr>
+          <a:xfrm>
+            <a:off x="5960699" y="4436015"/>
             <a:ext cx="825500" cy="170519"/>
           </a:xfrm>
           <a:prstGeom prst="rect">
@@ -14604,13 +14532,13 @@
           <p:cNvSpPr txBox="1"/>
           <p:nvPr>
             <p:custDataLst>
-              <p:tags r:id="rId101"/>
-            </p:custDataLst>
-          </p:nvPr>
-        </p:nvSpPr>
-        <p:spPr>
-          <a:xfrm>
-            <a:off x="8645041" y="5197654"/>
+              <p:tags r:id="rId100"/>
+            </p:custDataLst>
+          </p:nvPr>
+        </p:nvSpPr>
+        <p:spPr>
+          <a:xfrm>
+            <a:off x="8645041" y="4443762"/>
             <a:ext cx="736600" cy="155025"/>
           </a:xfrm>
           <a:prstGeom prst="rect">
@@ -14649,7 +14577,7 @@
           <p:cNvSpPr txBox="1"/>
           <p:nvPr>
             <p:custDataLst>
-              <p:tags r:id="rId102"/>
+              <p:tags r:id="rId101"/>
             </p:custDataLst>
           </p:nvPr>
         </p:nvSpPr>
@@ -14686,7 +14614,7 @@
           <p:cNvSpPr txBox="1"/>
           <p:nvPr>
             <p:custDataLst>
-              <p:tags r:id="rId103"/>
+              <p:tags r:id="rId102"/>
             </p:custDataLst>
           </p:nvPr>
         </p:nvSpPr>
@@ -14723,7 +14651,7 @@
           <p:cNvSpPr txBox="1"/>
           <p:nvPr>
             <p:custDataLst>
-              <p:tags r:id="rId104"/>
+              <p:tags r:id="rId103"/>
             </p:custDataLst>
           </p:nvPr>
         </p:nvSpPr>
@@ -14764,7 +14692,7 @@
           <p:cNvSpPr txBox="1"/>
           <p:nvPr>
             <p:custDataLst>
-              <p:tags r:id="rId105"/>
+              <p:tags r:id="rId104"/>
             </p:custDataLst>
           </p:nvPr>
         </p:nvSpPr>
@@ -14805,13 +14733,13 @@
           <p:cNvSpPr txBox="1"/>
           <p:nvPr>
             <p:custDataLst>
-              <p:tags r:id="rId106"/>
-            </p:custDataLst>
-          </p:nvPr>
-        </p:nvSpPr>
-        <p:spPr>
-          <a:xfrm>
-            <a:off x="6027367" y="5532807"/>
+              <p:tags r:id="rId105"/>
+            </p:custDataLst>
+          </p:nvPr>
+        </p:nvSpPr>
+        <p:spPr>
+          <a:xfrm>
+            <a:off x="6027367" y="4778915"/>
             <a:ext cx="901700" cy="170519"/>
           </a:xfrm>
           <a:prstGeom prst="rect">
@@ -14849,13 +14777,13 @@
           <p:cNvSpPr txBox="1"/>
           <p:nvPr>
             <p:custDataLst>
-              <p:tags r:id="rId107"/>
-            </p:custDataLst>
-          </p:nvPr>
-        </p:nvSpPr>
-        <p:spPr>
-          <a:xfrm>
-            <a:off x="3764428" y="5540554"/>
+              <p:tags r:id="rId106"/>
+            </p:custDataLst>
+          </p:nvPr>
+        </p:nvSpPr>
+        <p:spPr>
+          <a:xfrm>
+            <a:off x="3764428" y="4786662"/>
             <a:ext cx="800100" cy="155025"/>
           </a:xfrm>
           <a:prstGeom prst="rect">
@@ -14894,7 +14822,7 @@
           <p:cNvSpPr txBox="1"/>
           <p:nvPr>
             <p:custDataLst>
-              <p:tags r:id="rId108"/>
+              <p:tags r:id="rId107"/>
             </p:custDataLst>
           </p:nvPr>
         </p:nvSpPr>
@@ -14931,7 +14859,7 @@
           <p:cNvSpPr txBox="1"/>
           <p:nvPr>
             <p:custDataLst>
-              <p:tags r:id="rId109"/>
+              <p:tags r:id="rId108"/>
             </p:custDataLst>
           </p:nvPr>
         </p:nvSpPr>
@@ -14968,7 +14896,7 @@
           <p:cNvSpPr txBox="1"/>
           <p:nvPr>
             <p:custDataLst>
-              <p:tags r:id="rId110"/>
+              <p:tags r:id="rId109"/>
             </p:custDataLst>
           </p:nvPr>
         </p:nvSpPr>
@@ -15009,7 +14937,7 @@
           <p:cNvSpPr txBox="1"/>
           <p:nvPr>
             <p:custDataLst>
-              <p:tags r:id="rId111"/>
+              <p:tags r:id="rId110"/>
             </p:custDataLst>
           </p:nvPr>
         </p:nvSpPr>
@@ -15050,13 +14978,13 @@
           <p:cNvSpPr txBox="1"/>
           <p:nvPr>
             <p:custDataLst>
-              <p:tags r:id="rId112"/>
-            </p:custDataLst>
-          </p:nvPr>
-        </p:nvSpPr>
-        <p:spPr>
-          <a:xfrm>
-            <a:off x="1621251" y="5799507"/>
+              <p:tags r:id="rId111"/>
+            </p:custDataLst>
+          </p:nvPr>
+        </p:nvSpPr>
+        <p:spPr>
+          <a:xfrm>
+            <a:off x="1621251" y="5045615"/>
             <a:ext cx="685800" cy="170519"/>
           </a:xfrm>
           <a:prstGeom prst="rect">
@@ -15095,13 +15023,13 @@
           <p:cNvSpPr txBox="1"/>
           <p:nvPr>
             <p:custDataLst>
-              <p:tags r:id="rId113"/>
-            </p:custDataLst>
-          </p:nvPr>
-        </p:nvSpPr>
-        <p:spPr>
-          <a:xfrm>
-            <a:off x="6358032" y="5807254"/>
+              <p:tags r:id="rId112"/>
+            </p:custDataLst>
+          </p:nvPr>
+        </p:nvSpPr>
+        <p:spPr>
+          <a:xfrm>
+            <a:off x="6358032" y="5053362"/>
             <a:ext cx="825500" cy="155025"/>
           </a:xfrm>
           <a:prstGeom prst="rect">
@@ -15140,7 +15068,7 @@
           <p:cNvSpPr txBox="1"/>
           <p:nvPr>
             <p:custDataLst>
-              <p:tags r:id="rId114"/>
+              <p:tags r:id="rId113"/>
             </p:custDataLst>
           </p:nvPr>
         </p:nvSpPr>
@@ -15165,51 +15093,6 @@
           </a:p>
         </p:txBody>
       </p:sp>
-      <p:sp>
-        <p:nvSpPr>
-          <p:cNvPr id="171" name="OTLSHAPE_TB_00000000000000000000000000000000_TodayMarkerText">
-            <a:extLst>
-              <a:ext uri="{FF2B5EF4-FFF2-40B4-BE49-F238E27FC236}">
-                <a16:creationId xmlns:a16="http://schemas.microsoft.com/office/drawing/2014/main" id="{3C0D88D0-CA85-4FE5-B20B-61DD15179E40}"/>
-              </a:ext>
-            </a:extLst>
-          </p:cNvPr>
-          <p:cNvSpPr txBox="1"/>
-          <p:nvPr>
-            <p:custDataLst>
-              <p:tags r:id="rId115"/>
-            </p:custDataLst>
-          </p:nvPr>
-        </p:nvSpPr>
-        <p:spPr>
-          <a:xfrm>
-            <a:off x="5141733" y="1552226"/>
-            <a:ext cx="368300" cy="186055"/>
-          </a:xfrm>
-          <a:prstGeom prst="rect">
-            <a:avLst/>
-          </a:prstGeom>
-          <a:noFill/>
-        </p:spPr>
-        <p:txBody>
-          <a:bodyPr vert="horz" wrap="none" lIns="0" tIns="0" rIns="0" bIns="0" rtlCol="0" anchor="ctr" anchorCtr="0">
-            <a:spAutoFit/>
-          </a:bodyPr>
-          <a:lstStyle/>
-          <a:p>
-            <a:pPr algn="ctr"/>
-            <a:r>
-              <a:rPr lang="en-GB" sz="1200" spc="-12" dirty="0">
-                <a:solidFill>
-                  <a:schemeClr val="dk1"/>
-                </a:solidFill>
-                <a:latin typeface="Calibri" panose="020F0502020204030204" pitchFamily="34" charset="0"/>
-              </a:rPr>
-              <a:t>Today</a:t>
-            </a:r>
-          </a:p>
-        </p:txBody>
-      </p:sp>
       <p:cxnSp>
         <p:nvCxnSpPr>
           <p:cNvPr id="162" name="OTLSHAPE_TB_00000000000000000000000000000000_Separator1">
@@ -15222,7 +15105,7 @@
           <p:cNvCxnSpPr/>
           <p:nvPr>
             <p:custDataLst>
-              <p:tags r:id="rId116"/>
+              <p:tags r:id="rId114"/>
             </p:custDataLst>
           </p:nvPr>
         </p:nvCxnSpPr>
@@ -15273,7 +15156,7 @@
           <p:cNvCxnSpPr/>
           <p:nvPr>
             <p:custDataLst>
-              <p:tags r:id="rId117"/>
+              <p:tags r:id="rId115"/>
             </p:custDataLst>
           </p:nvPr>
         </p:nvCxnSpPr>
@@ -15324,7 +15207,7 @@
           <p:cNvCxnSpPr/>
           <p:nvPr>
             <p:custDataLst>
-              <p:tags r:id="rId118"/>
+              <p:tags r:id="rId116"/>
             </p:custDataLst>
           </p:nvPr>
         </p:nvCxnSpPr>
@@ -15375,7 +15258,7 @@
           <p:cNvCxnSpPr/>
           <p:nvPr>
             <p:custDataLst>
-              <p:tags r:id="rId119"/>
+              <p:tags r:id="rId117"/>
             </p:custDataLst>
           </p:nvPr>
         </p:nvCxnSpPr>
@@ -15426,7 +15309,7 @@
           <p:cNvCxnSpPr/>
           <p:nvPr>
             <p:custDataLst>
-              <p:tags r:id="rId120"/>
+              <p:tags r:id="rId118"/>
             </p:custDataLst>
           </p:nvPr>
         </p:nvCxnSpPr>
@@ -15477,7 +15360,7 @@
           <p:cNvCxnSpPr/>
           <p:nvPr>
             <p:custDataLst>
-              <p:tags r:id="rId121"/>
+              <p:tags r:id="rId119"/>
             </p:custDataLst>
           </p:nvPr>
         </p:nvCxnSpPr>
@@ -15518,63 +15401,28 @@
       </p:cxnSp>
       <p:sp>
         <p:nvSpPr>
-          <p:cNvPr id="133" name="OTLSHAPE_SLT_10e909a896d14618b53863625d69ab6f_Shape">
-            <a:extLst>
-              <a:ext uri="{FF2B5EF4-FFF2-40B4-BE49-F238E27FC236}">
-                <a16:creationId xmlns:a16="http://schemas.microsoft.com/office/drawing/2014/main" id="{0CD3C7A2-0676-4D14-B52F-CEFFD1F73595}"/>
+          <p:cNvPr id="3" name="OTLSHAPE_TB_00000000000000000000000000000000_TodayMarkerShape" hidden="1">
+            <a:extLst>
+              <a:ext uri="{FF2B5EF4-FFF2-40B4-BE49-F238E27FC236}">
+                <a16:creationId xmlns:a16="http://schemas.microsoft.com/office/drawing/2014/main" id="{E473CB9C-786D-4D2C-9E81-8D3F1058488B}"/>
               </a:ext>
             </a:extLst>
           </p:cNvPr>
           <p:cNvSpPr/>
           <p:nvPr>
             <p:custDataLst>
-              <p:tags r:id="rId122"/>
-            </p:custDataLst>
-          </p:nvPr>
-        </p:nvSpPr>
-        <p:spPr>
-          <a:xfrm>
-            <a:off x="3924545" y="3737247"/>
-            <a:ext cx="1485900" cy="127000"/>
-          </a:xfrm>
-          <a:prstGeom prst="roundRect">
-            <a:avLst/>
-          </a:prstGeom>
-          <a:solidFill>
-            <a:schemeClr val="accent1"/>
-          </a:solidFill>
-          <a:ln w="12700" cap="flat" cmpd="sng" algn="ctr">
-            <a:noFill/>
-            <a:prstDash val="solid"/>
-            <a:miter lim="800000"/>
-          </a:ln>
-          <a:effectLst/>
-          <a:extLst>
-            <a:ext uri="{91240B29-F687-4F45-9708-019B960494DF}">
-              <a14:hiddenLine xmlns:a14="http://schemas.microsoft.com/office/drawing/2010/main" w="12700" cap="flat" cmpd="sng" algn="ctr">
-                <a:solidFill>
-                  <a:schemeClr val="accent1">
-                    <a:shade val="50000"/>
-                  </a:schemeClr>
-                </a:solidFill>
-                <a:prstDash val="solid"/>
-                <a:miter lim="800000"/>
-              </a14:hiddenLine>
-            </a:ext>
-            <a:ext uri="{31F19639-BCED-4A60-ADC4-E9642A236FB7}">
-              <a14:hiddenScene3d xmlns:a14="http://schemas.microsoft.com/office/drawing/2010/main">
-                <a:camera prst="orthographicFront"/>
-                <a:lightRig rig="balanced" dir="t">
-                  <a:rot lat="0" lon="0" rev="8700000"/>
-                </a:lightRig>
-              </a14:hiddenScene3d>
-            </a:ext>
-            <a:ext uri="{E45631CC-5BF2-4C18-A39C-3461C7D3F71A}">
-              <a14:hiddenSp3d xmlns:a14="http://schemas.microsoft.com/office/drawing/2010/main">
-                <a:bevelT w="165100" h="12700"/>
-              </a14:hiddenSp3d>
-            </a:ext>
-          </a:extLst>
+              <p:tags r:id="rId120"/>
+            </p:custDataLst>
+          </p:nvPr>
+        </p:nvSpPr>
+        <p:spPr>
+          <a:xfrm>
+            <a:off x="12700" y="12700"/>
+            <a:ext cx="0" cy="0"/>
+          </a:xfrm>
+          <a:prstGeom prst="triangle">
+            <a:avLst/>
+          </a:prstGeom>
         </p:spPr>
         <p:style>
           <a:lnRef idx="2">
@@ -15603,24 +15451,24 @@
       </p:sp>
       <p:sp>
         <p:nvSpPr>
-          <p:cNvPr id="134" name="OTLSHAPE_SLT_10e909a896d14618b53863625d69ab6f_JoinedDate">
-            <a:extLst>
-              <a:ext uri="{FF2B5EF4-FFF2-40B4-BE49-F238E27FC236}">
-                <a16:creationId xmlns:a16="http://schemas.microsoft.com/office/drawing/2014/main" id="{65BE42F7-E100-4382-9E20-3BE42BE1F045}"/>
+          <p:cNvPr id="4" name="OTLSHAPE_TB_00000000000000000000000000000000_TodayMarkerText" hidden="1">
+            <a:extLst>
+              <a:ext uri="{FF2B5EF4-FFF2-40B4-BE49-F238E27FC236}">
+                <a16:creationId xmlns:a16="http://schemas.microsoft.com/office/drawing/2014/main" id="{BC6F2910-4C42-4907-83F6-85018206F675}"/>
               </a:ext>
             </a:extLst>
           </p:cNvPr>
           <p:cNvSpPr txBox="1"/>
           <p:nvPr>
             <p:custDataLst>
-              <p:tags r:id="rId123"/>
-            </p:custDataLst>
-          </p:nvPr>
-        </p:nvSpPr>
-        <p:spPr>
-          <a:xfrm>
-            <a:off x="3190442" y="3723235"/>
-            <a:ext cx="685800" cy="155025"/>
+              <p:tags r:id="rId121"/>
+            </p:custDataLst>
+          </p:nvPr>
+        </p:nvSpPr>
+        <p:spPr>
+          <a:xfrm>
+            <a:off x="12700" y="12700"/>
+            <a:ext cx="0" cy="276999"/>
           </a:xfrm>
           <a:prstGeom prst="rect">
             <a:avLst/>
@@ -15633,60 +15481,8 @@
           </a:bodyPr>
           <a:lstStyle/>
           <a:p>
-            <a:pPr algn="r"/>
-            <a:r>
-              <a:rPr lang="en-GB" sz="1000" spc="-4">
-                <a:solidFill>
-                  <a:schemeClr val="dk2"/>
-                </a:solidFill>
-                <a:latin typeface="Calibri" panose="020F0502020204030204" pitchFamily="34" charset="0"/>
-              </a:rPr>
-              <a:t>Nov 1 - Dec 1</a:t>
-            </a:r>
-          </a:p>
-        </p:txBody>
-      </p:sp>
-      <p:sp>
-        <p:nvSpPr>
-          <p:cNvPr id="135" name="OTLSHAPE_SLT_10e909a896d14618b53863625d69ab6f_Title">
-            <a:extLst>
-              <a:ext uri="{FF2B5EF4-FFF2-40B4-BE49-F238E27FC236}">
-                <a16:creationId xmlns:a16="http://schemas.microsoft.com/office/drawing/2014/main" id="{0A03D9B8-7D7E-4818-82BF-ACC1E49DC9D8}"/>
-              </a:ext>
-            </a:extLst>
-          </p:cNvPr>
-          <p:cNvSpPr txBox="1"/>
-          <p:nvPr>
-            <p:custDataLst>
-              <p:tags r:id="rId124"/>
-            </p:custDataLst>
-          </p:nvPr>
-        </p:nvSpPr>
-        <p:spPr>
-          <a:xfrm>
-            <a:off x="5455869" y="3716109"/>
-            <a:ext cx="2798049" cy="169277"/>
-          </a:xfrm>
-          <a:prstGeom prst="rect">
-            <a:avLst/>
-          </a:prstGeom>
-          <a:noFill/>
-        </p:spPr>
-        <p:txBody>
-          <a:bodyPr vert="horz" wrap="square" lIns="0" tIns="0" rIns="0" bIns="0" rtlCol="0" anchor="ctr" anchorCtr="0">
-            <a:spAutoFit/>
-          </a:bodyPr>
-          <a:lstStyle/>
-          <a:p>
-            <a:r>
-              <a:rPr lang="en-GB" sz="1100" b="1" spc="-6" dirty="0">
-                <a:solidFill>
-                  <a:schemeClr val="dk1"/>
-                </a:solidFill>
-                <a:latin typeface="Calibri" panose="020F0502020204030204" pitchFamily="34" charset="0"/>
-              </a:rPr>
-              <a:t>Prototype level re-generation</a:t>
-            </a:r>
+            <a:pPr algn="ctr"/>
+            <a:endParaRPr lang="en-GB"/>
           </a:p>
         </p:txBody>
       </p:sp>
@@ -15841,7 +15637,7 @@
 
 <file path=ppt/tags/tag119.xml><?xml version="1.0" encoding="utf-8"?>
 <p:tagLst xmlns:a="http://schemas.openxmlformats.org/drawingml/2006/main" xmlns:r="http://schemas.openxmlformats.org/officeDocument/2006/relationships" xmlns:p="http://schemas.openxmlformats.org/presentationml/2006/main">
-  <p:tag name="__PART_0" val="eyIkaWQiOiIxIiwiQ3VsdHVyZUluZm9OYW1lIjoiZW4tVVMiLCJTdHlsZU5hbWUiOm51bGwsIlZlcnNpb24iOnsiJGlkIjoiMiIsIlZlcnNpb24iOiIzLjIuMCIsIk9yaWdpbmFsQXNzZW1ibHlWZXJzaW9uIjoiNC4wMS4wMC4wMCIsIkVkaXRpb24iOiJGcmVlIiwiSXNQbHVzRWRpdGlvbiI6ZmFsc2UsIklzUHJvRWRpdGlvbiI6ZmFsc2V9LCJFZmZlY3QiOjAsIlN0eWxlIjp7IiRpZCI6IjMiLCJUaW1lYmFuZFN0eWxlIjp7IiRpZCI6IjQiLCJTY2FsZU1hcmtpbmciOjAsIlNoYXBlIjoxMywiU2hhcGVTdHlsZSI6eyIkaWQiOiI1IiwiTWFyZ2luIjp7IiRpZCI6IjYiLCJUb3AiOjAsIkxlZnQiOjEwLCJSaWdodCI6MTAsIkJvdHRvbSI6MH0sIlBhZGRpbmciOnsiJGlkIjoiNyIsIlRvcCI6NSwiTGVmdCI6MTMsIlJpZ2h0IjoxMywiQm90dG9tIjo1fSwiQmFja2dyb3VuZCI6eyIkaWQiOiI4IiwiQ29sb3IiOnsiJGlkIjoiOSIsIkEiOjI1NSwiUiI6MjMxLCJHIjoyMzAsIkIiOjIzMH19LCJJc1Zpc2libGUiOnRydWUsIldpZHRoIjo4NTguMCwiSGVpZ2h0IjozMC4wLCJCb3JkZXJTdHlsZSI6eyIkaWQiOiIxMCIsIkxpbmVDb2xvciI6eyIkaWQiOiIxMSIsIiR0eXBlIjoiTkxSRS5Db21tb24uRG9tLlNvbGlkQ29sb3JCcnVzaCwgTkxSRS5Db21tb24iLCJDb2xvciI6eyIkaWQiOiIxMiIsIkEiOjI1NSwiUiI6MjU1LCJHIjowLCJCIjowfX0sIkxpbmVXZWlnaHQiOjAuMCwiTGluZVR5cGUiOjAsIlBhcmVudFN0eWxlIjpudWxsfSwiUGFyZW50U3R5bGUiOm51bGx9LCJSaWdodEVuZENhcHNTdHlsZSI6eyIkaWQiOiIxMyIsIkZvbnRTZXR0aW5ncyI6eyIkaWQiOiIxNCIsIkZvbnRTaXplIjoxOCwiRm9udE5hbWUiOiJDYWxpYnJpIiwiSXNCb2xkIjp0cnVlLCJJc0l0YWxpYyI6ZmFsc2UsIklzVW5kZXJsaW5lZCI6ZmFsc2UsIlBhcmVudFN0eWxlIjpudWxsfSwiQXV0b1NpemUiOjAsIkZvcmVncm91bmQiOnsiJGlkIjoiMTUiLCJDb2xvciI6eyIkaWQiOiIxNiIsIkEiOjI1NSwiUiI6MCwiRyI6MCwiQiI6MH19LCJNYXhXaWR0aCI6IkluZmluaXR5IiwiTWF4SGVpZ2h0IjoiSW5maW5pdHkiLCJTbWFydEZvcmVncm91bmRJc0FjdGl2ZSI6ZmFsc2UsIkhvcml6b250YWxBbGlnbm1lbnQiOjAsIlZlcnRpY2FsQWxpZ25tZW50IjowLCJTbWFydEZvcmVncm91bmQiOm51bGwsIkJhY2tncm91bmRGaWxsVHlwZSI6MCwiTWFyZ2luIjp7IiRpZCI6IjE3IiwiVG9wIjowLCJMZWZ0IjowLCJSaWdodCI6MjAsIkJvdHRvbSI6MH0sIlBhZGRpbmciOnsiJGlkIjoiMTgiLCJUb3AiOjAsIkxlZnQiOjAsIlJpZ2h0IjowLCJCb3R0b20iOjB9LCJCYWNrZ3JvdW5kIjp7IiRpZCI6IjE5IiwiQ29sb3IiOnsiJGlkIjoiMjAiLCJBIjo4OSwiUiI6MCwiRyI6MCwiQiI6MH19LCJJc1Zpc2libGUiOmZhbHNlLCJXaWR0aCI6MC4wLCJIZWlnaHQiOjAuMCwiQm9yZGVyU3R5bGUiOm51bGwsIlBhcmVudFN0eWxlIjpudWxsfSwiTGVmdEVuZENhcHNTdHlsZSI6eyIkaWQiOiIyMSIsIkZvbnRTZXR0aW5ncyI6eyIkaWQiOiIyMiIsIkZvbnRTaXplIjoxOCwiRm9udE5hbWUiOiJDYWxpYnJpIiwiSXNCb2xkIjp0cnVlLCJJc0l0YWxpYyI6ZmFsc2UsIklzVW5kZXJsaW5lZCI6ZmFsc2UsIlBhcmVudFN0eWxlIjpudWxsfSwiQXV0b1NpemUiOjAsIkZvcmVncm91bmQiOnsiJGlkIjoiMjMiLCJDb2xvciI6eyIkaWQiOiIyNCIsIkEiOjI1NSwiUiI6MjM3LCJHIjoxMjUsIkIiOjQ5fX0sIk1heFdpZHRoIjoiSW5maW5pdHkiLCJNYXhIZWlnaHQiOiJJbmZpbml0eSIsIlNtYXJ0Rm9yZWdyb3VuZElzQWN0aXZlIjpmYWxzZSwiSG9yaXpvbnRhbEFsaWdubWVudCI6MCwiVmVydGljYWxBbGlnbm1lbnQiOjAsIlNtYXJ0Rm9yZWdyb3VuZCI6bnVsbCwiQmFja2dyb3VuZEZpbGxUeXBlIjowLCJNYXJnaW4iOnsiJGlkIjoiMjUiLCJUb3AiOjAsIkxlZnQiOjIwLCJSaWdodCI6MCwiQm90dG9tIjowfSwiUGFkZGluZyI6eyIkaWQiOiIyNiIsIlRvcCI6MCwiTGVmdCI6MCwiUmlnaHQiOjAsIkJvdHRvbSI6MH0sIkJhY2tncm91bmQiOnsiJGlkIjoiMjciLCJDb2xvciI6eyIkcmVmIjoiMjAifX0sIklzVmlzaWJsZSI6ZmFsc2UsIldpZHRoIjowLjAsIkhlaWdodCI6MC4wLCJCb3JkZXJTdHlsZSI6bnVsbCwiUGFyZW50U3R5bGUiOm51bGx9LCJUb2RheVRleHRTdHlsZSI6eyIkaWQiOiIyOCIsIkZvbnRTZXR0aW5ncyI6eyIkaWQiOiIyOSIsIkZvbnRTaXplIjoxMiwiRm9udE5hbWUiOiJDYWxpYnJpIiwiSXNCb2xkIjpmYWxzZSwiSXNJdGFsaWMiOmZhbHNlLCJJc1VuZGVybGluZWQiOmZhbHNlLCJQYXJlbnRTdHlsZSI6bnVsbH0sIkF1dG9TaXplIjowLCJGb3JlZ3JvdW5kIjp7IiRpZCI6IjMwIiwiQ29sb3IiOnsiJGlkIjoiMzEiLCJBIjoyNTUsIlIiOjAsIkciOjAsIkIiOjB9fSwiTWF4V2lkdGgiOjIwMC4wLCJNYXhIZWlnaHQiOiJJbmZpbml0eSIsIlNtYXJ0Rm9yZWdyb3VuZElzQWN0aXZlIjpmYWxzZSwiSG9yaXpvbnRhbEFsaWdubWVudCI6MCwiVmVydGljYWxBbGlnbm1lbnQiOjAsIlNtYXJ0Rm9yZWdyb3VuZCI6bnVsbCwiQmFja2dyb3VuZEZpbGxUeXBlIjowLCJNYXJnaW4iOnsiJGlkIjoiMzIiLCJUb3AiOjAsIkxlZnQiOjAsIlJpZ2h0IjowLCJCb3R0b20iOjB9LCJQYWRkaW5nIjp7IiRpZCI6IjMzIiwiVG9wIjowLCJMZWZ0IjowLCJSaWdodCI6MCwiQm90dG9tIjowfSwiQmFja2dyb3VuZCI6eyIkaWQiOiIzNCIsIkNvbG9yIjp7IiRyZWYiOiIyMCJ9fSwiSXNWaXNpYmxlIjp0cnVlLCJXaWR0aCI6MC4wLCJIZWlnaHQiOjAuMCwiQm9yZGVyU3R5bGUiOm51bGwsIlBhcmVudFN0eWxlIjpudWxsfSwiVG9kYXlNYXJrZXJTdHlsZSI6eyIkaWQiOiIzNSIsIk1hcmdpbiI6eyIkaWQiOiIzNiIsIlRvcCI6MCwiTGVmdCI6MCwiUmlnaHQiOjAsIkJvdHRvbSI6MH0sIlBhZGRpbmciOnsiJGlkIjoiMzciLCJUb3AiOjAsIkxlZnQiOjAsIlJpZ2h0IjowLCJCb3R0b20iOjB9LCJCYWNrZ3JvdW5kIjp7IiRpZCI6IjM4IiwiQ29sb3IiOnsiJGlkIjoiMzkiLCJBIjoyNTUsIlIiOjI1NSwiRyI6MCwiQiI6MH19LCJJc1Zpc2libGUiOnRydWUsIldpZHRoIjowLjAsIkhlaWdodCI6MC4wLCJCb3JkZXJTdHlsZSI6bnVsbCwiUGFyZW50U3R5bGUiOm51bGx9LCJTY2FsZVN0eWxlIjp7IiRpZCI6IjQwIiwiU2hvd1NlZ21lbnRTZXBhcmF0b3JzIjp0cnVlLCJTZWdtZW50U2VwYXJhdG9yT3BhY2l0eSI6MzAsIkZvbnRTZXR0aW5ncyI6eyIkaWQiOiI0MSIsIkZvbnRTaXplIjoxMiwiRm9udE5hbWUiOiJDYWxpYnJpIiwiSXNCb2xkIjpmYWxzZSwiSXNJdGFsaWMiOmZhbHNlLCJJc1VuZGVybGluZWQiOmZhbHNlLCJQYXJlbnRTdHlsZSI6bnVsbH0sIkF1dG9TaXplIjowLCJGb3JlZ3JvdW5kIjp7IiRpZCI6IjQyIiwiQ29sb3IiOnsiJGlkIjoiNDMiLCJBIjoyNTUsIlIiOjAsIkciOjAsIkIiOjB9fSwiTWF4V2lkdGgiOjIwMC4wLCJNYXhIZWlnaHQiOiJJbmZpbml0eSIsIlNtYXJ0Rm9yZWdyb3VuZElzQWN0aXZlIjpmYWxzZSwiSG9yaXpvbnRhbEFsaWdubWVudCI6MCwiVmVydGljYWxBbGlnbm1lbnQiOjEsIlNtYXJ0Rm9yZWdyb3VuZCI6bnVsbCwiQmFja2dyb3VuZEZpbGxUeXBlIjowLCJNYXJnaW4iOnsiJGlkIjoiNDQiLCJUb3AiOjAsIkxlZnQiOjUsIlJpZ2h0IjowLCJCb3R0b20iOjB9LCJQYWRkaW5nIjp7IiRpZCI6IjQ1IiwiVG9wIjowLCJMZWZ0IjowLCJSaWdodCI6MCwiQm90dG9tIjowfSwiQmFja2dyb3VuZCI6eyIkaWQiOiI0NiIsIkNvbG9yIjp7IiRyZWYiOiIyMCJ9fSwiSXNWaXNpYmxlIjp0cnVlLCJXaWR0aCI6MC4wLCJIZWlnaHQiOjAuMCwiQm9yZGVyU3R5bGUiOm51bGwsIlBhcmVudFN0eWxlIjpudWxsfSwiRWxhcHNlZFRpbWVCYWNrZ3JvdW5kIjp7IiRpZCI6IjQ3IiwiQ29sb3IiOnsiJGlkIjoiNDgiLCJBIjo3NiwiUiI6MTUwLCJHIjoyMTQsIkIiOjY2fX0sIkFwcGVuZFllYXJPblllYXJDaGFuZ2UiOnRydWUsIkVsYXBzZWRUaW1lRm9ybWF0IjoxLCJUb2RheU1hcmtlclBvc2l0aW9uIjoxLCJRdWlja1Bvc2l0aW9uIjozLCJBYnNvbHV0ZVBvc2l0aW9uIjoxNDYuODcyNTEzLCJNYXJnaW4iOnsiJGlkIjoiNDkiLCJUb3AiOjAsIkxlZnQiOjEwLCJSaWdodCI6MTAsIkJvdHRvbSI6MH0sIlBhZGRpbmciOnsiJGlkIjoiNTAiLCJUb3AiOjAsIkxlZnQiOjAsIlJpZ2h0IjowLCJCb3R0b20iOjB9LCJCYWNrZ3JvdW5kIjp7IiRpZCI6IjUxIiwiQ29sb3IiOnsiJGlkIjoiNTIiLCJBIjoyNTUsIlIiOjQ3LCJHIjo1NCwiQiI6MTUzfX0sIklzVmlzaWJsZSI6dHJ1ZSwiV2lkdGgiOjAuMCwiSGVpZ2h0IjowLjAsIkJvcmRlclN0eWxlIjpudWxsLCJQYXJlbnRTdHlsZSI6bnVsbH0sIkRlZmF1bHRNaWxlc3RvbmVTdHlsZSI6eyIkaWQiOiI1MyIsIlNoYXBlIjowLCJDb25uZWN0b3JNYXJnaW4iOnsiJGlkIjoiNTQiLCJUb3AiOjAsIkxlZnQiOjIsIlJpZ2h0IjoyLCJCb3R0b20iOjB9LCJDb25uZWN0b3JTdHlsZSI6eyIkaWQiOiI1NSIsIkxpbmVDb2xvciI6eyIkaWQiOiI1NiIsIiR0eXBlIjoiTkxSRS5Db21tb24uRG9tLlNvbGlkQ29sb3JCcnVzaCwgTkxSRS5Db21tb24iLCJDb2xvciI6eyIkaWQiOiI1NyIsIkEiOjEyNywiUiI6NzksIkciOjEyOSwiQiI6MTg5fX0sIkxpbmVXZWlnaHQiOjEuMCwiTGluZVR5cGUiOjAsIlBhcmVudFN0eWxlIjpudWxsfSwiSXNCZWxvd1RpbWViYW5kIjpmYWxzZSwiUG9zaXRpb25PblRhc2siOjAsIkhpZGVEYXRlIjpmYWxzZSwiU2hhcGVTaXplIjoxLCJTcGFjaW5nIjoyLjAsIlBhZGRpbmciOnsiJGlkIjoiNTgiLCJUb3AiOjcsIkxlZnQiOjMsIlJpZ2h0IjowLCJCb3R0b20iOjJ9LCJTaGFwZVN0eWxlIjp7IiRpZCI6IjU5IiwiTWFyZ2luIjp7IiRpZCI6IjYwIiwiVG9wIjowLCJMZWZ0IjowLCJSaWdodCI6MCwiQm90dG9tIjowfSwiUGFkZGluZyI6eyIkaWQiOiI2MSIsIlRvcCI6MCwiTGVmdCI6MCwiUmlnaHQiOjAsIkJvdHRvbSI6MH0sIkJhY2tncm91bmQiOnsiJGlkIjoiNjIiLCJDb2xvciI6eyIkaWQiOiI2MyIsIkEiOjI1NSwiUiI6MCwiRyI6MTE0LCJCIjoxODh9fSwiSXNWaXNpYmxlIjp0cnVlLCJXaWR0aCI6MTguMCwiSGVpZ2h0IjoyMC4wLCJCb3JkZXJTdHlsZSI6eyIkaWQiOiI2NCIsIkxpbmVDb2xvciI6eyIkaWQiOiI2NSIsIiR0eXBlIjoiTkxSRS5Db21tb24uRG9tLlNvbGlkQ29sb3JCcnVzaCwgTkxSRS5Db21tb24iLCJDb2xvciI6eyIkaWQiOiI2NiIsIkEiOjI1NSwiUiI6MjU1LCJHIjowLCJCIjowfX0sIkxpbmVXZWlnaHQiOjAuMCwiTGluZVR5cGUiOjAsIlBhcmVudFN0eWxlIjpudWxsfSwiUGFyZW50U3R5bGUiOm51bGx9LCJUaXRsZVN0eWxlIjp7IiRpZCI6IjY3IiwiRm9udFNldHRpbmdzIjp7IiRpZCI6IjY4IiwiRm9udFNpemUiOjExLCJGb250TmFtZSI6IkNhbGlicmkiLCJJc0JvbGQiOnRydWUsIklzSXRhbGljIjpmYWxzZSwiSXNVbmRlcmxpbmVkIjpmYWxzZSwiUGFyZW50U3R5bGUiOm51bGx9LCJBdXRvU2l6ZSI6MCwiRm9yZWdyb3VuZCI6eyIkaWQiOiI2OSIsIkNvbG9yIjp7IiRpZCI6IjcwIiwiQSI6MjU1LCJSIjowLCJHIjowLCJCIjowfX0sIk1heFdpZHRoIjoyMDAuMCwiTWF4SGVpZ2h0IjoiSW5maW5pdHkiLCJTbWFydEZvcmVncm91bmRJc0FjdGl2ZSI6ZmFsc2UsIkhvcml6b250YWxBbGlnbm1lbnQiOjEsIlZlcnRpY2FsQWxpZ25tZW50IjowLCJTbWFydEZvcmVncm91bmQiOm51bGwsIkJhY2tncm91bmRGaWxsVHlwZSI6MCwiTWFyZ2luIjp7IiRpZCI6IjcxIiwiVG9wIjowLCJMZWZ0IjowLCJSaWdodCI6MCwiQm90dG9tIjowfSwiUGFkZGluZyI6eyIkaWQiOiI3MiIsIlRvcCI6MCwiTGVmdCI6MCwiUmlnaHQiOjAsIkJvdHRvbSI6MH0sIkJhY2tncm91bmQiOnsiJGlkIjoiNzMiLCJDb2xvciI6eyIkcmVmIjoiMjAifX0sIklzVmlzaWJsZSI6dHJ1ZSwiV2lkdGgiOjAuMCwiSGVpZ2h0IjowLjAsIkJvcmRlclN0eWxlIjpudWxsLCJQYXJlbnRTdHlsZSI6bnVsbH0sIkRhdGVTdHlsZSI6eyIkaWQiOiI3NCIsIkZvbnRTZXR0aW5ncyI6eyIkaWQiOiI3NSIsIkZvbnRTaXplIjoxMCwiRm9udE5hbWUiOiJDYWxpYnJpIiwiSXNCb2xkIjpmYWxzZSwiSXNJdGFsaWMiOmZhbHNlLCJJc1VuZGVybGluZWQiOmZhbHNlLCJQYXJlbnRTdHlsZSI6bnVsbH0sIkF1dG9TaXplIjowLCJGb3JlZ3JvdW5kIjp7IiRpZCI6Ijc2IiwiQ29sb3IiOnsiJGlkIjoiNzciLCJBIjoyNTUsIlIiOjY4LCJHIjo4NCwiQiI6MTA2fX0sIk1heFdpZHRoIjoyMDAuMCwiTWF4SGVpZ2h0IjoiSW5maW5pdHkiLCJTbWFydEZvcmVncm91bmRJc0FjdGl2ZSI6ZmFsc2UsIkhvcml6b250YWxBbGlnbm1lbnQiOjAsIlZlcnRpY2FsQWxpZ25tZW50IjowLCJTbWFydEZvcmVncm91bmQiOm51bGwsIkJhY2tncm91bmRGaWxsVHlwZSI6MCwiTWFyZ2luIjp7IiRpZCI6Ijc4IiwiVG9wIjowLCJMZWZ0IjowLCJSaWdodCI6MCwiQm90dG9tIjowfSwiUGFkZGluZyI6eyIkaWQiOiI3OSIsIlRvcCI6MCwiTGVmdCI6MCwiUmlnaHQiOjAsIkJvdHRvbSI6MH0sIkJhY2tncm91bmQiOnsiJGlkIjoiODAiLCJDb2xvciI6eyIkcmVmIjoiMjAifX0sIklzVmlzaWJsZSI6dHJ1ZSwiV2lkdGgiOjAuMCwiSGVpZ2h0IjowLjAsIkJvcmRlclN0eWxlIjpudWxsLCJQYXJlbnRTdHlsZSI6bnVsbH0sIkRhdGVGb3JtYXQiOnsiJGlkIjoiODEiLCJGb3JtYXRTdHJpbmciOiJNTU0gZCIsIlNlcGFyYXRvciI6Ii8iLCJVc2VJbnRlcm5hdGlvbmFsRGF0ZUZvcm1hdCI6ZmFsc2UsIkRhdGVJc1Zpc2libGUiOnRydWUsIlRpbWVJc1Zpc2libGUiOmZhbHNlLCJIb3VyRGlnaXRzIjoxLCJBbVBtRGVzaWduYXRvciI6MiwiVHJpbTAwTWludXRlcyI6ZmFsc2UsIkxhc3RLbm93blZpc2liaWxpdHlTdGF0ZSI6bnVsbH0sIklzVmlzaWJsZSI6dHJ1ZSwiUGFyZW50U3R5bGUiOm51bGx9LCJEZWZhdWx0VGFza1N0eWxlIjp7IiRpZCI6IjgyIiwiU2hhcGUiOjIsIlNoYXBlVGhpY2tuZXNzIjoxLCJEdXJhdGlvbkZvcm1hdCI6NSwiSW5jbHVkZU5vbldvcmtpbmdEYXlzSW5EdXJhdGlvbiI6ZmFsc2UsIlBlcmNlbnRhZ2VDb21wbGV0ZVN0eWxlIjp7IiRpZCI6IjgzIiwiRm9udFNldHRpbmdzIjp7IiRpZCI6Ijg0IiwiRm9udFNpemUiOjEwLCJGb250TmFtZSI6IkNhbGlicmkiLCJJc0JvbGQiOmZhbHNlLCJJc0l0YWxpYyI6ZmFsc2UsIklzVW5kZXJsaW5lZCI6ZmFsc2UsIlBhcmVudFN0eWxlIjpudWxsfSwiQXV0b1NpemUiOjAsIkZvcmVncm91bmQiOnsiJGlkIjoiODUiLCJDb2xvciI6eyIkaWQiOiI4NiIsIkEiOjI1NSwiUiI6MTkyLCJHIjo4MCwiQiI6Nzd9fSwiTWF4V2lkdGgiOjIwMC4wLCJNYXhIZWlnaHQiOiJJbmZpbml0eSIsIlNtYXJ0Rm9yZWdyb3VuZElzQWN0aXZlIjpmYWxzZSwiSG9yaXpvbnRhbEFsaWdubWVudCI6MCwiVmVydGljYWxBbGlnbm1lbnQiOjAsIlNtYXJ0Rm9yZWdyb3VuZCI6bnVsbCwiQmFja2dyb3VuZEZpbGxUeXBlIjowLCJNYXJnaW4iOnsiJGlkIjoiODciLCJUb3AiOjAsIkxlZnQiOjAsIlJpZ2h0IjowLCJCb3R0b20iOjB9LCJQYWRkaW5nIjp7IiRpZCI6Ijg4IiwiVG9wIjowLCJMZWZ0IjowLCJSaWdodCI6MCwiQm90dG9tIjowfSwiQmFja2dyb3VuZCI6eyIkaWQiOiI4OSIsIkNvbG9yIjp7IiRyZWYiOiIyMCJ9fSwiSXNWaXNpYmxlIjp0cnVlLCJXaWR0aCI6MC4wLCJIZWlnaHQiOjAuMCwiQm9yZGVyU3R5bGUiOm51bGwsIlBhcmVudFN0eWxlIjpudWxsfSwiRHVyYXRpb25TdHlsZSI6eyIkaWQiOiI5MCIsIkZvbnRTZXR0aW5ncyI6eyIkaWQiOiI5MSIsIkZvbnRTaXplIjoxMCwiRm9udE5hbWUiOiJDYWxpYnJpIiwiSXNCb2xkIjpmYWxzZSwiSXNJdGFsaWMiOmZhbHNlLCJJc1VuZGVybGluZWQiOmZhbHNlLCJQYXJlbnRTdHlsZSI6bnVsbH0sIkF1dG9TaXplIjowLCJGb3JlZ3JvdW5kIjp7IiRpZCI6IjkyIiwiQ29sb3IiOnsiJGlkIjoiOTMiLCJBIjoyNTUsIlIiOjIzNywiRyI6MTI1LCJCIjo0OX19LCJNYXhXaWR0aCI6MjAwLjAsIk1heEhlaWdodCI6IkluZmluaXR5IiwiU21hcnRGb3JlZ3JvdW5kSXNBY3RpdmUiOmZhbHNlLCJIb3Jpem9udGFsQWxpZ25tZW50IjowLCJWZXJ0aWNhbEFsaWdubWVudCI6MCwiU21hcnRGb3JlZ3JvdW5kIjpudWxsLCJCYWNrZ3JvdW5kRmlsbFR5cGUiOjAsIk1hcmdpbiI6eyIkaWQiOiI5NCIsIlRvcCI6MCwiTGVmdCI6MCwiUmlnaHQiOjAsIkJvdHRvbSI6MH0sIlBhZGRpbmciOnsiJGlkIjoiOTUiLCJUb3AiOjAsIkxlZnQiOjAsIlJpZ2h0IjowLCJCb3R0b20iOjB9LCJCYWNrZ3JvdW5kIjp7IiRpZCI6Ijk2IiwiQ29sb3IiOnsiJHJlZiI6IjIwIn19LCJJc1Zpc2libGUiOnRydWUsIldpZHRoIjowLjAsIkhlaWdodCI6MC4wLCJCb3JkZXJTdHlsZSI6bnVsbCwiUGFyZW50U3R5bGUiOm51bGx9LCJIb3Jpem9udGFsQ29ubmVjdG9yU3R5bGUiOnsiJGlkIjoiOTciLCJMaW5lQ29sb3IiOnsiJGlkIjoiOTgiLCIkdHlwZSI6Ik5MUkUuQ29tbW9uLkRvbS5Tb2xpZENvbG9yQnJ1c2gsIE5MUkUuQ29tbW9uIiwiQ29sb3IiOnsiJGlkIjoiOTkiLCJBIjoyNTUsIlIiOjIwNCwiRyI6MjA0LCJCIjoyMDR9fSwiTGluZVdlaWdodCI6MS4wLCJMaW5lVHlwZSI6MCwiUGFyZW50U3R5bGUiOm51bGx9LCJWZXJ0aWNhbENvbm5lY3RvclN0eWxlIjp7IiRpZCI6IjEwMCIsIkxpbmVDb2xvciI6eyIkaWQiOiIxMDEiLCIkdHlwZSI6Ik5MUkUuQ29tbW9uLkRvbS5Tb2xpZENvbG9yQnJ1c2gsIE5MUkUuQ29tbW9uIiwiQ29sb3IiOnsiJGlkIjoiMTAyIiwiQSI6MjU1LCJSIjoyMDQsIkciOjIwNCwiQiI6MjA0fX0sIkxpbmVXZWlnaHQiOjAuMCwiTGluZVR5cGUiOjAsIlBhcmVudFN0eWxlIjpudWxsfSwiTWFyZ2luIjpudWxsLCJTdGFydERhdGVQb3NpdGlvbiI6MywiRW5kRGF0ZVBvc2l0aW9uIjozLCJEYXRlSXNWaXNpYmxlIjp0cnVlLCJUaXRsZVBvc2l0aW9uIjo0LCJEdXJhdGlvblBvc2l0aW9uIjo2LCJQZXJjZW50YWdlQ29tcGxldGVkUG9zaXRpb24iOjYsIlNwYWNpbmciOjUsIklzQmVsb3dUaW1lYmFuZCI6dHJ1ZSwiUGVyY2VudGFnZUNvbXBsZXRlU2hhcGVPcGFjaXR5IjozNSwiU2hhcGVTdHlsZSI6eyIkaWQiOiIxMDMiLCJNYXJnaW4iOnsiJGlkIjoiMTA0IiwiVG9wIjowLCJMZWZ0Ijo0LCJSaWdodCI6NCwiQm90dG9tIjowfSwiUGFkZGluZyI6eyIkaWQiOiIxMDUiLCJUb3AiOjAsIkxlZnQiOjAsIlJpZ2h0IjowLCJCb3R0b20iOjB9LCJCYWNrZ3JvdW5kIjp7IiRpZCI6IjEwNiIsIkNvbG9yIjp7IiRpZCI6IjEwNyIsIkEiOjI1NSwiUiI6MCwiRyI6MTE0LCJCIjoxODh9fSwiSXNWaXNpYmxlIjp0cnVlLCJXaWR0aCI6MC4wLCJIZWlnaHQiOjE2LjAsIkJvcmRlclN0eWxlIjp7IiRpZCI6IjEwOCIsIkxpbmVDb2xvciI6eyIkaWQiOiIxMDkiLCIkdHlwZSI6Ik5MUkUuQ29tbW9uLkRvbS5Tb2xpZENvbG9yQnJ1c2gsIE5MUkUuQ29tbW9uIiwiQ29sb3IiOnsiJGlkIjoiMTEwIiwiQSI6MjU1LCJSIjoyNTUsIkciOjAsIkIiOjB9fSwiTGluZVdlaWdodCI6MC4wLCJMaW5lVHlwZSI6MCwiUGFyZW50U3R5bGUiOm51bGx9LCJQYXJlbnRTdHlsZSI6bnVsbH0sIlRpdGxlU3R5bGUiOnsiJGlkIjoiMTExIiwiRm9udFNldHRpbmdzIjp7IiRpZCI6IjExMiIsIkZvbnRTaXplIjoxMSwiRm9udE5hbWUiOiJDYWxpYnJpIiwiSXNCb2xkIjp0cnVlLCJJc0l0YWxpYyI6ZmFsc2UsIklzVW5kZXJsaW5lZCI6ZmFsc2UsIlBhcmVudFN0eWxlIjpudWxsfSwiQXV0b1NpemUiOjAsIkZvcmVncm91bmQiOnsiJGlkIjoiMTEzIiwiQ29sb3IiOnsiJGlkIjoiMTE0IiwiQSI6MjU1LCJSIjowLCJHIjowLCJCIjowfX0sIk1heFdpZHRoIjo5NjAuMCwiTWF4SGVpZ2h0IjoiSW5maW5pdHkiLCJTbWFydEZvcmVncm91bmRJc0FjdGl2ZSI6ZmFsc2UsIkhvcml6b250YWxBbGlnbm1lbnQiOjAsIlZlcnRpY2FsQWxpZ25tZW50IjowLCJTbWFydEZvcmVncm91bmQiOm51bGwsIkJhY2tncm91bmRGaWxsVHlwZSI6MCwiTWFyZ2luIjp7IiRpZCI6IjExNSIsIlRvcCI6MCwiTGVmdCI6MCwiUmlnaHQiOjAsIkJvdHRvbSI6MH0sIlBhZGRpbmciOnsiJGlkIjoiMTE2IiwiVG9wIjowLCJMZWZ0IjowLCJSaWdodCI6MCwiQm90dG9tIjowfSwiQmFja2dyb3VuZCI6eyIkaWQiOiIxMTciLCJDb2xvciI6eyIkcmVmIjoiMjAifX0sIklzVmlzaWJsZSI6dHJ1ZSwiV2lkdGgiOjAuMCwiSGVpZ2h0IjowLjAsIkJvcmRlclN0eWxlIjpudWxsLCJQYXJlbnRTdHlsZSI6bnVsbH0sIkRhdGVTdHlsZSI6eyIkaWQiOiIxMTgiLCJGb250U2V0dGluZ3MiOnsiJGlkIjoiMTE5IiwiRm9udFNpemUiOjEwLCJGb250TmFtZSI6IkNhbGlicmkiLCJJc0JvbGQiOmZhbHNlLCJJc0l0YWxpYyI6ZmFsc2UsIklzVW5kZXJsaW5lZCI6ZmFsc2UsIlBhcmVudFN0eWxlIjpudWxsfSwiQXV0b1NpemUiOjAsIkZvcmVncm91bmQiOnsiJGlkIjoiMTIwIiwiQ29sb3IiOnsiJGlkIjoiMTIxIiwiQSI6MjU1LCJSIjo2OCwiRyI6ODQsIkIiOjEwNn19LCJNYXhXaWR0aCI6MjAwLjAsIk1heEhlaWdodCI6IkluZmluaXR5IiwiU21hcnRGb3JlZ3JvdW5kSXNBY3RpdmUiOmZhbHNlLCJIb3Jpem9udGFsQWxpZ25tZW50IjoyLCJWZXJ0aWNhbEFsaWdubWVudCI6MCwiU21hcnRGb3JlZ3JvdW5kIjpudWxsLCJCYWNrZ3JvdW5kRmlsbFR5cGUiOjAsIk1hcmdpbiI6eyIkaWQiOiIxMjIiLCJUb3AiOjAsIkxlZnQiOjAsIlJpZ2h0IjowLCJCb3R0b20iOjB9LCJQYWRkaW5nIjp7IiRpZCI6IjEyMyIsIlRvcCI6MCwiTGVmdCI6MCwiUmlnaHQiOjAsIkJvdHRvbSI6MH0sIkJhY2tncm91bmQiOnsiJGlkIjoiMTI0IiwiQ29sb3IiOnsiJHJlZiI6IjIwIn19LCJJc1Zpc2libGUiOnRydWUsIldpZHRoIjowLjAsIkhlaWdodCI6MC4wLCJCb3JkZXJTdHlsZSI6bnVsbCwiUGFyZW50U3R5bGUiOm51bGx9LCJEYXRlRm9ybWF0Ijp7IiRpZCI6IjEyNSIsIkZvcm1hdFN0cmluZyI6Ik1NTSBkIiwiU2VwYXJhdG9yIjoiLyIsIlVzZUludGVybmF0aW9uYWxEYXRlRm9ybWF0IjpmYWxzZSwiRGF0ZUlzVmlzaWJsZSI6dHJ1ZSwiVGltZUlzVmlzaWJsZSI6ZmFsc2UsIkhvdXJEaWdpdHMiOjEsIkFtUG1EZXNpZ25hdG9yIjoyLCJUcmltMDBNaW51dGVzIjpmYWxzZSwiTGFzdEtub3duVmlzaWJpbGl0eVN0YXRlIjpudWxsfSwiSXNWaXNpYmxlIjp0cnVlLCJQYXJlbnRTdHlsZSI6bnVsbCwiX2V4cGxpY2l0bHlTZXQiOnsiJGlkIjoiMTI2IiwiU2hhcGVTdHlsZSI6ZmFsc2UsIlRpdGxlU3R5bGUiOmZhbHNlLCJEYXRlU3R5bGUiOmZhbHNlLCJIb3Jpem9udGFsQ29ubmVjdG9yU3R5bGUiOmZhbHNlLCJWZXJ0aWNhbENvbm5lY3RvclN0eWxlIjpmYWxzZSwiUGVyY2VudGFnZUNvbXBsZXRlU2hhcGVPcGFjaXR5IjpmYWxzZSwiU2hhcGUiOmZhbHNlLCJTaGFwZVRoaWNrbmVzcyI6ZmFsc2UsIkR1cmF0aW9uRm9ybWF0IjpmYWxzZSwiSW5jbHVkZU5vbldvcmtpbmdEYXlzSW5EdXJhdGlvbiI6ZmFsc2UsIk1hcmdpbiI6ZmFsc2UsIlN0YXJ0RGF0ZVBvc2l0aW9uIjpmYWxzZSwiRW5kRGF0ZVBvc2l0aW9uIjpmYWxzZSwiVGl0bGVQb3NpdGlvbiI6ZmFsc2UsIkR1cmF0aW9uUG9zaXRpb24iOmZhbHNlLCJQZXJjZW50YWdlQ29tcGxldGVkUG9zaXRpb24iOmZhbHNlLCJTcGFjaW5nIjpmYWxzZSwiSXNCZWxvd1RpbWViYW5kIjpmYWxzZSwiRGF0ZUZvcm1hdCI6ZmFsc2UsIklzVmlzaWJsZSI6ZmFsc2V9fSwiR3JpZGxpbmVQYW5lbFN0eWxlIjp7IiRpZCI6IjEyNyIsIkdyaWRsaW5lU3R5bGUiOnsiJGlkIjoiMTI4IiwiTGluZUNvbG9yIjp7IiRpZCI6IjEyOSIsIiR0eXBlIjoiTkxSRS5Db21tb24uRG9tLlNvbGlkQ29sb3JCcnVzaCwgTkxSRS5Db21tb24iLCJDb2xvciI6eyIkaWQiOiIxMzAiLCJBIjozOCwiUiI6OTEsIkciOjE1NSwiQiI6MjEzfX0sIkxpbmVXZWlnaHQiOjAuNiwiTGluZVR5cGUiOjAsIlBhcmVudFN0eWxlIjpudWxsfSwiTWFyZ2luIjp7IiRpZCI6IjEzMSIsIlRvcCI6MCwiTGVmdCI6MCwiUmlnaHQiOjAsIkJvdHRvbSI6MH0sIlBhZGRpbmciOnsiJGlkIjoiMTMyIiwiVG9wIjowLCJMZWZ0IjowLCJSaWdodCI6MCwiQm90dG9tIjowfSwiQmFja2dyb3VuZCI6bnVsbCwiSXNWaXNpYmxlIjp0cnVlLCJXaWR0aCI6MC4wLCJIZWlnaHQiOjAuMCwiQm9yZGVyU3R5bGUiOnsiJGlkIjoiMTMzIiwiTGluZUNvbG9yIjpudWxsLCJMaW5lV2VpZ2h0IjowLjAsIkxpbmVUeXBlIjowLCJQYXJlbnRTdHlsZSI6bnVsbH0sIlBhcmVudFN0eWxlIjpudWxsfSwiU2hvd0VsYXBzZWRUaW1lR3JhZGllbnRTdHlsZSI6ZmFsc2UsIkRlZmF1bHRTd2ltbGFuZVN0eWxlIjp7IiRpZCI6IjEzNCIsIkhlYWRlclN0eWxlIjp7IiRpZCI6IjEzNSIsIlRleHRTdHlsZSI6eyIkaWQiOiIxMzYiLCJGb250U2V0dGluZ3MiOnsiJGlkIjoiMTM3IiwiRm9udFNpemUiOjEyLCJGb250TmFtZSI6IkNhbGlicmkiLCJJc0JvbGQiOmZhbHNlLCJJc0l0YWxpYyI6ZmFsc2UsIklzVW5kZXJsaW5lZCI6ZmFsc2UsIlBhcmVudFN0eWxlIjpudWxsfSwiQXV0b1NpemUiOjAsIkZvcmVncm91bmQiOnsiJGlkIjoiMTM4IiwiQ29sb3IiOnsiJGlkIjoiMTM5IiwiQSI6MjU1LCJSIjozMiwiRyI6NTYsIkIiOjEwMH19LCJNYXhXaWR0aCI6MC4wLCJNYXhIZWlnaHQiOjAuMCwiU21hcnRGb3JlZ3JvdW5kSXNBY3RpdmUiOmZhbHNlLCJIb3Jpem9udGFsQWxpZ25tZW50IjowLCJWZXJ0aWNhbEFsaWdubWVudCI6MCwiU21hcnRGb3JlZ3JvdW5kIjpudWxsLCJCYWNrZ3JvdW5kRmlsbFR5cGUiOjAsIk1hcmdpbiI6eyIkaWQiOiIxNDAiLCJUb3AiOjAsIkxlZnQiOjAsIlJpZ2h0IjowLCJCb3R0b20iOjB9LCJQYWRkaW5nIjp7IiRpZCI6IjE0MSIsIlRvcCI6MCwiTGVmdCI6MCwiUmlnaHQiOjAsIkJvdHRvbSI6MH0sIkJhY2tncm91bmQiOm51bGwsIklzVmlzaWJsZSI6ZmFsc2UsIldpZHRoIjowLjAsIkhlaWdodCI6MC4wLCJCb3JkZXJTdHlsZSI6bnVsbCwiUGFyZW50U3R5bGUiOm51bGx9LCJSZWN0YW5nbGVTdHlsZSI6eyIkaWQiOiIxNDIiLCJNYXJnaW4iOnsiJGlkIjoiMTQzIiwiVG9wIjowLCJMZWZ0IjowLCJSaWdodCI6MCwiQm90dG9tIjowfSwiUGFkZGluZyI6eyIkaWQiOiIxNDQiLCJUb3AiOjAsIkxlZnQiOjAsIlJpZ2h0IjowLCJCb3R0b20iOjB9LCJCYWNrZ3JvdW5kIjp7IiRpZCI6IjE0NSIsIkNvbG9yIjp7IiRpZCI6IjE0NiIsIkEiOjEyNywiUiI6OTEsIkciOjE1NSwiQiI6MjEzfX0sIklzVmlzaWJsZSI6ZmFsc2UsIldpZHRoIjowLjAsIkhlaWdodCI6MC4wLCJCb3JkZXJTdHlsZSI6eyIkaWQiOiIxNDciLCJMaW5lQ29sb3IiOnsiJGlkIjoiMTQ4IiwiJHR5cGUiOiJOTFJFLkNvbW1vbi5Eb20uU29saWRDb2xvckJydXNoLCBOTFJFLkNvbW1vbiIsIkNvbG9yIjp7IiRpZCI6IjE0OSIsIkEiOjI1NSwiUiI6MjU1LCJHIjowLCJCIjowfX0sIkxpbmVXZWlnaHQiOjAuMCwiTGluZVR5cGUiOjAsIlBhcmVudFN0eWxlIjpudWxsfSwiUGFyZW50U3R5bGUiOm51bGx9LCJNYXJnaW4iOnsiJGlkIjoiMTUwIiwiVG9wIjowLCJMZWZ0IjowLCJSaWdodCI6MCwiQm90dG9tIjowfSwiUGFkZGluZyI6eyIkaWQiOiIxNTEiLCJUb3AiOjAsIkxlZnQiOjAsIlJpZ2h0IjowLCJCb3R0b20iOjB9LCJCYWNrZ3JvdW5kIjpudWxsLCJJc1Zpc2libGUiOnRydWUsIldpZHRoIjowLjAsIkhlaWdodCI6MC4wLCJCb3JkZXJTdHlsZSI6bnVsbCwiUGFyZW50U3R5bGUiOm51bGx9LCJCYWNrZ3JvdW5kU3R5bGUiOnsiJGlkIjoiMTUyIiwiTWFyZ2luIjp7IiRpZCI6IjE1MyIsIlRvcCI6MCwiTGVmdCI6MCwiUmlnaHQiOjAsIkJvdHRvbSI6MH0sIlBhZGRpbmciOnsiJGlkIjoiMTU0IiwiVG9wIjowLCJMZWZ0IjowLCJSaWdodCI6MCwiQm90dG9tIjowfSwiQmFja2dyb3VuZCI6eyIkaWQiOiIxNTUiLCJDb2xvciI6eyIkaWQiOiIxNTYiLCJBIjozOCwiUiI6OTEsIkciOjE1NSwiQiI6MjEzfX0sIklzVmlzaWJsZSI6dHJ1ZSwiV2lkdGgiOjAuMCwiSGVpZ2h0IjowLjAsIkJvcmRlclN0eWxlIjp7IiRpZCI6IjE1NyIsIkxpbmVDb2xvciI6eyIkaWQiOiIxNTgiLCIkdHlwZSI6Ik5MUkUuQ29tbW9uLkRvbS5Tb2xpZENvbG9yQnJ1c2gsIE5MUkUuQ29tbW9uIiwiQ29sb3IiOnsiJGlkIjoiMTU5IiwiQSI6MjU1LCJSIjoyNTUsIkciOjAsIkIiOjB9fSwiTGluZVdlaWdodCI6MC4wLCJMaW5lVHlwZSI6MCwiUGFyZW50U3R5bGUiOm51bGx9LCJQYXJlbnRTdHlsZSI6bnVsbH0sIklzQWJvdmVUaW1lYmFuZCI6ZmFsc2UsIk1hcmdpbiI6eyIkaWQiOiIxNjAiLCJUb3AiOjAsIkxlZnQiOjAsIlJpZ2h0IjowLCJCb3R0b20iOjB9LCJQYWRkaW5nIjp7IiRpZCI6IjE2MSIsIlRvcCI6MCwiTGVmdCI6MCwiUmlnaHQiOjAsIkJvdHRvbSI6MH0sIklzVmlzaWJsZSI6dHJ1ZSwiV2lkdGgiOjAuMCwiSGVpZ2h0IjowLjAsIkJvcmRlclN0eWxlIjpudWxsLCJQYXJlbnRTdHlsZSI6bnVsbH19LCJTY2FsZSI6eyIkaWQiOiIxNjIiLCJTdGFydERhdGUiOiIwMDAxLTAxLTAxVDAwOjAwOjAwIiwiRW5kRGF0ZSI6IjIwMjAtMDMtMzFUMjM6NTk6MDAiLCJGb3JtYXQiOiJNTU0iLCJUeXBlIjoyLCJBdXRvRGF0ZVJhbmdlIjp0cnVlLCJXb3JraW5nRGF5cyI6MzEsIlRvZGF5TWFya2VyVGV4dCI6IlRvZGF5IiwiQXV0b1NjYWxlVHlwZSI6dHJ1ZX0sIk1pbGVzdG9uZXMiOltdLCJUYXNrcyI6W10sIlN3aW1sYW5lcyI6W3siJGlkIjoiMTYzIiwiSWQiOiJhMWJkNDRlNS04OWMwLTQxNWUtODY4Mi1lMjkzOTc5MjEyZGQiLCJJbmRleCI6MCwiSGVhZGVyVGV4dCI6IkxpdGVyYXR1cmUgU3VydmV5IiwiU3R5bGUiOnsiJGlkIjoiMTY0IiwiSGVhZGVyU3R5bGUiOnsiJGlkIjoiMTY1IiwiVGV4dFN0eWxlIjp7IiRpZCI6IjE2NiIsIkZvbnRTZXR0aW5ncyI6eyIkaWQiOiIxNjciLCJGb250U2l6ZSI6MTIsIkZvbnROYW1lIjoiQ2FsaWJyaSIsIklzQm9sZCI6ZmFsc2UsIklzSXRhbGljIjpmYWxzZSwiSXNVbmRlcmxpbmVkIjpmYWxzZSwiUGFyZW50U3R5bGUiOm51bGx9LCJBdXRvU2l6ZSI6MCwiRm9yZWdyb3VuZCI6eyIkaWQiOiIxNjgiLCJDb2xvciI6eyIkaWQiOiIxNjkiLCJBIjoyNTUsIlIiOjIyLCJHIjoyOCwiQiI6MzV9fSwiTWF4V2lkdGgiOjUxLjQ5MzMzMzMzMzMzMzMzOSwiTWF4SGVpZ2h0IjowLjAsIlNtYXJ0Rm9yZWdyb3VuZElzQWN0aXZlIjpmYWxzZSwiSG9yaXpvbnRhbEFsaWdubWVudCI6MCwiVmVydGljYWxBbGlnbm1lbnQiOjAsIlNtYXJ0Rm9yZWdyb3VuZCI6bnVsbCwiQmFja2dyb3VuZEZpbGxUeXBlIjowLCJNYXJnaW4iOnsiJGlkIjoiMTcwIiwiVG9wIjowLCJMZWZ0IjowLCJSaWdodCI6MCwiQm90dG9tIjowfSwiUGFkZGluZyI6eyIkaWQiOiIxNzEiLCJUb3AiOjAsIkxlZnQiOjAsIlJpZ2h0IjowLCJCb3R0b20iOjB9LCJCYWNrZ3JvdW5kIjpudWxsLCJJc1Zpc2libGUiOmZhbHNlLCJXaWR0aCI6MC4wLCJIZWlnaHQiOjAuMCwiQm9yZGVyU3R5bGUiOm51bGwsIlBhcmVudFN0eWxlIjpudWxsfSwiUmVjdGFuZ2xlU3R5bGUiOnsiJGlkIjoiMTcyIiwiTWFyZ2luIjp7IiRpZCI6IjE3MyIsIlRvcCI6MCwiTGVmdCI6MCwiUmlnaHQiOjAsIkJvdHRvbSI6MH0sIlBhZGRpbmciOnsiJGlkIjoiMTc0IiwiVG9wIjowLCJMZWZ0IjowLCJSaWdodCI6MCwiQm90dG9tIjowfSwiQmFja2dyb3VuZCI6eyIkaWQiOiIxNzUiLCJDb2xvciI6eyIkaWQiOiIxNzYiLCJBIjoxMjcsIlIiOjY4LCJHIjo4NCwiQiI6MTA2fX0sIklzVmlzaWJsZSI6ZmFsc2UsIldpZHRoIjowLjAsIkhlaWdodCI6MC4wLCJCb3JkZXJTdHlsZSI6eyIkaWQiOiIxNzciLCJMaW5lQ29sb3IiOnsiJGlkIjoiMTc4IiwiJHR5cGUiOiJOTFJFLkNvbW1vbi5Eb20uU29saWRDb2xvckJydXNoLCBOTFJFLkNvbW1vbiIsIkNvbG9yIjp7IiRpZCI6IjE3OSIsIkEiOjI1NSwiUiI6MjIsIkciOjI4LCJCIjozNX19LCJMaW5lV2VpZ2h0IjowLjAsIkxpbmVUeXBlIjowLCJQYXJlbnRTdHlsZSI6bnVsbH0sIlBhcmVudFN0eWxlIjpudWxsfSwiTWFyZ2luIjp7IiRpZCI6IjE4MCIsIlRvcCI6MCwiTGVmdCI6MCwiUmlnaHQiOjAsIkJvdHRvbSI6MH0sIlBhZGRpbmciOnsiJGlkIjoiMTgxIiwiVG9wIjowLCJMZWZ0IjowLCJSaWdodCI6MCwiQm90dG9tIjowfSwiQmFja2dyb3VuZCI6bnVsbCwiSXNWaXNpYmxlIjp0cnVlLCJXaWR0aCI6MC4wLCJIZWlnaHQiOjAuMCwiQm9yZGVyU3R5bGUiOm51bGwsIlBhcmVudFN0eWxlIjpudWxsfSwiQmFja2dyb3VuZFN0eWxlIjp7IiRpZCI6IjE4MiIsIk1hcmdpbiI6eyIkaWQiOiIxODMiLCJUb3AiOjAsIkxlZnQiOjAsIlJpZ2h0IjowLCJCb3R0b20iOjB9LCJQYWRkaW5nIjp7IiRpZCI6IjE4NCIsIlRvcCI6MCwiTGVmdCI6MCwiUmlnaHQiOjAsIkJvdHRvbSI6MH0sIkJhY2tncm91bmQiOnsiJGlkIjoiMTg1IiwiQ29sb3IiOnsiJGlkIjoiMTg2IiwiQSI6MzgsIlIiOjY4LCJHIjo4NCwiQiI6MTA2fX0sIklzVmlzaWJsZSI6dHJ1ZSwiV2lkdGgiOjAuMCwiSGVpZ2h0IjowLjAsIkJvcmRlclN0eWxlIjp7IiRpZCI6IjE4NyIsIkxpbmVDb2xvciI6eyIkaWQiOiIxODgiLCIkdHlwZSI6Ik5MUkUuQ29tbW9uLkRvbS5Tb2xpZENvbG9yQnJ1c2gsIE5MUkUuQ29tbW9uIiwiQ29sb3IiOnsiJGlkIjoiMTg5IiwiQSI6MjU1LCJSIjoyMiwiRyI6MjgsIkIiOjM1fX0sIkxpbmVXZWlnaHQiOjAuMCwiTGluZVR5cGUiOjAsIlBhcmVudFN0eWxlIjpudWxsfSwiUGFyZW50U3R5bGUiOm51bGx9LCJJc0Fib3ZlVGltZWJhbmQiOmZhbHNlLCJNYXJnaW4iOnsiJGlkIjoiMTkwIiwiVG9wIjowLCJMZWZ0IjowLCJSaWdodCI6MCwiQm90dG9tIjowfSwiUGFkZGluZyI6eyIkaWQiOiIxOTEiLCJUb3AiOjAsIkxlZnQiOjAsIlJpZ2h0IjowLCJCb3R0b20iOjB9LCJJc1Zpc2libGUiOnRydWUsIldpZHRoIjowLjAsIkhlaWdodCI6MC4wLCJCb3JkZXJTdHlsZSI6bnVsbCwiUGFyZW50U3R5bGUiOm51bGx9LCJUYXNrcyI6W3siJGlkIjoiMTkyIiwiX2F0dGFjaGVkTWlsZXN0b25lcyI6W10sIlRhc2tEZWZpbml0aW9uIjp7IiRpZCI6IjE5MyIsIkdyb3VwTmFtZSI6bnVsbCwiU3RhcnREYXRlIjoiMjAxOS0wOS0yOVQwMDowMDowMFoiLCJFbmREYXRlIjoiMjAxOS0xMC0wNFQyMzo1OTowMFoiLCJQZXJjZW50YWdlQ29tcGxldGUiOm51bGwsIlN0eWxlIjp7IiRpZCI6IjE5NCIsIlNoYXBlIjoxLCJTaGFwZVRoaWNrbmVzcyI6MCwiRHVyYXRpb25Gb3JtYXQiOjAsIkluY2x1ZGVOb25Xb3JraW5nRGF5c0luRHVyYXRpb24iOmZhbHNlLCJQZXJjZW50YWdlQ29tcGxldGVTdHlsZSI6eyIkaWQiOiIxOTUiLCJGb250U2V0dGluZ3MiOnsiJGlkIjoiMTk2IiwiRm9udFNpemUiOjEwLCJGb250TmFtZSI6IkNhbGlicmkiLCJJc0JvbGQiOmZhbHNlLCJJc0l0YWxpYyI6ZmFsc2UsIklzVW5kZXJsaW5lZCI6ZmFsc2UsIlBhcmVudFN0eWxlIjpudWxsfSwiQXV0b1NpemUiOjAsIkZvcmVncm91bmQiOnsiJGlkIjoiMTk3IiwiQ29sb3IiOnsiJGlkIjoiMTk4IiwiQSI6MjU1LCJSIjoyMzcsIkciOjEyNSwiQiI6NDl9fSwiTWF4V2lkdGgiOjIwMC4wLCJNYXhIZWlnaHQiOiJJbmZpbml0eSIsIlNtYXJ0Rm9yZWdyb3VuZElzQWN0aXZlIjpmYWxzZSwiSG9yaXpvbnRhbEFsaWdubWVudCI6MSwiVmVydGljYWxBbGlnbm1lbnQiOjAsIlNtYXJ0Rm9yZWdyb3VuZCI6bnVsbCwiQmFja2dyb3VuZEZpbGxUeXBlIjowLCJNYXJnaW4iOnsiJGlkIjoiMTk5IiwiVG9wIjowLCJMZWZ0IjowLCJSaWdodCI6MCwiQm90dG9tIjowfSwiUGFkZGluZyI6eyIkaWQiOiIyMDAiLCJUb3AiOjAsIkxlZnQiOjAsIlJpZ2h0IjowLCJCb3R0b20iOjB9LCJCYWNrZ3JvdW5kIjp7IiRpZCI6IjIwMSIsIkNvbG9yIjp7IiRpZCI6IjIwMiIsIkEiOjg5LCJSIjowLCJHIjowLCJCIjowfX0sIklzVmlzaWJsZSI6dHJ1ZSwiV2lkdGgiOjAuMCwiSGVpZ2h0IjowLjAsIkJvcmRlclN0eWxlIjp7IiRpZCI6IjIwMyIsIkxpbmVDb2xvciI6bnVsbCwiTGluZVdlaWdodCI6MC4wLCJMaW5lVHlwZSI6MCwiUGFyZW50U3R5bGUiOm51bGx9LCJQYXJlbnRTdHlsZSI6bnVsbH0sIkR1cmF0aW9uU3R5bGUiOnsiJGlkIjoiMjA0IiwiRm9udFNldHRpbmdzIjp7IiRpZCI6IjIwNSIsIkZvbnRTaXplIjoxMCwiRm9udE5hbWUiOiJDYWxpYnJpIiwiSXNCb2xkIjpmYWxzZSwiSXNJdGFsaWMiOmZhbHNlLCJJc1VuZGVybGluZWQiOmZhbHNlLCJQYXJlbnRTdHlsZSI6bnVsbH0sIkF1dG9TaXplIjowLCJGb3JlZ3JvdW5kIjp7IiRpZCI6IjIwNiIsIkNvbG9yIjp7IiRpZCI6IjIwNyIsIkEiOjI1NSwiUiI6MjM3LCJHIjoxMjUsIkIiOjQ5fX0sIk1heFdpZHRoIjoyMDAuMCwiTWF4SGVpZ2h0IjoiSW5maW5pdHkiLCJTbWFydEZvcmVncm91bmRJc0FjdGl2ZSI6ZmFsc2UsIkhvcml6b250YWxBbGlnbm1lbnQiOjAsIlZlcnRpY2FsQWxpZ25tZW50IjowLCJTbWFydEZvcmVncm91bmQiOm51bGwsIkJhY2tncm91bmRGaWxsVHlwZSI6MCwiTWFyZ2luIjp7IiRpZCI6IjIwOCIsIlRvcCI6MCwiTGVmdCI6MCwiUmlnaHQiOjAsIkJvdHRvbSI6MH0sIlBhZGRpbmciOnsiJGlkIjoiMjA5IiwiVG9wIjowLCJMZWZ0IjowLCJSaWdodCI6MCwiQm90dG9tIjowfSwiQmFja2dyb3VuZCI6eyIkaWQiOiIyMTAiLCJDb2xvciI6eyIkcmVmIjoiMjAyIn19LCJJc1Zpc2libGUiOnRydWUsIldpZHRoIjowLjAsIkhlaWdodCI6MC4wLCJCb3JkZXJTdHlsZSI6eyIkaWQiOiIyMTEiLCJMaW5lQ29sb3IiOm51bGwsIkxpbmVXZWlnaHQiOjAuMCwiTGluZVR5cGUiOjAsIlBhcmVudFN0eWxlIjpudWxsfSwiUGFyZW50U3R5bGUiOm51bGx9LCJIb3Jpem9udGFsQ29ubmVjdG9yU3R5bGUiOnsiJGlkIjoiMjEyIiwiTGluZUNvbG9yIjp7IiRpZCI6IjIxMyIsIiR0eXBlIjoiTkxSRS5Db21tb24uRG9tLlNvbGlkQ29sb3JCcnVzaCwgTkxSRS5Db21tb24iLCJDb2xvciI6eyIkaWQiOiIyMTQiLCJBIjoyNTUsIlIiOjIwNCwiRyI6MjA0LCJCIjoyMDR9fSwiTGluZVdlaWdodCI6MS4wLCJMaW5lVHlwZSI6MCwiUGFyZW50U3R5bGUiOm51bGx9LCJWZXJ0aWNhbENvbm5lY3RvclN0eWxlIjp7IiRpZCI6IjIxNSIsIkxpbmVDb2xvciI6eyIkaWQiOiIyMTYiLCIkdHlwZSI6Ik5MUkUuQ29tbW9uLkRvbS5Tb2xpZENvbG9yQnJ1c2gsIE5MUkUuQ29tbW9uIiwiQ29sb3IiOnsiJGlkIjoiMjE3IiwiQSI6MjU1LCJSIjoyMDQsIkciOjIwNCwiQiI6MjA0fX0sIkxpbmVXZWlnaHQiOjAuMCwiTGluZVR5cGUiOjAsIlBhcmVudFN0eWxlIjpudWxsfSwiTWFyZ2luIjpudWxsLCJTdGFydERhdGVQb3NpdGlvbiI6MywiRW5kRGF0ZVBvc2l0aW9uIjozLCJEYXRlSXNWaXNpYmxlIjp0cnVlLCJUaXRsZVBvc2l0aW9uIjo0LCJEdXJhdGlvblBvc2l0aW9uIjo2LCJQZXJjZW50YWdlQ29tcGxldGVkUG9zaXRpb24iOjIsIlNwYWNpbmciOjUsIklzQmVsb3dUaW1lYmFuZCI6dHJ1ZSwiUGVyY2VudGFnZUNvbXBsZXRlU2hhcGVPcGFjaXR5IjozNSwiU2hhcGVTdHlsZSI6eyIkaWQiOiIyMTgiLCJNYXJnaW4iOnsiJGlkIjoiMjE5IiwiVG9wIjowLCJMZWZ0Ijo0LCJSaWdodCI6NCwiQm90dG9tIjowfSwiUGFkZGluZyI6eyIkaWQiOiIyMjAiLCJUb3AiOjAsIkxlZnQiOjAsIlJpZ2h0IjowLCJCb3R0b20iOjB9LCJCYWNrZ3JvdW5kIjp7IiRpZCI6IjIyMSIsIkNvbG9yIjp7IiRpZCI6IjIyMiIsIkEiOjI1NSwiUiI6NjgsIkciOjExNCwiQiI6MTk2fX0sIklzVmlzaWJsZSI6dHJ1ZSwiV2lkdGgiOjAuMCwiSGVpZ2h0IjoxMC4wLCJCb3JkZXJTdHlsZSI6eyIkaWQiOiIyMjMiLCJMaW5lQ29sb3IiOnsiJGlkIjoiMjI0IiwiJHR5cGUiOiJOTFJFLkNvbW1vbi5Eb20uU29saWRDb2xvckJydXNoLCBOTFJFLkNvbW1vbiIsIkNvbG9yIjp7IiRpZCI6IjIyNSIsIkEiOjI1NSwiUiI6MjU1LCJHIjowLCJCIjowfX0sIkxpbmVXZWlnaHQiOjAuMCwiTGluZVR5cGUiOjAsIlBhcmVudFN0eWxlIjpudWxsfSwiUGFyZW50U3R5bGUiOm51bGx9LCJUaXRsZVN0eWxlIjp7IiRpZCI6IjIyNiIsIkZvbnRTZXR0aW5ncyI6eyIkaWQiOiIyMjciLCJGb250U2l6ZSI6MTEsIkZvbnROYW1lIjoiQ2FsaWJyaSIsIklzQm9sZCI6dHJ1ZSwiSXNJdGFsaWMiOmZhbHNlLCJJc1VuZGVybGluZWQiOmZhbHNlLCJQYXJlbnRTdHlsZSI6bnVsbH0sIkF1dG9TaXplIjowLCJGb3JlZ3JvdW5kIjp7IiRpZCI6IjIyOCIsIkNvbG9yIjp7IiRpZCI6IjIyOSIsIkEiOjI1NSwiUiI6MCwiRyI6MCwiQiI6MH19LCJNYXhXaWR0aCI6OTYwLjAsIk1heEhlaWdodCI6IkluZmluaXR5IiwiU21hcnRGb3JlZ3JvdW5kSXNBY3RpdmUiOmZhbHNlLCJIb3Jpem9udGFsQWxpZ25tZW50IjowLCJWZXJ0aWNhbEFsaWdubWVudCI6MCwiU21hcnRGb3JlZ3JvdW5kIjpudWxsLCJCYWNrZ3JvdW5kRmlsbFR5cGUiOjAsIk1hcmdpbiI6eyIkaWQiOiIyMzAiLCJUb3AiOjAsIkxlZnQiOjAsIlJpZ2h0IjowLCJCb3R0b20iOjB9LCJQYWRkaW5nIjp7IiRpZCI6IjIzMSIsIlRvcCI6MCwiTGVmdCI6MCwiUmlnaHQiOjAsIkJvdHRvbSI6MH0sIkJhY2tncm91bmQiOnsiJGlkIjoiMjMyIiwiQ29sb3IiOnsiJHJlZiI6IjIwMiJ9fSwiSXNWaXNpYmxlIjp0cnVlLCJXaWR0aCI6MC4wLCJIZWlnaHQiOjAuMCwiQm9yZGVyU3R5bGUiOnsiJGlkIjoiMjMzIiwiTGluZUNvbG9yIjpudWxsLCJMaW5lV2VpZ2h0IjowLjAsIkxpbmVUeXBlIjowLCJQYXJlbnRTdHlsZSI6bnVsbH0sIlBhcmVudFN0eWxlIjpudWxsfSwiRGF0ZVN0eWxlIjp7IiRpZCI6IjIzNCIsIkZvbnRTZXR0aW5ncyI6eyIkaWQiOiIyMzUiLCJGb250U2l6ZSI6MTAsIkZvbnROYW1lIjoiQ2FsaWJyaSIsIklzQm9sZCI6ZmFsc2UsIklzSXRhbGljIjpmYWxzZSwiSXNVbmRlcmxpbmVkIjpmYWxzZSwiUGFyZW50U3R5bGUiOm51bGx9LCJBdXRvU2l6ZSI6MCwiRm9yZWdyb3VuZCI6eyIkaWQiOiIyMzYiLCJDb2xvciI6eyIkaWQiOiIyMzciLCJBIjoyNTUsIlIiOjY4LCJHIjo4NCwiQiI6MTA2fX0sIk1heFdpZHRoIjoyMDAuMCwiTWF4SGVpZ2h0IjoiSW5maW5pdHkiLCJTbWFydEZvcmVncm91bmRJc0FjdGl2ZSI6ZmFsc2UsIkhvcml6b250YWxBbGlnbm1lbnQiOjIsIlZlcnRpY2FsQWxpZ25tZW50IjowLCJTbWFydEZvcmVncm91bmQiOm51bGwsIkJhY2tncm91bmRGaWxsVHlwZSI6MCwiTWFyZ2luIjp7IiRpZCI6IjIzOCIsIlRvcCI6MCwiTGVmdCI6MCwiUmlnaHQiOjAsIkJvdHRvbSI6MH0sIlBhZGRpbmciOnsiJGlkIjoiMjM5IiwiVG9wIjowLCJMZWZ0IjowLCJSaWdodCI6MCwiQm90dG9tIjowfSwiQmFja2dyb3VuZCI6eyIkaWQiOiIyNDAiLCJDb2xvciI6eyIkcmVmIjoiMjAyIn19LCJJc1Zpc2libGUiOnRydWUsIldpZHRoIjowLjAsIkhlaWdodCI6MC4wLCJCb3JkZXJTdHlsZSI6eyIkaWQiOiIyNDEiLCJMaW5lQ29sb3IiOm51bGwsIkxpbmVXZWlnaHQiOjAuMCwiTGluZVR5cGUiOjAsIlBhcmVudFN0eWxlIjpudWxsfSwiUGFyZW50U3R5bGUiOm51bGx9LCJEYXRlRm9ybWF0Ijp7IiRpZCI6IjI0MiIsIkZvcm1hdFN0cmluZyI6Ik1NTSBkIiwiU2VwYXJhdG9yIjoiLyIsIlVzZUludGVybmF0aW9uYWxEYXRlRm9ybWF0IjpmYWxzZSwiRGF0ZUlzVmlzaWJsZSI6dHJ1ZSwiVGltZUlzVmlzaWJsZSI6ZmFsc2UsIkhvdXJEaWdpdHMiOjEsIkFtUG1EZXNpZ25hdG9yIjoyLCJUcmltMDBNaW51dGVzIjpmYWxzZSwiTGFzdEtub3duVmlzaWJpbGl0eVN0YXRlIjpudWxsfSwiSXNWaXNpYmxlIjp0cnVlLCJQYXJlbnRTdHlsZSI6bnVsbH0sIkluZGV4IjoxLCJTbWFydER1cmF0aW9uQWN0aXZhdGVkIjpmYWxzZSwiRGF0ZUZvcm1hdCI6eyIkcmVmIjoiMjQyIn0sIklkIjoiN2E1ZTBhYzQtNjJiNy00NTAxLTk2NGItY2U4OWNmNWNlNWU1IiwiSW1wb3J0SWQiOm51bGwsIlRpdGxlIjoiTGl0ZXJhdHVyZSBTZWFyY2giLCJOb3RlIjpudWxsLCJIeXBlcmxpbmsiOnsiJGlkIjoiMjQzIiwiQWRkcmVzcyI6IiIsIlN1YkFkZHJlc3MiOiIifSwiSXNDaGFuZ2VkIjpmYWxzZSwiSXNOZXciOmZhbHNlfSwiSW5kZXgiOjB9LHsiJGlkIjoiMjQ0IiwiX2F0dGFjaGVkTWlsZXN0b25lcyI6W10sIlRhc2tEZWZpbml0aW9uIjp7IiRpZCI6IjI0NSIsIkdyb3VwTmFtZSI6bnVsbCwiU3RhcnREYXRlIjoiMjAxOS0xMC0wNVQwMDowMDowMFoiLCJFbmREYXRlIjoiMjAxOS0xMC0yNVQyMzo1OTowMFoiLCJQZXJjZW50YWdlQ29tcGxldGUiOm51bGwsIlN0eWxlIjp7IiRpZCI6IjI0NiIsIlNoYXBlIjoxLCJTaGFwZVRoaWNrbmVzcyI6MCwiRHVyYXRpb25Gb3JtYXQiOjAsIkluY2x1ZGVOb25Xb3JraW5nRGF5c0luRHVyYXRpb24iOmZhbHNlLCJQZXJjZW50YWdlQ29tcGxldGVTdHlsZSI6eyIkaWQiOiIyNDciLCJGb250U2V0dGluZ3MiOnsiJGlkIjoiMjQ4IiwiRm9udFNpemUiOjEwLCJGb250TmFtZSI6IkNhbGlicmkiLCJJc0JvbGQiOmZhbHNlLCJJc0l0YWxpYyI6ZmFsc2UsIklzVW5kZXJsaW5lZCI6ZmFsc2UsIlBhcmVudFN0eWxlIjpudWxsfSwiQXV0b1NpemUiOjAsIkZvcmVncm91bmQiOnsiJGlkIjoiMjQ5IiwiQ29sb3IiOnsiJGlkIjoiMjUwIiwiQSI6MjU1LCJSIjoyMzcsIkciOjEyNSwiQiI6NDl9fSwiTWF4V2lkdGgiOjIwMC4wLCJNYXhIZWlnaHQiOiJJbmZpbml0eSIsIlNtYXJ0Rm9yZWdyb3VuZElzQWN0aXZlIjpmYWxzZSwiSG9yaXpvbnRhbEFsaWdubWVudCI6MSwiVmVydGljYWxBbGlnbm1lbnQiOjAsIlNtYXJ0Rm9yZWdyb3VuZCI6bnVsbCwiQmFja2dyb3VuZEZpbGxUeXBlIjowLCJNYXJnaW4iOnsiJGlkIjoiMjUxIiwiVG9wIjowLCJMZWZ0IjowLCJSaWdodCI6MCwiQm90dG9tIjowfSwiUGFkZGluZyI6eyIkaWQiOiIyNTIiLCJUb3AiOjAsIkxlZnQiOjAsIlJpZ2h0IjowLCJCb3R0b20iOjB9LCJCYWNrZ3JvdW5kIjp7IiRyZWYiOiIyMDEifSwiSXNWaXNpYmxlIjp0cnVlLCJXaWR0aCI6MC4wLCJIZWlnaHQiOjAuMCwiQm9yZGVyU3R5bGUiOnsiJGlkIjoiMjUzIiwiTGluZUNvbG9yIjpudWxsLCJMaW5lV2VpZ2h0IjowLjAsIkxpbmVUeXBlIjowLCJQYXJlbnRTdHlsZSI6bnVsbH0sIlBhcmVudFN0eWxlIjpudWxsfSwiRHVyYXRpb25TdHlsZSI6eyIkaWQiOiIyNTQiLCJGb250U2V0dGluZ3MiOnsiJGlkIjoiMjU1IiwiRm9udFNpemUiOjEwLCJGb250TmFtZSI6IkNhbGlicmkiLCJJc0JvbGQiOmZhbHNlLCJJc0l0YWxpYyI6ZmFsc2UsIklzVW5kZXJsaW5lZCI6ZmFsc2UsIlBhcmVudFN0eWxlIjpudWxsfSwiQXV0b1NpemUiOjAsIkZvcmVncm91bmQiOnsiJGlkIjoiMjU2IiwiQ29sb3IiOnsiJHJlZiI6IjIwNyJ9fSwiTWF4V2lkdGgiOjIwMC4wLCJNYXhIZWlnaHQiOiJJbmZpbml0eSIsIlNtYXJ0Rm9yZWdyb3VuZElzQWN0aXZlIjpmYWxzZSwiSG9yaXpvbnRhbEFsaWdubWVudCI6MCwiVmVydGljYWxBbGlnbm1lbnQiOjAsIlNtYXJ0Rm9yZWdyb3VuZCI6bnVsbCwiQmFja2dyb3VuZEZpbGxUeXBlIjowLCJNYXJnaW4iOnsiJGlkIjoiMjU3IiwiVG9wIjowLCJMZWZ0IjowLCJSaWdodCI6MCwiQm90dG9tIjowfSwiUGFkZGluZyI6eyIkaWQiOiIyNTgiLCJUb3AiOjAsIkxlZnQiOjAsIlJpZ2h0IjowLCJCb3R0b20iOjB9LCJCYWNrZ3JvdW5kIjp7IiRyZWYiOiIyMTAifSwiSXNWaXNpYmxlIjp0cnVlLCJXaWR0aCI6MC4wLCJIZWlnaHQiOjAuMCwiQm9yZGVyU3R5bGUiOnsiJGlkIjoiMjU5IiwiTGluZUNvbG9yIjpudWxsLCJMaW5lV2VpZ2h0IjowLjAsIkxpbmVUeXBlIjowLCJQYXJlbnRTdHlsZSI6bnVsbH0sIlBhcmVudFN0eWxlIjpudWxsfSwiSG9yaXpvbnRhbENvbm5lY3RvclN0eWxlIjp7IiRpZCI6IjI2MCIsIkxpbmVDb2xvciI6eyIkcmVmIjoiMjEzIn0sIkxpbmVXZWlnaHQiOjEuMCwiTGluZVR5cGUiOjAsIlBhcmVudFN0eWxlIjpudWxsfSwiVmVydGljYWxDb25uZWN0b3JTdHlsZSI6eyIkaWQiOiIyNjEiLCJMaW5lQ29sb3IiOnsiJHJlZiI6IjIxNiJ9LCJMaW5lV2VpZ2h0IjowLjAsIkxpbmVUeXBlIjowLCJQYXJlbnRTdHlsZSI6bnVsbH0sIk1hcmdpbiI6bnVsbCwiU3RhcnREYXRlUG9zaXRpb24iOjMsIkVuZERhdGVQb3NpdGlvbiI6MywiRGF0ZUlzVmlzaWJsZSI6dHJ1ZSwiVGl0bGVQb3NpdGlvbiI6NCwiRHVyYXRpb25Qb3NpdGlvbiI6NiwiUGVyY2VudGFnZUNvbXBsZXRlZFBvc2l0aW9uIjoyLCJTcGFjaW5nIjo1LCJJc0JlbG93VGltZWJhbmQiOnRydWUsIlBlcmNlbnRhZ2VDb21wbGV0ZVNoYXBlT3BhY2l0eSI6MzUsIlNoYXBlU3R5bGUiOnsiJGlkIjoiMjYyIiwiTWFyZ2luIjp7IiRpZCI6IjI2MyIsIlRvcCI6MCwiTGVmdCI6NCwiUmlnaHQiOjQsIkJvdHRvbSI6MH0sIlBhZGRpbmciOnsiJGlkIjoiMjY0IiwiVG9wIjowLCJMZWZ0IjowLCJSaWdodCI6MCwiQm90dG9tIjowfSwiQmFja2dyb3VuZCI6eyIkaWQiOiIyNjUiLCJDb2xvciI6eyIkaWQiOiIyNjYiLCJBIjoyNTUsIlIiOjY4LCJHIjoxMTQsIkIiOjE5Nn19LCJJc1Zpc2libGUiOnRydWUsIldpZHRoIjowLjAsIkhlaWdodCI6MTAuMCwiQm9yZGVyU3R5bGUiOnsiJGlkIjoiMjY3IiwiTGluZUNvbG9yIjp7IiRyZWYiOiIyMjQifSwiTGluZVdlaWdodCI6MC4wLCJMaW5lVHlwZSI6MCwiUGFyZW50U3R5bGUiOm51bGx9LCJQYXJlbnRTdHlsZSI6bnVsbH0sIlRpdGxlU3R5bGUiOnsiJGlkIjoiMjY4IiwiRm9udFNldHRpbmdzIjp7IiRpZCI6IjI2OSIsIkZvbnRTaXplIjoxMSwiRm9udE5hbWUiOiJDYWxpYnJpIiwiSXNCb2xkIjp0cnVlLCJJc0l0YWxpYyI6ZmFsc2UsIklzVW5kZXJsaW5lZCI6ZmFsc2UsIlBhcmVudFN0eWxlIjpudWxsfSwiQXV0b1NpemUiOjAsIkZvcmVncm91bmQiOnsiJGlkIjoiMjcwIiwiQ29sb3IiOnsiJGlkIjoiMjcxIiwiQSI6MjU1LCJSIjowLCJHIjowLCJCIjowfX0sIk1heFdpZHRoIjo5NjAuMCwiTWF4SGVpZ2h0IjoiSW5maW5pdHkiLCJTbWFydEZvcmVncm91bmRJc0FjdGl2ZSI6ZmFsc2UsIkhvcml6b250YWxBbGlnbm1lbnQiOjAsIlZlcnRpY2FsQWxpZ25tZW50IjowLCJTbWFydEZvcmVncm91bmQiOm51bGwsIkJhY2tncm91bmRGaWxsVHlwZSI6MCwiTWFyZ2luIjp7IiRpZCI6IjI3MiIsIlRvcCI6MCwiTGVmdCI6MCwiUmlnaHQiOjAsIkJvdHRvbSI6MH0sIlBhZGRpbmciOnsiJGlkIjoiMjczIiwiVG9wIjowLCJMZWZ0IjowLCJSaWdodCI6MCwiQm90dG9tIjowfSwiQmFja2dyb3VuZCI6eyIkcmVmIjoiMjMyIn0sIklzVmlzaWJsZSI6dHJ1ZSwiV2lkdGgiOjAuMCwiSGVpZ2h0IjowLjAsIkJvcmRlclN0eWxlIjp7IiRpZCI6IjI3NCIsIkxpbmVDb2xvciI6bnVsbCwiTGluZVdlaWdodCI6MC4wLCJMaW5lVHlwZSI6MCwiUGFyZW50U3R5bGUiOm51bGx9LCJQYXJlbnRTdHlsZSI6bnVsbH0sIkRhdGVTdHlsZSI6eyIkaWQiOiIyNzUiLCJGb250U2V0dGluZ3MiOnsiJGlkIjoiMjc2IiwiRm9udFNpemUiOjEwLCJGb250TmFtZSI6IkNhbGlicmkiLCJJc0JvbGQiOmZhbHNlLCJJc0l0YWxpYyI6ZmFsc2UsIklzVW5kZXJsaW5lZCI6ZmFsc2UsIlBhcmVudFN0eWxlIjpudWxsfSwiQXV0b1NpemUiOjAsIkZvcmVncm91bmQiOnsiJGlkIjoiMjc3IiwiQ29sb3IiOnsiJGlkIjoiMjc4IiwiQSI6MjU1LCJSIjo2OCwiRyI6ODQsIkIiOjEwNn19LCJNYXhXaWR0aCI6MjAwLjAsIk1heEhlaWdodCI6IkluZmluaXR5IiwiU21hcnRGb3JlZ3JvdW5kSXNBY3RpdmUiOmZhbHNlLCJIb3Jpem9udGFsQWxpZ25tZW50IjoyLCJWZXJ0aWNhbEFsaWdubWVudCI6MCwiU21hcnRGb3JlZ3JvdW5kIjpudWxsLCJCYWNrZ3JvdW5kRmlsbFR5cGUiOjAsIk1hcmdpbiI6eyIkaWQiOiIyNzkiLCJUb3AiOjAsIkxlZnQiOjAsIlJpZ2h0IjowLCJCb3R0b20iOjB9LCJQYWRkaW5nIjp7IiRpZCI6IjI4MCIsIlRvcCI6MCwiTGVmdCI6MCwiUmlnaHQiOjAsIkJvdHRvbSI6MH0sIkJhY2tncm91bmQiOnsiJHJlZiI6IjI0MCJ9LCJJc1Zpc2libGUiOnRydWUsIldpZHRoIjowLjAsIkhlaWdodCI6MC4wLCJCb3JkZXJTdHlsZSI6eyIkaWQiOiIyODEiLCJMaW5lQ29sb3IiOm51bGwsIkxpbmVXZWlnaHQiOjAuMCwiTGluZVR5cGUiOjAsIlBhcmVudFN0eWxlIjpudWxsfSwiUGFyZW50U3R5bGUiOm51bGx9LCJEYXRlRm9ybWF0Ijp7IiRpZCI6IjI4MiIsIkZvcm1hdFN0cmluZyI6Ik1NTSBkIiwiU2VwYXJhdG9yIjoiLyIsIlVzZUludGVybmF0aW9uYWxEYXRlRm9ybWF0IjpmYWxzZSwiRGF0ZUlzVmlzaWJsZSI6dHJ1ZSwiVGltZUlzVmlzaWJsZSI6ZmFsc2UsIkhvdXJEaWdpdHMiOjEsIkFtUG1EZXNpZ25hdG9yIjoyLCJUcmltMDBNaW51dGVzIjpmYWxzZSwiTGFzdEtub3duVmlzaWJpbGl0eVN0YXRlIjpudWxsfSwiSXNWaXNpYmxlIjp0cnVlLCJQYXJlbnRTdHlsZSI6bnVsbH0sIkluZGV4IjoyLCJTbWFydER1cmF0aW9uQWN0aXZhdGVkIjpmYWxzZSwiRGF0ZUZvcm1hdCI6eyIkcmVmIjoiMjgyIn0sIklkIjoiNTgzOTliYzQtNjIzZS00ZjU3LTlhNzUtNmU5Yzk5NWE1OGI3IiwiSW1wb3J0SWQiOm51bGwsIlRpdGxlIjoiTGl0ZXJhdHVyZSBTdXJ2ZXkiLCJOb3RlIjpudWxsLCJIeXBlcmxpbmsiOnsiJGlkIjoiMjgzIiwiQWRkcmVzcyI6IiIsIlN1YkFkZHJlc3MiOiIifSwiSXNDaGFuZ2VkIjpmYWxzZSwiSXNOZXciOmZhbHNlfSwiSW5kZXgiOjB9XSwiTWlsZXN0b25lcyI6W119LHsiJGlkIjoiMjg0IiwiSWQiOiI1NjNmMDYxYy03ZGY0LTRmNjgtOGMxNi0zZGRlOTMyZTI5ODMiLCJJbmRleCI6MywiSGVhZGVyVGV4dCI6IkltcGxlbWVudCBCYXNlIEdhbWUiLCJTdHlsZSI6eyIkaWQiOiIyODUiLCJIZWFkZXJTdHlsZSI6eyIkaWQiOiIyODYiLCJUZXh0U3R5bGUiOnsiJGlkIjoiMjg3IiwiRm9udFNldHRpbmdzIjp7IiRpZCI6IjI4OCIsIkZvbnRTaXplIjoxMiwiRm9udE5hbWUiOiJDYWxpYnJpIiwiSXNCb2xkIjpmYWxzZSwiSXNJdGFsaWMiOmZhbHNlLCJJc1VuZGVybGluZWQiOmZhbHNlLCJQYXJlbnRTdHlsZSI6bnVsbH0sIkF1dG9TaXplIjowLCJGb3JlZ3JvdW5kIjp7IiRpZCI6IjI4OSIsIkNvbG9yIjp7IiRpZCI6IjI5MCIsIkEiOjI1NSwiUiI6MjEsIkciOjM3LCJCIjo2Nn19LCJNYXhXaWR0aCI6NTEuNDkzMzMzMzMzMzMzMzM5LCJNYXhIZWlnaHQiOjAuMCwiU21hcnRGb3JlZ3JvdW5kSXNBY3RpdmUiOmZhbHNlLCJIb3Jpem9udGFsQWxpZ25tZW50IjowLCJWZXJ0aWNhbEFsaWdubWVudCI6MCwiU21hcnRGb3JlZ3JvdW5kIjpudWxsLCJCYWNrZ3JvdW5kRmlsbFR5cGUiOjAsIk1hcmdpbiI6eyIkcmVmIjoiMTcwIn0sIlBhZGRpbmciOnsiJHJlZiI6IjE3MSJ9LCJCYWNrZ3JvdW5kIjpudWxsLCJJc1Zpc2libGUiOmZhbHNlLCJXaWR0aCI6MC4wLCJIZWlnaHQiOjAuMCwiQm9yZGVyU3R5bGUiOm51bGwsIlBhcmVudFN0eWxlIjpudWxsfSwiUmVjdGFuZ2xlU3R5bGUiOnsiJGlkIjoiMjkxIiwiTWFyZ2luIjp7IiRyZWYiOiIxNzMifSwiUGFkZGluZyI6eyIkcmVmIjoiMTc0In0sIkJhY2tncm91bmQiOnsiJGlkIjoiMjkyIiwiQ29sb3IiOnsiJGlkIjoiMjkzIiwiQSI6MTI3LCJSIjo2OCwiRyI6MTE0LCJCIjoxOTZ9fSwiSXNWaXNpYmxlIjpmYWxzZSwiV2lkdGgiOjAuMCwiSGVpZ2h0IjowLjAsIkJvcmRlclN0eWxlIjp7IiRpZCI6IjI5NCIsIkxpbmVDb2xvciI6eyIkaWQiOiIyOTUiLCIkdHlwZSI6Ik5MUkUuQ29tbW9uLkRvbS5Tb2xpZENvbG9yQnJ1c2gsIE5MUkUuQ29tbW9uIiwiQ29sb3IiOnsiJGlkIjoiMjk2IiwiQSI6MjU1LCJSIjoyMSwiRyI6MzcsIkIiOjY2fX0sIkxpbmVXZWlnaHQiOjAuMCwiTGluZVR5cGUiOjAsIlBhcmVudFN0eWxlIjpudWxsfSwiUGFyZW50U3R5bGUiOm51bGx9LCJNYXJnaW4iOnsiJHJlZiI6IjE4MCJ9LCJQYWRkaW5nIjp7IiRyZWYiOiIxODEifSwiQmFja2dyb3VuZCI6bnVsbCwiSXNWaXNpYmxlIjp0cnVlLCJXaWR0aCI6MC4wLCJIZWlnaHQiOjAuMCwiQm9yZGVyU3R5bGUiOm51bGwsIlBhcmVudFN0eWxlIjpudWxsfSwiQmFja2dyb3VuZFN0eWxlIjp7IiRpZCI6IjI5NyIsIk1hcmdpbiI6eyIkcmVmIjoiMTgzIn0sIlBhZGRpbmciOnsiJHJlZiI6IjE4NCJ9LCJCYWNrZ3JvdW5kIjp7IiRpZCI6IjI5OCIsIkNvbG9yIjp7IiRpZCI6IjI5OSIsIkEiOjM4LCJSIjo2OCwiRyI6MTE0LCJCIjoxOTZ9fSwiSXNWaXNpYmxlIjp0cnVlLCJXaWR0aCI6MC4wLCJIZWlnaHQiOjAuMCwiQm9yZGVyU3R5bGUiOnsiJGlkIjoiMzAwIiwiTGluZUNvbG9yIjp7IiRpZCI6IjMwMSIsIiR0eXBlIjoiTkxSRS5Db21tb24uRG9tLlNvbGlkQ29sb3JCcnVzaCwgTkxSRS5Db21tb24iLCJDb2xvciI6eyIkaWQiOiIzMDIiLCJBIjoyNTUsIlIiOjIxLCJHIjozNywiQiI6NjZ9fSwiTGluZVdlaWdodCI6MC4wLCJMaW5lVHlwZSI6MCwiUGFyZW50U3R5bGUiOm51bGx9LCJQYXJlbnRTdHlsZSI6bnVsbH0sIklzQWJvdmVUaW1lYmFuZCI6ZmFsc2UsIk1hcmdpbiI6eyIkcmVmIjoiMTkwIn0sIlBhZGRpbmciOnsiJHJlZiI6IjE5MSJ9LCJJc1Zpc2libGUiOnRydWUsIldpZHRoIjowLjAsIkhlaWdodCI6MC4wLCJCb3JkZXJTdHlsZSI6bnVsbCwiUGFyZW50U3R5bGUiOm51bGx9LCJUYXNrcyI6W3siJGlkIjoiMzAzIiwiX2F0dGFjaGVkTWlsZXN0b25lcyI6W10sIlRhc2tEZWZpbml0aW9uIjp7IiRpZCI6IjMwNCIsIkdyb3VwTmFtZSI6bnVsbCwiU3RhcnREYXRlIjoiMjAxOS0wOS0yOVQwMDowMDowMFoiLCJFbmREYXRlIjoiMjAxOS0xMC0zMVQyMzo1OTowMFoiLCJQZXJjZW50YWdlQ29tcGxldGUiOm51bGwsIlN0eWxlIjp7IiRpZCI6IjMwNSIsIlNoYXBlIjoxLCJTaGFwZVRoaWNrbmVzcyI6MCwiRHVyYXRpb25Gb3JtYXQiOjAsIkluY2x1ZGVOb25Xb3JraW5nRGF5c0luRHVyYXRpb24iOmZhbHNlLCJQZXJjZW50YWdlQ29tcGxldGVTdHlsZSI6eyIkaWQiOiIzMDYiLCJGb250U2V0dGluZ3MiOnsiJGlkIjoiMzA3IiwiRm9udFNpemUiOjEwLCJGb250TmFtZSI6IkNhbGlicmkiLCJJc0JvbGQiOmZhbHNlLCJJc0l0YWxpYyI6ZmFsc2UsIklzVW5kZXJsaW5lZCI6ZmFsc2UsIlBhcmVudFN0eWxlIjpudWxsfSwiQXV0b1NpemUiOjAsIkZvcmVncm91bmQiOnsiJGlkIjoiMzA4IiwiQ29sb3IiOnsiJGlkIjoiMzA5IiwiQSI6MjU1LCJSIjoyMzcsIkciOjEyNSwiQiI6NDl9fSwiTWF4V2lkdGgiOjIwMC4wLCJNYXhIZWlnaHQiOiJJbmZpbml0eSIsIlNtYXJ0Rm9yZWdyb3VuZElzQWN0aXZlIjpmYWxzZSwiSG9yaXpvbnRhbEFsaWdubWVudCI6MSwiVmVydGljYWxBbGlnbm1lbnQiOjAsIlNtYXJ0Rm9yZWdyb3VuZCI6bnVsbCwiQmFja2dyb3VuZEZpbGxUeXBlIjowLCJNYXJnaW4iOnsiJGlkIjoiMzEwIiwiVG9wIjowLCJMZWZ0IjowLCJSaWdodCI6MCwiQm90dG9tIjowfSwiUGFkZGluZyI6eyIkaWQiOiIzMTEiLCJUb3AiOjAsIkxlZnQiOjAsIlJpZ2h0IjowLCJCb3R0b20iOjB9LCJCYWNrZ3JvdW5kIjp7IiRyZWYiOiIyMDEifSwiSXNWaXNpYmxlIjp0cnVlLCJXaWR0aCI6MC4wLCJIZWlnaHQiOjAuMCwiQm9yZGVyU3R5bGUiOnsiJGlkIjoiMzEyIiwiTGluZUNvbG9yIjpudWxsLCJMaW5lV2VpZ2h0IjowLjAsIkxpbmVUeXBlIjowLCJQYXJlbnRTdHlsZSI6bnVsbH0sIlBhcmVudFN0eWxlIjpudWxsfSwiRHVyYXRpb25TdHlsZSI6eyIkaWQiOiIzMTMiLCJGb250U2V0dGluZ3MiOnsiJGlkIjoiMzE0IiwiRm9udFNpemUiOjEwLCJGb250TmFtZSI6IkNhbGlicmkiLCJJc0JvbGQiOmZhbHNlLCJJc0l0YWxpYyI6ZmFsc2UsIklzVW5kZXJsaW5lZCI6ZmFsc2UsIlBhcmVudFN0eWxlIjpudWxsfSwiQXV0b1NpemUiOjAsIkZvcmVncm91bmQiOnsiJGlkIjoiMzE1IiwiQ29sb3IiOnsiJHJlZiI6IjIwNyJ9fSwiTWF4V2lkdGgiOjIwMC4wLCJNYXhIZWlnaHQiOiJJbmZpbml0eSIsIlNtYXJ0Rm9yZWdyb3VuZElzQWN0aXZlIjpmYWxzZSwiSG9yaXpvbnRhbEFsaWdubWVudCI6MCwiVmVydGljYWxBbGlnbm1lbnQiOjAsIlNtYXJ0Rm9yZWdyb3VuZCI6bnVsbCwiQmFja2dyb3VuZEZpbGxUeXBlIjowLCJNYXJnaW4iOnsiJGlkIjoiMzE2IiwiVG9wIjowLCJMZWZ0IjowLCJSaWdodCI6MCwiQm90dG9tIjowfSwiUGFkZGluZyI6eyIkaWQiOiIzMTciLCJUb3AiOjAsIkxlZnQiOjAsIlJpZ2h0IjowLCJCb3R0b20iOjB9LCJCYWNrZ3JvdW5kIjp7IiRyZWYiOiIyMTAifSwiSXNWaXNpYmxlIjp0cnVlLCJXaWR0aCI6MC4wLCJIZWlnaHQiOjAuMCwiQm9yZGVyU3R5bGUiOnsiJGlkIjoiMzE4IiwiTGluZUNvbG9yIjpudWxsLCJMaW5lV2VpZ2h0IjowLjAsIkxpbmVUeXBlIjowLCJQYXJlbnRTdHlsZSI6bnVsbH0sIlBhcmVudFN0eWxlIjpudWxsfSwiSG9yaXpvbnRhbENvbm5lY3RvclN0eWxlIjp7IiRpZCI6IjMxOSIsIkxpbmVDb2xvciI6eyIkcmVmIjoiMjEzIn0sIkxpbmVXZWlnaHQiOjEuMCwiTGluZVR5cGUiOjAsIlBhcmVudFN0eWxlIjpudWxsfSwiVmVydGljYWxDb25uZWN0b3JTdHlsZSI6eyIkaWQiOiIzMjAiLCJMaW5lQ29sb3IiOnsiJHJlZiI6IjIxNiJ9LCJMaW5lV2VpZ2h0IjowLjAsIkxpbmVUeXBlIjowLCJQYXJlbnRTdHlsZSI6bnVsbH0sIk1hcmdpbiI6bnVsbCwiU3RhcnREYXRlUG9zaXRpb24iOjMsIkVuZERhdGVQb3NpdGlvbiI6MywiRGF0ZUlzVmlzaWJsZSI6dHJ1ZSwiVGl0bGVQb3NpdGlvbiI6NCwiRHVyYXRpb25Qb3NpdGlvbiI6NiwiUGVyY2VudGFnZUNvbXBsZXRlZFBvc2l0aW9uIjoyLCJTcGFjaW5nIjo1LCJJc0JlbG93VGltZWJhbmQiOnRydWUsIlBlcmNlbnRhZ2VDb21wbGV0ZVNoYXBlT3BhY2l0eSI6MzUsIlNoYXBlU3R5bGUiOnsiJGlkIjoiMzIxIiwiTWFyZ2luIjp7IiRpZCI6IjMyMiIsIlRvcCI6MCwiTGVmdCI6NCwiUmlnaHQiOjQsIkJvdHRvbSI6MH0sIlBhZGRpbmciOnsiJGlkIjoiMzIzIiwiVG9wIjowLCJMZWZ0IjowLCJSaWdodCI6MCwiQm90dG9tIjowfSwiQmFja2dyb3VuZCI6eyIkaWQiOiIzMjQiLCJDb2xvciI6eyIkaWQiOiIzMjUiLCJBIjoyNTUsIlIiOjY4LCJHIjoxMTQsIkIiOjE5Nn19LCJJc1Zpc2libGUiOnRydWUsIldpZHRoIjowLjAsIkhlaWdodCI6MTAuMCwiQm9yZGVyU3R5bGUiOnsiJGlkIjoiMzI2IiwiTGluZUNvbG9yIjp7IiRyZWYiOiIyMjQifSwiTGluZVdlaWdodCI6MC4wLCJMaW5lVHlwZSI6MCwiUGFyZW50U3R5bGUiOm51bGx9LCJQYXJlbnRTdHlsZSI6bnVsbH0sIlRpdGxlU3R5bGUiOnsiJGlkIjoiMzI3IiwiRm9udFNldHRpbmdzIjp7IiRpZCI6IjMyOCIsIkZvbnRTaXplIjoxMSwiRm9udE5hbWUiOiJDYWxpYnJpIiwiSXNCb2xkIjp0cnVlLCJJc0l0YWxpYyI6ZmFsc2UsIklzVW5kZXJsaW5lZCI6ZmFsc2UsIlBhcmVudFN0eWxlIjpudWxsfSwiQXV0b1NpemUiOjAsIkZvcmVncm91bmQiOnsiJGlkIjoiMzI5IiwiQ29sb3IiOnsiJGlkIjoiMzMwIiwiQSI6MjU1LCJSIjowLCJHIjowLCJCIjowfX0sIk1heFdpZHRoIjo5NjAuMCwiTWF4SGVpZ2h0IjoiSW5maW5pdHkiLCJTbWFydEZvcmVncm91bmRJc0FjdGl2ZSI6ZmFsc2UsIkhvcml6b250YWxBbGlnbm1lbnQiOjAsIlZlcnRpY2FsQWxpZ25tZW50IjowLCJTbWFydEZvcmVncm91bmQiOm51bGwsIkJhY2tncm91bmRGaWxsVHlwZSI6MCwiTWFyZ2luIjp7IiRpZCI6IjMzMSIsIlRvcCI6MCwiTGVmdCI6MCwiUmlnaHQiOjAsIkJvdHRvbSI6MH0sIlBhZGRpbmciOnsiJGlkIjoiMzMyIiwiVG9wIjowLCJMZWZ0IjowLCJSaWdodCI6MCwiQm90dG9tIjowfSwiQmFja2dyb3VuZCI6eyIkcmVmIjoiMjMyIn0sIklzVmlzaWJsZSI6dHJ1ZSwiV2lkdGgiOjAuMCwiSGVpZ2h0IjowLjAsIkJvcmRlclN0eWxlIjp7IiRpZCI6IjMzMyIsIkxpbmVDb2xvciI6bnVsbCwiTGluZVdlaWdodCI6MC4wLCJMaW5lVHlwZSI6MCwiUGFyZW50U3R5bGUiOm51bGx9LCJQYXJlbnRTdHlsZSI6bnVsbH0sIkRhdGVTdHlsZSI6eyIkaWQiOiIzMzQiLCJGb250U2V0dGluZ3MiOnsiJGlkIjoiMzM1IiwiRm9udFNpemUiOjEwLCJGb250TmFtZSI6IkNhbGlicmkiLCJJc0JvbGQiOmZhbHNlLCJJc0l0YWxpYyI6ZmFsc2UsIklzVW5kZXJsaW5lZCI6ZmFsc2UsIlBhcmVudFN0eWxlIjpudWxsfSwiQXV0b1NpemUiOjAsIkZvcmVncm91bmQiOnsiJGlkIjoiMzM2IiwiQ29sb3IiOnsiJGlkIjoiMzM3IiwiQSI6MjU1LCJSIjo2OCwiRyI6ODQsIkIiOjEwNn19LCJNYXhXaWR0aCI6MjAwLjAsIk1heEhlaWdodCI6IkluZmluaXR5IiwiU21hcnRGb3JlZ3JvdW5kSXNBY3RpdmUiOmZhbHNlLCJIb3Jpem9udGFsQWxpZ25tZW50IjoyLCJWZXJ0aWNhbEFsaWdubWVudCI6MCwiU21hcnRGb3JlZ3JvdW5kIjpudWxsLCJCYWNrZ3JvdW5kRmlsbFR5cGUiOjAsIk1hcmdpbiI6eyIkaWQiOiIzMzgiLCJUb3AiOjAsIkxlZnQiOjAsIlJpZ2h0IjowLCJCb3R0b20iOjB9LCJQYWRkaW5nIjp7IiRpZCI6IjMzOSIsIlRvcCI6MCwiTGVmdCI6MCwiUmlnaHQiOjAsIkJvdHRvbSI6MH0sIkJhY2tncm91bmQiOnsiJHJlZiI6IjI0MCJ9LCJJc1Zpc2libGUiOnRydWUsIldpZHRoIjowLjAsIkhlaWdodCI6MC4wLCJCb3JkZXJTdHlsZSI6eyIkaWQiOiIzNDAiLCJMaW5lQ29sb3IiOm51bGwsIkxpbmVXZWlnaHQiOjAuMCwiTGluZVR5cGUiOjAsIlBhcmVudFN0eWxlIjpudWxsfSwiUGFyZW50U3R5bGUiOm51bGx9LCJEYXRlRm9ybWF0Ijp7IiRpZCI6IjM0MSIsIkZvcm1hdFN0cmluZyI6Ik1NTSBkIiwiU2VwYXJhdG9yIjoiLyIsIlVzZUludGVybmF0aW9uYWxEYXRlRm9ybWF0IjpmYWxzZSwiRGF0ZUlzVmlzaWJsZSI6dHJ1ZSwiVGltZUlzVmlzaWJsZSI6ZmFsc2UsIkhvdXJEaWdpdHMiOjEsIkFtUG1EZXNpZ25hdG9yIjoyLCJUcmltMDBNaW51dGVzIjpmYWxzZSwiTGFzdEtub3duVmlzaWJpbGl0eVN0YXRlIjpudWxsfSwiSXNWaXNpYmxlIjp0cnVlLCJQYXJlbnRTdHlsZSI6bnVsbH0sIkluZGV4Ijo0LCJTbWFydER1cmF0aW9uQWN0aXZhdGVkIjpmYWxzZSwiRGF0ZUZvcm1hdCI6eyIkcmVmIjoiMzQxIn0sIklkIjoiZDg3NzhiNzktZjViNS00OTA4LTk5ZGUtY2I5MjVkYTRlYjE1IiwiSW1wb3J0SWQiOm51bGwsIlRpdGxlIjoiQnVpbGQgYmFzZSBGUFMgZmVhdHVyZXMiLCJOb3RlIjpudWxsLCJIeXBlcmxpbmsiOnsiJGlkIjoiMzQyIiwiQWRkcmVzcyI6IiIsIlN1YkFkZHJlc3MiOiIifSwiSXNDaGFuZ2VkIjpmYWxzZSwiSXNOZXciOmZhbHNlfSwiSW5kZXgiOjB9LHsiJGlkIjoiMzQzIiwiX2F0dGFjaGVkTWlsZXN0b25lcyI6W10sIlRhc2tEZWZpbml0aW9uIjp7IiRpZCI6IjM0NCIsIkdyb3VwTmFtZSI6bnVsbCwiU3RhcnREYXRlIjoiMjAxOS0xMS0wMVQwMDowMDowMFoiLCJFbmREYXRlIjoiMjAxOS0xMi0wMVQyMzo1OTowMFoiLCJQZXJjZW50YWdlQ29tcGxldGUiOm51bGwsIlN0eWxlIjp7IiRpZCI6IjM0NSIsIlNoYXBlIjoxLCJTaGFwZVRoaWNrbmVzcyI6MCwiRHVyYXRpb25Gb3JtYXQiOjAsIkluY2x1ZGVOb25Xb3JraW5nRGF5c0luRHVyYXRpb24iOmZhbHNlLCJQZXJjZW50YWdlQ29tcGxldGVTdHlsZSI6eyIkaWQiOiIzNDYiLCJGb250U2V0dGluZ3MiOnsiJGlkIjoiMzQ3IiwiRm9udFNpemUiOjEwLCJGb250TmFtZSI6IkNhbGlicmkiLCJJc0JvbGQiOmZhbHNlLCJJc0l0YWxpYyI6ZmFsc2UsIklzVW5kZXJsaW5lZCI6ZmFsc2UsIlBhcmVudFN0eWxlIjpudWxsfSwiQXV0b1NpemUiOjAsIkZvcmVncm91bmQiOnsiJGlkIjoiMzQ4IiwiQ29sb3IiOnsiJGlkIjoiMzQ5IiwiQSI6MjU1LCJSIjoyMzcsIkciOjEyNSwiQiI6NDl9fSwiTWF4V2lkdGgiOjIwMC4wLCJNYXhIZWlnaHQiOiJJbmZpbml0eSIsIlNtYXJ0Rm9yZWdyb3VuZElzQWN0aXZlIjpmYWxzZSwiSG9yaXpvbnRhbEFsaWdubWVudCI6MSwiVmVydGljYWxBbGlnbm1lbnQiOjAsIlNtYXJ0Rm9yZWdyb3VuZCI6bnVsbCwiQmFja2dyb3VuZEZpbGxUeXBlIjowLCJNYXJnaW4iOnsiJGlkIjoiMzUwIiwiVG9wIjowLCJMZWZ0IjowLCJSaWdodCI6MCwiQm90dG9tIjowfSwiUGFkZGluZyI6eyIkaWQiOiIzNTEiLCJUb3AiOjAsIkxlZnQiOjAsIlJpZ2h0IjowLCJCb3R0b20iOjB9LCJCYWNrZ3JvdW5kIjp7IiRyZWYiOiIyMDEifSwiSXNWaXNpYmxlIjp0cnVlLCJXaWR0aCI6MC4wLCJIZWlnaHQiOjAuMCwiQm9yZGVyU3R5bGUiOnsiJGlkIjoiMzUyIiwiTGluZUNvbG9yIjpudWxsLCJMaW5lV2VpZ2h0IjowLjAsIkxpbmVUeXBlIjowLCJQYXJlbnRTdHlsZSI6bnVsbH0sIlBhcmVudFN0eWxlIjpudWxsfSwiRHVyYXRpb25TdHlsZSI6eyIkaWQiOiIzNTMiLCJGb250U2V0dGluZ3MiOnsiJGlkIjoiMzU0IiwiRm9udFNpemUiOjEwLCJGb250TmFtZSI6IkNhbGlicmkiLCJJc0JvbGQiOmZhbHNlLCJJc0l0YWxpYyI6ZmFsc2UsIklzVW5kZXJsaW5lZCI6ZmFsc2UsIlBhcmVudFN0eWxlIjpudWxsfSwiQXV0b1NpemUiOjAsIkZvcmVncm91bmQiOnsiJGlkIjoiMzU1IiwiQ29sb3IiOnsiJHJlZiI6IjIwNyJ9fSwiTWF4V2lkdGgiOjIwMC4wLCJNYXhIZWlnaHQiOiJJbmZpbml0eSIsIlNtYXJ0Rm9yZWdyb3VuZElzQWN0aXZlIjpmYWxzZSwiSG9yaXpvbnRhbEFsaWdubWVudCI6MCwiVmVydGljYWxBbGlnbm1lbnQiOjAsIlNtYXJ0Rm9yZWdyb3VuZCI6bnVsbCwiQmFja2dyb3VuZEZpbGxUeXBlIjowLCJNYXJnaW4iOnsiJGlkIjoiMzU2IiwiVG9wIjowLCJMZWZ0IjowLCJSaWdodCI6MCwiQm90dG9tIjowfSwiUGFkZGluZyI6eyIkaWQiOiIzNTciLCJUb3AiOjAsIkxlZnQiOjAsIlJpZ2h0IjowLCJCb3R0b20iOjB9LCJCYWNrZ3JvdW5kIjp7IiRyZWYiOiIyMTAifSwiSXNWaXNpYmxlIjp0cnVlLCJXaWR0aCI6MC4wLCJIZWlnaHQiOjAuMCwiQm9yZGVyU3R5bGUiOnsiJGlkIjoiMzU4IiwiTGluZUNvbG9yIjpudWxsLCJMaW5lV2VpZ2h0IjowLjAsIkxpbmVUeXBlIjowLCJQYXJlbnRTdHlsZSI6bnVsbH0sIlBhcmVudFN0eWxlIjpudWxsfSwiSG9yaXpvbnRhbENvbm5lY3RvclN0eWxlIjp7IiRpZCI6IjM1OSIsIkxpbmVDb2xvciI6eyIkcmVmIjoiMjEzIn0sIkxpbmVXZWlnaHQiOjEuMCwiTGluZVR5cGUiOjAsIlBhcmVudFN0eWxlIjpudWxsfSwiVmVydGljYWxDb25uZWN0b3JTdHlsZSI6eyIkaWQiOiIzNjAiLCJMaW5lQ29sb3IiOnsiJHJlZiI6IjIxNiJ9LCJMaW5lV2VpZ2h0IjowLjAsIkxpbmVUeXBlIjowLCJQYXJlbnRTdHlsZSI6bnVsbH0sIk1hcmdpbiI6bnVsbCwiU3RhcnREYXRlUG9zaXRpb24iOjMsIkVuZERhdGVQb3NpdGlvbiI6MywiRGF0ZUlzVmlzaWJsZSI6dHJ1ZSwiVGl0bGVQb3NpdGlvbiI6NCwiRHVyYXRpb25Qb3NpdGlvbiI6NiwiUGVyY2VudGFnZUNvbXBsZXRlZFBvc2l0aW9uIjoyLCJTcGFjaW5nIjo1LCJJc0JlbG93VGltZWJhbmQiOnRydWUsIlBlcmNlbnRhZ2VDb21wbGV0ZVNoYXBlT3BhY2l0eSI6MzUsIlNoYXBlU3R5bGUiOnsiJGlkIjoiMzYxIiwiTWFyZ2luIjp7IiRpZCI6IjM2MiIsIlRvcCI6MCwiTGVmdCI6NCwiUmlnaHQiOjQsIkJvdHRvbSI6MH0sIlBhZGRpbmciOnsiJGlkIjoiMzYzIiwiVG9wIjowLCJMZWZ0IjowLCJSaWdodCI6MCwiQm90dG9tIjowfSwiQmFja2dyb3VuZCI6eyIkaWQiOiIzNjQiLCJDb2xvciI6eyIkaWQiOiIzNjUiLCJBIjoyNTUsIlIiOjY4LCJHIjoxMTQsIkIiOjE5Nn19LCJJc1Zpc2libGUiOnRydWUsIldpZHRoIjowLjAsIkhlaWdodCI6MTAuMCwiQm9yZGVyU3R5bGUiOnsiJGlkIjoiMzY2IiwiTGluZUNvbG9yIjp7IiRyZWYiOiIyMjQifSwiTGluZVdlaWdodCI6MC4wLCJMaW5lVHlwZSI6MCwiUGFyZW50U3R5bGUiOm51bGx9LCJQYXJlbnRTdHlsZSI6bnVsbH0sIlRpdGxlU3R5bGUiOnsiJGlkIjoiMzY3IiwiRm9udFNldHRpbmdzIjp7IiRpZCI6IjM2OCIsIkZvbnRTaXplIjoxMSwiRm9udE5hbWUiOiJDYWxpYnJpIiwiSXNCb2xkIjp0cnVlLCJJc0l0YWxpYyI6ZmFsc2UsIklzVW5kZXJsaW5lZCI6ZmFsc2UsIlBhcmVudFN0eWxlIjpudWxsfSwiQXV0b1NpemUiOjAsIkZvcmVncm91bmQiOnsiJGlkIjoiMzY5IiwiQ29sb3IiOnsiJGlkIjoiMzcwIiwiQSI6MjU1LCJSIjowLCJHIjowLCJCIjowfX0sIk1heFdpZHRoIjo5NjAuMCwiTWF4SGVpZ2h0IjoiSW5maW5pdHkiLCJTbWFydEZvcmVncm91bmRJc0FjdGl2ZSI6ZmFsc2UsIkhvcml6b250YWxBbGlnbm1lbnQiOjAsIlZlcnRpY2FsQWxpZ25tZW50IjowLCJTbWFydEZvcmVncm91bmQiOm51bGwsIkJhY2tncm91bmRGaWxsVHlwZSI6MCwiTWFyZ2luIjp7IiRpZCI6IjM3MSIsIlRvcCI6MCwiTGVmdCI6MCwiUmlnaHQiOjAsIkJvdHRvbSI6MH0sIlBhZGRpbmciOnsiJGlkIjoiMzcyIiwiVG9wIjowLCJMZWZ0IjowLCJSaWdodCI6MCwiQm90dG9tIjowfSwiQmFja2dyb3VuZCI6eyIkcmVmIjoiMjMyIn0sIklzVmlzaWJsZSI6dHJ1ZSwiV2lkdGgiOjAuMCwiSGVpZ2h0IjowLjAsIkJvcmRlclN0eWxlIjp7IiRpZCI6IjM3MyIsIkxpbmVDb2xvciI6bnVsbCwiTGluZVdlaWdodCI6MC4wLCJMaW5lVHlwZSI6MCwiUGFyZW50U3R5bGUiOm51bGx9LCJQYXJlbnRTdHlsZSI6bnVsbH0sIkRhdGVTdHlsZSI6eyIkaWQiOiIzNzQiLCJGb250U2V0dGluZ3MiOnsiJGlkIjoiMzc1IiwiRm9udFNpemUiOjEwLCJGb250TmFtZSI6IkNhbGlicmkiLCJJc0JvbGQiOmZhbHNlLCJJc0l0YWxpYyI6ZmFsc2UsIklzVW5kZXJsaW5lZCI6ZmFsc2UsIlBhcmVudFN0eWxlIjpudWxsfSwiQXV0b1NpemUiOjAsIkZvcmVncm91bmQiOnsiJGlkIjoiMzc2IiwiQ29sb3IiOnsiJGlkIjoiMzc3IiwiQSI6MjU1LCJSIjo2OCwiRyI6ODQsIkIiOjEwNn19LCJNYXhXaWR0aCI6MjAwLjAsIk1heEhlaWdodCI6IkluZmluaXR5IiwiU21hcnRGb3JlZ3JvdW5kSXNBY3RpdmUiOmZhbHNlLCJIb3Jpem9udGFsQWxpZ25tZW50IjoyLCJWZXJ0aWNhbEFsaWdubWVudCI6MCwiU21hcnRGb3JlZ3JvdW5kIjpudWxsLCJCYWNrZ3JvdW5kRmlsbFR5cGUiOjAsIk1hcmdpbiI6eyIkaWQiOiIzNzgiLCJUb3AiOjAsIkxlZnQiOjAsIlJpZ2h0IjowLCJCb3R0b20iOjB9LCJQYWRkaW5nIjp7IiRpZCI6IjM3OSIsIlRvcCI6MCwiTGVmdCI6MCwiUmlnaHQiOjAsIkJvdHRvbSI6MH0sIkJhY2tncm91bmQiOnsiJHJlZiI6IjI0MCJ9LCJJc1Zpc2libGUiOnRydWUsIldpZHRoIjowLjAsIkhlaWdodCI6MC4wLCJCb3JkZXJTdHlsZSI6eyIkaWQiOiIzODAiLCJMaW5lQ29sb3IiOm51bGwsIkxpbmVXZWlnaHQiOjAuMCwiTGluZVR5cGUiOjAsIlBhcmVudFN0eWxlIjpudWxsfSwiUGFyZW50U3R5bGUiOm51bGx9LCJEYXRlRm9ybWF0Ijp7IiRpZCI6IjM4MSIsIkZvcm1hdFN0cmluZyI6Ik1NTSBkIiwiU2VwYXJhdG9yIjoiLyIsIlVzZUludGVybmF0aW9uYWxEYXRlRm9ybWF0IjpmYWxzZSwiRGF0ZUlzVmlzaWJsZSI6dHJ1ZSwiVGltZUlzVmlzaWJsZSI6ZmFsc2UsIkhvdXJEaWdpdHMiOjEsIkFtUG1EZXNpZ25hdG9yIjoyLCJUcmltMDBNaW51dGVzIjpmYWxzZSwiTGFzdEtub3duVmlzaWJpbGl0eVN0YXRlIjpudWxsfSwiSXNWaXNpYmxlIjp0cnVlLCJQYXJlbnRTdHlsZSI6bnVsbH0sIkluZGV4Ijo1LCJTbWFydER1cmF0aW9uQWN0aXZhdGVkIjpmYWxzZSwiRGF0ZUZvcm1hdCI6eyIkcmVmIjoiMzgxIn0sIklkIjoiM2M2OTVmYzYtNzU4ZS00YjI0LWFkN2MtMGJjZWY0MGI4NTkzIiwiSW1wb3J0SWQiOm51bGwsIlRpdGxlIjoiUHJvdG90eXBlIGxldmVsIGdlbmVyYXRpb24iLCJOb3RlIjpudWxsLCJIeXBlcmxpbmsiOnsiJGlkIjoiMzgyIiwiQWRkcmVzcyI6IiIsIlN1YkFkZHJlc3MiOiIifSwiSXNDaGFuZ2VkIjpmYWxzZSwiSXNOZXciOmZhbHNlfSwiSW5kZXgiOjB9LHsiJGlkIjoiMzgzIiwiX2F0dGFjaGVkTWlsZXN0b25lcyI6W10sIlRhc2tEZWZpbml0aW9uIjp7IiRpZCI6IjM4NCIsIkdyb3VwTmFtZSI6bnVsbCwiU3RhcnREYXRlIjoiMjAxOS0xMS0wMVQwMDowMDowMFoiLCJFbmREYXRlIjoiMjAxOS0xMi0wMVQyMzo1OTowMFoiLCJQZXJjZW50YWdlQ29tcGxldGUiOm51bGwsIlN0eWxlIjp7IiRpZCI6IjM4NSIsIlNoYXBlIjoxLCJTaGFwZVRoaWNrbmVzcyI6MCwiRHVyYXRpb25Gb3JtYXQiOjAsIkluY2x1ZGVOb25Xb3JraW5nRGF5c0luRHVyYXRpb24iOmZhbHNlLCJQZXJjZW50YWdlQ29tcGxldGVTdHlsZSI6eyIkaWQiOiIzODYiLCJGb250U2V0dGluZ3MiOnsiJGlkIjoiMzg3IiwiRm9udFNpemUiOjEwLCJGb250TmFtZSI6IkNhbGlicmkiLCJJc0JvbGQiOmZhbHNlLCJJc0l0YWxpYyI6ZmFsc2UsIklzVW5kZXJsaW5lZCI6ZmFsc2UsIlBhcmVudFN0eWxlIjpudWxsfSwiQXV0b1NpemUiOjAsIkZvcmVncm91bmQiOnsiJGlkIjoiMzg4IiwiQ29sb3IiOnsiJGlkIjoiMzg5IiwiQSI6MjU1LCJSIjoyMzcsIkciOjEyNSwiQiI6NDl9fSwiTWF4V2lkdGgiOjIwMC4wLCJNYXhIZWlnaHQiOiJJbmZpbml0eSIsIlNtYXJ0Rm9yZWdyb3VuZElzQWN0aXZlIjpmYWxzZSwiSG9yaXpvbnRhbEFsaWdubWVudCI6MSwiVmVydGljYWxBbGlnbm1lbnQiOjAsIlNtYXJ0Rm9yZWdyb3VuZCI6bnVsbCwiQmFja2dyb3VuZEZpbGxUeXBlIjowLCJNYXJnaW4iOnsiJGlkIjoiMzkwIiwiVG9wIjowLCJMZWZ0IjowLCJSaWdodCI6MCwiQm90dG9tIjowfSwiUGFkZGluZyI6eyIkaWQiOiIzOTEiLCJUb3AiOjAsIkxlZnQiOjAsIlJpZ2h0IjowLCJCb3R0b20iOjB9LCJCYWNrZ3JvdW5kIjp7IiRyZWYiOiIyMDEifSwiSXNWaXNpYmxlIjp0cnVlLCJXaWR0aCI6MC4wLCJIZWlnaHQiOjAuMCwiQm9yZGVyU3R5bGUiOnsiJGlkIjoiMzkyIiwiTGluZUNvbG9yIjpudWxsLCJMaW5lV2VpZ2h0IjowLjAsIkxpbmVUeXBlIjowLCJQYXJlbnRTdHlsZSI6bnVsbH0sIlBhcmVudFN0eWxlIjpudWxsfSwiRHVyYXRpb25TdHlsZSI6eyIkaWQiOiIzOTMiLCJGb250U2V0dGluZ3MiOnsiJGlkIjoiMzk0IiwiRm9udFNpemUiOjEwLCJGb250TmFtZSI6IkNhbGlicmkiLCJJc0JvbGQiOmZhbHNlLCJJc0l0YWxpYyI6ZmFsc2UsIklzVW5kZXJsaW5lZCI6ZmFsc2UsIlBhcmVudFN0eWxlIjpudWxsfSwiQXV0b1NpemUiOjAsIkZvcmVncm91bmQiOnsiJGlkIjoiMzk1IiwiQ29sb3IiOnsiJHJlZiI6IjIwNyJ9fSwiTWF4V2lkdGgiOjIwMC4wLCJNYXhIZWlnaHQiOiJJbmZpbml0eSIsIlNtYXJ0Rm9yZWdyb3VuZElzQWN0aXZlIjpmYWxzZSwiSG9yaXpvbnRhbEFsaWdubWVudCI6MCwiVmVydGljYWxBbGlnbm1lbnQiOjAsIlNtYXJ0Rm9yZWdyb3VuZCI6bnVsbCwiQmFja2dyb3VuZEZpbGxUeXBlIjowLCJNYXJnaW4iOnsiJGlkIjoiMzk2IiwiVG9wIjowLCJMZWZ0IjowLCJSaWdodCI6MCwiQm90dG9tIjowfSwiUGFkZGluZyI6eyIkaWQiOiIzOTciLCJUb3AiOjAsIkxlZnQiOjAsIlJpZ2h0IjowLCJCb3R0b20iOjB9LCJCYWNrZ3JvdW5kIjp7IiRyZWYiOiIyMTAifSwiSXNWaXNpYmxlIjp0cnVlLCJXaWR0aCI6MC4wLCJIZWlnaHQiOjAuMCwiQm9yZGVyU3R5bGUiOnsiJGlkIjoiMzk4IiwiTGluZUNvbG9yIjpudWxsLCJMaW5lV2VpZ2h0IjowLjAsIkxpbmVUeXBlIjowLCJQYXJlbnRTdHlsZSI6bnVsbH0sIlBhcmVudFN0eWxlIjpudWxsfSwiSG9yaXpvbnRhbENvbm5lY3RvclN0eWxlIjp7IiRpZCI6IjM5OSIsIkxpbmVDb2xvciI6eyIkcmVmIjoiMjEzIn0sIkxpbmVXZWlnaHQiOjEuMCwiTGluZVR5cGUiOjAsIlBhcmVudFN0eWxlIjpudWxsfSwiVmVydGljYWxDb25uZWN0b3JTdHlsZSI6eyIkaWQiOiI0MDAiLCJMaW5lQ29sb3IiOnsiJHJlZiI6IjIxNiJ9LCJMaW5lV2VpZ2h0IjowLjAsIkxpbmVUeXBlIjowLCJQYXJlbnRTdHlsZSI6bnVsbH0sIk1hcmdpbiI6bnVsbCwiU3RhcnREYXRlUG9zaXRpb24iOjMsIkVuZERhdGVQb3NpdGlvbiI6MywiRGF0ZUlzVmlzaWJsZSI6dHJ1ZSwiVGl0bGVQb3NpdGlvbiI6NCwiRHVyYXRpb25Qb3NpdGlvbiI6NiwiUGVyY2VudGFnZUNvbXBsZXRlZFBvc2l0aW9uIjoyLCJTcGFjaW5nIjo1LCJJc0JlbG93VGltZWJhbmQiOnRydWUsIlBlcmNlbnRhZ2VDb21wbGV0ZVNoYXBlT3BhY2l0eSI6MzUsIlNoYXBlU3R5bGUiOnsiJGlkIjoiNDAxIiwiTWFyZ2luIjp7IiRpZCI6IjQwMiIsIlRvcCI6MCwiTGVmdCI6NCwiUmlnaHQiOjQsIkJvdHRvbSI6MH0sIlBhZGRpbmciOnsiJGlkIjoiNDAzIiwiVG9wIjowLCJMZWZ0IjowLCJSaWdodCI6MCwiQm90dG9tIjowfSwiQmFja2dyb3VuZCI6eyIkaWQiOiI0MDQiLCJDb2xvciI6eyIkaWQiOiI0MDUiLCJBIjoyNTUsIlIiOjY4LCJHIjoxMTQsIkIiOjE5Nn19LCJJc1Zpc2libGUiOnRydWUsIldpZHRoIjowLjAsIkhlaWdodCI6MTAuMCwiQm9yZGVyU3R5bGUiOnsiJGlkIjoiNDA2IiwiTGluZUNvbG9yIjp7IiRyZWYiOiIyMjQifSwiTGluZVdlaWdodCI6MC4wLCJMaW5lVHlwZSI6MCwiUGFyZW50U3R5bGUiOm51bGx9LCJQYXJlbnRTdHlsZSI6bnVsbH0sIlRpdGxlU3R5bGUiOnsiJGlkIjoiNDA3IiwiRm9udFNldHRpbmdzIjp7IiRpZCI6IjQwOCIsIkZvbnRTaXplIjoxMSwiRm9udE5hbWUiOiJDYWxpYnJpIiwiSXNCb2xkIjp0cnVlLCJJc0l0YWxpYyI6ZmFsc2UsIklzVW5kZXJsaW5lZCI6ZmFsc2UsIlBhcmVudFN0eWxlIjpudWxsfSwiQXV0b1NpemUiOjAsIkZvcmVncm91bmQiOnsiJGlkIjoiNDA5IiwiQ29sb3IiOnsiJGlkIjoiNDEwIiwiQSI6MjU1LCJSIjowLCJHIjowLCJCIjowfX0sIk1heFdpZHRoIjo5NjAuMCwiTWF4SGVpZ2h0IjoiSW5maW5pdHkiLCJTbWFydEZvcmVncm91bmRJc0FjdGl2ZSI6ZmFsc2UsIkhvcml6b250YWxBbGlnbm1lbnQiOjAsIlZlcnRpY2FsQWxpZ25tZW50IjowLCJTbWFydEZvcmVncm91bmQiOm51bGwsIkJhY2tncm91bmRGaWxsVHlwZSI6MCwiTWFyZ2luIjp7IiRpZCI6IjQxMSIsIlRvcCI6MCwiTGVmdCI6MCwiUmlnaHQiOjAsIkJvdHRvbSI6MH0sIlBhZGRpbmciOnsiJGlkIjoiNDEyIiwiVG9wIjowLCJMZWZ0IjowLCJSaWdodCI6MCwiQm90dG9tIjowfSwiQmFja2dyb3VuZCI6eyIkcmVmIjoiMjMyIn0sIklzVmlzaWJsZSI6dHJ1ZSwiV2lkdGgiOjAuMCwiSGVpZ2h0IjowLjAsIkJvcmRlclN0eWxlIjp7IiRpZCI6IjQxMyIsIkxpbmVDb2xvciI6bnVsbCwiTGluZVdlaWdodCI6MC4wLCJMaW5lVHlwZSI6MCwiUGFyZW50U3R5bGUiOm51bGx9LCJQYXJlbnRTdHlsZSI6bnVsbH0sIkRhdGVTdHlsZSI6eyIkaWQiOiI0MTQiLCJGb250U2V0dGluZ3MiOnsiJGlkIjoiNDE1IiwiRm9udFNpemUiOjEwLCJGb250TmFtZSI6IkNhbGlicmkiLCJJc0JvbGQiOmZhbHNlLCJJc0l0YWxpYyI6ZmFsc2UsIklzVW5kZXJsaW5lZCI6ZmFsc2UsIlBhcmVudFN0eWxlIjpudWxsfSwiQXV0b1NpemUiOjAsIkZvcmVncm91bmQiOnsiJGlkIjoiNDE2IiwiQ29sb3IiOnsiJGlkIjoiNDE3IiwiQSI6MjU1LCJSIjo2OCwiRyI6ODQsIkIiOjEwNn19LCJNYXhXaWR0aCI6MjAwLjAsIk1heEhlaWdodCI6IkluZmluaXR5IiwiU21hcnRGb3JlZ3JvdW5kSXNBY3RpdmUiOmZhbHNlLCJIb3Jpem9udGFsQWxpZ25tZW50IjoyLCJWZXJ0aWNhbEFsaWdubWVudCI6MCwiU21hcnRGb3JlZ3JvdW5kIjpudWxsLCJCYWNrZ3JvdW5kRmlsbFR5cGUiOjAsIk1hcmdpbiI6eyIkaWQiOiI0MTgiLCJUb3AiOjAsIkxlZnQiOjAsIlJpZ2h0IjowLCJCb3R0b20iOjB9LCJQYWRkaW5nIjp7IiRpZCI6IjQxOSIsIlRvcCI6MCwiTGVmdCI6MCwiUmlnaHQiOjAsIkJvdHRvbSI6MH0sIkJhY2tncm91bmQiOnsiJHJlZiI6IjI0MCJ9LCJJc1Zpc2libGUiOnRydWUsIldpZHRoIjowLjAsIkhlaWdodCI6MC4wLCJCb3JkZXJTdHlsZSI6eyIkaWQiOiI0MjAiLCJMaW5lQ29sb3IiOm51bGwsIkxpbmVXZWlnaHQiOjAuMCwiTGluZVR5cGUiOjAsIlBhcmVudFN0eWxlIjpudWxsfSwiUGFyZW50U3R5bGUiOm51bGx9LCJEYXRlRm9ybWF0Ijp7IiRpZCI6IjQyMSIsIkZvcm1hdFN0cmluZyI6Ik1NTSBkIiwiU2VwYXJhdG9yIjoiLyIsIlVzZUludGVybmF0aW9uYWxEYXRlRm9ybWF0IjpmYWxzZSwiRGF0ZUlzVmlzaWJsZSI6dHJ1ZSwiVGltZUlzVmlzaWJsZSI6ZmFsc2UsIkhvdXJEaWdpdHMiOjEsIkFtUG1EZXNpZ25hdG9yIjoyLCJUcmltMDBNaW51dGVzIjpmYWxzZSwiTGFzdEtub3duVmlzaWJpbGl0eVN0YXRlIjpudWxsfSwiSXNWaXNpYmxlIjp0cnVlLCJQYXJlbnRTdHlsZSI6bnVsbH0sIkluZGV4Ijo2LCJTbWFydER1cmF0aW9uQWN0aXZhdGVkIjpmYWxzZSwiRGF0ZUZvcm1hdCI6eyIkcmVmIjoiNDIxIn0sIklkIjoiMTBlOTA5YTgtOTZkMS00NjE4LWI1MzgtNjM2MjVkNjlhYjZmIiwiSW1wb3J0SWQiOm51bGwsIlRpdGxlIjoiUHJvdG90eXBlIHJvb20gZGVjb3JhdGlvbiIsIk5vdGUiOm51bGwsIkh5cGVybGluayI6eyIkaWQiOiI0MjIiLCJBZGRyZXNzIjoiIiwiU3ViQWRkcmVzcyI6IiJ9LCJJc0NoYW5nZWQiOmZhbHNlLCJJc05ldyI6ZmFsc2V9LCJJbmRleCI6MH1dLCJNaWxlc3RvbmVzIjpbXX0seyIkaWQiOiI0MjMiLCJJZCI6ImM5NGUyMzE5LTNhYWItNDAyOC04MzcxLWY1YWJmMjUxY2UzNiIsIkluZGV4Ijo3LCJIZWFkZXJUZXh0IjoiTGV2ZWwgR2VuZXJhdGlvbiIsIlN0eWxlIjp7IiRpZCI6IjQyNCIsIkhlYWRlclN0eWxlIjp7IiRpZCI6IjQyNSIsIlRleHRTdHlsZSI6eyIkaWQiOiI0MjYiLCJGb250U2V0dGluZ3MiOnsiJGlkIjoiNDI3IiwiRm9udFNpemUiOjEyLCJGb250TmFtZSI6IkNhbGlicmkiLCJJc0JvbGQiOmZhbHNlLCJJc0l0YWxpYyI6ZmFsc2UsIklzVW5kZXJsaW5lZCI6ZmFsc2UsIlBhcmVudFN0eWxlIjpudWxsfSwiQXV0b1NpemUiOjAsIkZvcmVncm91bmQiOnsiJGlkIjoiNDI4IiwiQ29sb3IiOnsiJGlkIjoiNDI5IiwiQSI6MjU1LCJSIjo4OCwiRyI6MzksIkIiOjd9fSwiTWF4V2lkdGgiOjUxLjQ5MzMzMzMzMzMzMzMzOSwiTWF4SGVpZ2h0IjowLjAsIlNtYXJ0Rm9yZWdyb3VuZElzQWN0aXZlIjpmYWxzZSwiSG9yaXpvbnRhbEFsaWdubWVudCI6MCwiVmVydGljYWxBbGlnbm1lbnQiOjAsIlNtYXJ0Rm9yZWdyb3VuZCI6bnVsbCwiQmFja2dyb3VuZEZpbGxUeXBlIjowLCJNYXJnaW4iOnsiJGlkIjoiNDMwIiwiVG9wIjowLCJMZWZ0IjowLCJSaWdodCI6MCwiQm90dG9tIjowfSwiUGFkZGluZyI6eyIkaWQiOiI0MzEiLCJUb3AiOjAsIkxlZnQiOjAsIlJpZ2h0IjowLCJCb3R0b20iOjB9LCJCYWNrZ3JvdW5kIjpudWxsLCJJc1Zpc2libGUiOmZhbHNlLCJXaWR0aCI6MC4wLCJIZWlnaHQiOjAuMCwiQm9yZGVyU3R5bGUiOm51bGwsIlBhcmVudFN0eWxlIjpudWxsfSwiUmVjdGFuZ2xlU3R5bGUiOnsiJGlkIjoiNDMyIiwiTWFyZ2luIjp7IiRpZCI6IjQzMyIsIlRvcCI6MCwiTGVmdCI6MCwiUmlnaHQiOjAsIkJvdHRvbSI6MH0sIlBhZGRpbmciOnsiJGlkIjoiNDM0IiwiVG9wIjowLCJMZWZ0IjowLCJSaWdodCI6MCwiQm90dG9tIjowfSwiQmFja2dyb3VuZCI6eyIkaWQiOiI0MzUiLCJDb2xvciI6eyIkaWQiOiI0MzYiLCJBIjoxMjcsIlIiOjIzNywiRyI6MTI1LCJCIjo0OX19LCJJc1Zpc2libGUiOmZhbHNlLCJXaWR0aCI6MC4wLCJIZWlnaHQiOjAuMCwiQm9yZGVyU3R5bGUiOnsiJGlkIjoiNDM3IiwiTGluZUNvbG9yIjp7IiRpZCI6IjQzOCIsIiR0eXBlIjoiTkxSRS5Db21tb24uRG9tLlNvbGlkQ29sb3JCcnVzaCwgTkxSRS5Db21tb24iLCJDb2xvciI6eyIkaWQiOiI0MzkiLCJBIjoyNTUsIlIiOjg4LCJHIjozOSwiQiI6N319LCJMaW5lV2VpZ2h0IjowLjAsIkxpbmVUeXBlIjowLCJQYXJlbnRTdHlsZSI6bnVsbH0sIlBhcmVudFN0eWxlIjpudWxsfSwiTWFyZ2luIjp7IiRpZCI6IjQ0MCIsIlRvcCI6MCwiTGVmdCI6MCwiUmlnaHQiOjAsIkJvdHRvbSI6MH0sIlBhZGRpbmciOnsiJGlkIjoiNDQxIiwiVG9wIjowLCJMZWZ0IjowLCJSaWdodCI6MCwiQm90dG9tIjowfSwiQmFja2dyb3VuZCI6bnVsbCwiSXNWaXNpYmxlIjp0cnVlLCJXaWR0aCI6MC4wLCJIZWlnaHQiOjAuMCwiQm9yZGVyU3R5bGUiOm51bGwsIlBhcmVudFN0eWxlIjpudWxsfSwiQmFja2dyb3VuZFN0eWxlIjp7IiRpZCI6IjQ0MiIsIk1hcmdpbiI6eyIkaWQiOiI0NDMiLCJUb3AiOjAsIkxlZnQiOjAsIlJpZ2h0IjowLCJCb3R0b20iOjB9LCJQYWRkaW5nIjp7IiRpZCI6IjQ0NCIsIlRvcCI6MCwiTGVmdCI6MCwiUmlnaHQiOjAsIkJvdHRvbSI6MH0sIkJhY2tncm91bmQiOnsiJGlkIjoiNDQ1IiwiQ29sb3IiOnsiJGlkIjoiNDQ2IiwiQSI6MzgsIlIiOjIzNywiRyI6MTI1LCJCIjo0OX19LCJJc1Zpc2libGUiOnRydWUsIldpZHRoIjowLjAsIkhlaWdodCI6MC4wLCJCb3JkZXJTdHlsZSI6eyIkaWQiOiI0NDciLCJMaW5lQ29sb3IiOnsiJGlkIjoiNDQ4IiwiJHR5cGUiOiJOTFJFLkNvbW1vbi5Eb20uU29saWRDb2xvckJydXNoLCBOTFJFLkNvbW1vbiIsIkNvbG9yIjp7IiRpZCI6IjQ0OSIsIkEiOjI1NSwiUiI6ODgsIkciOjM5LCJCIjo3fX0sIkxpbmVXZWlnaHQiOjAuMCwiTGluZVR5cGUiOjAsIlBhcmVudFN0eWxlIjpudWxsfSwiUGFyZW50U3R5bGUiOm51bGx9LCJJc0Fib3ZlVGltZWJhbmQiOmZhbHNlLCJNYXJnaW4iOnsiJGlkIjoiNDUwIiwiVG9wIjowLCJMZWZ0IjowLCJSaWdodCI6MCwiQm90dG9tIjowfSwiUGFkZGluZyI6eyIkaWQiOiI0NTEiLCJUb3AiOjAsIkxlZnQiOjAsIlJpZ2h0IjowLCJCb3R0b20iOjB9LCJJc1Zpc2libGUiOnRydWUsIldpZHRoIjowLjAsIkhlaWdodCI6MC4wLCJCb3JkZXJTdHlsZSI6bnVsbCwiUGFyZW50U3R5bGUiOm51bGx9LCJUYXNrcyI6W3siJGlkIjoiNDUyIiwiX2F0dGFjaGVkTWlsZXN0b25lcyI6W10sIlRhc2tEZWZpbml0aW9uIjp7IiRpZCI6IjQ1MyIsIkdyb3VwTmFtZSI6bnVsbCwiU3RhcnREYXRlIjoiMjAxOS0xMi0wM1QwMDowMDowMFoiLCJFbmREYXRlIjoiMjAyMC0wMy0zMVQyMzo1OTowMFoiLCJQZXJjZW50YWdlQ29tcGxldGUiOm51bGwsIlN0eWxlIjp7IiRpZCI6IjQ1NCIsIlNoYXBlIjoxLCJTaGFwZVRoaWNrbmVzcyI6MSwiRHVyYXRpb25Gb3JtYXQiOjAsIkluY2x1ZGVOb25Xb3JraW5nRGF5c0luRHVyYXRpb24iOmZhbHNlLCJQZXJjZW50YWdlQ29tcGxldGVTdHlsZSI6eyIkaWQiOiI0NTUiLCJGb250U2V0dGluZ3MiOnsiJGlkIjoiNDU2IiwiRm9udFNpemUiOjEwLCJGb250TmFtZSI6IkNhbGlicmkiLCJJc0JvbGQiOmZhbHNlLCJJc0l0YWxpYyI6ZmFsc2UsIklzVW5kZXJsaW5lZCI6ZmFsc2UsIlBhcmVudFN0eWxlIjpudWxsfSwiQXV0b1NpemUiOjAsIkZvcmVncm91bmQiOnsiJGlkIjoiNDU3IiwiQ29sb3IiOnsiJGlkIjoiNDU4IiwiQSI6MjU1LCJSIjoxOTIsIkciOjgwLCJCIjo3N319LCJNYXhXaWR0aCI6MjAwLjAsIk1heEhlaWdodCI6IkluZmluaXR5IiwiU21hcnRGb3JlZ3JvdW5kSXNBY3RpdmUiOmZhbHNlLCJIb3Jpem9udGFsQWxpZ25tZW50IjoxLCJWZXJ0aWNhbEFsaWdubWVudCI6MCwiU21hcnRGb3JlZ3JvdW5kIjpudWxsLCJCYWNrZ3JvdW5kRmlsbFR5cGUiOjAsIk1hcmdpbiI6eyIkaWQiOiI0NTkiLCJUb3AiOjAsIkxlZnQiOjAsIlJpZ2h0IjowLCJCb3R0b20iOjB9LCJQYWRkaW5nIjp7IiRpZCI6IjQ2MCIsIlRvcCI6MCwiTGVmdCI6MCwiUmlnaHQiOjAsIkJvdHRvbSI6MH0sIkJhY2tncm91bmQiOnsiJGlkIjoiNDYxIiwiQ29sb3IiOnsiJGlkIjoiNDYyIiwiQSI6ODksIlIiOjAsIkciOjAsIkIiOjB9fSwiSXNWaXNpYmxlIjp0cnVlLCJXaWR0aCI6MC4wLCJIZWlnaHQiOjAuMCwiQm9yZGVyU3R5bGUiOnsiJGlkIjoiNDYzIiwiTGluZUNvbG9yIjpudWxsLCJMaW5lV2VpZ2h0IjowLjAsIkxpbmVUeXBlIjowLCJQYXJlbnRTdHlsZSI6bnVsbH0sIlBhcmVudFN0eWxlIjpudWxsfSwiRHVyYXRpb25TdHlsZSI6eyIkaWQiOiI0NjQiLCJGb250U2V0dGluZ3MiOnsiJGlkIjoiNDY1IiwiRm9udFNpemUiOjEwLCJGb250TmFtZSI6IkNhbGlicmkiLCJJc0JvbGQiOmZhbHNlLCJJc0l0YWxpYyI6ZmFsc2UsIklzVW5kZXJsaW5lZCI6ZmFsc2UsIlBhcmVudFN0eWxlIjpudWxsfSwiQXV0b1NpemUiOjAsIkZvcmVncm91bmQiOnsiJGlkIjoiNDY2IiwiQ29sb3IiOnsiJGlkIjoiNDY3IiwiQSI6MjU1LCJSIjoyMzcsIkciOjEyNSwiQiI6NDl9fSwiTWF4V2lkdGgiOjIwMC4wLCJNYXhIZWlnaHQiOiJJbmZpbml0eSIsIlNtYXJ0Rm9yZWdyb3VuZElzQWN0aXZlIjpmYWxzZSwiSG9yaXpvbnRhbEFsaWdubWVudCI6MCwiVmVydGljYWxBbGlnbm1lbnQiOjAsIlNtYXJ0Rm9yZWdyb3VuZCI6bnVsbCwiQmFja2dyb3VuZEZpbGxUeXBlIjowLCJNYXJnaW4iOnsiJGlkIjoiNDY4IiwiVG9wIjowLCJMZWZ0IjowLCJSaWdodCI6MCwiQm90dG9tIjowfSwiUGFkZGluZyI6eyIkaWQiOiI0NjkiLCJUb3AiOjAsIkxlZnQiOjAsIlJpZ2h0IjowLCJCb3R0b20iOjB9LCJCYWNrZ3JvdW5kIjp7IiRpZCI6IjQ3MCIsIkNvbG9yIjp7IiRyZWYiOiI0NjIifX0sIklzVmlzaWJsZSI6dHJ1ZSwiV2lkdGgiOjAuMCwiSGVpZ2h0IjowLjAsIkJvcmRlclN0eWxlIjp7IiRpZCI6IjQ3MSIsIkxpbmVDb2xvciI6bnVsbCwiTGluZVdlaWdodCI6MC4wLCJMaW5lVHlwZSI6MCwiUGFyZW50U3R5bGUiOm51bGx9LCJQYXJlbnRTdHlsZSI6bnVsbH0sIkhvcml6b250YWxDb25uZWN0b3JTdHlsZSI6eyIkaWQiOiI0NzIiLCJMaW5lQ29sb3IiOnsiJGlkIjoiNDczIiwiJHR5cGUiOiJOTFJFLkNvbW1vbi5Eb20uU29saWRDb2xvckJydXNoLCBOTFJFLkNvbW1vbiIsIkNvbG9yIjp7IiRpZCI6IjQ3NCIsIkEiOjI1NSwiUiI6MjA0LCJHIjoyMDQsIkIiOjIwNH19LCJMaW5lV2VpZ2h0IjoxLjAsIkxpbmVUeXBlIjowLCJQYXJlbnRTdHlsZSI6bnVsbH0sIlZlcnRpY2FsQ29ubmVjdG9yU3R5bGUiOnsiJGlkIjoiNDc1IiwiTGluZUNvbG9yIjp7IiRpZCI6IjQ3NiIsIiR0eXBlIjoiTkxSRS5Db21tb24uRG9tLlNvbGlkQ29sb3JCcnVzaCwgTkxSRS5Db21tb24iLCJDb2xvciI6eyIkaWQiOiI0NzciLCJBIjoyNTUsIlIiOjIwNCwiRyI6MjA0LCJCIjoyMDR9fSwiTGluZVdlaWdodCI6MC4wLCJMaW5lVHlwZSI6MCwiUGFyZW50U3R5bGUiOm51bGx9LCJNYXJnaW4iOm51bGwsIlN0YXJ0RGF0ZVBvc2l0aW9uIjoyLCJFbmREYXRlUG9zaXRpb24iOjIsIkRhdGVJc1Zpc2libGUiOnRydWUsIlRpdGxlUG9zaXRpb24iOjMsIkR1cmF0aW9uUG9zaXRpb24iOjYsIlBlcmNlbnRhZ2VDb21wbGV0ZWRQb3NpdGlvbiI6NiwiU3BhY2luZyI6NSwiSXNCZWxvd1RpbWViYW5kIjp0cnVlLCJQZXJjZW50YWdlQ29tcGxldGVTaGFwZU9wYWNpdHkiOjM1LCJTaGFwZVN0eWxlIjp7IiRpZCI6IjQ3OCIsIk1hcmdpbiI6eyIkaWQiOiI0NzkiLCJUb3AiOjAsIkxlZnQiOjQsIlJpZ2h0Ijo0LCJCb3R0b20iOjB9LCJQYWRkaW5nIjp7IiRpZCI6IjQ4MCIsIlRvcCI6MCwiTGVmdCI6MCwiUmlnaHQiOjAsIkJvdHRvbSI6MH0sIkJhY2tncm91bmQiOnsiJGlkIjoiNDgxIiwiQ29sb3IiOnsiJGlkIjoiNDgyIiwiQSI6MjU1LCJSIjo2OCwiRyI6MTE0LCJCIjoxOTZ9fSwiSXNWaXNpYmxlIjp0cnVlLCJXaWR0aCI6MC4wLCJIZWlnaHQiOjE2LjAsIkJvcmRlclN0eWxlIjp7IiRpZCI6IjQ4MyIsIkxpbmVDb2xvciI6eyIkaWQiOiI0ODQiLCIkdHlwZSI6Ik5MUkUuQ29tbW9uLkRvbS5Tb2xpZENvbG9yQnJ1c2gsIE5MUkUuQ29tbW9uIiwiQ29sb3IiOnsiJGlkIjoiNDg1IiwiQSI6MjU1LCJSIjoyNTUsIkciOjAsIkIiOjB9fSwiTGluZVdlaWdodCI6MC4wLCJMaW5lVHlwZSI6MCwiUGFyZW50U3R5bGUiOm51bGx9LCJQYXJlbnRTdHlsZSI6bnVsbH0sIlRpdGxlU3R5bGUiOnsiJGlkIjoiNDg2IiwiRm9udFNldHRpbmdzIjp7IiRpZCI6IjQ4NyIsIkZvbnRTaXplIjoxMSwiRm9udE5hbWUiOiJDYWxpYnJpIiwiSXNCb2xkIjp0cnVlLCJJc0l0YWxpYyI6ZmFsc2UsIklzVW5kZXJsaW5lZCI6ZmFsc2UsIlBhcmVudFN0eWxlIjpudWxsfSwiQXV0b1NpemUiOjAsIkZvcmVncm91bmQiOnsiJGlkIjoiNDg4IiwiQ29sb3IiOnsiJGlkIjoiNDg5IiwiQSI6MjU1LCJSIjowLCJHIjowLCJCIjowfX0sIk1heFdpZHRoIjo2NjAuMCwiTWF4SGVpZ2h0IjoiSW5maW5pdHkiLCJTbWFydEZvcmVncm91bmRJc0FjdGl2ZSI6ZmFsc2UsIkhvcml6b250YWxBbGlnbm1lbnQiOjIsIlZlcnRpY2FsQWxpZ25tZW50IjowLCJTbWFydEZvcmVncm91bmQiOm51bGwsIkJhY2tncm91bmRGaWxsVHlwZSI6MCwiTWFyZ2luIjp7IiRpZCI6IjQ5MCIsIlRvcCI6MCwiTGVmdCI6MCwiUmlnaHQiOjAsIkJvdHRvbSI6MH0sIlBhZGRpbmciOnsiJGlkIjoiNDkxIiwiVG9wIjowLCJMZWZ0IjowLCJSaWdodCI6MCwiQm90dG9tIjowfSwiQmFja2dyb3VuZCI6eyIkaWQiOiI0OTIiLCJDb2xvciI6eyIkcmVmIjoiNDYyIn19LCJJc1Zpc2libGUiOnRydWUsIldpZHRoIjowLjAsIkhlaWdodCI6MC4wLCJCb3JkZXJTdHlsZSI6eyIkaWQiOiI0OTMiLCJMaW5lQ29sb3IiOm51bGwsIkxpbmVXZWlnaHQiOjAuMCwiTGluZVR5cGUiOjAsIlBhcmVudFN0eWxlIjpudWxsfSwiUGFyZW50U3R5bGUiOm51bGx9LCJEYXRlU3R5bGUiOnsiJGlkIjoiNDk0IiwiRm9udFNldHRpbmdzIjp7IiRpZCI6IjQ5NSIsIkZvbnRTaXplIjoxMCwiRm9udE5hbWUiOiJDYWxpYnJpIiwiSXNCb2xkIjpmYWxzZSwiSXNJdGFsaWMiOmZhbHNlLCJJc1VuZGVybGluZWQiOmZhbHNlLCJQYXJlbnRTdHlsZSI6bnVsbH0sIkF1dG9TaXplIjowLCJGb3JlZ3JvdW5kIjp7IiRpZCI6IjQ5NiIsIkNvbG9yIjp7IiRpZCI6IjQ5NyIsIkEiOjI1NSwiUiI6MjU1LCJHIjoyNTUsIkIiOjI1NX19LCJNYXhXaWR0aCI6MjAwLjAsIk1heEhlaWdodCI6IkluZmluaXR5IiwiU21hcnRGb3JlZ3JvdW5kSXNBY3RpdmUiOmZhbHNlLCJIb3Jpem9udGFsQWxpZ25tZW50IjoxLCJWZXJ0aWNhbEFsaWdubWVudCI6MCwiU21hcnRGb3JlZ3JvdW5kIjpudWxsLCJCYWNrZ3JvdW5kRmlsbFR5cGUiOjAsIk1hcmdpbiI6eyIkaWQiOiI0OTgiLCJUb3AiOjAsIkxlZnQiOjAsIlJpZ2h0IjowLCJCb3R0b20iOjB9LCJQYWRkaW5nIjp7IiRpZCI6IjQ5OSIsIlRvcCI6MCwiTGVmdCI6MCwiUmlnaHQiOjAsIkJvdHRvbSI6MH0sIkJhY2tncm91bmQiOnsiJGlkIjoiNTAwIiwiQ29sb3IiOnsiJHJlZiI6IjQ2MiJ9fSwiSXNWaXNpYmxlIjp0cnVlLCJXaWR0aCI6MC4wLCJIZWlnaHQiOjAuMCwiQm9yZGVyU3R5bGUiOnsiJGlkIjoiNTAxIiwiTGluZUNvbG9yIjpudWxsLCJMaW5lV2VpZ2h0IjowLjAsIkxpbmVUeXBlIjowLCJQYXJlbnRTdHlsZSI6bnVsbH0sIlBhcmVudFN0eWxlIjpudWxsfSwiRGF0ZUZvcm1hdCI6eyIkaWQiOiI1MDIiLCJGb3JtYXRTdHJpbmciOiJNTU0gZCIsIlNlcGFyYXRvciI6Ii8iLCJVc2VJbnRlcm5hdGlvbmFsRGF0ZUZvcm1hdCI6ZmFsc2UsIkRhdGVJc1Zpc2libGUiOnRydWUsIlRpbWVJc1Zpc2libGUiOmZhbHNlLCJIb3VyRGlnaXRzIjoxLCJBbVBtRGVzaWduYXRvciI6MiwiVHJpbTAwTWludXRlcyI6ZmFsc2UsIkxhc3RLbm93blZpc2liaWxpdHlTdGF0ZSI6bnVsbH0sIklzVmlzaWJsZSI6dHJ1ZSwiUGFyZW50U3R5bGUiOm51bGx9LCJJbmRleCI6OCwiU21hcnREdXJhdGlvbkFjdGl2YXRlZCI6ZmFsc2UsIkRhdGVGb3JtYXQiOnsiJHJlZiI6IjUwMiJ9LCJJZCI6Ijg2NDc5ZGY4LWJjNTMtNGZhOC1hODMzLWY1YTA2MjAxYjZkMCIsIkltcG9ydElkIjpudWxsLCJUaXRsZSI6IkxldmVsIGdlbmVyYXRvciIsIk5vdGUiOm51bGwsIkh5cGVybGluayI6eyIkaWQiOiI1MDMiLCJBZGRyZXNzIjoiIiwiU3ViQWRkcmVzcyI6IiJ9LCJJc0NoYW5nZWQiOmZhbHNlLCJJc05ldyI6ZmFsc2V9LCJJbmRleCI6MH0seyIkaWQiOiI1MDQiLCJfYXR0YWNoZWRNaWxlc3RvbmVzIjpbXSwiVGFza0RlZmluaXRpb24iOnsiJGlkIjoiNTA1IiwiR3JvdXBOYW1lIjpudWxsLCJTdGFydERhdGUiOiIyMDE5LTEyLTAzVDAwOjAwOjAwWiIsIkVuZERhdGUiOiIyMDIwLTAzLTMxVDIzOjU5OjAwWiIsIlBlcmNlbnRhZ2VDb21wbGV0ZSI6bnVsbCwiU3R5bGUiOnsiJGlkIjoiNTA2IiwiU2hhcGUiOjEsIlNoYXBlVGhpY2tuZXNzIjoxLCJEdXJhdGlvbkZvcm1hdCI6MCwiSW5jbHVkZU5vbldvcmtpbmdEYXlzSW5EdXJhdGlvbiI6ZmFsc2UsIlBlcmNlbnRhZ2VDb21wbGV0ZVN0eWxlIjp7IiRpZCI6IjUwNyIsIkZvbnRTZXR0aW5ncyI6eyIkaWQiOiI1MDgiLCJGb250U2l6ZSI6MTAsIkZvbnROYW1lIjoiQ2FsaWJyaSIsIklzQm9sZCI6ZmFsc2UsIklzSXRhbGljIjpmYWxzZSwiSXNVbmRlcmxpbmVkIjpmYWxzZSwiUGFyZW50U3R5bGUiOm51bGx9LCJBdXRvU2l6ZSI6MCwiRm9yZWdyb3VuZCI6eyIkaWQiOiI1MDkiLCJDb2xvciI6eyIkaWQiOiI1MTAiLCJBIjoyNTUsIlIiOjE5MiwiRyI6ODAsIkIiOjc3fX0sIk1heFdpZHRoIjoyMDAuMCwiTWF4SGVpZ2h0IjoiSW5maW5pdHkiLCJTbWFydEZvcmVncm91bmRJc0FjdGl2ZSI6ZmFsc2UsIkhvcml6b250YWxBbGlnbm1lbnQiOjEsIlZlcnRpY2FsQWxpZ25tZW50IjowLCJTbWFydEZvcmVncm91bmQiOm51bGwsIkJhY2tncm91bmRGaWxsVHlwZSI6MCwiTWFyZ2luIjp7IiRyZWYiOiI0NTkifSwiUGFkZGluZyI6eyIkcmVmIjoiNDYwIn0sIkJhY2tncm91bmQiOnsiJHJlZiI6IjQ2MSJ9LCJJc1Zpc2libGUiOnRydWUsIldpZHRoIjowLjAsIkhlaWdodCI6MC4wLCJCb3JkZXJTdHlsZSI6eyIkaWQiOiI1MTEiLCJMaW5lQ29sb3IiOm51bGwsIkxpbmVXZWlnaHQiOjAuMCwiTGluZVR5cGUiOjAsIlBhcmVudFN0eWxlIjpudWxsfSwiUGFyZW50U3R5bGUiOm51bGx9LCJEdXJhdGlvblN0eWxlIjp7IiRpZCI6IjUxMiIsIkZvbnRTZXR0aW5ncyI6eyIkaWQiOiI1MTMiLCJGb250U2l6ZSI6MTAsIkZvbnROYW1lIjoiQ2FsaWJyaSIsIklzQm9sZCI6ZmFsc2UsIklzSXRhbGljIjpmYWxzZSwiSXNVbmRlcmxpbmVkIjpmYWxzZSwiUGFyZW50U3R5bGUiOm51bGx9LCJBdXRvU2l6ZSI6MCwiRm9yZWdyb3VuZCI6eyIkcmVmIjoiNDY2In0sIk1heFdpZHRoIjoyMDAuMCwiTWF4SGVpZ2h0IjoiSW5maW5pdHkiLCJTbWFydEZvcmVncm91bmRJc0FjdGl2ZSI6ZmFsc2UsIkhvcml6b250YWxBbGlnbm1lbnQiOjAsIlZlcnRpY2FsQWxpZ25tZW50IjowLCJTbWFydEZvcmVncm91bmQiOm51bGwsIkJhY2tncm91bmRGaWxsVHlwZSI6MCwiTWFyZ2luIjp7IiRyZWYiOiI0NjgifSwiUGFkZGluZyI6eyIkcmVmIjoiNDY5In0sIkJhY2tncm91bmQiOnsiJHJlZiI6IjQ3MCJ9LCJJc1Zpc2libGUiOnRydWUsIldpZHRoIjowLjAsIkhlaWdodCI6MC4wLCJCb3JkZXJTdHlsZSI6eyIkaWQiOiI1MTQiLCJMaW5lQ29sb3IiOm51bGwsIkxpbmVXZWlnaHQiOjAuMCwiTGluZVR5cGUiOjAsIlBhcmVudFN0eWxlIjpudWxsfSwiUGFyZW50U3R5bGUiOm51bGx9LCJIb3Jpem9udGFsQ29ubmVjdG9yU3R5bGUiOnsiJGlkIjoiNTE1IiwiTGluZUNvbG9yIjp7IiRyZWYiOiI0NzMifSwiTGluZVdlaWdodCI6MS4wLCJMaW5lVHlwZSI6MCwiUGFyZW50U3R5bGUiOm51bGx9LCJWZXJ0aWNhbENvbm5lY3RvclN0eWxlIjp7IiRpZCI6IjUxNiIsIkxpbmVDb2xvciI6eyIkcmVmIjoiNDc2In0sIkxpbmVXZWlnaHQiOjAuMCwiTGluZVR5cGUiOjAsIlBhcmVudFN0eWxlIjpudWxsfSwiTWFyZ2luIjpudWxsLCJTdGFydERhdGVQb3NpdGlvbiI6MiwiRW5kRGF0ZVBvc2l0aW9uIjoyLCJEYXRlSXNWaXNpYmxlIjp0cnVlLCJUaXRsZVBvc2l0aW9uIjozLCJEdXJhdGlvblBvc2l0aW9uIjo2LCJQZXJjZW50YWdlQ29tcGxldGVkUG9zaXRpb24iOjYsIlNwYWNpbmciOjUsIklzQmVsb3dUaW1lYmFuZCI6dHJ1ZSwiUGVyY2VudGFnZUNvbXBsZXRlU2hhcGVPcGFjaXR5IjozNSwiU2hhcGVTdHlsZSI6eyIkaWQiOiI1MTciLCJNYXJnaW4iOnsiJHJlZiI6IjQ3OSJ9LCJQYWRkaW5nIjp7IiRyZWYiOiI0ODAifSwiQmFja2dyb3VuZCI6eyIkaWQiOiI1MTgiLCJDb2xvciI6eyIkaWQiOiI1MTkiLCJBIjoyNTUsIlIiOjY4LCJHIjoxMTQsIkIiOjE5Nn19LCJJc1Zpc2libGUiOnRydWUsIldpZHRoIjowLjAsIkhlaWdodCI6MTYuMCwiQm9yZGVyU3R5bGUiOnsiJGlkIjoiNTIwIiwiTGluZUNvbG9yIjp7IiRyZWYiOiI0ODQifSwiTGluZVdlaWdodCI6MC4wLCJMaW5lVHlwZSI6MCwiUGFyZW50U3R5bGUiOm51bGx9LCJQYXJlbnRTdHlsZSI6bnVsbH0sIlRpdGxlU3R5bGUiOnsiJGlkIjoiNTIxIiwiRm9udFNldHRpbmdzIjp7IiRpZCI6IjUyMiIsIkZvbnRTaXplIjoxMSwiRm9udE5hbWUiOiJDYWxpYnJpIiwiSXNCb2xkIjp0cnVlLCJJc0l0YWxpYyI6ZmFsc2UsIklzVW5kZXJsaW5lZCI6ZmFsc2UsIlBhcmVudFN0eWxlIjpudWxsfSwiQXV0b1NpemUiOjAsIkZvcmVncm91bmQiOnsiJGlkIjoiNTIzIiwiQ29sb3IiOnsiJGlkIjoiNTI0IiwiQSI6MjU1LCJSIjowLCJHIjowLCJCIjowfX0sIk1heFdpZHRoIjo2NjAuMCwiTWF4SGVpZ2h0IjoiSW5maW5pdHkiLCJTbWFydEZvcmVncm91bmRJc0FjdGl2ZSI6ZmFsc2UsIkhvcml6b250YWxBbGlnbm1lbnQiOjIsIlZlcnRpY2FsQWxpZ25tZW50IjowLCJTbWFydEZvcmVncm91bmQiOm51bGwsIkJhY2tncm91bmRGaWxsVHlwZSI6MCwiTWFyZ2luIjp7IiRyZWYiOiI0OTAifSwiUGFkZGluZyI6eyIkcmVmIjoiNDkxIn0sIkJhY2tncm91bmQiOnsiJHJlZiI6IjQ5MiJ9LCJJc1Zpc2libGUiOnRydWUsIldpZHRoIjowLjAsIkhlaWdodCI6MC4wLCJCb3JkZXJTdHlsZSI6eyIkaWQiOiI1MjUiLCJMaW5lQ29sb3IiOm51bGwsIkxpbmVXZWlnaHQiOjAuMCwiTGluZVR5cGUiOjAsIlBhcmVudFN0eWxlIjpudWxsfSwiUGFyZW50U3R5bGUiOm51bGx9LCJEYXRlU3R5bGUiOnsiJGlkIjoiNTI2IiwiRm9udFNldHRpbmdzIjp7IiRpZCI6IjUyNyIsIkZvbnRTaXplIjoxMCwiRm9udE5hbWUiOiJDYWxpYnJpIiwiSXNCb2xkIjpmYWxzZSwiSXNJdGFsaWMiOmZhbHNlLCJJc1VuZGVybGluZWQiOmZhbHNlLCJQYXJlbnRTdHlsZSI6bnVsbH0sIkF1dG9TaXplIjowLCJGb3JlZ3JvdW5kIjp7IiRpZCI6IjUyOCIsIkNvbG9yIjp7IiRpZCI6IjUyOSIsIkEiOjI1NSwiUiI6MjU1LCJHIjoyNTUsIkIiOjI1NX19LCJNYXhXaWR0aCI6MjAwLjAsIk1heEhlaWdodCI6IkluZmluaXR5IiwiU21hcnRGb3JlZ3JvdW5kSXNBY3RpdmUiOmZhbHNlLCJIb3Jpem9udGFsQWxpZ25tZW50IjoxLCJWZXJ0aWNhbEFsaWdubWVudCI6MCwiU21hcnRGb3JlZ3JvdW5kIjpudWxsLCJCYWNrZ3JvdW5kRmlsbFR5cGUiOjAsIk1hcmdpbiI6eyIkcmVmIjoiNDk4In0sIlBhZGRpbmciOnsiJHJlZiI6IjQ5OSJ9LCJCYWNrZ3JvdW5kIjp7IiRyZWYiOiI1MDAifSwiSXNWaXNpYmxlIjp0cnVlLCJXaWR0aCI6MC4wLCJIZWlnaHQiOjAuMCwiQm9yZGVyU3R5bGUiOnsiJGlkIjoiNTMwIiwiTGluZUNvbG9yIjpudWxsLCJMaW5lV2VpZ2h0IjowLjAsIkxpbmVUeXBlIjowLCJQYXJlbnRTdHlsZSI6bnVsbH0sIlBhcmVudFN0eWxlIjpudWxsfSwiRGF0ZUZvcm1hdCI6eyIkcmVmIjoiNTAyIn0sIklzVmlzaWJsZSI6dHJ1ZSwiUGFyZW50U3R5bGUiOm51bGx9LCJJbmRleCI6OSwiU21hcnREdXJhdGlvbkFjdGl2YXRlZCI6ZmFsc2UsIkRhdGVGb3JtYXQiOnsiJHJlZiI6IjUwMiJ9LCJJZCI6Ijk0YmVkN2EzLTJmOWYtNDEwZi1hNmM1LTgyYzBlNDNiMTE1NiIsIkltcG9ydElkIjpudWxsLCJUaXRsZSI6IlJvb20gZ2VuZXJhdG9yIiwiTm90ZSI6bnVsbCwiSHlwZXJsaW5rIjp7IiRpZCI6IjUzMSIsIkFkZHJlc3MiOiIiLCJTdWJBZGRyZXNzIjoiIn0sIklzQ2hhbmdlZCI6ZmFsc2UsIklzTmV3IjpmYWxzZX0sIkluZGV4IjowfV0sIk1pbGVzdG9uZXMiOltdfSx7IiRpZCI6IjUzMiIsIklkIjoiNjhkNTRjMDItZDg4Yy00M2JkLThlNTctMThhYTY4ZGIwN2E5IiwiSW5kZXgiOjEwLCJIZWFkZXJUZXh0IjoiR2FtZXBsYXkiLCJTdHlsZSI6eyIkaWQiOiI1MzMiLCJIZWFkZXJTdHlsZSI6eyIkaWQiOiI1MzQiLCJUZXh0U3R5bGUiOnsiJGlkIjoiNTM1IiwiRm9udFNldHRpbmdzIjp7IiRpZCI6IjUzNiIsIkZvbnRTaXplIjoxMiwiRm9udE5hbWUiOiJDYWxpYnJpIiwiSXNCb2xkIjpmYWxzZSwiSXNJdGFsaWMiOmZhbHNlLCJJc1VuZGVybGluZWQiOmZhbHNlLCJQYXJlbnRTdHlsZSI6bnVsbH0sIkF1dG9TaXplIjowLCJGb3JlZ3JvdW5kIjp7IiRpZCI6IjUzNyIsIkNvbG9yIjp7IiRpZCI6IjUzOCIsIkEiOjI1NSwiUiI6NTUsIkciOjU1LCJCIjo1NX19LCJNYXhXaWR0aCI6NTEuNDkzMzMzMzMzMzMzMzM5LCJNYXhIZWlnaHQiOjAuMCwiU21hcnRGb3JlZ3JvdW5kSXNBY3RpdmUiOmZhbHNlLCJIb3Jpem9udGFsQWxpZ25tZW50IjowLCJWZXJ0aWNhbEFsaWdubWVudCI6MCwiU21hcnRGb3JlZ3JvdW5kIjpudWxsLCJCYWNrZ3JvdW5kRmlsbFR5cGUiOjAsIk1hcmdpbiI6eyIkcmVmIjoiNDMwIn0sIlBhZGRpbmciOnsiJHJlZiI6IjQzMSJ9LCJCYWNrZ3JvdW5kIjpudWxsLCJJc1Zpc2libGUiOmZhbHNlLCJXaWR0aCI6MC4wLCJIZWlnaHQiOjAuMCwiQm9yZGVyU3R5bGUiOm51bGwsIlBhcmVudFN0eWxlIjpudWxsfSwiUmVjdGFuZ2xlU3R5bGUiOnsiJGlkIjoiNTM5IiwiTWFyZ2luIjp7IiRyZWYiOiI0MzMifSwiUGFkZGluZyI6eyIkcmVmIjoiNDM0In0sIkJhY2tncm91bmQiOnsiJGlkIjoiNTQwIiwiQ29sb3IiOnsiJGlkIjoiNTQxIiwiQSI6MTI3LCJSIjoxNjUsIkciOjE2NSwiQiI6MTY1fX0sIklzVmlzaWJsZSI6ZmFsc2UsIldpZHRoIjowLjAsIkhlaWdodCI6MC4wLCJCb3JkZXJTdHlsZSI6eyIkaWQiOiI1NDIiLCJMaW5lQ29sb3IiOnsiJGlkIjoiNTQzIiwiJHR5cGUiOiJOTFJFLkNvbW1vbi5Eb20uU29saWRDb2xvckJydXNoLCBOTFJFLkNvbW1vbiIsIkNvbG9yIjp7IiRpZCI6IjU0NCIsIkEiOjI1NSwiUiI6NTUsIkciOjU1LCJCIjo1NX19LCJMaW5lV2VpZ2h0IjowLjAsIkxpbmVUeXBlIjowLCJQYXJlbnRTdHlsZSI6bnVsbH0sIlBhcmVudFN0eWxlIjpudWxsfSwiTWFyZ2luIjp7IiRyZWYiOiI0NDAifSwiUGFkZGluZyI6eyIkcmVmIjoiNDQxIn0sIkJhY2tncm91bmQiOm51bGwsIklzVmlzaWJsZSI6dHJ1ZSwiV2lkdGgiOjAuMCwiSGVpZ2h0IjowLjAsIkJvcmRlclN0eWxlIjpudWxsLCJQYXJlbnRTdHlsZSI6bnVsbH0sIkJhY2tncm91bmRTdHlsZSI6eyIkaWQiOiI1NDUiLCJNYXJnaW4iOnsiJHJlZiI6IjQ0MyJ9LCJQYWRkaW5nIjp7IiRyZWYiOiI0NDQifSwiQmFja2dyb3VuZCI6eyIkaWQiOiI1NDYiLCJDb2xvciI6eyIkaWQiOiI1NDciLCJBIjozOCwiUiI6MTY1LCJHIjoxNjUsIkIiOjE2NX19LCJJc1Zpc2libGUiOnRydWUsIldpZHRoIjowLjAsIkhlaWdodCI6MC4wLCJCb3JkZXJTdHlsZSI6eyIkaWQiOiI1NDgiLCJMaW5lQ29sb3IiOnsiJGlkIjoiNTQ5IiwiJHR5cGUiOiJOTFJFLkNvbW1vbi5Eb20uU29saWRDb2xvckJydXNoLCBOTFJFLkNvbW1vbiIsIkNvbG9yIjp7IiRpZCI6IjU1MCIsIkEiOjI1NSwiUiI6NTUsIkciOjU1LCJCIjo1NX19LCJMaW5lV2VpZ2h0IjowLjAsIkxpbmVUeXBlIjowLCJQYXJlbnRTdHlsZSI6bnVsbH0sIlBhcmVudFN0eWxlIjpudWxsfSwiSXNBYm92ZVRpbWViYW5kIjpmYWxzZSwiTWFyZ2luIjp7IiRyZWYiOiI0NTAifSwiUGFkZGluZyI6eyIkcmVmIjoiNDUxIn0sIklzVmlzaWJsZSI6dHJ1ZSwiV2lkdGgiOjAuMCwiSGVpZ2h0IjowLjAsIkJvcmRlclN0eWxlIjpudWxsLCJQYXJlbnRTdHlsZSI6bnVsbH0sIlRhc2tzIjpbeyIkaWQiOiI1NTEiLCJfYXR0YWNoZWRNaWxlc3RvbmVzIjpbXSwiVGFza0RlZmluaXRpb24iOnsiJGlkIjoiNTUyIiwiR3JvdXBOYW1lIjpudWxsLCJTdGFydERhdGUiOiIyMDIwLTAxLTAxVDAwOjAwOjAwWiIsIkVuZERhdGUiOiIyMDIwLTAzLTMxVDIzOjU5OjAwWiIsIlBlcmNlbnRhZ2VDb21wbGV0ZSI6bnVsbCwiU3R5bGUiOnsiJGlkIjoiNTUzIiwiU2hhcGUiOjEsIlNoYXBlVGhpY2tuZXNzIjoxLCJEdXJhdGlvbkZvcm1hdCI6MCwiSW5jbHVkZU5vbldvcmtpbmdEYXlzSW5EdXJhdGlvbiI6ZmFsc2UsIlBlcmNlbnRhZ2VDb21wbGV0ZVN0eWxlIjp7IiRpZCI6IjU1NCIsIkZvbnRTZXR0aW5ncyI6eyIkaWQiOiI1NTUiLCJGb250U2l6ZSI6MTAsIkZvbnROYW1lIjoiQ2FsaWJyaSIsIklzQm9sZCI6ZmFsc2UsIklzSXRhbGljIjpmYWxzZSwiSXNVbmRlcmxpbmVkIjpmYWxzZSwiUGFyZW50U3R5bGUiOm51bGx9LCJBdXRvU2l6ZSI6MCwiRm9yZWdyb3VuZCI6eyIkaWQiOiI1NTYiLCJDb2xvciI6eyIkaWQiOiI1NTciLCJBIjoyNTUsIlIiOjE5MiwiRyI6ODAsIkIiOjc3fX0sIk1heFdpZHRoIjoyMDAuMCwiTWF4SGVpZ2h0IjoiSW5maW5pdHkiLCJTbWFydEZvcmVncm91bmRJc0FjdGl2ZSI6ZmFsc2UsIkhvcml6b250YWxBbGlnbm1lbnQiOjEsIlZlcnRpY2FsQWxpZ25tZW50IjowLCJTbWFydEZvcmVncm91bmQiOm51bGwsIkJhY2tncm91bmRGaWxsVHlwZSI6MCwiTWFyZ2luIjp7IiRyZWYiOiI0NTkifSwiUGFkZGluZyI6eyIkcmVmIjoiNDYwIn0sIkJhY2tncm91bmQiOnsiJHJlZiI6IjQ2MSJ9LCJJc1Zpc2libGUiOnRydWUsIldpZHRoIjowLjAsIkhlaWdodCI6MC4wLCJCb3JkZXJTdHlsZSI6eyIkaWQiOiI1NTgiLCJMaW5lQ29sb3IiOm51bGwsIkxpbmVXZWlnaHQiOjAuMCwiTGluZVR5cGUiOjAsIlBhcmVudFN0eWxlIjpudWxsfSwiUGFyZW50U3R5bGUiOm51bGx9LCJEdXJhdGlvblN0eWxlIjp7IiRpZCI6IjU1OSIsIkZvbnRTZXR0aW5ncyI6eyIkaWQiOiI1NjAiLCJGb250U2l6ZSI6MTAsIkZvbnROYW1lIjoiQ2FsaWJyaSIsIklzQm9sZCI6ZmFsc2UsIklzSXRhbGljIjpmYWxzZSwiSXNVbmRlcmxpbmVkIjpmYWxzZSwiUGFyZW50U3R5bGUiOm51bGx9LCJBdXRvU2l6ZSI6MCwiRm9yZWdyb3VuZCI6eyIkcmVmIjoiNDY2In0sIk1heFdpZHRoIjoyMDAuMCwiTWF4SGVpZ2h0IjoiSW5maW5pdHkiLCJTbWFydEZvcmVncm91bmRJc0FjdGl2ZSI6ZmFsc2UsIkhvcml6b250YWxBbGlnbm1lbnQiOjAsIlZlcnRpY2FsQWxpZ25tZW50IjowLCJTbWFydEZvcmVncm91bmQiOm51bGwsIkJhY2tncm91bmRGaWxsVHlwZSI6MCwiTWFyZ2luIjp7IiRyZWYiOiI0NjgifSwiUGFkZGluZyI6eyIkcmVmIjoiNDY5In0sIkJhY2tncm91bmQiOnsiJHJlZiI6IjQ3MCJ9LCJJc1Zpc2libGUiOnRydWUsIldpZHRoIjowLjAsIkhlaWdodCI6MC4wLCJCb3JkZXJTdHlsZSI6eyIkaWQiOiI1NjEiLCJMaW5lQ29sb3IiOm51bGwsIkxpbmVXZWlnaHQiOjAuMCwiTGluZVR5cGUiOjAsIlBhcmVudFN0eWxlIjpudWxsfSwiUGFyZW50U3R5bGUiOm51bGx9LCJIb3Jpem9udGFsQ29ubmVjdG9yU3R5bGUiOnsiJGlkIjoiNTYyIiwiTGluZUNvbG9yIjp7IiRyZWYiOiI0NzMifSwiTGluZVdlaWdodCI6MS4wLCJMaW5lVHlwZSI6MCwiUGFyZW50U3R5bGUiOm51bGx9LCJWZXJ0aWNhbENvbm5lY3RvclN0eWxlIjp7IiRpZCI6IjU2MyIsIkxpbmVDb2xvciI6eyIkcmVmIjoiNDc2In0sIkxpbmVXZWlnaHQiOjAuMCwiTGluZVR5cGUiOjAsIlBhcmVudFN0eWxlIjpudWxsfSwiTWFyZ2luIjpudWxsLCJTdGFydERhdGVQb3NpdGlvbiI6MiwiRW5kRGF0ZVBvc2l0aW9uIjoyLCJEYXRlSXNWaXNpYmxlIjp0cnVlLCJUaXRsZVBvc2l0aW9uIjozLCJEdXJhdGlvblBvc2l0aW9uIjo2LCJQZXJjZW50YWdlQ29tcGxldGVkUG9zaXRpb24iOjYsIlNwYWNpbmciOjUsIklzQmVsb3dUaW1lYmFuZCI6dHJ1ZSwiUGVyY2VudGFnZUNvbXBsZXRlU2hhcGVPcGFjaXR5IjozNSwiU2hhcGVTdHlsZSI6eyIkaWQiOiI1NjQiLCJNYXJnaW4iOnsiJHJlZiI6IjQ3OSJ9LCJQYWRkaW5nIjp7IiRyZWYiOiI0ODAifSwiQmFja2dyb3VuZCI6eyIkaWQiOiI1NjUiLCJDb2xvciI6eyIkaWQiOiI1NjYiLCJBIjoyNTUsIlIiOjY4LCJHIjoxMTQsIkIiOjE5Nn19LCJJc1Zpc2libGUiOnRydWUsIldpZHRoIjowLjAsIkhlaWdodCI6MTYuMCwiQm9yZGVyU3R5bGUiOnsiJGlkIjoiNTY3IiwiTGluZUNvbG9yIjp7IiRyZWYiOiI0ODQifSwiTGluZVdlaWdodCI6MC4wLCJMaW5lVHlwZSI6MCwiUGFyZW50U3R5bGUiOm51bGx9LCJQYXJlbnRTdHlsZSI6bnVsbH0sIlRpdGxlU3R5bGUiOnsiJGlkIjoiNTY4IiwiRm9udFNldHRpbmdzIjp7IiRpZCI6IjU2OSIsIkZvbnRTaXplIjoxMSwiRm9udE5hbWUiOiJDYWxpYnJpIiwiSXNCb2xkIjp0cnVlLCJJc0l0YWxpYyI6ZmFsc2UsIklzVW5kZXJsaW5lZCI6ZmFsc2UsIlBhcmVudFN0eWxlIjpudWxsfSwiQXV0b1NpemUiOjAsIkZvcmVncm91bmQiOnsiJGlkIjoiNTcwIiwiQ29sb3IiOnsiJGlkIjoiNTcxIiwiQSI6MjU1LCJSIjowLCJHIjowLCJCIjowfX0sIk1heFdpZHRoIjo2NjAuMCwiTWF4SGVpZ2h0IjoiSW5maW5pdHkiLCJTbWFydEZvcmVncm91bmRJc0FjdGl2ZSI6ZmFsc2UsIkhvcml6b250YWxBbGlnbm1lbnQiOjIsIlZlcnRpY2FsQWxpZ25tZW50IjowLCJTbWFydEZvcmVncm91bmQiOm51bGwsIkJhY2tncm91bmRGaWxsVHlwZSI6MCwiTWFyZ2luIjp7IiRyZWYiOiI0OTAifSwiUGFkZGluZyI6eyIkcmVmIjoiNDkxIn0sIkJhY2tncm91bmQiOnsiJHJlZiI6IjQ5MiJ9LCJJc1Zpc2libGUiOnRydWUsIldpZHRoIjowLjAsIkhlaWdodCI6MC4wLCJCb3JkZXJTdHlsZSI6eyIkaWQiOiI1NzIiLCJMaW5lQ29sb3IiOm51bGwsIkxpbmVXZWlnaHQiOjAuMCwiTGluZVR5cGUiOjAsIlBhcmVudFN0eWxlIjpudWxsfSwiUGFyZW50U3R5bGUiOm51bGx9LCJEYXRlU3R5bGUiOnsiJGlkIjoiNTczIiwiRm9udFNldHRpbmdzIjp7IiRpZCI6IjU3NCIsIkZvbnRTaXplIjoxMCwiRm9udE5hbWUiOiJDYWxpYnJpIiwiSXNCb2xkIjpmYWxzZSwiSXNJdGFsaWMiOmZhbHNlLCJJc1VuZGVybGluZWQiOmZhbHNlLCJQYXJlbnRTdHlsZSI6bnVsbH0sIkF1dG9TaXplIjowLCJGb3JlZ3JvdW5kIjp7IiRpZCI6IjU3NSIsIkNvbG9yIjp7IiRpZCI6IjU3NiIsIkEiOjI1NSwiUiI6MjU1LCJHIjoyNTUsIkIiOjI1NX19LCJNYXhXaWR0aCI6MjAwLjAsIk1heEhlaWdodCI6IkluZmluaXR5IiwiU21hcnRGb3JlZ3JvdW5kSXNBY3RpdmUiOmZhbHNlLCJIb3Jpem9udGFsQWxpZ25tZW50IjoxLCJWZXJ0aWNhbEFsaWdubWVudCI6MCwiU21hcnRGb3JlZ3JvdW5kIjpudWxsLCJCYWNrZ3JvdW5kRmlsbFR5cGUiOjAsIk1hcmdpbiI6eyIkcmVmIjoiNDk4In0sIlBhZGRpbmciOnsiJHJlZiI6IjQ5OSJ9LCJCYWNrZ3JvdW5kIjp7IiRyZWYiOiI1MDAifSwiSXNWaXNpYmxlIjp0cnVlLCJXaWR0aCI6MC4wLCJIZWlnaHQiOjAuMCwiQm9yZGVyU3R5bGUiOnsiJGlkIjoiNTc3IiwiTGluZUNvbG9yIjpudWxsLCJMaW5lV2VpZ2h0IjowLjAsIkxpbmVUeXBlIjowLCJQYXJlbnRTdHlsZSI6bnVsbH0sIlBhcmVudFN0eWxlIjpudWxsfSwiRGF0ZUZvcm1hdCI6eyIkcmVmIjoiNTAyIn0sIklzVmlzaWJsZSI6dHJ1ZSwiUGFyZW50U3R5bGUiOm51bGx9LCJJbmRleCI6MTEsIlNtYXJ0RHVyYXRpb25BY3RpdmF0ZWQiOmZhbHNlLCJEYXRlRm9ybWF0Ijp7IiRyZWYiOiI1MDIifSwiSWQiOiJhODhlNTg3Ni00NGEzLTRiMjgtYjg0NS05OTIxMTEzNWIyODAiLCJJbXBvcnRJZCI6bnVsbCwiVGl0bGUiOiJBZGQgZ2FtZXBsYXkiLCJOb3RlIjpudWxsLCJIeXBlcmxpbmsiOnsiJGlkIjoiNTc4IiwiQWRkcmVzcyI6IiIsIlN1YkFkZHJlc3MiOiIifSwiSXNDaGFuZ2VkIjpmYWxzZSwiSXNOZXciOmZhbHNlfSwiSW5kZXgiOjB9XSwiTWlsZXN0b25lcyI6W119LHsiJGlkIjoiNTc5IiwiSWQiOiJiY2I0OGM4OS00NzE0LTQ5MzMtOTE0MC0zMDlmOGE0ZjZmZWUiLCJJbmRleCI6MTIsIkhlYWRlclRleHQiOiJSZXBvcnQiLCJTdHlsZSI6eyIkaWQiOiI1ODAiLCJIZWFkZXJTdHlsZSI6eyIkaWQiOiI1ODEiLCJUZXh0U3R5bGUiOnsiJGlkIjoiNTgyIiwiRm9udFNldHRpbmdzIjp7IiRpZCI6IjU4MyIsIkZvbnRTaXplIjoxMiwiRm9udE5hbWUiOiJDYWxpYnJpIiwiSXNCb2xkIjpmYWxzZSwiSXNJdGFsaWMiOmZhbHNlLCJJc1VuZGVybGluZWQiOmZhbHNlLCJQYXJlbnRTdHlsZSI6bnVsbH0sIkF1dG9TaXplIjowLCJGb3JlZ3JvdW5kIjp7IiRpZCI6IjU4NCIsIkNvbG9yIjp7IiRpZCI6IjU4NSIsIkEiOjI1NSwiUiI6ODUsIkciOjY0LCJCIjowfX0sIk1heFdpZHRoIjo1MS40OTMzMzMzMzMzMzMzMzksIk1heEhlaWdodCI6MC4wLCJTbWFydEZvcmVncm91bmRJc0FjdGl2ZSI6ZmFsc2UsIkhvcml6b250YWxBbGlnbm1lbnQiOjAsIlZlcnRpY2FsQWxpZ25tZW50IjowLCJTbWFydEZvcmVncm91bmQiOm51bGwsIkJhY2tncm91bmRGaWxsVHlwZSI6MCwiTWFyZ2luIjp7IiRyZWYiOiI0MzAifSwiUGFkZGluZyI6eyIkcmVmIjoiNDMxIn0sIkJhY2tncm91bmQiOm51bGwsIklzVmlzaWJsZSI6ZmFsc2UsIldpZHRoIjowLjAsIkhlaWdodCI6MC4wLCJCb3JkZXJTdHlsZSI6bnVsbCwiUGFyZW50U3R5bGUiOm51bGx9LCJSZWN0YW5nbGVTdHlsZSI6eyIkaWQiOiI1ODYiLCJNYXJnaW4iOnsiJHJlZiI6IjQzMyJ9LCJQYWRkaW5nIjp7IiRyZWYiOiI0MzQifSwiQmFja2dyb3VuZCI6eyIkaWQiOiI1ODciLCJDb2xvciI6eyIkaWQiOiI1ODgiLCJBIjoxMjcsIlIiOjI1NSwiRyI6MTkyLCJCIjowfX0sIklzVmlzaWJsZSI6ZmFsc2UsIldpZHRoIjowLjAsIkhlaWdodCI6MC4wLCJCb3JkZXJTdHlsZSI6eyIkaWQiOiI1ODkiLCJMaW5lQ29sb3IiOnsiJGlkIjoiNTkwIiwiJHR5cGUiOiJOTFJFLkNvbW1vbi5Eb20uU29saWRDb2xvckJydXNoLCBOTFJFLkNvbW1vbiIsIkNvbG9yIjp7IiRpZCI6IjU5MSIsIkEiOjI1NSwiUiI6ODUsIkciOjY0LCJCIjowfX0sIkxpbmVXZWlnaHQiOjAuMCwiTGluZVR5cGUiOjAsIlBhcmVudFN0eWxlIjpudWxsfSwiUGFyZW50U3R5bGUiOm51bGx9LCJNYXJnaW4iOnsiJHJlZiI6IjQ0MCJ9LCJQYWRkaW5nIjp7IiRyZWYiOiI0NDEifSwiQmFja2dyb3VuZCI6bnVsbCwiSXNWaXNpYmxlIjp0cnVlLCJXaWR0aCI6MC4wLCJIZWlnaHQiOjAuMCwiQm9yZGVyU3R5bGUiOm51bGwsIlBhcmVudFN0eWxlIjpudWxsfSwiQmFja2dyb3VuZFN0eWxlIjp7IiRpZCI6IjU5MiIsIk1hcmdpbiI6eyIkcmVmIjoiNDQzIn0sIlBhZGRpbmciOnsiJHJlZiI6IjQ0NCJ9LCJCYWNrZ3JvdW5kIjp7IiRpZCI6IjU5MyIsIkNvbG9yIjp7IiRpZCI6IjU5NCIsIkEiOjM4LCJSIjoyNTUsIkciOjE5MiwiQiI6MH19LCJJc1Zpc2libGUiOnRydWUsIldpZHRoIjowLjAsIkhlaWdodCI6MC4wLCJCb3JkZXJTdHlsZSI6eyIkaWQiOiI1OTUiLCJMaW5lQ29sb3IiOnsiJGlkIjoiNTk2IiwiJHR5cGUiOiJOTFJFLkNvbW1vbi5Eb20uU29saWRDb2xvckJydXNoLCBOTFJFLkNvbW1vbiIsIkNvbG9yIjp7IiRpZCI6IjU5NyIsIkEiOjI1NSwiUiI6ODUsIkciOjY0LCJCIjowfX0sIkxpbmVXZWlnaHQiOjAuMCwiTGluZVR5cGUiOjAsIlBhcmVudFN0eWxlIjpudWxsfSwiUGFyZW50U3R5bGUiOm51bGx9LCJJc0Fib3ZlVGltZWJhbmQiOmZhbHNlLCJNYXJnaW4iOnsiJHJlZiI6IjQ1MCJ9LCJQYWRkaW5nIjp7IiRyZWYiOiI0NTEifSwiSXNWaXNpYmxlIjp0cnVlLCJXaWR0aCI6MC4wLCJIZWlnaHQiOjAuMCwiQm9yZGVyU3R5bGUiOm51bGwsIlBhcmVudFN0eWxlIjpudWxsfSwiVGFza3MiOlt7IiRpZCI6IjU5OCIsIl9hdHRhY2hlZE1pbGVzdG9uZXMiOltdLCJUYXNrRGVmaW5pdGlvbiI6eyIkaWQiOiI1OTkiLCJHcm91cE5hbWUiOm51bGwsIlN0YXJ0RGF0ZSI6IjIwMTktMDktMjlUMDA6MDA6MDBaIiwiRW5kRGF0ZSI6IjIwMTktMTItMTNUMjM6NTk6MDBaIiwiUGVyY2VudGFnZUNvbXBsZXRlIjpudWxsLCJTdHlsZSI6eyIkaWQiOiI2MDAiLCJTaGFwZSI6MSwiU2hhcGVUaGlja25lc3MiOjEsIkR1cmF0aW9uRm9ybWF0IjowLCJJbmNsdWRlTm9uV29ya2luZ0RheXNJbkR1cmF0aW9uIjpmYWxzZSwiUGVyY2VudGFnZUNvbXBsZXRlU3R5bGUiOnsiJGlkIjoiNjAxIiwiRm9udFNldHRpbmdzIjp7IiRpZCI6IjYwMiIsIkZvbnRTaXplIjoxMCwiRm9udE5hbWUiOiJDYWxpYnJpIiwiSXNCb2xkIjpmYWxzZSwiSXNJdGFsaWMiOmZhbHNlLCJJc1VuZGVybGluZWQiOmZhbHNlLCJQYXJlbnRTdHlsZSI6bnVsbH0sIkF1dG9TaXplIjowLCJGb3JlZ3JvdW5kIjp7IiRpZCI6IjYwMyIsIkNvbG9yIjp7IiRpZCI6IjYwNCIsIkEiOjI1NSwiUiI6MTkyLCJHIjo4MCwiQiI6Nzd9fSwiTWF4V2lkdGgiOjIwMC4wLCJNYXhIZWlnaHQiOiJJbmZpbml0eSIsIlNtYXJ0Rm9yZWdyb3VuZElzQWN0aXZlIjpmYWxzZSwiSG9yaXpvbnRhbEFsaWdubWVudCI6MSwiVmVydGljYWxBbGlnbm1lbnQiOjAsIlNtYXJ0Rm9yZWdyb3VuZCI6bnVsbCwiQmFja2dyb3VuZEZpbGxUeXBlIjowLCJNYXJnaW4iOnsiJHJlZiI6IjQ1OSJ9LCJQYWRkaW5nIjp7IiRyZWYiOiI0NjAifSwiQmFja2dyb3VuZCI6eyIkcmVmIjoiNDYxIn0sIklzVmlzaWJsZSI6dHJ1ZSwiV2lkdGgiOjAuMCwiSGVpZ2h0IjowLjAsIkJvcmRlclN0eWxlIjp7IiRpZCI6IjYwNSIsIkxpbmVDb2xvciI6bnVsbCwiTGluZVdlaWdodCI6MC4wLCJMaW5lVHlwZSI6MCwiUGFyZW50U3R5bGUiOm51bGx9LCJQYXJlbnRTdHlsZSI6bnVsbH0sIkR1cmF0aW9uU3R5bGUiOnsiJGlkIjoiNjA2IiwiRm9udFNldHRpbmdzIjp7IiRpZCI6IjYwNyIsIkZvbnRTaXplIjoxMCwiRm9udE5hbWUiOiJDYWxpYnJpIiwiSXNCb2xkIjpmYWxzZSwiSXNJdGFsaWMiOmZhbHNlLCJJc1VuZGVybGluZWQiOmZhbHNlLCJQYXJlbnRTdHlsZSI6bnVsbH0sIkF1dG9TaXplIjowLCJGb3JlZ3JvdW5kIjp7IiRyZWYiOiI0NjYifSwiTWF4V2lkdGgiOjIwMC4wLCJNYXhIZWlnaHQiOiJJbmZpbml0eSIsIlNtYXJ0Rm9yZWdyb3VuZElzQWN0aXZlIjpmYWxzZSwiSG9yaXpvbnRhbEFsaWdubWVudCI6MCwiVmVydGljYWxBbGlnbm1lbnQiOjAsIlNtYXJ0Rm9yZWdyb3VuZCI6bnVsbCwiQmFja2dyb3VuZEZpbGxUeXBlIjowLCJNYXJnaW4iOnsiJHJlZiI6IjQ2OCJ9LCJQYWRkaW5nIjp7IiRyZWYiOiI0NjkifSwiQmFja2dyb3VuZCI6eyIkcmVmIjoiNDcwIn0sIklzVmlzaWJsZSI6dHJ1ZSwiV2lkdGgiOjAuMCwiSGVpZ2h0IjowLjAsIkJvcmRlclN0eWxlIjp7IiRpZCI6IjYwOCIsIkxpbmVDb2xvciI6bnVsbCwiTGluZVdlaWdodCI6MC4wLCJMaW5lVHlwZSI6MCwiUGFyZW50U3R5bGUiOm51bGx9LCJQYXJlbnRTdHlsZSI6bnVsbH0sIkhvcml6b250YWxDb25uZWN0b3JTdHlsZSI6eyIkaWQiOiI2MDkiLCJMaW5lQ29sb3IiOnsiJHJlZiI6IjQ3MyJ9LCJMaW5lV2VpZ2h0IjoxLjAsIkxpbmVUeXBlIjowLCJQYXJlbnRTdHlsZSI6bnVsbH0sIlZlcnRpY2FsQ29ubmVjdG9yU3R5bGUiOnsiJGlkIjoiNjEwIiwiTGluZUNvbG9yIjp7IiRyZWYiOiI0NzYifSwiTGluZVdlaWdodCI6MC4wLCJMaW5lVHlwZSI6MCwiUGFyZW50U3R5bGUiOm51bGx9LCJNYXJnaW4iOm51bGwsIlN0YXJ0RGF0ZVBvc2l0aW9uIjoyLCJFbmREYXRlUG9zaXRpb24iOjIsIkRhdGVJc1Zpc2libGUiOnRydWUsIlRpdGxlUG9zaXRpb24iOjQsIkR1cmF0aW9uUG9zaXRpb24iOjYsIlBlcmNlbnRhZ2VDb21wbGV0ZWRQb3NpdGlvbiI6NiwiU3BhY2luZyI6NSwiSXNCZWxvd1RpbWViYW5kIjp0cnVlLCJQZXJjZW50YWdlQ29tcGxldGVTaGFwZU9wYWNpdHkiOjM1LCJTaGFwZVN0eWxlIjp7IiRpZCI6IjYxMSIsIk1hcmdpbiI6eyIkcmVmIjoiNDc5In0sIlBhZGRpbmciOnsiJHJlZiI6IjQ4MCJ9LCJCYWNrZ3JvdW5kIjp7IiRpZCI6IjYxMiIsIkNvbG9yIjp7IiRpZCI6IjYxMyIsIkEiOjI1NSwiUiI6NjgsIkciOjExNCwiQiI6MTk2fX0sIklzVmlzaWJsZSI6dHJ1ZSwiV2lkdGgiOjAuMCwiSGVpZ2h0IjoxNi4wLCJCb3JkZXJTdHlsZSI6eyIkaWQiOiI2MTQiLCJMaW5lQ29sb3IiOnsiJHJlZiI6IjQ4NCJ9LCJMaW5lV2VpZ2h0IjowLjAsIkxpbmVUeXBlIjowLCJQYXJlbnRTdHlsZSI6bnVsbH0sIlBhcmVudFN0eWxlIjpudWxsfSwiVGl0bGVTdHlsZSI6eyIkaWQiOiI2MTUiLCJGb250U2V0dGluZ3MiOnsiJGlkIjoiNjE2IiwiRm9udFNpemUiOjExLCJGb250TmFtZSI6IkNhbGlicmkiLCJJc0JvbGQiOnRydWUsIklzSXRhbGljIjpmYWxzZSwiSXNVbmRlcmxpbmVkIjpmYWxzZSwiUGFyZW50U3R5bGUiOm51bGx9LCJBdXRvU2l6ZSI6MCwiRm9yZWdyb3VuZCI6eyIkaWQiOiI2MTciLCJDb2xvciI6eyIkaWQiOiI2MTgiLCJBIjoyNTUsIlIiOjAsIkciOjAsIkIiOjB9fSwiTWF4V2lkdGgiOjY2MC4wLCJNYXhIZWlnaHQiOiJJbmZpbml0eSIsIlNtYXJ0Rm9yZWdyb3VuZElzQWN0aXZlIjpmYWxzZSwiSG9yaXpvbnRhbEFsaWdubWVudCI6MCwiVmVydGljYWxBbGlnbm1lbnQiOjAsIlNtYXJ0Rm9yZWdyb3VuZCI6bnVsbCwiQmFja2dyb3VuZEZpbGxUeXBlIjowLCJNYXJnaW4iOnsiJHJlZiI6IjQ5MCJ9LCJQYWRkaW5nIjp7IiRyZWYiOiI0OTEifSwiQmFja2dyb3VuZCI6eyIkcmVmIjoiNDkyIn0sIklzVmlzaWJsZSI6dHJ1ZSwiV2lkdGgiOjAuMCwiSGVpZ2h0IjowLjAsIkJvcmRlclN0eWxlIjp7IiRpZCI6IjYxOSIsIkxpbmVDb2xvciI6bnVsbCwiTGluZVdlaWdodCI6MC4wLCJMaW5lVHlwZSI6MCwiUGFyZW50U3R5bGUiOm51bGx9LCJQYXJlbnRTdHlsZSI6bnVsbH0sIkRhdGVTdHlsZSI6eyIkaWQiOiI2MjAiLCJGb250U2V0dGluZ3MiOnsiJGlkIjoiNjIxIiwiRm9udFNpemUiOjEwLCJGb250TmFtZSI6IkNhbGlicmkiLCJJc0JvbGQiOmZhbHNlLCJJc0l0YWxpYyI6ZmFsc2UsIklzVW5kZXJsaW5lZCI6ZmFsc2UsIlBhcmVudFN0eWxlIjpudWxsfSwiQXV0b1NpemUiOjAsIkZvcmVncm91bmQiOnsiJGlkIjoiNjIyIiwiQ29sb3IiOnsiJGlkIjoiNjIzIiwiQSI6MjU1LCJSIjoyNTUsIkciOjI1NSwiQiI6MjU1fX0sIk1heFdpZHRoIjoyMDAuMCwiTWF4SGVpZ2h0IjoiSW5maW5pdHkiLCJTbWFydEZvcmVncm91bmRJc0FjdGl2ZSI6ZmFsc2UsIkhvcml6b250YWxBbGlnbm1lbnQiOjEsIlZlcnRpY2FsQWxpZ25tZW50IjowLCJTbWFydEZvcmVncm91bmQiOm51bGwsIkJhY2tncm91bmRGaWxsVHlwZSI6MCwiTWFyZ2luIjp7IiRyZWYiOiI0OTgifSwiUGFkZGluZyI6eyIkcmVmIjoiNDk5In0sIkJhY2tncm91bmQiOnsiJHJlZiI6IjUwMCJ9LCJJc1Zpc2libGUiOnRydWUsIldpZHRoIjowLjAsIkhlaWdodCI6MC4wLCJCb3JkZXJTdHlsZSI6eyIkaWQiOiI2MjQiLCJMaW5lQ29sb3IiOm51bGwsIkxpbmVXZWlnaHQiOjAuMCwiTGluZVR5cGUiOjAsIlBhcmVudFN0eWxlIjpudWxsfSwiUGFyZW50U3R5bGUiOm51bGx9LCJEYXRlRm9ybWF0Ijp7IiRyZWYiOiI1MDIifSwiSXNWaXNpYmxlIjp0cnVlLCJQYXJlbnRTdHlsZSI6bnVsbH0sIkluZGV4IjoxMywiU21hcnREdXJhdGlvbkFjdGl2YXRlZCI6ZmFsc2UsIkRhdGVGb3JtYXQiOnsiJHJlZiI6IjUwMiJ9LCJJZCI6IjRkOTY3ZTMxLWQ5NTctNDc0OC05Y2IxLWE3NDZiOTY2MDdkNSIsIkltcG9ydElkIjpudWxsLCJUaXRsZSI6IlByb2dyZXNzIHJlcG9ydCIsIk5vdGUiOm51bGwsIkh5cGVybGluayI6eyIkaWQiOiI2MjUiLCJBZGRyZXNzIjoiIiwiU3ViQWRkcmVzcyI6IiJ9LCJJc0NoYW5nZWQiOmZhbHNlLCJJc05ldyI6ZmFsc2V9LCJJbmRleCI6MH0seyIkaWQiOiI2MjYiLCJfYXR0YWNoZWRNaWxlc3RvbmVzIjpbXSwiVGFza0RlZmluaXRpb24iOnsiJGlkIjoiNjI3IiwiR3JvdXBOYW1lIjpudWxsLCJTdGFydERhdGUiOiIyMDE5LTA5LTI5VDAwOjAwOjAwWiIsIkVuZERhdGUiOiIyMDIwLTAzLTMxVDIzOjU5OjAwWiIsIlBlcmNlbnRhZ2VDb21wbGV0ZSI6bnVsbCwiU3R5bGUiOnsiJGlkIjoiNjI4IiwiU2hhcGUiOjEsIlNoYXBlVGhpY2tuZXNzIjoxLCJEdXJhdGlvbkZvcm1hdCI6MCwiSW5jbHVkZU5vbldvcmtpbmdEYXlzSW5EdXJhdGlvbiI6ZmFsc2UsIlBlcmNlbnRhZ2VDb21wbGV0ZVN0eWxlIjp7IiRpZCI6IjYyOSIsIkZvbnRTZXR0aW5ncyI6eyIkaWQiOiI2MzAiLCJGb250U2l6ZSI6MTAsIkZvbnROYW1lIjoiQ2FsaWJyaSIsIklzQm9sZCI6ZmFsc2UsIklzSXRhbGljIjpmYWxzZSwiSXNVbmRlcmxpbmVkIjpmYWxzZSwiUGFyZW50U3R5bGUiOm51bGx9LCJBdXRvU2l6ZSI6MCwiRm9yZWdyb3VuZCI6eyIkaWQiOiI2MzEiLCJDb2xvciI6eyIkaWQiOiI2MzIiLCJBIjoyNTUsIlIiOjE5MiwiRyI6ODAsIkIiOjc3fX0sIk1heFdpZHRoIjoyMDAuMCwiTWF4SGVpZ2h0IjoiSW5maW5pdHkiLCJTbWFydEZvcmVncm91bmRJc0FjdGl2ZSI6ZmFsc2UsIkhvcml6b250YWxBbGlnbm1lbnQiOjEsIlZlcnRpY2FsQWxpZ25tZW50IjowLCJTbWFydEZvcmVncm91bmQiOm51bGwsIkJhY2tncm91bmRGaWxsVHlwZSI6MCwiTWFyZ2luIjp7IiRyZWYiOiI0NTkifSwiUGFkZGluZyI6eyIkcmVmIjoiNDYwIn0sIkJhY2tncm91bmQiOnsiJHJlZiI6IjQ2MSJ9LCJJc1Zpc2libGUiOnRydWUsIldpZHRoIjowLjAsIkhlaWdodCI6MC4wLCJCb3JkZXJTdHlsZSI6eyIkaWQiOiI2MzMiLCJMaW5lQ29sb3IiOm51bGwsIkxpbmVXZWlnaHQiOjAuMCwiTGluZVR5cGUiOjAsIlBhcmVudFN0eWxlIjpudWxsfSwiUGFyZW50U3R5bGUiOm51bGx9LCJEdXJhdGlvblN0eWxlIjp7IiRpZCI6IjYzNCIsIkZvbnRTZXR0aW5ncyI6eyIkaWQiOiI2MzUiLCJGb250U2l6ZSI6MTAsIkZvbnROYW1lIjoiQ2FsaWJyaSIsIklzQm9sZCI6ZmFsc2UsIklzSXRhbGljIjpmYWxzZSwiSXNVbmRlcmxpbmVkIjpmYWxzZSwiUGFyZW50U3R5bGUiOm51bGx9LCJBdXRvU2l6ZSI6MCwiRm9yZWdyb3VuZCI6eyIkcmVmIjoiNDY2In0sIk1heFdpZHRoIjoyMDAuMCwiTWF4SGVpZ2h0IjoiSW5maW5pdHkiLCJTbWFydEZvcmVncm91bmRJc0FjdGl2ZSI6ZmFsc2UsIkhvcml6b250YWxBbGlnbm1lbnQiOjAsIlZlcnRpY2FsQWxpZ25tZW50IjowLCJTbWFydEZvcmVncm91bmQiOm51bGwsIkJhY2tncm91bmRGaWxsVHlwZSI6MCwiTWFyZ2luIjp7IiRyZWYiOiI0NjgifSwiUGFkZGluZyI6eyIkcmVmIjoiNDY5In0sIkJhY2tncm91bmQiOnsiJHJlZiI6IjQ3MCJ9LCJJc1Zpc2libGUiOnRydWUsIldpZHRoIjowLjAsIkhlaWdodCI6MC4wLCJCb3JkZXJTdHlsZSI6eyIkaWQiOiI2MzYiLCJMaW5lQ29sb3IiOm51bGwsIkxpbmVXZWlnaHQiOjAuMCwiTGluZVR5cGUiOjAsIlBhcmVudFN0eWxlIjpudWxsfSwiUGFyZW50U3R5bGUiOm51bGx9LCJIb3Jpem9udGFsQ29ubmVjdG9yU3R5bGUiOnsiJGlkIjoiNjM3IiwiTGluZUNvbG9yIjp7IiRyZWYiOiI0NzMifSwiTGluZVdlaWdodCI6MS4wLCJMaW5lVHlwZSI6MCwiUGFyZW50U3R5bGUiOm51bGx9LCJWZXJ0aWNhbENvbm5lY3RvclN0eWxlIjp7IiRpZCI6IjYzOCIsIkxpbmVDb2xvciI6eyIkcmVmIjoiNDc2In0sIkxpbmVXZWlnaHQiOjAuMCwiTGluZVR5cGUiOjAsIlBhcmVudFN0eWxlIjpudWxsfSwiTWFyZ2luIjpudWxsLCJTdGFydERhdGVQb3NpdGlvbiI6MiwiRW5kRGF0ZVBvc2l0aW9uIjoyLCJEYXRlSXNWaXNpYmxlIjp0cnVlLCJUaXRsZVBvc2l0aW9uIjozLCJEdXJhdGlvblBvc2l0aW9uIjo2LCJQZXJjZW50YWdlQ29tcGxldGVkUG9zaXRpb24iOjYsIlNwYWNpbmciOjUsIklzQmVsb3dUaW1lYmFuZCI6dHJ1ZSwiUGVyY2VudGFnZUNvbXBsZXRlU2hhcGVPcGFjaXR5IjozNSwiU2hhcGVTdHlsZSI6eyIkaWQiOiI2MzkiLCJNYXJnaW4iOnsiJHJlZiI6IjQ3OSJ9LCJQYWRkaW5nIjp7IiRyZWYiOiI0ODAifSwiQmFja2dyb3VuZCI6eyIkaWQiOiI2NDAiLCJDb2xvciI6eyIkaWQiOiI2NDEiLCJBIjoyNTUsIlIiOjY4LCJHIjoxMTQsIkIiOjE5Nn19LCJJc1Zpc2libGUiOnRydWUsIldpZHRoIjowLjAsIkhlaWdodCI6MTYuMCwiQm9yZGVyU3R5bGUiOnsiJGlkIjoiNjQyIiwiTGluZUNvbG9yIjp7IiRyZWYiOiI0ODQifSwiTGluZVdlaWdodCI6MC4wLCJMaW5lVHlwZSI6MCwiUGFyZW50U3R5bGUiOm51bGx9LCJQYXJlbnRTdHlsZSI6bnVsbH0sIlRpdGxlU3R5bGUiOnsiJGlkIjoiNjQzIiwiRm9udFNldHRpbmdzIjp7IiRpZCI6IjY0NCIsIkZvbnRTaXplIjoxMSwiRm9udE5hbWUiOiJDYWxpYnJpIiwiSXNCb2xkIjp0cnVlLCJJc0l0YWxpYyI6ZmFsc2UsIklzVW5kZXJsaW5lZCI6ZmFsc2UsIlBhcmVudFN0eWxlIjpudWxsfSwiQXV0b1NpemUiOjAsIkZvcmVncm91bmQiOnsiJGlkIjoiNjQ1IiwiQ29sb3IiOnsiJGlkIjoiNjQ2IiwiQSI6MjU1LCJSIjowLCJHIjowLCJCIjowfX0sIk1heFdpZHRoIjo2NjAuMCwiTWF4SGVpZ2h0IjoiSW5maW5pdHkiLCJTbWFydEZvcmVncm91bmRJc0FjdGl2ZSI6ZmFsc2UsIkhvcml6b250YWxBbGlnbm1lbnQiOjIsIlZlcnRpY2FsQWxpZ25tZW50IjowLCJTbWFydEZvcmVncm91bmQiOm51bGwsIkJhY2tncm91bmRGaWxsVHlwZSI6MCwiTWFyZ2luIjp7IiRyZWYiOiI0OTAifSwiUGFkZGluZyI6eyIkcmVmIjoiNDkxIn0sIkJhY2tncm91bmQiOnsiJHJlZiI6IjQ5MiJ9LCJJc1Zpc2libGUiOnRydWUsIldpZHRoIjowLjAsIkhlaWdodCI6MC4wLCJCb3JkZXJTdHlsZSI6eyIkaWQiOiI2NDciLCJMaW5lQ29sb3IiOm51bGwsIkxpbmVXZWlnaHQiOjAuMCwiTGluZVR5cGUiOjAsIlBhcmVudFN0eWxlIjpudWxsfSwiUGFyZW50U3R5bGUiOm51bGx9LCJEYXRlU3R5bGUiOnsiJGlkIjoiNjQ4IiwiRm9udFNldHRpbmdzIjp7IiRpZCI6IjY0OSIsIkZvbnRTaXplIjoxMCwiRm9udE5hbWUiOiJDYWxpYnJpIiwiSXNCb2xkIjpmYWxzZSwiSXNJdGFsaWMiOmZhbHNlLCJJc1VuZGVybGluZWQiOmZhbHNlLCJQYXJlbnRTdHlsZSI6bnVsbH0sIkF1dG9TaXplIjowLCJGb3JlZ3JvdW5kIjp7IiRpZCI6IjY1MCIsIkNvbG9yIjp7IiRpZCI6IjY1MSIsIkEiOjI1NSwiUiI6MjU1LCJHIjoyNTUsIkIiOjI1NX19LCJNYXhXaWR0aCI6MjAwLjAsIk1heEhlaWdodCI6IkluZmluaXR5IiwiU21hcnRGb3JlZ3JvdW5kSXNBY3RpdmUiOmZhbHNlLCJIb3Jpem9udGFsQWxpZ25tZW50IjoxLCJWZXJ0aWNhbEFsaWdubWVudCI6MCwiU21hcnRGb3JlZ3JvdW5kIjpudWxsLCJCYWNrZ3JvdW5kRmlsbFR5cGUiOjAsIk1hcmdpbiI6eyIkcmVmIjoiNDk4In0sIlBhZGRpbmciOnsiJHJlZiI6IjQ5OSJ9LCJCYWNrZ3JvdW5kIjp7IiRyZWYiOiI1MDAifSwiSXNWaXNpYmxlIjp0cnVlLCJXaWR0aCI6MC4wLCJIZWlnaHQiOjAuMCwiQm9yZGVyU3R5bGUiOnsiJGlkIjoiNjUyIiwiTGluZUNvbG9yIjpudWxsLCJMaW5lV2VpZ2h0IjowLjAsIkxpbmVUeXBlIjowLCJQYXJlbnRTdHlsZSI6bnVsbH0sIlBhcmVudFN0eWxlIjpudWxsfSwiRGF0ZUZvcm1hdCI6eyIkcmVmIjoiNTAyIn0sIklzVmlzaWJsZSI6dHJ1ZSwiUGFyZW50U3R5bGUiOm51bGx9LCJJbmRleCI6MTQsIlNtYXJ0RHVyYXRpb25BY3RpdmF0ZWQiOmZhbHNlLCJEYXRlRm9ybWF0Ijp7IiRyZWYiOiI1MDIifSwiSWQiOiI4MTMwZDU0My1lYzU4LTRkNDgtYTczMC01MjczYzI5NTgwOWEiLCJJbXBvcnRJZCI6bnVsbCwiVGl0bGUiOiJGaW5hbCByZXBvcnQiLCJOb3RlIjpudWxsLCJIeXBlcmxpbmsiOnsiJGlkIjoiNjUzIiwiQWRkcmVzcyI6IiIsIlN1YkFkZHJlc3MiOiIifSwiSXNDaGFuZ2VkIjpmYWxzZSwiSXNOZXciOmZhbHNlfSwiSW5kZXgiOjB9XSwiTWlsZXN0b25lcyI6W119XSwiTXNQcm9qZWN0SXRlbXNUcmVlIjp7IiRpZCI6IjY1NCIsIlJvb3QiOnsiSW1wb3J0SWQiOm51bGwsIklzSW1wb3J0ZWQiOmZhbHNlLCJDaGlsZHJlbiI6W119fSwiTWV0YWRhdGEiOnsiJGlkIjoiNjU1IiwiUmVjZW50Q29sb3JzQ29sbGVjdGlvbiI6IltdIn0sIlNldHRpbmdzIjp7IiRpZCI6IjY1NiIsIkltcGFPcHRpb25zIjp7IiRpZCI6IjY1NyIsIkxlZnRUb1JpZ2h0IjpmYWxzZSwiUGF5bG9hZE9wdGlvbnMiOjJ9LCJVc2VDb21wcmVzc2lvbiI6ZmFsc2UsIkNvbXByZXNpb25QZXJjZW50YWdlIjo1MC4wLCJJbmFjdGl2ZUludGVydmFsV2lkdGhUaHJlc2hvbGQiOjMwLjAsIkluYWN0aXZlSW50ZXJ2YWxXaWR0aCI6MS4wLCJTcGxpdFRhc2tzIjpmYWxzZSwiVXNlQ2x1c3RlciI6ZmFsc2UsIkVwc2lsb24iOjUuMCwiTWluUG9pbnRzVG9Gb3JtQUNsdXN0ZXIiOjIsIkdlbmVyYXRlSW52aXNpYmxlU2hhcGVzIjpmYWxzZSwiU21hcnRUaW1lbGluZVRhc2tQZXJjZW50YWdlRml0IjpmYWxzZX0sIklzTmV3IjpmYWxzZSwiSW1wb3J0VHlwZSI6MCwiRmlsZVBhdGgiOm51bGwsIlRpbWVDb25maWd1cmF0aW9uIjp7IiRpZCI6IjY1OCIsIlVzZVRpbWUiOmZhbHNlLCJXb3JrRGF5U3RhcnQiOiIwMDowMDowMCIsIldvcmtEYXlFbmQiOiIyMzo1OTowMCJ9LCJMYXN0VXNlZFRlbXBsYXRlSWQiOiI4MmE3NzYwNi1iNjRhLTQ4NWQtYWY0MS0xYWUzNzhjOWE1ZDQifQ=="/>
+  <p:tag name="__PART_0" val="eyIkaWQiOiIxIiwiQ3VsdHVyZUluZm9OYW1lIjoiZW4tVVMiLCJTdHlsZU5hbWUiOm51bGwsIlZlcnNpb24iOnsiJGlkIjoiMiIsIlZlcnNpb24iOiIzLjIuMCIsIk9yaWdpbmFsQXNzZW1ibHlWZXJzaW9uIjoiNC4wMS4wMC4wMCIsIkVkaXRpb24iOiJGcmVlIiwiSXNQbHVzRWRpdGlvbiI6ZmFsc2UsIklzUHJvRWRpdGlvbiI6ZmFsc2V9LCJFZmZlY3QiOjAsIlN0eWxlIjp7IiRpZCI6IjMiLCJUaW1lYmFuZFN0eWxlIjp7IiRpZCI6IjQiLCJTY2FsZU1hcmtpbmciOjAsIlNoYXBlIjoxMywiU2hhcGVTdHlsZSI6eyIkaWQiOiI1IiwiTWFyZ2luIjp7IiRpZCI6IjYiLCJUb3AiOjAsIkxlZnQiOjEwLCJSaWdodCI6MTAsIkJvdHRvbSI6MH0sIlBhZGRpbmciOnsiJGlkIjoiNyIsIlRvcCI6NSwiTGVmdCI6MTMsIlJpZ2h0IjoxMywiQm90dG9tIjo1fSwiQmFja2dyb3VuZCI6eyIkaWQiOiI4IiwiQ29sb3IiOnsiJGlkIjoiOSIsIkEiOjI1NSwiUiI6MjMxLCJHIjoyMzAsIkIiOjIzMH19LCJJc1Zpc2libGUiOnRydWUsIldpZHRoIjo4NTguMCwiSGVpZ2h0IjozMC4wLCJCb3JkZXJTdHlsZSI6eyIkaWQiOiIxMCIsIkxpbmVDb2xvciI6eyIkaWQiOiIxMSIsIiR0eXBlIjoiTkxSRS5Db21tb24uRG9tLlNvbGlkQ29sb3JCcnVzaCwgTkxSRS5Db21tb24iLCJDb2xvciI6eyIkaWQiOiIxMiIsIkEiOjI1NSwiUiI6MjU1LCJHIjowLCJCIjowfX0sIkxpbmVXZWlnaHQiOjAuMCwiTGluZVR5cGUiOjAsIlBhcmVudFN0eWxlIjpudWxsfSwiUGFyZW50U3R5bGUiOm51bGx9LCJSaWdodEVuZENhcHNTdHlsZSI6eyIkaWQiOiIxMyIsIkZvbnRTZXR0aW5ncyI6eyIkaWQiOiIxNCIsIkZvbnRTaXplIjoxOCwiRm9udE5hbWUiOiJDYWxpYnJpIiwiSXNCb2xkIjp0cnVlLCJJc0l0YWxpYyI6ZmFsc2UsIklzVW5kZXJsaW5lZCI6ZmFsc2UsIlBhcmVudFN0eWxlIjpudWxsfSwiQXV0b1NpemUiOjAsIkZvcmVncm91bmQiOnsiJGlkIjoiMTUiLCJDb2xvciI6eyIkaWQiOiIxNiIsIkEiOjI1NSwiUiI6MCwiRyI6MCwiQiI6MH19LCJNYXhXaWR0aCI6IkluZmluaXR5IiwiTWF4SGVpZ2h0IjoiSW5maW5pdHkiLCJTbWFydEZvcmVncm91bmRJc0FjdGl2ZSI6ZmFsc2UsIkhvcml6b250YWxBbGlnbm1lbnQiOjAsIlZlcnRpY2FsQWxpZ25tZW50IjowLCJTbWFydEZvcmVncm91bmQiOm51bGwsIkJhY2tncm91bmRGaWxsVHlwZSI6MCwiTWFyZ2luIjp7IiRpZCI6IjE3IiwiVG9wIjowLCJMZWZ0IjowLCJSaWdodCI6MjAsIkJvdHRvbSI6MH0sIlBhZGRpbmciOnsiJGlkIjoiMTgiLCJUb3AiOjAsIkxlZnQiOjAsIlJpZ2h0IjowLCJCb3R0b20iOjB9LCJCYWNrZ3JvdW5kIjp7IiRpZCI6IjE5IiwiQ29sb3IiOnsiJGlkIjoiMjAiLCJBIjo4OSwiUiI6MCwiRyI6MCwiQiI6MH19LCJJc1Zpc2libGUiOmZhbHNlLCJXaWR0aCI6MC4wLCJIZWlnaHQiOjAuMCwiQm9yZGVyU3R5bGUiOm51bGwsIlBhcmVudFN0eWxlIjpudWxsfSwiTGVmdEVuZENhcHNTdHlsZSI6eyIkaWQiOiIyMSIsIkZvbnRTZXR0aW5ncyI6eyIkaWQiOiIyMiIsIkZvbnRTaXplIjoxOCwiRm9udE5hbWUiOiJDYWxpYnJpIiwiSXNCb2xkIjp0cnVlLCJJc0l0YWxpYyI6ZmFsc2UsIklzVW5kZXJsaW5lZCI6ZmFsc2UsIlBhcmVudFN0eWxlIjpudWxsfSwiQXV0b1NpemUiOjAsIkZvcmVncm91bmQiOnsiJGlkIjoiMjMiLCJDb2xvciI6eyIkaWQiOiIyNCIsIkEiOjI1NSwiUiI6MjM3LCJHIjoxMjUsIkIiOjQ5fX0sIk1heFdpZHRoIjoiSW5maW5pdHkiLCJNYXhIZWlnaHQiOiJJbmZpbml0eSIsIlNtYXJ0Rm9yZWdyb3VuZElzQWN0aXZlIjpmYWxzZSwiSG9yaXpvbnRhbEFsaWdubWVudCI6MCwiVmVydGljYWxBbGlnbm1lbnQiOjAsIlNtYXJ0Rm9yZWdyb3VuZCI6bnVsbCwiQmFja2dyb3VuZEZpbGxUeXBlIjowLCJNYXJnaW4iOnsiJGlkIjoiMjUiLCJUb3AiOjAsIkxlZnQiOjIwLCJSaWdodCI6MCwiQm90dG9tIjowfSwiUGFkZGluZyI6eyIkaWQiOiIyNiIsIlRvcCI6MCwiTGVmdCI6MCwiUmlnaHQiOjAsIkJvdHRvbSI6MH0sIkJhY2tncm91bmQiOnsiJGlkIjoiMjciLCJDb2xvciI6eyIkcmVmIjoiMjAifX0sIklzVmlzaWJsZSI6ZmFsc2UsIldpZHRoIjowLjAsIkhlaWdodCI6MC4wLCJCb3JkZXJTdHlsZSI6bnVsbCwiUGFyZW50U3R5bGUiOm51bGx9LCJUb2RheVRleHRTdHlsZSI6eyIkaWQiOiIyOCIsIkZvbnRTZXR0aW5ncyI6eyIkaWQiOiIyOSIsIkZvbnRTaXplIjoxMiwiRm9udE5hbWUiOiJDYWxpYnJpIiwiSXNCb2xkIjpmYWxzZSwiSXNJdGFsaWMiOmZhbHNlLCJJc1VuZGVybGluZWQiOmZhbHNlLCJQYXJlbnRTdHlsZSI6bnVsbH0sIkF1dG9TaXplIjowLCJGb3JlZ3JvdW5kIjp7IiRpZCI6IjMwIiwiQ29sb3IiOnsiJGlkIjoiMzEiLCJBIjoyNTUsIlIiOjAsIkciOjAsIkIiOjB9fSwiTWF4V2lkdGgiOjIwMC4wLCJNYXhIZWlnaHQiOiJJbmZpbml0eSIsIlNtYXJ0Rm9yZWdyb3VuZElzQWN0aXZlIjpmYWxzZSwiSG9yaXpvbnRhbEFsaWdubWVudCI6MCwiVmVydGljYWxBbGlnbm1lbnQiOjAsIlNtYXJ0Rm9yZWdyb3VuZCI6bnVsbCwiQmFja2dyb3VuZEZpbGxUeXBlIjowLCJNYXJnaW4iOnsiJGlkIjoiMzIiLCJUb3AiOjAsIkxlZnQiOjAsIlJpZ2h0IjowLCJCb3R0b20iOjB9LCJQYWRkaW5nIjp7IiRpZCI6IjMzIiwiVG9wIjowLCJMZWZ0IjowLCJSaWdodCI6MCwiQm90dG9tIjowfSwiQmFja2dyb3VuZCI6eyIkaWQiOiIzNCIsIkNvbG9yIjp7IiRyZWYiOiIyMCJ9fSwiSXNWaXNpYmxlIjp0cnVlLCJXaWR0aCI6MC4wLCJIZWlnaHQiOjAuMCwiQm9yZGVyU3R5bGUiOm51bGwsIlBhcmVudFN0eWxlIjpudWxsfSwiVG9kYXlNYXJrZXJTdHlsZSI6eyIkaWQiOiIzNSIsIk1hcmdpbiI6eyIkaWQiOiIzNiIsIlRvcCI6MCwiTGVmdCI6MCwiUmlnaHQiOjAsIkJvdHRvbSI6MH0sIlBhZGRpbmciOnsiJGlkIjoiMzciLCJUb3AiOjAsIkxlZnQiOjAsIlJpZ2h0IjowLCJCb3R0b20iOjB9LCJCYWNrZ3JvdW5kIjp7IiRpZCI6IjM4IiwiQ29sb3IiOnsiJGlkIjoiMzkiLCJBIjoyNTUsIlIiOjI1NSwiRyI6MCwiQiI6MH19LCJJc1Zpc2libGUiOnRydWUsIldpZHRoIjowLjAsIkhlaWdodCI6MC4wLCJCb3JkZXJTdHlsZSI6bnVsbCwiUGFyZW50U3R5bGUiOm51bGx9LCJTY2FsZVN0eWxlIjp7IiRpZCI6IjQwIiwiU2hvd1NlZ21lbnRTZXBhcmF0b3JzIjp0cnVlLCJTZWdtZW50U2VwYXJhdG9yT3BhY2l0eSI6MzAsIkZvbnRTZXR0aW5ncyI6eyIkaWQiOiI0MSIsIkZvbnRTaXplIjoxMiwiRm9udE5hbWUiOiJDYWxpYnJpIiwiSXNCb2xkIjpmYWxzZSwiSXNJdGFsaWMiOmZhbHNlLCJJc1VuZGVybGluZWQiOmZhbHNlLCJQYXJlbnRTdHlsZSI6bnVsbH0sIkF1dG9TaXplIjowLCJGb3JlZ3JvdW5kIjp7IiRpZCI6IjQyIiwiQ29sb3IiOnsiJGlkIjoiNDMiLCJBIjoyNTUsIlIiOjAsIkciOjAsIkIiOjB9fSwiTWF4V2lkdGgiOjIwMC4wLCJNYXhIZWlnaHQiOiJJbmZpbml0eSIsIlNtYXJ0Rm9yZWdyb3VuZElzQWN0aXZlIjpmYWxzZSwiSG9yaXpvbnRhbEFsaWdubWVudCI6MCwiVmVydGljYWxBbGlnbm1lbnQiOjEsIlNtYXJ0Rm9yZWdyb3VuZCI6bnVsbCwiQmFja2dyb3VuZEZpbGxUeXBlIjowLCJNYXJnaW4iOnsiJGlkIjoiNDQiLCJUb3AiOjAsIkxlZnQiOjUsIlJpZ2h0IjowLCJCb3R0b20iOjB9LCJQYWRkaW5nIjp7IiRpZCI6IjQ1IiwiVG9wIjowLCJMZWZ0IjowLCJSaWdodCI6MCwiQm90dG9tIjowfSwiQmFja2dyb3VuZCI6eyIkaWQiOiI0NiIsIkNvbG9yIjp7IiRyZWYiOiIyMCJ9fSwiSXNWaXNpYmxlIjp0cnVlLCJXaWR0aCI6MC4wLCJIZWlnaHQiOjAuMCwiQm9yZGVyU3R5bGUiOm51bGwsIlBhcmVudFN0eWxlIjpudWxsfSwiRWxhcHNlZFRpbWVCYWNrZ3JvdW5kIjp7IiRpZCI6IjQ3IiwiQ29sb3IiOnsiJGlkIjoiNDgiLCJBIjo3NiwiUiI6MTUwLCJHIjoyMTQsIkIiOjY2fX0sIkFwcGVuZFllYXJPblllYXJDaGFuZ2UiOnRydWUsIkVsYXBzZWRUaW1lRm9ybWF0IjoxLCJUb2RheU1hcmtlclBvc2l0aW9uIjowLCJRdWlja1Bvc2l0aW9uIjozLCJBYnNvbHV0ZVBvc2l0aW9uIjoxNDYuODcyNTEzLCJNYXJnaW4iOnsiJGlkIjoiNDkiLCJUb3AiOjAsIkxlZnQiOjEwLCJSaWdodCI6MTAsIkJvdHRvbSI6MH0sIlBhZGRpbmciOnsiJGlkIjoiNTAiLCJUb3AiOjAsIkxlZnQiOjAsIlJpZ2h0IjowLCJCb3R0b20iOjB9LCJCYWNrZ3JvdW5kIjp7IiRpZCI6IjUxIiwiQ29sb3IiOnsiJGlkIjoiNTIiLCJBIjoyNTUsIlIiOjQ3LCJHIjo1NCwiQiI6MTUzfX0sIklzVmlzaWJsZSI6dHJ1ZSwiV2lkdGgiOjAuMCwiSGVpZ2h0IjowLjAsIkJvcmRlclN0eWxlIjpudWxsLCJQYXJlbnRTdHlsZSI6bnVsbH0sIkRlZmF1bHRNaWxlc3RvbmVTdHlsZSI6eyIkaWQiOiI1MyIsIlNoYXBlIjowLCJDb25uZWN0b3JNYXJnaW4iOnsiJGlkIjoiNTQiLCJUb3AiOjAsIkxlZnQiOjIsIlJpZ2h0IjoyLCJCb3R0b20iOjB9LCJDb25uZWN0b3JTdHlsZSI6eyIkaWQiOiI1NSIsIkxpbmVDb2xvciI6eyIkaWQiOiI1NiIsIiR0eXBlIjoiTkxSRS5Db21tb24uRG9tLlNvbGlkQ29sb3JCcnVzaCwgTkxSRS5Db21tb24iLCJDb2xvciI6eyIkaWQiOiI1NyIsIkEiOjEyNywiUiI6NzksIkciOjEyOSwiQiI6MTg5fX0sIkxpbmVXZWlnaHQiOjEuMCwiTGluZVR5cGUiOjAsIlBhcmVudFN0eWxlIjpudWxsfSwiSXNCZWxvd1RpbWViYW5kIjpmYWxzZSwiUG9zaXRpb25PblRhc2siOjAsIkhpZGVEYXRlIjpmYWxzZSwiU2hhcGVTaXplIjoxLCJTcGFjaW5nIjoyLjAsIlBhZGRpbmciOnsiJGlkIjoiNTgiLCJUb3AiOjcsIkxlZnQiOjMsIlJpZ2h0IjowLCJCb3R0b20iOjJ9LCJTaGFwZVN0eWxlIjp7IiRpZCI6IjU5IiwiTWFyZ2luIjp7IiRpZCI6IjYwIiwiVG9wIjowLCJMZWZ0IjowLCJSaWdodCI6MCwiQm90dG9tIjowfSwiUGFkZGluZyI6eyIkaWQiOiI2MSIsIlRvcCI6MCwiTGVmdCI6MCwiUmlnaHQiOjAsIkJvdHRvbSI6MH0sIkJhY2tncm91bmQiOnsiJGlkIjoiNjIiLCJDb2xvciI6eyIkaWQiOiI2MyIsIkEiOjI1NSwiUiI6MCwiRyI6MTE0LCJCIjoxODh9fSwiSXNWaXNpYmxlIjp0cnVlLCJXaWR0aCI6MTguMCwiSGVpZ2h0IjoyMC4wLCJCb3JkZXJTdHlsZSI6eyIkaWQiOiI2NCIsIkxpbmVDb2xvciI6eyIkaWQiOiI2NSIsIiR0eXBlIjoiTkxSRS5Db21tb24uRG9tLlNvbGlkQ29sb3JCcnVzaCwgTkxSRS5Db21tb24iLCJDb2xvciI6eyIkaWQiOiI2NiIsIkEiOjI1NSwiUiI6MjU1LCJHIjowLCJCIjowfX0sIkxpbmVXZWlnaHQiOjAuMCwiTGluZVR5cGUiOjAsIlBhcmVudFN0eWxlIjpudWxsfSwiUGFyZW50U3R5bGUiOm51bGx9LCJUaXRsZVN0eWxlIjp7IiRpZCI6IjY3IiwiRm9udFNldHRpbmdzIjp7IiRpZCI6IjY4IiwiRm9udFNpemUiOjExLCJGb250TmFtZSI6IkNhbGlicmkiLCJJc0JvbGQiOnRydWUsIklzSXRhbGljIjpmYWxzZSwiSXNVbmRlcmxpbmVkIjpmYWxzZSwiUGFyZW50U3R5bGUiOm51bGx9LCJBdXRvU2l6ZSI6MCwiRm9yZWdyb3VuZCI6eyIkaWQiOiI2OSIsIkNvbG9yIjp7IiRpZCI6IjcwIiwiQSI6MjU1LCJSIjowLCJHIjowLCJCIjowfX0sIk1heFdpZHRoIjoyMDAuMCwiTWF4SGVpZ2h0IjoiSW5maW5pdHkiLCJTbWFydEZvcmVncm91bmRJc0FjdGl2ZSI6ZmFsc2UsIkhvcml6b250YWxBbGlnbm1lbnQiOjEsIlZlcnRpY2FsQWxpZ25tZW50IjowLCJTbWFydEZvcmVncm91bmQiOm51bGwsIkJhY2tncm91bmRGaWxsVHlwZSI6MCwiTWFyZ2luIjp7IiRpZCI6IjcxIiwiVG9wIjowLCJMZWZ0IjowLCJSaWdodCI6MCwiQm90dG9tIjowfSwiUGFkZGluZyI6eyIkaWQiOiI3MiIsIlRvcCI6MCwiTGVmdCI6MCwiUmlnaHQiOjAsIkJvdHRvbSI6MH0sIkJhY2tncm91bmQiOnsiJGlkIjoiNzMiLCJDb2xvciI6eyIkcmVmIjoiMjAifX0sIklzVmlzaWJsZSI6dHJ1ZSwiV2lkdGgiOjAuMCwiSGVpZ2h0IjowLjAsIkJvcmRlclN0eWxlIjpudWxsLCJQYXJlbnRTdHlsZSI6bnVsbH0sIkRhdGVTdHlsZSI6eyIkaWQiOiI3NCIsIkZvbnRTZXR0aW5ncyI6eyIkaWQiOiI3NSIsIkZvbnRTaXplIjoxMCwiRm9udE5hbWUiOiJDYWxpYnJpIiwiSXNCb2xkIjpmYWxzZSwiSXNJdGFsaWMiOmZhbHNlLCJJc1VuZGVybGluZWQiOmZhbHNlLCJQYXJlbnRTdHlsZSI6bnVsbH0sIkF1dG9TaXplIjowLCJGb3JlZ3JvdW5kIjp7IiRpZCI6Ijc2IiwiQ29sb3IiOnsiJGlkIjoiNzciLCJBIjoyNTUsIlIiOjY4LCJHIjo4NCwiQiI6MTA2fX0sIk1heFdpZHRoIjoyMDAuMCwiTWF4SGVpZ2h0IjoiSW5maW5pdHkiLCJTbWFydEZvcmVncm91bmRJc0FjdGl2ZSI6ZmFsc2UsIkhvcml6b250YWxBbGlnbm1lbnQiOjAsIlZlcnRpY2FsQWxpZ25tZW50IjowLCJTbWFydEZvcmVncm91bmQiOm51bGwsIkJhY2tncm91bmRGaWxsVHlwZSI6MCwiTWFyZ2luIjp7IiRpZCI6Ijc4IiwiVG9wIjowLCJMZWZ0IjowLCJSaWdodCI6MCwiQm90dG9tIjowfSwiUGFkZGluZyI6eyIkaWQiOiI3OSIsIlRvcCI6MCwiTGVmdCI6MCwiUmlnaHQiOjAsIkJvdHRvbSI6MH0sIkJhY2tncm91bmQiOnsiJGlkIjoiODAiLCJDb2xvciI6eyIkcmVmIjoiMjAifX0sIklzVmlzaWJsZSI6dHJ1ZSwiV2lkdGgiOjAuMCwiSGVpZ2h0IjowLjAsIkJvcmRlclN0eWxlIjpudWxsLCJQYXJlbnRTdHlsZSI6bnVsbH0sIkRhdGVGb3JtYXQiOnsiJGlkIjoiODEiLCJGb3JtYXRTdHJpbmciOiJNTU0gZCIsIlNlcGFyYXRvciI6Ii8iLCJVc2VJbnRlcm5hdGlvbmFsRGF0ZUZvcm1hdCI6ZmFsc2UsIkRhdGVJc1Zpc2libGUiOnRydWUsIlRpbWVJc1Zpc2libGUiOmZhbHNlLCJIb3VyRGlnaXRzIjoxLCJBbVBtRGVzaWduYXRvciI6MiwiVHJpbTAwTWludXRlcyI6ZmFsc2UsIkxhc3RLbm93blZpc2liaWxpdHlTdGF0ZSI6bnVsbH0sIklzVmlzaWJsZSI6dHJ1ZSwiUGFyZW50U3R5bGUiOm51bGx9LCJEZWZhdWx0VGFza1N0eWxlIjp7IiRpZCI6IjgyIiwiU2hhcGUiOjIsIlNoYXBlVGhpY2tuZXNzIjoxLCJEdXJhdGlvbkZvcm1hdCI6NSwiSW5jbHVkZU5vbldvcmtpbmdEYXlzSW5EdXJhdGlvbiI6ZmFsc2UsIlBlcmNlbnRhZ2VDb21wbGV0ZVN0eWxlIjp7IiRpZCI6IjgzIiwiRm9udFNldHRpbmdzIjp7IiRpZCI6Ijg0IiwiRm9udFNpemUiOjEwLCJGb250TmFtZSI6IkNhbGlicmkiLCJJc0JvbGQiOmZhbHNlLCJJc0l0YWxpYyI6ZmFsc2UsIklzVW5kZXJsaW5lZCI6ZmFsc2UsIlBhcmVudFN0eWxlIjpudWxsfSwiQXV0b1NpemUiOjAsIkZvcmVncm91bmQiOnsiJGlkIjoiODUiLCJDb2xvciI6eyIkaWQiOiI4NiIsIkEiOjI1NSwiUiI6MTkyLCJHIjo4MCwiQiI6Nzd9fSwiTWF4V2lkdGgiOjIwMC4wLCJNYXhIZWlnaHQiOiJJbmZpbml0eSIsIlNtYXJ0Rm9yZWdyb3VuZElzQWN0aXZlIjpmYWxzZSwiSG9yaXpvbnRhbEFsaWdubWVudCI6MCwiVmVydGljYWxBbGlnbm1lbnQiOjAsIlNtYXJ0Rm9yZWdyb3VuZCI6bnVsbCwiQmFja2dyb3VuZEZpbGxUeXBlIjowLCJNYXJnaW4iOnsiJGlkIjoiODciLCJUb3AiOjAsIkxlZnQiOjAsIlJpZ2h0IjowLCJCb3R0b20iOjB9LCJQYWRkaW5nIjp7IiRpZCI6Ijg4IiwiVG9wIjowLCJMZWZ0IjowLCJSaWdodCI6MCwiQm90dG9tIjowfSwiQmFja2dyb3VuZCI6eyIkaWQiOiI4OSIsIkNvbG9yIjp7IiRyZWYiOiIyMCJ9fSwiSXNWaXNpYmxlIjp0cnVlLCJXaWR0aCI6MC4wLCJIZWlnaHQiOjAuMCwiQm9yZGVyU3R5bGUiOm51bGwsIlBhcmVudFN0eWxlIjpudWxsfSwiRHVyYXRpb25TdHlsZSI6eyIkaWQiOiI5MCIsIkZvbnRTZXR0aW5ncyI6eyIkaWQiOiI5MSIsIkZvbnRTaXplIjoxMCwiRm9udE5hbWUiOiJDYWxpYnJpIiwiSXNCb2xkIjpmYWxzZSwiSXNJdGFsaWMiOmZhbHNlLCJJc1VuZGVybGluZWQiOmZhbHNlLCJQYXJlbnRTdHlsZSI6bnVsbH0sIkF1dG9TaXplIjowLCJGb3JlZ3JvdW5kIjp7IiRpZCI6IjkyIiwiQ29sb3IiOnsiJGlkIjoiOTMiLCJBIjoyNTUsIlIiOjIzNywiRyI6MTI1LCJCIjo0OX19LCJNYXhXaWR0aCI6MjAwLjAsIk1heEhlaWdodCI6IkluZmluaXR5IiwiU21hcnRGb3JlZ3JvdW5kSXNBY3RpdmUiOmZhbHNlLCJIb3Jpem9udGFsQWxpZ25tZW50IjowLCJWZXJ0aWNhbEFsaWdubWVudCI6MCwiU21hcnRGb3JlZ3JvdW5kIjpudWxsLCJCYWNrZ3JvdW5kRmlsbFR5cGUiOjAsIk1hcmdpbiI6eyIkaWQiOiI5NCIsIlRvcCI6MCwiTGVmdCI6MCwiUmlnaHQiOjAsIkJvdHRvbSI6MH0sIlBhZGRpbmciOnsiJGlkIjoiOTUiLCJUb3AiOjAsIkxlZnQiOjAsIlJpZ2h0IjowLCJCb3R0b20iOjB9LCJCYWNrZ3JvdW5kIjp7IiRpZCI6Ijk2IiwiQ29sb3IiOnsiJHJlZiI6IjIwIn19LCJJc1Zpc2libGUiOnRydWUsIldpZHRoIjowLjAsIkhlaWdodCI6MC4wLCJCb3JkZXJTdHlsZSI6bnVsbCwiUGFyZW50U3R5bGUiOm51bGx9LCJIb3Jpem9udGFsQ29ubmVjdG9yU3R5bGUiOnsiJGlkIjoiOTciLCJMaW5lQ29sb3IiOnsiJGlkIjoiOTgiLCIkdHlwZSI6Ik5MUkUuQ29tbW9uLkRvbS5Tb2xpZENvbG9yQnJ1c2gsIE5MUkUuQ29tbW9uIiwiQ29sb3IiOnsiJGlkIjoiOTkiLCJBIjoyNTUsIlIiOjIwNCwiRyI6MjA0LCJCIjoyMDR9fSwiTGluZVdlaWdodCI6MS4wLCJMaW5lVHlwZSI6MCwiUGFyZW50U3R5bGUiOm51bGx9LCJWZXJ0aWNhbENvbm5lY3RvclN0eWxlIjp7IiRpZCI6IjEwMCIsIkxpbmVDb2xvciI6eyIkaWQiOiIxMDEiLCIkdHlwZSI6Ik5MUkUuQ29tbW9uLkRvbS5Tb2xpZENvbG9yQnJ1c2gsIE5MUkUuQ29tbW9uIiwiQ29sb3IiOnsiJGlkIjoiMTAyIiwiQSI6MjU1LCJSIjoyMDQsIkciOjIwNCwiQiI6MjA0fX0sIkxpbmVXZWlnaHQiOjAuMCwiTGluZVR5cGUiOjAsIlBhcmVudFN0eWxlIjpudWxsfSwiTWFyZ2luIjpudWxsLCJTdGFydERhdGVQb3NpdGlvbiI6MywiRW5kRGF0ZVBvc2l0aW9uIjozLCJEYXRlSXNWaXNpYmxlIjp0cnVlLCJUaXRsZVBvc2l0aW9uIjo0LCJEdXJhdGlvblBvc2l0aW9uIjo2LCJQZXJjZW50YWdlQ29tcGxldGVkUG9zaXRpb24iOjYsIlNwYWNpbmciOjUsIklzQmVsb3dUaW1lYmFuZCI6dHJ1ZSwiUGVyY2VudGFnZUNvbXBsZXRlU2hhcGVPcGFjaXR5IjozNSwiU2hhcGVTdHlsZSI6eyIkaWQiOiIxMDMiLCJNYXJnaW4iOnsiJGlkIjoiMTA0IiwiVG9wIjowLCJMZWZ0Ijo0LCJSaWdodCI6NCwiQm90dG9tIjowfSwiUGFkZGluZyI6eyIkaWQiOiIxMDUiLCJUb3AiOjAsIkxlZnQiOjAsIlJpZ2h0IjowLCJCb3R0b20iOjB9LCJCYWNrZ3JvdW5kIjp7IiRpZCI6IjEwNiIsIkNvbG9yIjp7IiRpZCI6IjEwNyIsIkEiOjI1NSwiUiI6MCwiRyI6MTE0LCJCIjoxODh9fSwiSXNWaXNpYmxlIjp0cnVlLCJXaWR0aCI6MC4wLCJIZWlnaHQiOjE2LjAsIkJvcmRlclN0eWxlIjp7IiRpZCI6IjEwOCIsIkxpbmVDb2xvciI6eyIkaWQiOiIxMDkiLCIkdHlwZSI6Ik5MUkUuQ29tbW9uLkRvbS5Tb2xpZENvbG9yQnJ1c2gsIE5MUkUuQ29tbW9uIiwiQ29sb3IiOnsiJGlkIjoiMTEwIiwiQSI6MjU1LCJSIjoyNTUsIkciOjAsIkIiOjB9fSwiTGluZVdlaWdodCI6MC4wLCJMaW5lVHlwZSI6MCwiUGFyZW50U3R5bGUiOm51bGx9LCJQYXJlbnRTdHlsZSI6bnVsbH0sIlRpdGxlU3R5bGUiOnsiJGlkIjoiMTExIiwiRm9udFNldHRpbmdzIjp7IiRpZCI6IjExMiIsIkZvbnRTaXplIjoxMSwiRm9udE5hbWUiOiJDYWxpYnJpIiwiSXNCb2xkIjp0cnVlLCJJc0l0YWxpYyI6ZmFsc2UsIklzVW5kZXJsaW5lZCI6ZmFsc2UsIlBhcmVudFN0eWxlIjpudWxsfSwiQXV0b1NpemUiOjAsIkZvcmVncm91bmQiOnsiJGlkIjoiMTEzIiwiQ29sb3IiOnsiJGlkIjoiMTE0IiwiQSI6MjU1LCJSIjowLCJHIjowLCJCIjowfX0sIk1heFdpZHRoIjo5NjAuMCwiTWF4SGVpZ2h0IjoiSW5maW5pdHkiLCJTbWFydEZvcmVncm91bmRJc0FjdGl2ZSI6ZmFsc2UsIkhvcml6b250YWxBbGlnbm1lbnQiOjAsIlZlcnRpY2FsQWxpZ25tZW50IjowLCJTbWFydEZvcmVncm91bmQiOm51bGwsIkJhY2tncm91bmRGaWxsVHlwZSI6MCwiTWFyZ2luIjp7IiRpZCI6IjExNSIsIlRvcCI6MCwiTGVmdCI6MCwiUmlnaHQiOjAsIkJvdHRvbSI6MH0sIlBhZGRpbmciOnsiJGlkIjoiMTE2IiwiVG9wIjowLCJMZWZ0IjowLCJSaWdodCI6MCwiQm90dG9tIjowfSwiQmFja2dyb3VuZCI6eyIkaWQiOiIxMTciLCJDb2xvciI6eyIkcmVmIjoiMjAifX0sIklzVmlzaWJsZSI6dHJ1ZSwiV2lkdGgiOjAuMCwiSGVpZ2h0IjowLjAsIkJvcmRlclN0eWxlIjpudWxsLCJQYXJlbnRTdHlsZSI6bnVsbH0sIkRhdGVTdHlsZSI6eyIkaWQiOiIxMTgiLCJGb250U2V0dGluZ3MiOnsiJGlkIjoiMTE5IiwiRm9udFNpemUiOjEwLCJGb250TmFtZSI6IkNhbGlicmkiLCJJc0JvbGQiOmZhbHNlLCJJc0l0YWxpYyI6ZmFsc2UsIklzVW5kZXJsaW5lZCI6ZmFsc2UsIlBhcmVudFN0eWxlIjpudWxsfSwiQXV0b1NpemUiOjAsIkZvcmVncm91bmQiOnsiJGlkIjoiMTIwIiwiQ29sb3IiOnsiJGlkIjoiMTIxIiwiQSI6MjU1LCJSIjo2OCwiRyI6ODQsIkIiOjEwNn19LCJNYXhXaWR0aCI6MjAwLjAsIk1heEhlaWdodCI6IkluZmluaXR5IiwiU21hcnRGb3JlZ3JvdW5kSXNBY3RpdmUiOmZhbHNlLCJIb3Jpem9udGFsQWxpZ25tZW50IjoyLCJWZXJ0aWNhbEFsaWdubWVudCI6MCwiU21hcnRGb3JlZ3JvdW5kIjpudWxsLCJCYWNrZ3JvdW5kRmlsbFR5cGUiOjAsIk1hcmdpbiI6eyIkaWQiOiIxMjIiLCJUb3AiOjAsIkxlZnQiOjAsIlJpZ2h0IjowLCJCb3R0b20iOjB9LCJQYWRkaW5nIjp7IiRpZCI6IjEyMyIsIlRvcCI6MCwiTGVmdCI6MCwiUmlnaHQiOjAsIkJvdHRvbSI6MH0sIkJhY2tncm91bmQiOnsiJGlkIjoiMTI0IiwiQ29sb3IiOnsiJHJlZiI6IjIwIn19LCJJc1Zpc2libGUiOnRydWUsIldpZHRoIjowLjAsIkhlaWdodCI6MC4wLCJCb3JkZXJTdHlsZSI6bnVsbCwiUGFyZW50U3R5bGUiOm51bGx9LCJEYXRlRm9ybWF0Ijp7IiRpZCI6IjEyNSIsIkZvcm1hdFN0cmluZyI6Ik1NTSBkIiwiU2VwYXJhdG9yIjoiLyIsIlVzZUludGVybmF0aW9uYWxEYXRlRm9ybWF0IjpmYWxzZSwiRGF0ZUlzVmlzaWJsZSI6dHJ1ZSwiVGltZUlzVmlzaWJsZSI6ZmFsc2UsIkhvdXJEaWdpdHMiOjEsIkFtUG1EZXNpZ25hdG9yIjoyLCJUcmltMDBNaW51dGVzIjpmYWxzZSwiTGFzdEtub3duVmlzaWJpbGl0eVN0YXRlIjpudWxsfSwiSXNWaXNpYmxlIjp0cnVlLCJQYXJlbnRTdHlsZSI6bnVsbCwiX2V4cGxpY2l0bHlTZXQiOnsiJGlkIjoiMTI2IiwiU2hhcGVTdHlsZSI6ZmFsc2UsIlRpdGxlU3R5bGUiOmZhbHNlLCJEYXRlU3R5bGUiOmZhbHNlLCJIb3Jpem9udGFsQ29ubmVjdG9yU3R5bGUiOmZhbHNlLCJWZXJ0aWNhbENvbm5lY3RvclN0eWxlIjpmYWxzZSwiUGVyY2VudGFnZUNvbXBsZXRlU2hhcGVPcGFjaXR5IjpmYWxzZSwiU2hhcGUiOmZhbHNlLCJTaGFwZVRoaWNrbmVzcyI6ZmFsc2UsIkR1cmF0aW9uRm9ybWF0IjpmYWxzZSwiSW5jbHVkZU5vbldvcmtpbmdEYXlzSW5EdXJhdGlvbiI6ZmFsc2UsIk1hcmdpbiI6ZmFsc2UsIlN0YXJ0RGF0ZVBvc2l0aW9uIjpmYWxzZSwiRW5kRGF0ZVBvc2l0aW9uIjpmYWxzZSwiVGl0bGVQb3NpdGlvbiI6ZmFsc2UsIkR1cmF0aW9uUG9zaXRpb24iOmZhbHNlLCJQZXJjZW50YWdlQ29tcGxldGVkUG9zaXRpb24iOmZhbHNlLCJTcGFjaW5nIjpmYWxzZSwiSXNCZWxvd1RpbWViYW5kIjpmYWxzZSwiRGF0ZUZvcm1hdCI6ZmFsc2UsIklzVmlzaWJsZSI6ZmFsc2V9fSwiR3JpZGxpbmVQYW5lbFN0eWxlIjp7IiRpZCI6IjEyNyIsIkdyaWRsaW5lU3R5bGUiOnsiJGlkIjoiMTI4IiwiTGluZUNvbG9yIjp7IiRpZCI6IjEyOSIsIiR0eXBlIjoiTkxSRS5Db21tb24uRG9tLlNvbGlkQ29sb3JCcnVzaCwgTkxSRS5Db21tb24iLCJDb2xvciI6eyIkaWQiOiIxMzAiLCJBIjozOCwiUiI6OTEsIkciOjE1NSwiQiI6MjEzfX0sIkxpbmVXZWlnaHQiOjAuNiwiTGluZVR5cGUiOjAsIlBhcmVudFN0eWxlIjpudWxsfSwiTWFyZ2luIjp7IiRpZCI6IjEzMSIsIlRvcCI6MCwiTGVmdCI6MCwiUmlnaHQiOjAsIkJvdHRvbSI6MH0sIlBhZGRpbmciOnsiJGlkIjoiMTMyIiwiVG9wIjowLCJMZWZ0IjowLCJSaWdodCI6MCwiQm90dG9tIjowfSwiQmFja2dyb3VuZCI6bnVsbCwiSXNWaXNpYmxlIjp0cnVlLCJXaWR0aCI6MC4wLCJIZWlnaHQiOjAuMCwiQm9yZGVyU3R5bGUiOnsiJGlkIjoiMTMzIiwiTGluZUNvbG9yIjpudWxsLCJMaW5lV2VpZ2h0IjowLjAsIkxpbmVUeXBlIjowLCJQYXJlbnRTdHlsZSI6bnVsbH0sIlBhcmVudFN0eWxlIjpudWxsfSwiU2hvd0VsYXBzZWRUaW1lR3JhZGllbnRTdHlsZSI6ZmFsc2UsIkRlZmF1bHRTd2ltbGFuZVN0eWxlIjp7IiRpZCI6IjEzNCIsIkhlYWRlclN0eWxlIjp7IiRpZCI6IjEzNSIsIlRleHRTdHlsZSI6eyIkaWQiOiIxMzYiLCJGb250U2V0dGluZ3MiOnsiJGlkIjoiMTM3IiwiRm9udFNpemUiOjEyLCJGb250TmFtZSI6IkNhbGlicmkiLCJJc0JvbGQiOmZhbHNlLCJJc0l0YWxpYyI6ZmFsc2UsIklzVW5kZXJsaW5lZCI6ZmFsc2UsIlBhcmVudFN0eWxlIjpudWxsfSwiQXV0b1NpemUiOjAsIkZvcmVncm91bmQiOnsiJGlkIjoiMTM4IiwiQ29sb3IiOnsiJGlkIjoiMTM5IiwiQSI6MjU1LCJSIjozMiwiRyI6NTYsIkIiOjEwMH19LCJNYXhXaWR0aCI6MC4wLCJNYXhIZWlnaHQiOjAuMCwiU21hcnRGb3JlZ3JvdW5kSXNBY3RpdmUiOmZhbHNlLCJIb3Jpem9udGFsQWxpZ25tZW50IjowLCJWZXJ0aWNhbEFsaWdubWVudCI6MCwiU21hcnRGb3JlZ3JvdW5kIjpudWxsLCJCYWNrZ3JvdW5kRmlsbFR5cGUiOjAsIk1hcmdpbiI6eyIkaWQiOiIxNDAiLCJUb3AiOjAsIkxlZnQiOjAsIlJpZ2h0IjowLCJCb3R0b20iOjB9LCJQYWRkaW5nIjp7IiRpZCI6IjE0MSIsIlRvcCI6MCwiTGVmdCI6MCwiUmlnaHQiOjAsIkJvdHRvbSI6MH0sIkJhY2tncm91bmQiOm51bGwsIklzVmlzaWJsZSI6ZmFsc2UsIldpZHRoIjowLjAsIkhlaWdodCI6MC4wLCJCb3JkZXJTdHlsZSI6bnVsbCwiUGFyZW50U3R5bGUiOm51bGx9LCJSZWN0YW5nbGVTdHlsZSI6eyIkaWQiOiIxNDIiLCJNYXJnaW4iOnsiJGlkIjoiMTQzIiwiVG9wIjowLCJMZWZ0IjowLCJSaWdodCI6MCwiQm90dG9tIjowfSwiUGFkZGluZyI6eyIkaWQiOiIxNDQiLCJUb3AiOjAsIkxlZnQiOjAsIlJpZ2h0IjowLCJCb3R0b20iOjB9LCJCYWNrZ3JvdW5kIjp7IiRpZCI6IjE0NSIsIkNvbG9yIjp7IiRpZCI6IjE0NiIsIkEiOjEyNywiUiI6OTEsIkciOjE1NSwiQiI6MjEzfX0sIklzVmlzaWJsZSI6ZmFsc2UsIldpZHRoIjowLjAsIkhlaWdodCI6MC4wLCJCb3JkZXJTdHlsZSI6eyIkaWQiOiIxNDciLCJMaW5lQ29sb3IiOnsiJGlkIjoiMTQ4IiwiJHR5cGUiOiJOTFJFLkNvbW1vbi5Eb20uU29saWRDb2xvckJydXNoLCBOTFJFLkNvbW1vbiIsIkNvbG9yIjp7IiRpZCI6IjE0OSIsIkEiOjI1NSwiUiI6MjU1LCJHIjowLCJCIjowfX0sIkxpbmVXZWlnaHQiOjAuMCwiTGluZVR5cGUiOjAsIlBhcmVudFN0eWxlIjpudWxsfSwiUGFyZW50U3R5bGUiOm51bGx9LCJNYXJnaW4iOnsiJGlkIjoiMTUwIiwiVG9wIjowLCJMZWZ0IjowLCJSaWdodCI6MCwiQm90dG9tIjowfSwiUGFkZGluZyI6eyIkaWQiOiIxNTEiLCJUb3AiOjAsIkxlZnQiOjAsIlJpZ2h0IjowLCJCb3R0b20iOjB9LCJCYWNrZ3JvdW5kIjpudWxsLCJJc1Zpc2libGUiOnRydWUsIldpZHRoIjowLjAsIkhlaWdodCI6MC4wLCJCb3JkZXJTdHlsZSI6bnVsbCwiUGFyZW50U3R5bGUiOm51bGx9LCJCYWNrZ3JvdW5kU3R5bGUiOnsiJGlkIjoiMTUyIiwiTWFyZ2luIjp7IiRpZCI6IjE1MyIsIlRvcCI6MCwiTGVmdCI6MCwiUmlnaHQiOjAsIkJvdHRvbSI6MH0sIlBhZGRpbmciOnsiJGlkIjoiMTU0IiwiVG9wIjowLCJMZWZ0IjowLCJSaWdodCI6MCwiQm90dG9tIjowfSwiQmFja2dyb3VuZCI6eyIkaWQiOiIxNTUiLCJDb2xvciI6eyIkaWQiOiIxNTYiLCJBIjozOCwiUiI6OTEsIkciOjE1NSwiQiI6MjEzfX0sIklzVmlzaWJsZSI6dHJ1ZSwiV2lkdGgiOjAuMCwiSGVpZ2h0IjowLjAsIkJvcmRlclN0eWxlIjp7IiRpZCI6IjE1NyIsIkxpbmVDb2xvciI6eyIkaWQiOiIxNTgiLCIkdHlwZSI6Ik5MUkUuQ29tbW9uLkRvbS5Tb2xpZENvbG9yQnJ1c2gsIE5MUkUuQ29tbW9uIiwiQ29sb3IiOnsiJGlkIjoiMTU5IiwiQSI6MjU1LCJSIjoyNTUsIkciOjAsIkIiOjB9fSwiTGluZVdlaWdodCI6MC4wLCJMaW5lVHlwZSI6MCwiUGFyZW50U3R5bGUiOm51bGx9LCJQYXJlbnRTdHlsZSI6bnVsbH0sIklzQWJvdmVUaW1lYmFuZCI6ZmFsc2UsIk1hcmdpbiI6eyIkaWQiOiIxNjAiLCJUb3AiOjAsIkxlZnQiOjAsIlJpZ2h0IjowLCJCb3R0b20iOjB9LCJQYWRkaW5nIjp7IiRpZCI6IjE2MSIsIlRvcCI6MCwiTGVmdCI6MCwiUmlnaHQiOjAsIkJvdHRvbSI6MH0sIklzVmlzaWJsZSI6dHJ1ZSwiV2lkdGgiOjAuMCwiSGVpZ2h0IjowLjAsIkJvcmRlclN0eWxlIjpudWxsLCJQYXJlbnRTdHlsZSI6bnVsbH19LCJTY2FsZSI6eyIkaWQiOiIxNjIiLCJTdGFydERhdGUiOiIwMDAxLTAxLTAxVDAwOjAwOjAwIiwiRW5kRGF0ZSI6IjIwMjAtMDMtMzFUMjM6NTk6MDAiLCJGb3JtYXQiOiJNTU0iLCJUeXBlIjoyLCJBdXRvRGF0ZVJhbmdlIjp0cnVlLCJXb3JraW5nRGF5cyI6MzEsIlRvZGF5TWFya2VyVGV4dCI6IlRvZGF5IiwiQXV0b1NjYWxlVHlwZSI6dHJ1ZX0sIk1pbGVzdG9uZXMiOltdLCJUYXNrcyI6W10sIlN3aW1sYW5lcyI6W3siJGlkIjoiMTYzIiwiSWQiOiJhMWJkNDRlNS04OWMwLTQxNWUtODY4Mi1lMjkzOTc5MjEyZGQiLCJJbmRleCI6MCwiSGVhZGVyVGV4dCI6IkxpdGVyYXR1cmUgU3VydmV5IiwiU3R5bGUiOnsiJGlkIjoiMTY0IiwiSGVhZGVyU3R5bGUiOnsiJGlkIjoiMTY1IiwiVGV4dFN0eWxlIjp7IiRpZCI6IjE2NiIsIkZvbnRTZXR0aW5ncyI6eyIkaWQiOiIxNjciLCJGb250U2l6ZSI6MTIsIkZvbnROYW1lIjoiQ2FsaWJyaSIsIklzQm9sZCI6ZmFsc2UsIklzSXRhbGljIjpmYWxzZSwiSXNVbmRlcmxpbmVkIjpmYWxzZSwiUGFyZW50U3R5bGUiOm51bGx9LCJBdXRvU2l6ZSI6MCwiRm9yZWdyb3VuZCI6eyIkaWQiOiIxNjgiLCJDb2xvciI6eyIkaWQiOiIxNjkiLCJBIjoyNTUsIlIiOjIyLCJHIjoyOCwiQiI6MzV9fSwiTWF4V2lkdGgiOjUxLjQ5MzMzMzMzMzMzMzMzOSwiTWF4SGVpZ2h0IjowLjAsIlNtYXJ0Rm9yZWdyb3VuZElzQWN0aXZlIjpmYWxzZSwiSG9yaXpvbnRhbEFsaWdubWVudCI6MCwiVmVydGljYWxBbGlnbm1lbnQiOjAsIlNtYXJ0Rm9yZWdyb3VuZCI6bnVsbCwiQmFja2dyb3VuZEZpbGxUeXBlIjowLCJNYXJnaW4iOnsiJGlkIjoiMTcwIiwiVG9wIjowLCJMZWZ0IjowLCJSaWdodCI6MCwiQm90dG9tIjowfSwiUGFkZGluZyI6eyIkaWQiOiIxNzEiLCJUb3AiOjAsIkxlZnQiOjAsIlJpZ2h0IjowLCJCb3R0b20iOjB9LCJCYWNrZ3JvdW5kIjpudWxsLCJJc1Zpc2libGUiOmZhbHNlLCJXaWR0aCI6MC4wLCJIZWlnaHQiOjAuMCwiQm9yZGVyU3R5bGUiOm51bGwsIlBhcmVudFN0eWxlIjpudWxsfSwiUmVjdGFuZ2xlU3R5bGUiOnsiJGlkIjoiMTcyIiwiTWFyZ2luIjp7IiRpZCI6IjE3MyIsIlRvcCI6MCwiTGVmdCI6MCwiUmlnaHQiOjAsIkJvdHRvbSI6MH0sIlBhZGRpbmciOnsiJGlkIjoiMTc0IiwiVG9wIjowLCJMZWZ0IjowLCJSaWdodCI6MCwiQm90dG9tIjowfSwiQmFja2dyb3VuZCI6eyIkaWQiOiIxNzUiLCJDb2xvciI6eyIkaWQiOiIxNzYiLCJBIjoxMjcsIlIiOjY4LCJHIjo4NCwiQiI6MTA2fX0sIklzVmlzaWJsZSI6ZmFsc2UsIldpZHRoIjowLjAsIkhlaWdodCI6MC4wLCJCb3JkZXJTdHlsZSI6eyIkaWQiOiIxNzciLCJMaW5lQ29sb3IiOnsiJGlkIjoiMTc4IiwiJHR5cGUiOiJOTFJFLkNvbW1vbi5Eb20uU29saWRDb2xvckJydXNoLCBOTFJFLkNvbW1vbiIsIkNvbG9yIjp7IiRpZCI6IjE3OSIsIkEiOjI1NSwiUiI6MjIsIkciOjI4LCJCIjozNX19LCJMaW5lV2VpZ2h0IjowLjAsIkxpbmVUeXBlIjowLCJQYXJlbnRTdHlsZSI6bnVsbH0sIlBhcmVudFN0eWxlIjpudWxsfSwiTWFyZ2luIjp7IiRpZCI6IjE4MCIsIlRvcCI6MCwiTGVmdCI6MCwiUmlnaHQiOjAsIkJvdHRvbSI6MH0sIlBhZGRpbmciOnsiJGlkIjoiMTgxIiwiVG9wIjowLCJMZWZ0IjowLCJSaWdodCI6MCwiQm90dG9tIjowfSwiQmFja2dyb3VuZCI6bnVsbCwiSXNWaXNpYmxlIjp0cnVlLCJXaWR0aCI6MC4wLCJIZWlnaHQiOjAuMCwiQm9yZGVyU3R5bGUiOm51bGwsIlBhcmVudFN0eWxlIjpudWxsfSwiQmFja2dyb3VuZFN0eWxlIjp7IiRpZCI6IjE4MiIsIk1hcmdpbiI6eyIkaWQiOiIxODMiLCJUb3AiOjAsIkxlZnQiOjAsIlJpZ2h0IjowLCJCb3R0b20iOjB9LCJQYWRkaW5nIjp7IiRpZCI6IjE4NCIsIlRvcCI6MCwiTGVmdCI6MCwiUmlnaHQiOjAsIkJvdHRvbSI6MH0sIkJhY2tncm91bmQiOnsiJGlkIjoiMTg1IiwiQ29sb3IiOnsiJGlkIjoiMTg2IiwiQSI6MzgsIlIiOjY4LCJHIjo4NCwiQiI6MTA2fX0sIklzVmlzaWJsZSI6dHJ1ZSwiV2lkdGgiOjAuMCwiSGVpZ2h0IjowLjAsIkJvcmRlclN0eWxlIjp7IiRpZCI6IjE4NyIsIkxpbmVDb2xvciI6eyIkaWQiOiIxODgiLCIkdHlwZSI6Ik5MUkUuQ29tbW9uLkRvbS5Tb2xpZENvbG9yQnJ1c2gsIE5MUkUuQ29tbW9uIiwiQ29sb3IiOnsiJGlkIjoiMTg5IiwiQSI6MjU1LCJSIjoyMiwiRyI6MjgsIkIiOjM1fX0sIkxpbmVXZWlnaHQiOjAuMCwiTGluZVR5cGUiOjAsIlBhcmVudFN0eWxlIjpudWxsfSwiUGFyZW50U3R5bGUiOm51bGx9LCJJc0Fib3ZlVGltZWJhbmQiOmZhbHNlLCJNYXJnaW4iOnsiJGlkIjoiMTkwIiwiVG9wIjowLCJMZWZ0IjowLCJSaWdodCI6MCwiQm90dG9tIjowfSwiUGFkZGluZyI6eyIkaWQiOiIxOTEiLCJUb3AiOjAsIkxlZnQiOjAsIlJpZ2h0IjowLCJCb3R0b20iOjB9LCJJc1Zpc2libGUiOnRydWUsIldpZHRoIjowLjAsIkhlaWdodCI6MC4wLCJCb3JkZXJTdHlsZSI6bnVsbCwiUGFyZW50U3R5bGUiOm51bGx9LCJUYXNrcyI6W3siJGlkIjoiMTkyIiwiX2F0dGFjaGVkTWlsZXN0b25lcyI6W10sIlRhc2tEZWZpbml0aW9uIjp7IiRpZCI6IjE5MyIsIkdyb3VwTmFtZSI6bnVsbCwiU3RhcnREYXRlIjoiMjAxOS0wOS0yOVQwMDowMDowMFoiLCJFbmREYXRlIjoiMjAxOS0xMC0wNFQyMzo1OTowMFoiLCJQZXJjZW50YWdlQ29tcGxldGUiOjEwMC4wLCJTdHlsZSI6eyIkaWQiOiIxOTQiLCJTaGFwZSI6MSwiU2hhcGVUaGlja25lc3MiOjAsIkR1cmF0aW9uRm9ybWF0IjowLCJJbmNsdWRlTm9uV29ya2luZ0RheXNJbkR1cmF0aW9uIjpmYWxzZSwiUGVyY2VudGFnZUNvbXBsZXRlU3R5bGUiOnsiJGlkIjoiMTk1IiwiRm9udFNldHRpbmdzIjp7IiRpZCI6IjE5NiIsIkZvbnRTaXplIjoxMCwiRm9udE5hbWUiOiJDYWxpYnJpIiwiSXNCb2xkIjpmYWxzZSwiSXNJdGFsaWMiOmZhbHNlLCJJc1VuZGVybGluZWQiOmZhbHNlLCJQYXJlbnRTdHlsZSI6bnVsbH0sIkF1dG9TaXplIjowLCJGb3JlZ3JvdW5kIjp7IiRpZCI6IjE5NyIsIkNvbG9yIjp7IiRpZCI6IjE5OCIsIkEiOjI1NSwiUiI6MjM3LCJHIjoxMjUsIkIiOjQ5fX0sIk1heFdpZHRoIjoyMDAuMCwiTWF4SGVpZ2h0IjoiSW5maW5pdHkiLCJTbWFydEZvcmVncm91bmRJc0FjdGl2ZSI6ZmFsc2UsIkhvcml6b250YWxBbGlnbm1lbnQiOjEsIlZlcnRpY2FsQWxpZ25tZW50IjowLCJTbWFydEZvcmVncm91bmQiOm51bGwsIkJhY2tncm91bmRGaWxsVHlwZSI6MCwiTWFyZ2luIjp7IiRpZCI6IjE5OSIsIlRvcCI6MCwiTGVmdCI6MCwiUmlnaHQiOjAsIkJvdHRvbSI6MH0sIlBhZGRpbmciOnsiJGlkIjoiMjAwIiwiVG9wIjowLCJMZWZ0IjowLCJSaWdodCI6MCwiQm90dG9tIjowfSwiQmFja2dyb3VuZCI6eyIkaWQiOiIyMDEiLCJDb2xvciI6eyIkaWQiOiIyMDIiLCJBIjo4OSwiUiI6MCwiRyI6MCwiQiI6MH19LCJJc1Zpc2libGUiOnRydWUsIldpZHRoIjowLjAsIkhlaWdodCI6MC4wLCJCb3JkZXJTdHlsZSI6eyIkaWQiOiIyMDMiLCJMaW5lQ29sb3IiOm51bGwsIkxpbmVXZWlnaHQiOjAuMCwiTGluZVR5cGUiOjAsIlBhcmVudFN0eWxlIjpudWxsfSwiUGFyZW50U3R5bGUiOm51bGx9LCJEdXJhdGlvblN0eWxlIjp7IiRpZCI6IjIwNCIsIkZvbnRTZXR0aW5ncyI6eyIkaWQiOiIyMDUiLCJGb250U2l6ZSI6MTAsIkZvbnROYW1lIjoiQ2FsaWJyaSIsIklzQm9sZCI6ZmFsc2UsIklzSXRhbGljIjpmYWxzZSwiSXNVbmRlcmxpbmVkIjpmYWxzZSwiUGFyZW50U3R5bGUiOm51bGx9LCJBdXRvU2l6ZSI6MCwiRm9yZWdyb3VuZCI6eyIkaWQiOiIyMDYiLCJDb2xvciI6eyIkaWQiOiIyMDciLCJBIjoyNTUsIlIiOjIzNywiRyI6MTI1LCJCIjo0OX19LCJNYXhXaWR0aCI6MjAwLjAsIk1heEhlaWdodCI6IkluZmluaXR5IiwiU21hcnRGb3JlZ3JvdW5kSXNBY3RpdmUiOmZhbHNlLCJIb3Jpem9udGFsQWxpZ25tZW50IjowLCJWZXJ0aWNhbEFsaWdubWVudCI6MCwiU21hcnRGb3JlZ3JvdW5kIjpudWxsLCJCYWNrZ3JvdW5kRmlsbFR5cGUiOjAsIk1hcmdpbiI6eyIkaWQiOiIyMDgiLCJUb3AiOjAsIkxlZnQiOjAsIlJpZ2h0IjowLCJCb3R0b20iOjB9LCJQYWRkaW5nIjp7IiRpZCI6IjIwOSIsIlRvcCI6MCwiTGVmdCI6MCwiUmlnaHQiOjAsIkJvdHRvbSI6MH0sIkJhY2tncm91bmQiOnsiJGlkIjoiMjEwIiwiQ29sb3IiOnsiJHJlZiI6IjIwMiJ9fSwiSXNWaXNpYmxlIjp0cnVlLCJXaWR0aCI6MC4wLCJIZWlnaHQiOjAuMCwiQm9yZGVyU3R5bGUiOnsiJGlkIjoiMjExIiwiTGluZUNvbG9yIjpudWxsLCJMaW5lV2VpZ2h0IjowLjAsIkxpbmVUeXBlIjowLCJQYXJlbnRTdHlsZSI6bnVsbH0sIlBhcmVudFN0eWxlIjpudWxsfSwiSG9yaXpvbnRhbENvbm5lY3RvclN0eWxlIjp7IiRpZCI6IjIxMiIsIkxpbmVDb2xvciI6eyIkaWQiOiIyMTMiLCIkdHlwZSI6Ik5MUkUuQ29tbW9uLkRvbS5Tb2xpZENvbG9yQnJ1c2gsIE5MUkUuQ29tbW9uIiwiQ29sb3IiOnsiJGlkIjoiMjE0IiwiQSI6MjU1LCJSIjoyMDQsIkciOjIwNCwiQiI6MjA0fX0sIkxpbmVXZWlnaHQiOjEuMCwiTGluZVR5cGUiOjAsIlBhcmVudFN0eWxlIjpudWxsfSwiVmVydGljYWxDb25uZWN0b3JTdHlsZSI6eyIkaWQiOiIyMTUiLCJMaW5lQ29sb3IiOnsiJGlkIjoiMjE2IiwiJHR5cGUiOiJOTFJFLkNvbW1vbi5Eb20uU29saWRDb2xvckJydXNoLCBOTFJFLkNvbW1vbiIsIkNvbG9yIjp7IiRpZCI6IjIxNyIsIkEiOjI1NSwiUiI6MjA0LCJHIjoyMDQsIkIiOjIwNH19LCJMaW5lV2VpZ2h0IjowLjAsIkxpbmVUeXBlIjowLCJQYXJlbnRTdHlsZSI6bnVsbH0sIk1hcmdpbiI6bnVsbCwiU3RhcnREYXRlUG9zaXRpb24iOjMsIkVuZERhdGVQb3NpdGlvbiI6MywiRGF0ZUlzVmlzaWJsZSI6dHJ1ZSwiVGl0bGVQb3NpdGlvbiI6NCwiRHVyYXRpb25Qb3NpdGlvbiI6NiwiUGVyY2VudGFnZUNvbXBsZXRlZFBvc2l0aW9uIjoyLCJTcGFjaW5nIjo1LCJJc0JlbG93VGltZWJhbmQiOnRydWUsIlBlcmNlbnRhZ2VDb21wbGV0ZVNoYXBlT3BhY2l0eSI6MzUsIlNoYXBlU3R5bGUiOnsiJGlkIjoiMjE4IiwiTWFyZ2luIjp7IiRpZCI6IjIxOSIsIlRvcCI6MCwiTGVmdCI6NCwiUmlnaHQiOjQsIkJvdHRvbSI6MH0sIlBhZGRpbmciOnsiJGlkIjoiMjIwIiwiVG9wIjowLCJMZWZ0IjowLCJSaWdodCI6MCwiQm90dG9tIjowfSwiQmFja2dyb3VuZCI6eyIkaWQiOiIyMjEiLCJDb2xvciI6eyIkaWQiOiIyMjIiLCJBIjoyNTUsIlIiOjY4LCJHIjoxMTQsIkIiOjE5Nn19LCJJc1Zpc2libGUiOnRydWUsIldpZHRoIjowLjAsIkhlaWdodCI6MTAuMCwiQm9yZGVyU3R5bGUiOnsiJGlkIjoiMjIzIiwiTGluZUNvbG9yIjp7IiRpZCI6IjIyNCIsIiR0eXBlIjoiTkxSRS5Db21tb24uRG9tLlNvbGlkQ29sb3JCcnVzaCwgTkxSRS5Db21tb24iLCJDb2xvciI6eyIkaWQiOiIyMjUiLCJBIjoyNTUsIlIiOjI1NSwiRyI6MCwiQiI6MH19LCJMaW5lV2VpZ2h0IjowLjAsIkxpbmVUeXBlIjowLCJQYXJlbnRTdHlsZSI6bnVsbH0sIlBhcmVudFN0eWxlIjpudWxsfSwiVGl0bGVTdHlsZSI6eyIkaWQiOiIyMjYiLCJGb250U2V0dGluZ3MiOnsiJGlkIjoiMjI3IiwiRm9udFNpemUiOjExLCJGb250TmFtZSI6IkNhbGlicmkiLCJJc0JvbGQiOnRydWUsIklzSXRhbGljIjpmYWxzZSwiSXNVbmRlcmxpbmVkIjpmYWxzZSwiUGFyZW50U3R5bGUiOm51bGx9LCJBdXRvU2l6ZSI6MCwiRm9yZWdyb3VuZCI6eyIkaWQiOiIyMjgiLCJDb2xvciI6eyIkaWQiOiIyMjkiLCJBIjoyNTUsIlIiOjAsIkciOjAsIkIiOjB9fSwiTWF4V2lkdGgiOjk2MC4wLCJNYXhIZWlnaHQiOiJJbmZpbml0eSIsIlNtYXJ0Rm9yZWdyb3VuZElzQWN0aXZlIjpmYWxzZSwiSG9yaXpvbnRhbEFsaWdubWVudCI6MCwiVmVydGljYWxBbGlnbm1lbnQiOjAsIlNtYXJ0Rm9yZWdyb3VuZCI6bnVsbCwiQmFja2dyb3VuZEZpbGxUeXBlIjowLCJNYXJnaW4iOnsiJGlkIjoiMjMwIiwiVG9wIjowLCJMZWZ0IjowLCJSaWdodCI6MCwiQm90dG9tIjowfSwiUGFkZGluZyI6eyIkaWQiOiIyMzEiLCJUb3AiOjAsIkxlZnQiOjAsIlJpZ2h0IjowLCJCb3R0b20iOjB9LCJCYWNrZ3JvdW5kIjp7IiRpZCI6IjIzMiIsIkNvbG9yIjp7IiRyZWYiOiIyMDIifX0sIklzVmlzaWJsZSI6dHJ1ZSwiV2lkdGgiOjAuMCwiSGVpZ2h0IjowLjAsIkJvcmRlclN0eWxlIjp7IiRpZCI6IjIzMyIsIkxpbmVDb2xvciI6bnVsbCwiTGluZVdlaWdodCI6MC4wLCJMaW5lVHlwZSI6MCwiUGFyZW50U3R5bGUiOm51bGx9LCJQYXJlbnRTdHlsZSI6bnVsbH0sIkRhdGVTdHlsZSI6eyIkaWQiOiIyMzQiLCJGb250U2V0dGluZ3MiOnsiJGlkIjoiMjM1IiwiRm9udFNpemUiOjEwLCJGb250TmFtZSI6IkNhbGlicmkiLCJJc0JvbGQiOmZhbHNlLCJJc0l0YWxpYyI6ZmFsc2UsIklzVW5kZXJsaW5lZCI6ZmFsc2UsIlBhcmVudFN0eWxlIjpudWxsfSwiQXV0b1NpemUiOjAsIkZvcmVncm91bmQiOnsiJGlkIjoiMjM2IiwiQ29sb3IiOnsiJGlkIjoiMjM3IiwiQSI6MjU1LCJSIjo2OCwiRyI6ODQsIkIiOjEwNn19LCJNYXhXaWR0aCI6MjAwLjAsIk1heEhlaWdodCI6IkluZmluaXR5IiwiU21hcnRGb3JlZ3JvdW5kSXNBY3RpdmUiOmZhbHNlLCJIb3Jpem9udGFsQWxpZ25tZW50IjoyLCJWZXJ0aWNhbEFsaWdubWVudCI6MCwiU21hcnRGb3JlZ3JvdW5kIjpudWxsLCJCYWNrZ3JvdW5kRmlsbFR5cGUiOjAsIk1hcmdpbiI6eyIkaWQiOiIyMzgiLCJUb3AiOjAsIkxlZnQiOjAsIlJpZ2h0IjowLCJCb3R0b20iOjB9LCJQYWRkaW5nIjp7IiRpZCI6IjIzOSIsIlRvcCI6MCwiTGVmdCI6MCwiUmlnaHQiOjAsIkJvdHRvbSI6MH0sIkJhY2tncm91bmQiOnsiJGlkIjoiMjQwIiwiQ29sb3IiOnsiJHJlZiI6IjIwMiJ9fSwiSXNWaXNpYmxlIjp0cnVlLCJXaWR0aCI6MC4wLCJIZWlnaHQiOjAuMCwiQm9yZGVyU3R5bGUiOnsiJGlkIjoiMjQxIiwiTGluZUNvbG9yIjpudWxsLCJMaW5lV2VpZ2h0IjowLjAsIkxpbmVUeXBlIjowLCJQYXJlbnRTdHlsZSI6bnVsbH0sIlBhcmVudFN0eWxlIjpudWxsfSwiRGF0ZUZvcm1hdCI6eyIkaWQiOiIyNDIiLCJGb3JtYXRTdHJpbmciOiJNTU0gZCIsIlNlcGFyYXRvciI6Ii8iLCJVc2VJbnRlcm5hdGlvbmFsRGF0ZUZvcm1hdCI6ZmFsc2UsIkRhdGVJc1Zpc2libGUiOnRydWUsIlRpbWVJc1Zpc2libGUiOmZhbHNlLCJIb3VyRGlnaXRzIjoxLCJBbVBtRGVzaWduYXRvciI6MiwiVHJpbTAwTWludXRlcyI6ZmFsc2UsIkxhc3RLbm93blZpc2liaWxpdHlTdGF0ZSI6bnVsbH0sIklzVmlzaWJsZSI6dHJ1ZSwiUGFyZW50U3R5bGUiOm51bGx9LCJJbmRleCI6MSwiU21hcnREdXJhdGlvbkFjdGl2YXRlZCI6ZmFsc2UsIkRhdGVGb3JtYXQiOnsiJHJlZiI6IjI0MiJ9LCJJZCI6IjdhNWUwYWM0LTYyYjctNDUwMS05NjRiLWNlODljZjVjZTVlNSIsIkltcG9ydElkIjpudWxsLCJUaXRsZSI6IkxpdGVyYXR1cmUgU2VhcmNoIiwiTm90ZSI6bnVsbCwiSHlwZXJsaW5rIjp7IiRpZCI6IjI0MyIsIkFkZHJlc3MiOiIiLCJTdWJBZGRyZXNzIjoiIn0sIklzQ2hhbmdlZCI6ZmFsc2UsIklzTmV3IjpmYWxzZX0sIkluZGV4IjowfSx7IiRpZCI6IjI0NCIsIl9hdHRhY2hlZE1pbGVzdG9uZXMiOltdLCJUYXNrRGVmaW5pdGlvbiI6eyIkaWQiOiIyNDUiLCJHcm91cE5hbWUiOm51bGwsIlN0YXJ0RGF0ZSI6IjIwMTktMTAtMDVUMDA6MDA6MDBaIiwiRW5kRGF0ZSI6IjIwMTktMTAtMjVUMjM6NTk6MDBaIiwiUGVyY2VudGFnZUNvbXBsZXRlIjoxMDAuMCwiU3R5bGUiOnsiJGlkIjoiMjQ2IiwiU2hhcGUiOjEsIlNoYXBlVGhpY2tuZXNzIjowLCJEdXJhdGlvbkZvcm1hdCI6MCwiSW5jbHVkZU5vbldvcmtpbmdEYXlzSW5EdXJhdGlvbiI6ZmFsc2UsIlBlcmNlbnRhZ2VDb21wbGV0ZVN0eWxlIjp7IiRpZCI6IjI0NyIsIkZvbnRTZXR0aW5ncyI6eyIkaWQiOiIyNDgiLCJGb250U2l6ZSI6MTAsIkZvbnROYW1lIjoiQ2FsaWJyaSIsIklzQm9sZCI6ZmFsc2UsIklzSXRhbGljIjpmYWxzZSwiSXNVbmRlcmxpbmVkIjpmYWxzZSwiUGFyZW50U3R5bGUiOm51bGx9LCJBdXRvU2l6ZSI6MCwiRm9yZWdyb3VuZCI6eyIkaWQiOiIyNDkiLCJDb2xvciI6eyIkaWQiOiIyNTAiLCJBIjoyNTUsIlIiOjIzNywiRyI6MTI1LCJCIjo0OX19LCJNYXhXaWR0aCI6MjAwLjAsIk1heEhlaWdodCI6IkluZmluaXR5IiwiU21hcnRGb3JlZ3JvdW5kSXNBY3RpdmUiOmZhbHNlLCJIb3Jpem9udGFsQWxpZ25tZW50IjoxLCJWZXJ0aWNhbEFsaWdubWVudCI6MCwiU21hcnRGb3JlZ3JvdW5kIjpudWxsLCJCYWNrZ3JvdW5kRmlsbFR5cGUiOjAsIk1hcmdpbiI6eyIkaWQiOiIyNTEiLCJUb3AiOjAsIkxlZnQiOjAsIlJpZ2h0IjowLCJCb3R0b20iOjB9LCJQYWRkaW5nIjp7IiRpZCI6IjI1MiIsIlRvcCI6MCwiTGVmdCI6MCwiUmlnaHQiOjAsIkJvdHRvbSI6MH0sIkJhY2tncm91bmQiOnsiJHJlZiI6IjIwMSJ9LCJJc1Zpc2libGUiOnRydWUsIldpZHRoIjowLjAsIkhlaWdodCI6MC4wLCJCb3JkZXJTdHlsZSI6eyIkaWQiOiIyNTMiLCJMaW5lQ29sb3IiOm51bGwsIkxpbmVXZWlnaHQiOjAuMCwiTGluZVR5cGUiOjAsIlBhcmVudFN0eWxlIjpudWxsfSwiUGFyZW50U3R5bGUiOm51bGx9LCJEdXJhdGlvblN0eWxlIjp7IiRpZCI6IjI1NCIsIkZvbnRTZXR0aW5ncyI6eyIkaWQiOiIyNTUiLCJGb250U2l6ZSI6MTAsIkZvbnROYW1lIjoiQ2FsaWJyaSIsIklzQm9sZCI6ZmFsc2UsIklzSXRhbGljIjpmYWxzZSwiSXNVbmRlcmxpbmVkIjpmYWxzZSwiUGFyZW50U3R5bGUiOm51bGx9LCJBdXRvU2l6ZSI6MCwiRm9yZWdyb3VuZCI6eyIkaWQiOiIyNTYiLCJDb2xvciI6eyIkcmVmIjoiMjA3In19LCJNYXhXaWR0aCI6MjAwLjAsIk1heEhlaWdodCI6IkluZmluaXR5IiwiU21hcnRGb3JlZ3JvdW5kSXNBY3RpdmUiOmZhbHNlLCJIb3Jpem9udGFsQWxpZ25tZW50IjowLCJWZXJ0aWNhbEFsaWdubWVudCI6MCwiU21hcnRGb3JlZ3JvdW5kIjpudWxsLCJCYWNrZ3JvdW5kRmlsbFR5cGUiOjAsIk1hcmdpbiI6eyIkaWQiOiIyNTciLCJUb3AiOjAsIkxlZnQiOjAsIlJpZ2h0IjowLCJCb3R0b20iOjB9LCJQYWRkaW5nIjp7IiRpZCI6IjI1OCIsIlRvcCI6MCwiTGVmdCI6MCwiUmlnaHQiOjAsIkJvdHRvbSI6MH0sIkJhY2tncm91bmQiOnsiJHJlZiI6IjIxMCJ9LCJJc1Zpc2libGUiOnRydWUsIldpZHRoIjowLjAsIkhlaWdodCI6MC4wLCJCb3JkZXJTdHlsZSI6eyIkaWQiOiIyNTkiLCJMaW5lQ29sb3IiOm51bGwsIkxpbmVXZWlnaHQiOjAuMCwiTGluZVR5cGUiOjAsIlBhcmVudFN0eWxlIjpudWxsfSwiUGFyZW50U3R5bGUiOm51bGx9LCJIb3Jpem9udGFsQ29ubmVjdG9yU3R5bGUiOnsiJGlkIjoiMjYwIiwiTGluZUNvbG9yIjp7IiRyZWYiOiIyMTMifSwiTGluZVdlaWdodCI6MS4wLCJMaW5lVHlwZSI6MCwiUGFyZW50U3R5bGUiOm51bGx9LCJWZXJ0aWNhbENvbm5lY3RvclN0eWxlIjp7IiRpZCI6IjI2MSIsIkxpbmVDb2xvciI6eyIkcmVmIjoiMjE2In0sIkxpbmVXZWlnaHQiOjAuMCwiTGluZVR5cGUiOjAsIlBhcmVudFN0eWxlIjpudWxsfSwiTWFyZ2luIjpudWxsLCJTdGFydERhdGVQb3NpdGlvbiI6MywiRW5kRGF0ZVBvc2l0aW9uIjozLCJEYXRlSXNWaXNpYmxlIjp0cnVlLCJUaXRsZVBvc2l0aW9uIjo0LCJEdXJhdGlvblBvc2l0aW9uIjo2LCJQZXJjZW50YWdlQ29tcGxldGVkUG9zaXRpb24iOjIsIlNwYWNpbmciOjUsIklzQmVsb3dUaW1lYmFuZCI6dHJ1ZSwiUGVyY2VudGFnZUNvbXBsZXRlU2hhcGVPcGFjaXR5IjozNSwiU2hhcGVTdHlsZSI6eyIkaWQiOiIyNjIiLCJNYXJnaW4iOnsiJGlkIjoiMjYzIiwiVG9wIjowLCJMZWZ0Ijo0LCJSaWdodCI6NCwiQm90dG9tIjowfSwiUGFkZGluZyI6eyIkaWQiOiIyNjQiLCJUb3AiOjAsIkxlZnQiOjAsIlJpZ2h0IjowLCJCb3R0b20iOjB9LCJCYWNrZ3JvdW5kIjp7IiRpZCI6IjI2NSIsIkNvbG9yIjp7IiRpZCI6IjI2NiIsIkEiOjI1NSwiUiI6NjgsIkciOjExNCwiQiI6MTk2fX0sIklzVmlzaWJsZSI6dHJ1ZSwiV2lkdGgiOjAuMCwiSGVpZ2h0IjoxMC4wLCJCb3JkZXJTdHlsZSI6eyIkaWQiOiIyNjciLCJMaW5lQ29sb3IiOnsiJHJlZiI6IjIyNCJ9LCJMaW5lV2VpZ2h0IjowLjAsIkxpbmVUeXBlIjowLCJQYXJlbnRTdHlsZSI6bnVsbH0sIlBhcmVudFN0eWxlIjpudWxsfSwiVGl0bGVTdHlsZSI6eyIkaWQiOiIyNjgiLCJGb250U2V0dGluZ3MiOnsiJGlkIjoiMjY5IiwiRm9udFNpemUiOjExLCJGb250TmFtZSI6IkNhbGlicmkiLCJJc0JvbGQiOnRydWUsIklzSXRhbGljIjpmYWxzZSwiSXNVbmRlcmxpbmVkIjpmYWxzZSwiUGFyZW50U3R5bGUiOm51bGx9LCJBdXRvU2l6ZSI6MCwiRm9yZWdyb3VuZCI6eyIkaWQiOiIyNzAiLCJDb2xvciI6eyIkaWQiOiIyNzEiLCJBIjoyNTUsIlIiOjAsIkciOjAsIkIiOjB9fSwiTWF4V2lkdGgiOjk2MC4wLCJNYXhIZWlnaHQiOiJJbmZpbml0eSIsIlNtYXJ0Rm9yZWdyb3VuZElzQWN0aXZlIjpmYWxzZSwiSG9yaXpvbnRhbEFsaWdubWVudCI6MCwiVmVydGljYWxBbGlnbm1lbnQiOjAsIlNtYXJ0Rm9yZWdyb3VuZCI6bnVsbCwiQmFja2dyb3VuZEZpbGxUeXBlIjowLCJNYXJnaW4iOnsiJGlkIjoiMjcyIiwiVG9wIjowLCJMZWZ0IjowLCJSaWdodCI6MCwiQm90dG9tIjowfSwiUGFkZGluZyI6eyIkaWQiOiIyNzMiLCJUb3AiOjAsIkxlZnQiOjAsIlJpZ2h0IjowLCJCb3R0b20iOjB9LCJCYWNrZ3JvdW5kIjp7IiRyZWYiOiIyMzIifSwiSXNWaXNpYmxlIjp0cnVlLCJXaWR0aCI6MC4wLCJIZWlnaHQiOjAuMCwiQm9yZGVyU3R5bGUiOnsiJGlkIjoiMjc0IiwiTGluZUNvbG9yIjpudWxsLCJMaW5lV2VpZ2h0IjowLjAsIkxpbmVUeXBlIjowLCJQYXJlbnRTdHlsZSI6bnVsbH0sIlBhcmVudFN0eWxlIjpudWxsfSwiRGF0ZVN0eWxlIjp7IiRpZCI6IjI3NSIsIkZvbnRTZXR0aW5ncyI6eyIkaWQiOiIyNzYiLCJGb250U2l6ZSI6MTAsIkZvbnROYW1lIjoiQ2FsaWJyaSIsIklzQm9sZCI6ZmFsc2UsIklzSXRhbGljIjpmYWxzZSwiSXNVbmRlcmxpbmVkIjpmYWxzZSwiUGFyZW50U3R5bGUiOm51bGx9LCJBdXRvU2l6ZSI6MCwiRm9yZWdyb3VuZCI6eyIkaWQiOiIyNzciLCJDb2xvciI6eyIkaWQiOiIyNzgiLCJBIjoyNTUsIlIiOjY4LCJHIjo4NCwiQiI6MTA2fX0sIk1heFdpZHRoIjoyMDAuMCwiTWF4SGVpZ2h0IjoiSW5maW5pdHkiLCJTbWFydEZvcmVncm91bmRJc0FjdGl2ZSI6ZmFsc2UsIkhvcml6b250YWxBbGlnbm1lbnQiOjIsIlZlcnRpY2FsQWxpZ25tZW50IjowLCJTbWFydEZvcmVncm91bmQiOm51bGwsIkJhY2tncm91bmRGaWxsVHlwZSI6MCwiTWFyZ2luIjp7IiRpZCI6IjI3OSIsIlRvcCI6MCwiTGVmdCI6MCwiUmlnaHQiOjAsIkJvdHRvbSI6MH0sIlBhZGRpbmciOnsiJGlkIjoiMjgwIiwiVG9wIjowLCJMZWZ0IjowLCJSaWdodCI6MCwiQm90dG9tIjowfSwiQmFja2dyb3VuZCI6eyIkcmVmIjoiMjQwIn0sIklzVmlzaWJsZSI6dHJ1ZSwiV2lkdGgiOjAuMCwiSGVpZ2h0IjowLjAsIkJvcmRlclN0eWxlIjp7IiRpZCI6IjI4MSIsIkxpbmVDb2xvciI6bnVsbCwiTGluZVdlaWdodCI6MC4wLCJMaW5lVHlwZSI6MCwiUGFyZW50U3R5bGUiOm51bGx9LCJQYXJlbnRTdHlsZSI6bnVsbH0sIkRhdGVGb3JtYXQiOnsiJGlkIjoiMjgyIiwiRm9ybWF0U3RyaW5nIjoiTU1NIGQiLCJTZXBhcmF0b3IiOiIvIiwiVXNlSW50ZXJuYXRpb25hbERhdGVGb3JtYXQiOmZhbHNlLCJEYXRlSXNWaXNpYmxlIjp0cnVlLCJUaW1lSXNWaXNpYmxlIjpmYWxzZSwiSG91ckRpZ2l0cyI6MSwiQW1QbURlc2lnbmF0b3IiOjIsIlRyaW0wME1pbnV0ZXMiOmZhbHNlLCJMYXN0S25vd25WaXNpYmlsaXR5U3RhdGUiOm51bGx9LCJJc1Zpc2libGUiOnRydWUsIlBhcmVudFN0eWxlIjpudWxsfSwiSW5kZXgiOjIsIlNtYXJ0RHVyYXRpb25BY3RpdmF0ZWQiOmZhbHNlLCJEYXRlRm9ybWF0Ijp7IiRyZWYiOiIyODIifSwiSWQiOiI1ODM5OWJjNC02MjNlLTRmNTctOWE3NS02ZTljOTk1YTU4YjciLCJJbXBvcnRJZCI6bnVsbCwiVGl0bGUiOiJMaXRlcmF0dXJlIFN1cnZleSIsIk5vdGUiOm51bGwsIkh5cGVybGluayI6eyIkaWQiOiIyODMiLCJBZGRyZXNzIjoiIiwiU3ViQWRkcmVzcyI6IiJ9LCJJc0NoYW5nZWQiOmZhbHNlLCJJc05ldyI6ZmFsc2V9LCJJbmRleCI6MH1dLCJNaWxlc3RvbmVzIjpbXX0seyIkaWQiOiIyODQiLCJJZCI6IjU2M2YwNjFjLTdkZjQtNGY2OC04YzE2LTNkZGU5MzJlMjk4MyIsIkluZGV4IjozLCJIZWFkZXJUZXh0IjoiSW1wbGVtZW50IEJhc2UgR2FtZSIsIlN0eWxlIjp7IiRpZCI6IjI4NSIsIkhlYWRlclN0eWxlIjp7IiRpZCI6IjI4NiIsIlRleHRTdHlsZSI6eyIkaWQiOiIyODciLCJGb250U2V0dGluZ3MiOnsiJGlkIjoiMjg4IiwiRm9udFNpemUiOjEyLCJGb250TmFtZSI6IkNhbGlicmkiLCJJc0JvbGQiOmZhbHNlLCJJc0l0YWxpYyI6ZmFsc2UsIklzVW5kZXJsaW5lZCI6ZmFsc2UsIlBhcmVudFN0eWxlIjpudWxsfSwiQXV0b1NpemUiOjAsIkZvcmVncm91bmQiOnsiJGlkIjoiMjg5IiwiQ29sb3IiOnsiJGlkIjoiMjkwIiwiQSI6MjU1LCJSIjoyMSwiRyI6MzcsIkIiOjY2fX0sIk1heFdpZHRoIjo1MS40OTMzMzMzMzMzMzMzMzksIk1heEhlaWdodCI6MC4wLCJTbWFydEZvcmVncm91bmRJc0FjdGl2ZSI6ZmFsc2UsIkhvcml6b250YWxBbGlnbm1lbnQiOjAsIlZlcnRpY2FsQWxpZ25tZW50IjowLCJTbWFydEZvcmVncm91bmQiOm51bGwsIkJhY2tncm91bmRGaWxsVHlwZSI6MCwiTWFyZ2luIjp7IiRyZWYiOiIxNzAifSwiUGFkZGluZyI6eyIkcmVmIjoiMTcxIn0sIkJhY2tncm91bmQiOm51bGwsIklzVmlzaWJsZSI6ZmFsc2UsIldpZHRoIjowLjAsIkhlaWdodCI6MC4wLCJCb3JkZXJTdHlsZSI6bnVsbCwiUGFyZW50U3R5bGUiOm51bGx9LCJSZWN0YW5nbGVTdHlsZSI6eyIkaWQiOiIyOTEiLCJNYXJnaW4iOnsiJHJlZiI6IjE3MyJ9LCJQYWRkaW5nIjp7IiRyZWYiOiIxNzQifSwiQmFja2dyb3VuZCI6eyIkaWQiOiIyOTIiLCJDb2xvciI6eyIkaWQiOiIyOTMiLCJBIjoxMjcsIlIiOjY4LCJHIjoxMTQsIkIiOjE5Nn19LCJJc1Zpc2libGUiOmZhbHNlLCJXaWR0aCI6MC4wLCJIZWlnaHQiOjAuMCwiQm9yZGVyU3R5bGUiOnsiJGlkIjoiMjk0IiwiTGluZUNvbG9yIjp7IiRpZCI6IjI5NSIsIiR0eXBlIjoiTkxSRS5Db21tb24uRG9tLlNvbGlkQ29sb3JCcnVzaCwgTkxSRS5Db21tb24iLCJDb2xvciI6eyIkaWQiOiIyOTYiLCJBIjoyNTUsIlIiOjIxLCJHIjozNywiQiI6NjZ9fSwiTGluZVdlaWdodCI6MC4wLCJMaW5lVHlwZSI6MCwiUGFyZW50U3R5bGUiOm51bGx9LCJQYXJlbnRTdHlsZSI6bnVsbH0sIk1hcmdpbiI6eyIkcmVmIjoiMTgwIn0sIlBhZGRpbmciOnsiJHJlZiI6IjE4MSJ9LCJCYWNrZ3JvdW5kIjpudWxsLCJJc1Zpc2libGUiOnRydWUsIldpZHRoIjowLjAsIkhlaWdodCI6MC4wLCJCb3JkZXJTdHlsZSI6bnVsbCwiUGFyZW50U3R5bGUiOm51bGx9LCJCYWNrZ3JvdW5kU3R5bGUiOnsiJGlkIjoiMjk3IiwiTWFyZ2luIjp7IiRyZWYiOiIxODMifSwiUGFkZGluZyI6eyIkcmVmIjoiMTg0In0sIkJhY2tncm91bmQiOnsiJGlkIjoiMjk4IiwiQ29sb3IiOnsiJGlkIjoiMjk5IiwiQSI6MzgsIlIiOjY4LCJHIjoxMTQsIkIiOjE5Nn19LCJJc1Zpc2libGUiOnRydWUsIldpZHRoIjowLjAsIkhlaWdodCI6MC4wLCJCb3JkZXJTdHlsZSI6eyIkaWQiOiIzMDAiLCJMaW5lQ29sb3IiOnsiJGlkIjoiMzAxIiwiJHR5cGUiOiJOTFJFLkNvbW1vbi5Eb20uU29saWRDb2xvckJydXNoLCBOTFJFLkNvbW1vbiIsIkNvbG9yIjp7IiRpZCI6IjMwMiIsIkEiOjI1NSwiUiI6MjEsIkciOjM3LCJCIjo2Nn19LCJMaW5lV2VpZ2h0IjowLjAsIkxpbmVUeXBlIjowLCJQYXJlbnRTdHlsZSI6bnVsbH0sIlBhcmVudFN0eWxlIjpudWxsfSwiSXNBYm92ZVRpbWViYW5kIjpmYWxzZSwiTWFyZ2luIjp7IiRyZWYiOiIxOTAifSwiUGFkZGluZyI6eyIkcmVmIjoiMTkxIn0sIklzVmlzaWJsZSI6dHJ1ZSwiV2lkdGgiOjAuMCwiSGVpZ2h0IjowLjAsIkJvcmRlclN0eWxlIjpudWxsLCJQYXJlbnRTdHlsZSI6bnVsbH0sIlRhc2tzIjpbeyIkaWQiOiIzMDMiLCJfYXR0YWNoZWRNaWxlc3RvbmVzIjpbXSwiVGFza0RlZmluaXRpb24iOnsiJGlkIjoiMzA0IiwiR3JvdXBOYW1lIjpudWxsLCJTdGFydERhdGUiOiIyMDE5LTA5LTI5VDAwOjAwOjAwWiIsIkVuZERhdGUiOiIyMDE5LTEwLTMxVDIzOjU5OjAwWiIsIlBlcmNlbnRhZ2VDb21wbGV0ZSI6MTAwLjAsIlN0eWxlIjp7IiRpZCI6IjMwNSIsIlNoYXBlIjoxLCJTaGFwZVRoaWNrbmVzcyI6MCwiRHVyYXRpb25Gb3JtYXQiOjAsIkluY2x1ZGVOb25Xb3JraW5nRGF5c0luRHVyYXRpb24iOmZhbHNlLCJQZXJjZW50YWdlQ29tcGxldGVTdHlsZSI6eyIkaWQiOiIzMDYiLCJGb250U2V0dGluZ3MiOnsiJGlkIjoiMzA3IiwiRm9udFNpemUiOjEwLCJGb250TmFtZSI6IkNhbGlicmkiLCJJc0JvbGQiOmZhbHNlLCJJc0l0YWxpYyI6ZmFsc2UsIklzVW5kZXJsaW5lZCI6ZmFsc2UsIlBhcmVudFN0eWxlIjpudWxsfSwiQXV0b1NpemUiOjAsIkZvcmVncm91bmQiOnsiJGlkIjoiMzA4IiwiQ29sb3IiOnsiJGlkIjoiMzA5IiwiQSI6MjU1LCJSIjoyMzcsIkciOjEyNSwiQiI6NDl9fSwiTWF4V2lkdGgiOjIwMC4wLCJNYXhIZWlnaHQiOiJJbmZpbml0eSIsIlNtYXJ0Rm9yZWdyb3VuZElzQWN0aXZlIjpmYWxzZSwiSG9yaXpvbnRhbEFsaWdubWVudCI6MSwiVmVydGljYWxBbGlnbm1lbnQiOjAsIlNtYXJ0Rm9yZWdyb3VuZCI6bnVsbCwiQmFja2dyb3VuZEZpbGxUeXBlIjowLCJNYXJnaW4iOnsiJGlkIjoiMzEwIiwiVG9wIjowLCJMZWZ0IjowLCJSaWdodCI6MCwiQm90dG9tIjowfSwiUGFkZGluZyI6eyIkaWQiOiIzMTEiLCJUb3AiOjAsIkxlZnQiOjAsIlJpZ2h0IjowLCJCb3R0b20iOjB9LCJCYWNrZ3JvdW5kIjp7IiRyZWYiOiIyMDEifSwiSXNWaXNpYmxlIjp0cnVlLCJXaWR0aCI6MC4wLCJIZWlnaHQiOjAuMCwiQm9yZGVyU3R5bGUiOnsiJGlkIjoiMzEyIiwiTGluZUNvbG9yIjpudWxsLCJMaW5lV2VpZ2h0IjowLjAsIkxpbmVUeXBlIjowLCJQYXJlbnRTdHlsZSI6bnVsbH0sIlBhcmVudFN0eWxlIjpudWxsfSwiRHVyYXRpb25TdHlsZSI6eyIkaWQiOiIzMTMiLCJGb250U2V0dGluZ3MiOnsiJGlkIjoiMzE0IiwiRm9udFNpemUiOjEwLCJGb250TmFtZSI6IkNhbGlicmkiLCJJc0JvbGQiOmZhbHNlLCJJc0l0YWxpYyI6ZmFsc2UsIklzVW5kZXJsaW5lZCI6ZmFsc2UsIlBhcmVudFN0eWxlIjpudWxsfSwiQXV0b1NpemUiOjAsIkZvcmVncm91bmQiOnsiJGlkIjoiMzE1IiwiQ29sb3IiOnsiJHJlZiI6IjIwNyJ9fSwiTWF4V2lkdGgiOjIwMC4wLCJNYXhIZWlnaHQiOiJJbmZpbml0eSIsIlNtYXJ0Rm9yZWdyb3VuZElzQWN0aXZlIjpmYWxzZSwiSG9yaXpvbnRhbEFsaWdubWVudCI6MCwiVmVydGljYWxBbGlnbm1lbnQiOjAsIlNtYXJ0Rm9yZWdyb3VuZCI6bnVsbCwiQmFja2dyb3VuZEZpbGxUeXBlIjowLCJNYXJnaW4iOnsiJGlkIjoiMzE2IiwiVG9wIjowLCJMZWZ0IjowLCJSaWdodCI6MCwiQm90dG9tIjowfSwiUGFkZGluZyI6eyIkaWQiOiIzMTciLCJUb3AiOjAsIkxlZnQiOjAsIlJpZ2h0IjowLCJCb3R0b20iOjB9LCJCYWNrZ3JvdW5kIjp7IiRyZWYiOiIyMTAifSwiSXNWaXNpYmxlIjp0cnVlLCJXaWR0aCI6MC4wLCJIZWlnaHQiOjAuMCwiQm9yZGVyU3R5bGUiOnsiJGlkIjoiMzE4IiwiTGluZUNvbG9yIjpudWxsLCJMaW5lV2VpZ2h0IjowLjAsIkxpbmVUeXBlIjowLCJQYXJlbnRTdHlsZSI6bnVsbH0sIlBhcmVudFN0eWxlIjpudWxsfSwiSG9yaXpvbnRhbENvbm5lY3RvclN0eWxlIjp7IiRpZCI6IjMxOSIsIkxpbmVDb2xvciI6eyIkcmVmIjoiMjEzIn0sIkxpbmVXZWlnaHQiOjEuMCwiTGluZVR5cGUiOjAsIlBhcmVudFN0eWxlIjpudWxsfSwiVmVydGljYWxDb25uZWN0b3JTdHlsZSI6eyIkaWQiOiIzMjAiLCJMaW5lQ29sb3IiOnsiJHJlZiI6IjIxNiJ9LCJMaW5lV2VpZ2h0IjowLjAsIkxpbmVUeXBlIjowLCJQYXJlbnRTdHlsZSI6bnVsbH0sIk1hcmdpbiI6bnVsbCwiU3RhcnREYXRlUG9zaXRpb24iOjMsIkVuZERhdGVQb3NpdGlvbiI6MywiRGF0ZUlzVmlzaWJsZSI6dHJ1ZSwiVGl0bGVQb3NpdGlvbiI6NCwiRHVyYXRpb25Qb3NpdGlvbiI6NiwiUGVyY2VudGFnZUNvbXBsZXRlZFBvc2l0aW9uIjoyLCJTcGFjaW5nIjo1LCJJc0JlbG93VGltZWJhbmQiOnRydWUsIlBlcmNlbnRhZ2VDb21wbGV0ZVNoYXBlT3BhY2l0eSI6MzUsIlNoYXBlU3R5bGUiOnsiJGlkIjoiMzIxIiwiTWFyZ2luIjp7IiRpZCI6IjMyMiIsIlRvcCI6MCwiTGVmdCI6NCwiUmlnaHQiOjQsIkJvdHRvbSI6MH0sIlBhZGRpbmciOnsiJGlkIjoiMzIzIiwiVG9wIjowLCJMZWZ0IjowLCJSaWdodCI6MCwiQm90dG9tIjowfSwiQmFja2dyb3VuZCI6eyIkaWQiOiIzMjQiLCJDb2xvciI6eyIkaWQiOiIzMjUiLCJBIjoyNTUsIlIiOjY4LCJHIjoxMTQsIkIiOjE5Nn19LCJJc1Zpc2libGUiOnRydWUsIldpZHRoIjowLjAsIkhlaWdodCI6MTAuMCwiQm9yZGVyU3R5bGUiOnsiJGlkIjoiMzI2IiwiTGluZUNvbG9yIjp7IiRyZWYiOiIyMjQifSwiTGluZVdlaWdodCI6MC4wLCJMaW5lVHlwZSI6MCwiUGFyZW50U3R5bGUiOm51bGx9LCJQYXJlbnRTdHlsZSI6bnVsbH0sIlRpdGxlU3R5bGUiOnsiJGlkIjoiMzI3IiwiRm9udFNldHRpbmdzIjp7IiRpZCI6IjMyOCIsIkZvbnRTaXplIjoxMSwiRm9udE5hbWUiOiJDYWxpYnJpIiwiSXNCb2xkIjp0cnVlLCJJc0l0YWxpYyI6ZmFsc2UsIklzVW5kZXJsaW5lZCI6ZmFsc2UsIlBhcmVudFN0eWxlIjpudWxsfSwiQXV0b1NpemUiOjAsIkZvcmVncm91bmQiOnsiJGlkIjoiMzI5IiwiQ29sb3IiOnsiJGlkIjoiMzMwIiwiQSI6MjU1LCJSIjowLCJHIjowLCJCIjowfX0sIk1heFdpZHRoIjo5NjAuMCwiTWF4SGVpZ2h0IjoiSW5maW5pdHkiLCJTbWFydEZvcmVncm91bmRJc0FjdGl2ZSI6ZmFsc2UsIkhvcml6b250YWxBbGlnbm1lbnQiOjAsIlZlcnRpY2FsQWxpZ25tZW50IjowLCJTbWFydEZvcmVncm91bmQiOm51bGwsIkJhY2tncm91bmRGaWxsVHlwZSI6MCwiTWFyZ2luIjp7IiRpZCI6IjMzMSIsIlRvcCI6MCwiTGVmdCI6MCwiUmlnaHQiOjAsIkJvdHRvbSI6MH0sIlBhZGRpbmciOnsiJGlkIjoiMzMyIiwiVG9wIjowLCJMZWZ0IjowLCJSaWdodCI6MCwiQm90dG9tIjowfSwiQmFja2dyb3VuZCI6eyIkcmVmIjoiMjMyIn0sIklzVmlzaWJsZSI6dHJ1ZSwiV2lkdGgiOjAuMCwiSGVpZ2h0IjowLjAsIkJvcmRlclN0eWxlIjp7IiRpZCI6IjMzMyIsIkxpbmVDb2xvciI6bnVsbCwiTGluZVdlaWdodCI6MC4wLCJMaW5lVHlwZSI6MCwiUGFyZW50U3R5bGUiOm51bGx9LCJQYXJlbnRTdHlsZSI6bnVsbH0sIkRhdGVTdHlsZSI6eyIkaWQiOiIzMzQiLCJGb250U2V0dGluZ3MiOnsiJGlkIjoiMzM1IiwiRm9udFNpemUiOjEwLCJGb250TmFtZSI6IkNhbGlicmkiLCJJc0JvbGQiOmZhbHNlLCJJc0l0YWxpYyI6ZmFsc2UsIklzVW5kZXJsaW5lZCI6ZmFsc2UsIlBhcmVudFN0eWxlIjpudWxsfSwiQXV0b1NpemUiOjAsIkZvcmVncm91bmQiOnsiJGlkIjoiMzM2IiwiQ29sb3IiOnsiJGlkIjoiMzM3IiwiQSI6MjU1LCJSIjo2OCwiRyI6ODQsIkIiOjEwNn19LCJNYXhXaWR0aCI6MjAwLjAsIk1heEhlaWdodCI6IkluZmluaXR5IiwiU21hcnRGb3JlZ3JvdW5kSXNBY3RpdmUiOmZhbHNlLCJIb3Jpem9udGFsQWxpZ25tZW50IjoyLCJWZXJ0aWNhbEFsaWdubWVudCI6MCwiU21hcnRGb3JlZ3JvdW5kIjpudWxsLCJCYWNrZ3JvdW5kRmlsbFR5cGUiOjAsIk1hcmdpbiI6eyIkaWQiOiIzMzgiLCJUb3AiOjAsIkxlZnQiOjAsIlJpZ2h0IjowLCJCb3R0b20iOjB9LCJQYWRkaW5nIjp7IiRpZCI6IjMzOSIsIlRvcCI6MCwiTGVmdCI6MCwiUmlnaHQiOjAsIkJvdHRvbSI6MH0sIkJhY2tncm91bmQiOnsiJHJlZiI6IjI0MCJ9LCJJc1Zpc2libGUiOnRydWUsIldpZHRoIjowLjAsIkhlaWdodCI6MC4wLCJCb3JkZXJTdHlsZSI6eyIkaWQiOiIzNDAiLCJMaW5lQ29sb3IiOm51bGwsIkxpbmVXZWlnaHQiOjAuMCwiTGluZVR5cGUiOjAsIlBhcmVudFN0eWxlIjpudWxsfSwiUGFyZW50U3R5bGUiOm51bGx9LCJEYXRlRm9ybWF0Ijp7IiRpZCI6IjM0MSIsIkZvcm1hdFN0cmluZyI6Ik1NTSBkIiwiU2VwYXJhdG9yIjoiLyIsIlVzZUludGVybmF0aW9uYWxEYXRlRm9ybWF0IjpmYWxzZSwiRGF0ZUlzVmlzaWJsZSI6dHJ1ZSwiVGltZUlzVmlzaWJsZSI6ZmFsc2UsIkhvdXJEaWdpdHMiOjEsIkFtUG1EZXNpZ25hdG9yIjoyLCJUcmltMDBNaW51dGVzIjpmYWxzZSwiTGFzdEtub3duVmlzaWJpbGl0eVN0YXRlIjpudWxsfSwiSXNWaXNpYmxlIjp0cnVlLCJQYXJlbnRTdHlsZSI6bnVsbH0sIkluZGV4Ijo0LCJTbWFydER1cmF0aW9uQWN0aXZhdGVkIjpmYWxzZSwiRGF0ZUZvcm1hdCI6eyIkcmVmIjoiMzQxIn0sIklkIjoiZDg3NzhiNzktZjViNS00OTA4LTk5ZGUtY2I5MjVkYTRlYjE1IiwiSW1wb3J0SWQiOm51bGwsIlRpdGxlIjoiQnVpbGQgYmFzZSBGUFMgZmVhdHVyZXMiLCJOb3RlIjpudWxsLCJIeXBlcmxpbmsiOnsiJGlkIjoiMzQyIiwiQWRkcmVzcyI6IiIsIlN1YkFkZHJlc3MiOiIifSwiSXNDaGFuZ2VkIjpmYWxzZSwiSXNOZXciOmZhbHNlfSwiSW5kZXgiOjB9LHsiJGlkIjoiMzQzIiwiX2F0dGFjaGVkTWlsZXN0b25lcyI6W10sIlRhc2tEZWZpbml0aW9uIjp7IiRpZCI6IjM0NCIsIkdyb3VwTmFtZSI6bnVsbCwiU3RhcnREYXRlIjoiMjAxOS0xMS0wMVQwMDowMDowMFoiLCJFbmREYXRlIjoiMjAxOS0xMi0wMVQyMzo1OTowMFoiLCJQZXJjZW50YWdlQ29tcGxldGUiOjEwMC4wLCJTdHlsZSI6eyIkaWQiOiIzNDUiLCJTaGFwZSI6MSwiU2hhcGVUaGlja25lc3MiOjAsIkR1cmF0aW9uRm9ybWF0IjowLCJJbmNsdWRlTm9uV29ya2luZ0RheXNJbkR1cmF0aW9uIjpmYWxzZSwiUGVyY2VudGFnZUNvbXBsZXRlU3R5bGUiOnsiJGlkIjoiMzQ2IiwiRm9udFNldHRpbmdzIjp7IiRpZCI6IjM0NyIsIkZvbnRTaXplIjoxMCwiRm9udE5hbWUiOiJDYWxpYnJpIiwiSXNCb2xkIjpmYWxzZSwiSXNJdGFsaWMiOmZhbHNlLCJJc1VuZGVybGluZWQiOmZhbHNlLCJQYXJlbnRTdHlsZSI6bnVsbH0sIkF1dG9TaXplIjowLCJGb3JlZ3JvdW5kIjp7IiRpZCI6IjM0OCIsIkNvbG9yIjp7IiRpZCI6IjM0OSIsIkEiOjI1NSwiUiI6MjM3LCJHIjoxMjUsIkIiOjQ5fX0sIk1heFdpZHRoIjoyMDAuMCwiTWF4SGVpZ2h0IjoiSW5maW5pdHkiLCJTbWFydEZvcmVncm91bmRJc0FjdGl2ZSI6ZmFsc2UsIkhvcml6b250YWxBbGlnbm1lbnQiOjEsIlZlcnRpY2FsQWxpZ25tZW50IjowLCJTbWFydEZvcmVncm91bmQiOm51bGwsIkJhY2tncm91bmRGaWxsVHlwZSI6MCwiTWFyZ2luIjp7IiRpZCI6IjM1MCIsIlRvcCI6MCwiTGVmdCI6MCwiUmlnaHQiOjAsIkJvdHRvbSI6MH0sIlBhZGRpbmciOnsiJGlkIjoiMzUxIiwiVG9wIjowLCJMZWZ0IjowLCJSaWdodCI6MCwiQm90dG9tIjowfSwiQmFja2dyb3VuZCI6eyIkcmVmIjoiMjAxIn0sIklzVmlzaWJsZSI6dHJ1ZSwiV2lkdGgiOjAuMCwiSGVpZ2h0IjowLjAsIkJvcmRlclN0eWxlIjp7IiRpZCI6IjM1MiIsIkxpbmVDb2xvciI6bnVsbCwiTGluZVdlaWdodCI6MC4wLCJMaW5lVHlwZSI6MCwiUGFyZW50U3R5bGUiOm51bGx9LCJQYXJlbnRTdHlsZSI6bnVsbH0sIkR1cmF0aW9uU3R5bGUiOnsiJGlkIjoiMzUzIiwiRm9udFNldHRpbmdzIjp7IiRpZCI6IjM1NCIsIkZvbnRTaXplIjoxMCwiRm9udE5hbWUiOiJDYWxpYnJpIiwiSXNCb2xkIjpmYWxzZSwiSXNJdGFsaWMiOmZhbHNlLCJJc1VuZGVybGluZWQiOmZhbHNlLCJQYXJlbnRTdHlsZSI6bnVsbH0sIkF1dG9TaXplIjowLCJGb3JlZ3JvdW5kIjp7IiRpZCI6IjM1NSIsIkNvbG9yIjp7IiRyZWYiOiIyMDcifX0sIk1heFdpZHRoIjoyMDAuMCwiTWF4SGVpZ2h0IjoiSW5maW5pdHkiLCJTbWFydEZvcmVncm91bmRJc0FjdGl2ZSI6ZmFsc2UsIkhvcml6b250YWxBbGlnbm1lbnQiOjAsIlZlcnRpY2FsQWxpZ25tZW50IjowLCJTbWFydEZvcmVncm91bmQiOm51bGwsIkJhY2tncm91bmRGaWxsVHlwZSI6MCwiTWFyZ2luIjp7IiRpZCI6IjM1NiIsIlRvcCI6MCwiTGVmdCI6MCwiUmlnaHQiOjAsIkJvdHRvbSI6MH0sIlBhZGRpbmciOnsiJGlkIjoiMzU3IiwiVG9wIjowLCJMZWZ0IjowLCJSaWdodCI6MCwiQm90dG9tIjowfSwiQmFja2dyb3VuZCI6eyIkcmVmIjoiMjEwIn0sIklzVmlzaWJsZSI6dHJ1ZSwiV2lkdGgiOjAuMCwiSGVpZ2h0IjowLjAsIkJvcmRlclN0eWxlIjp7IiRpZCI6IjM1OCIsIkxpbmVDb2xvciI6bnVsbCwiTGluZVdlaWdodCI6MC4wLCJMaW5lVHlwZSI6MCwiUGFyZW50U3R5bGUiOm51bGx9LCJQYXJlbnRTdHlsZSI6bnVsbH0sIkhvcml6b250YWxDb25uZWN0b3JTdHlsZSI6eyIkaWQiOiIzNTkiLCJMaW5lQ29sb3IiOnsiJHJlZiI6IjIxMyJ9LCJMaW5lV2VpZ2h0IjoxLjAsIkxpbmVUeXBlIjowLCJQYXJlbnRTdHlsZSI6bnVsbH0sIlZlcnRpY2FsQ29ubmVjdG9yU3R5bGUiOnsiJGlkIjoiMzYwIiwiTGluZUNvbG9yIjp7IiRyZWYiOiIyMTYifSwiTGluZVdlaWdodCI6MC4wLCJMaW5lVHlwZSI6MCwiUGFyZW50U3R5bGUiOm51bGx9LCJNYXJnaW4iOm51bGwsIlN0YXJ0RGF0ZVBvc2l0aW9uIjozLCJFbmREYXRlUG9zaXRpb24iOjMsIkRhdGVJc1Zpc2libGUiOnRydWUsIlRpdGxlUG9zaXRpb24iOjQsIkR1cmF0aW9uUG9zaXRpb24iOjYsIlBlcmNlbnRhZ2VDb21wbGV0ZWRQb3NpdGlvbiI6MiwiU3BhY2luZyI6NSwiSXNCZWxvd1RpbWViYW5kIjp0cnVlLCJQZXJjZW50YWdlQ29tcGxldGVTaGFwZU9wYWNpdHkiOjM1LCJTaGFwZVN0eWxlIjp7IiRpZCI6IjM2MSIsIk1hcmdpbiI6eyIkaWQiOiIzNjIiLCJUb3AiOjAsIkxlZnQiOjQsIlJpZ2h0Ijo0LCJCb3R0b20iOjB9LCJQYWRkaW5nIjp7IiRpZCI6IjM2MyIsIlRvcCI6MCwiTGVmdCI6MCwiUmlnaHQiOjAsIkJvdHRvbSI6MH0sIkJhY2tncm91bmQiOnsiJGlkIjoiMzY0IiwiQ29sb3IiOnsiJGlkIjoiMzY1IiwiQSI6MjU1LCJSIjo2OCwiRyI6MTE0LCJCIjoxOTZ9fSwiSXNWaXNpYmxlIjp0cnVlLCJXaWR0aCI6MC4wLCJIZWlnaHQiOjEwLjAsIkJvcmRlclN0eWxlIjp7IiRpZCI6IjM2NiIsIkxpbmVDb2xvciI6eyIkcmVmIjoiMjI0In0sIkxpbmVXZWlnaHQiOjAuMCwiTGluZVR5cGUiOjAsIlBhcmVudFN0eWxlIjpudWxsfSwiUGFyZW50U3R5bGUiOm51bGx9LCJUaXRsZVN0eWxlIjp7IiRpZCI6IjM2NyIsIkZvbnRTZXR0aW5ncyI6eyIkaWQiOiIzNjgiLCJGb250U2l6ZSI6MTEsIkZvbnROYW1lIjoiQ2FsaWJyaSIsIklzQm9sZCI6dHJ1ZSwiSXNJdGFsaWMiOmZhbHNlLCJJc1VuZGVybGluZWQiOmZhbHNlLCJQYXJlbnRTdHlsZSI6bnVsbH0sIkF1dG9TaXplIjowLCJGb3JlZ3JvdW5kIjp7IiRpZCI6IjM2OSIsIkNvbG9yIjp7IiRpZCI6IjM3MCIsIkEiOjI1NSwiUiI6MCwiRyI6MCwiQiI6MH19LCJNYXhXaWR0aCI6OTYwLjAsIk1heEhlaWdodCI6IkluZmluaXR5IiwiU21hcnRGb3JlZ3JvdW5kSXNBY3RpdmUiOmZhbHNlLCJIb3Jpem9udGFsQWxpZ25tZW50IjowLCJWZXJ0aWNhbEFsaWdubWVudCI6MCwiU21hcnRGb3JlZ3JvdW5kIjpudWxsLCJCYWNrZ3JvdW5kRmlsbFR5cGUiOjAsIk1hcmdpbiI6eyIkaWQiOiIzNzEiLCJUb3AiOjAsIkxlZnQiOjAsIlJpZ2h0IjowLCJCb3R0b20iOjB9LCJQYWRkaW5nIjp7IiRpZCI6IjM3MiIsIlRvcCI6MCwiTGVmdCI6MCwiUmlnaHQiOjAsIkJvdHRvbSI6MH0sIkJhY2tncm91bmQiOnsiJHJlZiI6IjIzMiJ9LCJJc1Zpc2libGUiOnRydWUsIldpZHRoIjowLjAsIkhlaWdodCI6MC4wLCJCb3JkZXJTdHlsZSI6eyIkaWQiOiIzNzMiLCJMaW5lQ29sb3IiOm51bGwsIkxpbmVXZWlnaHQiOjAuMCwiTGluZVR5cGUiOjAsIlBhcmVudFN0eWxlIjpudWxsfSwiUGFyZW50U3R5bGUiOm51bGx9LCJEYXRlU3R5bGUiOnsiJGlkIjoiMzc0IiwiRm9udFNldHRpbmdzIjp7IiRpZCI6IjM3NSIsIkZvbnRTaXplIjoxMCwiRm9udE5hbWUiOiJDYWxpYnJpIiwiSXNCb2xkIjpmYWxzZSwiSXNJdGFsaWMiOmZhbHNlLCJJc1VuZGVybGluZWQiOmZhbHNlLCJQYXJlbnRTdHlsZSI6bnVsbH0sIkF1dG9TaXplIjowLCJGb3JlZ3JvdW5kIjp7IiRpZCI6IjM3NiIsIkNvbG9yIjp7IiRpZCI6IjM3NyIsIkEiOjI1NSwiUiI6NjgsIkciOjg0LCJCIjoxMDZ9fSwiTWF4V2lkdGgiOjIwMC4wLCJNYXhIZWlnaHQiOiJJbmZpbml0eSIsIlNtYXJ0Rm9yZWdyb3VuZElzQWN0aXZlIjpmYWxzZSwiSG9yaXpvbnRhbEFsaWdubWVudCI6MiwiVmVydGljYWxBbGlnbm1lbnQiOjAsIlNtYXJ0Rm9yZWdyb3VuZCI6bnVsbCwiQmFja2dyb3VuZEZpbGxUeXBlIjowLCJNYXJnaW4iOnsiJGlkIjoiMzc4IiwiVG9wIjowLCJMZWZ0IjowLCJSaWdodCI6MCwiQm90dG9tIjowfSwiUGFkZGluZyI6eyIkaWQiOiIzNzkiLCJUb3AiOjAsIkxlZnQiOjAsIlJpZ2h0IjowLCJCb3R0b20iOjB9LCJCYWNrZ3JvdW5kIjp7IiRyZWYiOiIyNDAifSwiSXNWaXNpYmxlIjp0cnVlLCJXaWR0aCI6MC4wLCJIZWlnaHQiOjAuMCwiQm9yZGVyU3R5bGUiOnsiJGlkIjoiMzgwIiwiTGluZUNvbG9yIjpudWxsLCJMaW5lV2VpZ2h0IjowLjAsIkxpbmVUeXBlIjowLCJQYXJlbnRTdHlsZSI6bnVsbH0sIlBhcmVudFN0eWxlIjpudWxsfSwiRGF0ZUZvcm1hdCI6eyIkaWQiOiIzODEiLCJGb3JtYXRTdHJpbmciOiJNTU0gZCIsIlNlcGFyYXRvciI6Ii8iLCJVc2VJbnRlcm5hdGlvbmFsRGF0ZUZvcm1hdCI6ZmFsc2UsIkRhdGVJc1Zpc2libGUiOnRydWUsIlRpbWVJc1Zpc2libGUiOmZhbHNlLCJIb3VyRGlnaXRzIjoxLCJBbVBtRGVzaWduYXRvciI6MiwiVHJpbTAwTWludXRlcyI6ZmFsc2UsIkxhc3RLbm93blZpc2liaWxpdHlTdGF0ZSI6bnVsbH0sIklzVmlzaWJsZSI6dHJ1ZSwiUGFyZW50U3R5bGUiOm51bGx9LCJJbmRleCI6NSwiU21hcnREdXJhdGlvbkFjdGl2YXRlZCI6ZmFsc2UsIkRhdGVGb3JtYXQiOnsiJHJlZiI6IjM4MSJ9LCJJZCI6IjNjNjk1ZmM2LTc1OGUtNGIyNC1hZDdjLTBiY2VmNDBiODU5MyIsIkltcG9ydElkIjpudWxsLCJUaXRsZSI6IlByb3RvdHlwZSBsZXZlbCBnZW5lcmF0aW9uIiwiTm90ZSI6bnVsbCwiSHlwZXJsaW5rIjp7IiRpZCI6IjM4MiIsIkFkZHJlc3MiOiIiLCJTdWJBZGRyZXNzIjoiIn0sIklzQ2hhbmdlZCI6ZmFsc2UsIklzTmV3IjpmYWxzZX0sIkluZGV4IjowfSx7IiRpZCI6IjM4MyIsIl9hdHRhY2hlZE1pbGVzdG9uZXMiOltdLCJUYXNrRGVmaW5pdGlvbiI6eyIkaWQiOiIzODQiLCJHcm91cE5hbWUiOm51bGwsIlN0YXJ0RGF0ZSI6IjIwMTktMTEtMDFUMDA6MDA6MDBaIiwiRW5kRGF0ZSI6IjIwMTktMTItMDFUMjM6NTk6MDBaIiwiUGVyY2VudGFnZUNvbXBsZXRlIjoxMDAuMCwiU3R5bGUiOnsiJGlkIjoiMzg1IiwiU2hhcGUiOjEsIlNoYXBlVGhpY2tuZXNzIjowLCJEdXJhdGlvbkZvcm1hdCI6MCwiSW5jbHVkZU5vbldvcmtpbmdEYXlzSW5EdXJhdGlvbiI6ZmFsc2UsIlBlcmNlbnRhZ2VDb21wbGV0ZVN0eWxlIjp7IiRpZCI6IjM4NiIsIkZvbnRTZXR0aW5ncyI6eyIkaWQiOiIzODciLCJGb250U2l6ZSI6MTAsIkZvbnROYW1lIjoiQ2FsaWJyaSIsIklzQm9sZCI6ZmFsc2UsIklzSXRhbGljIjpmYWxzZSwiSXNVbmRlcmxpbmVkIjpmYWxzZSwiUGFyZW50U3R5bGUiOm51bGx9LCJBdXRvU2l6ZSI6MCwiRm9yZWdyb3VuZCI6eyIkaWQiOiIzODgiLCJDb2xvciI6eyIkaWQiOiIzODkiLCJBIjoyNTUsIlIiOjIzNywiRyI6MTI1LCJCIjo0OX19LCJNYXhXaWR0aCI6MjAwLjAsIk1heEhlaWdodCI6IkluZmluaXR5IiwiU21hcnRGb3JlZ3JvdW5kSXNBY3RpdmUiOmZhbHNlLCJIb3Jpem9udGFsQWxpZ25tZW50IjoxLCJWZXJ0aWNhbEFsaWdubWVudCI6MCwiU21hcnRGb3JlZ3JvdW5kIjpudWxsLCJCYWNrZ3JvdW5kRmlsbFR5cGUiOjAsIk1hcmdpbiI6eyIkaWQiOiIzOTAiLCJUb3AiOjAsIkxlZnQiOjAsIlJpZ2h0IjowLCJCb3R0b20iOjB9LCJQYWRkaW5nIjp7IiRpZCI6IjM5MSIsIlRvcCI6MCwiTGVmdCI6MCwiUmlnaHQiOjAsIkJvdHRvbSI6MH0sIkJhY2tncm91bmQiOnsiJHJlZiI6IjIwMSJ9LCJJc1Zpc2libGUiOnRydWUsIldpZHRoIjowLjAsIkhlaWdodCI6MC4wLCJCb3JkZXJTdHlsZSI6eyIkaWQiOiIzOTIiLCJMaW5lQ29sb3IiOm51bGwsIkxpbmVXZWlnaHQiOjAuMCwiTGluZVR5cGUiOjAsIlBhcmVudFN0eWxlIjpudWxsfSwiUGFyZW50U3R5bGUiOm51bGx9LCJEdXJhdGlvblN0eWxlIjp7IiRpZCI6IjM5MyIsIkZvbnRTZXR0aW5ncyI6eyIkaWQiOiIzOTQiLCJGb250U2l6ZSI6MTAsIkZvbnROYW1lIjoiQ2FsaWJyaSIsIklzQm9sZCI6ZmFsc2UsIklzSXRhbGljIjpmYWxzZSwiSXNVbmRlcmxpbmVkIjpmYWxzZSwiUGFyZW50U3R5bGUiOm51bGx9LCJBdXRvU2l6ZSI6MCwiRm9yZWdyb3VuZCI6eyIkaWQiOiIzOTUiLCJDb2xvciI6eyIkcmVmIjoiMjA3In19LCJNYXhXaWR0aCI6MjAwLjAsIk1heEhlaWdodCI6IkluZmluaXR5IiwiU21hcnRGb3JlZ3JvdW5kSXNBY3RpdmUiOmZhbHNlLCJIb3Jpem9udGFsQWxpZ25tZW50IjowLCJWZXJ0aWNhbEFsaWdubWVudCI6MCwiU21hcnRGb3JlZ3JvdW5kIjpudWxsLCJCYWNrZ3JvdW5kRmlsbFR5cGUiOjAsIk1hcmdpbiI6eyIkaWQiOiIzOTYiLCJUb3AiOjAsIkxlZnQiOjAsIlJpZ2h0IjowLCJCb3R0b20iOjB9LCJQYWRkaW5nIjp7IiRpZCI6IjM5NyIsIlRvcCI6MCwiTGVmdCI6MCwiUmlnaHQiOjAsIkJvdHRvbSI6MH0sIkJhY2tncm91bmQiOnsiJHJlZiI6IjIxMCJ9LCJJc1Zpc2libGUiOnRydWUsIldpZHRoIjowLjAsIkhlaWdodCI6MC4wLCJCb3JkZXJTdHlsZSI6eyIkaWQiOiIzOTgiLCJMaW5lQ29sb3IiOm51bGwsIkxpbmVXZWlnaHQiOjAuMCwiTGluZVR5cGUiOjAsIlBhcmVudFN0eWxlIjpudWxsfSwiUGFyZW50U3R5bGUiOm51bGx9LCJIb3Jpem9udGFsQ29ubmVjdG9yU3R5bGUiOnsiJGlkIjoiMzk5IiwiTGluZUNvbG9yIjp7IiRyZWYiOiIyMTMifSwiTGluZVdlaWdodCI6MS4wLCJMaW5lVHlwZSI6MCwiUGFyZW50U3R5bGUiOm51bGx9LCJWZXJ0aWNhbENvbm5lY3RvclN0eWxlIjp7IiRpZCI6IjQwMCIsIkxpbmVDb2xvciI6eyIkcmVmIjoiMjE2In0sIkxpbmVXZWlnaHQiOjAuMCwiTGluZVR5cGUiOjAsIlBhcmVudFN0eWxlIjpudWxsfSwiTWFyZ2luIjpudWxsLCJTdGFydERhdGVQb3NpdGlvbiI6MywiRW5kRGF0ZVBvc2l0aW9uIjozLCJEYXRlSXNWaXNpYmxlIjp0cnVlLCJUaXRsZVBvc2l0aW9uIjo0LCJEdXJhdGlvblBvc2l0aW9uIjo2LCJQZXJjZW50YWdlQ29tcGxldGVkUG9zaXRpb24iOjIsIlNwYWNpbmciOjUsIklzQmVsb3dUaW1lYmFuZCI6dHJ1ZSwiUGVyY2VudGFnZUNvbXBsZXRlU2hhcGVPcGFjaXR5IjozNSwiU2hhcGVTdHlsZSI6eyIkaWQiOiI0MDEiLCJNYXJnaW4iOnsiJGlkIjoiNDAyIiwiVG9wIjowLCJMZWZ0Ijo0LCJSaWdodCI6NCwiQm90dG9tIjowfSwiUGFkZGluZyI6eyIkaWQiOiI0MDMiLCJUb3AiOjAsIkxlZnQiOjAsIlJpZ2h0IjowLCJCb3R0b20iOjB9LCJCYWNrZ3JvdW5kIjp7IiRpZCI6IjQwNCIsIkNvbG9yIjp7IiRpZCI6IjQwNSIsIkEiOjI1NSwiUiI6NjgsIkciOjExNCwiQiI6MTk2fX0sIklzVmlzaWJsZSI6dHJ1ZSwiV2lkdGgiOjAuMCwiSGVpZ2h0IjoxMC4wLCJCb3JkZXJTdHlsZSI6eyIkaWQiOiI0MDYiLCJMaW5lQ29sb3IiOnsiJHJlZiI6IjIyNCJ9LCJMaW5lV2VpZ2h0IjowLjAsIkxpbmVUeXBlIjowLCJQYXJlbnRTdHlsZSI6bnVsbH0sIlBhcmVudFN0eWxlIjpudWxsfSwiVGl0bGVTdHlsZSI6eyIkaWQiOiI0MDciLCJGb250U2V0dGluZ3MiOnsiJGlkIjoiNDA4IiwiRm9udFNpemUiOjExLCJGb250TmFtZSI6IkNhbGlicmkiLCJJc0JvbGQiOnRydWUsIklzSXRhbGljIjpmYWxzZSwiSXNVbmRlcmxpbmVkIjpmYWxzZSwiUGFyZW50U3R5bGUiOm51bGx9LCJBdXRvU2l6ZSI6MCwiRm9yZWdyb3VuZCI6eyIkaWQiOiI0MDkiLCJDb2xvciI6eyIkaWQiOiI0MTAiLCJBIjoyNTUsIlIiOjAsIkciOjAsIkIiOjB9fSwiTWF4V2lkdGgiOjk2MC4wLCJNYXhIZWlnaHQiOiJJbmZpbml0eSIsIlNtYXJ0Rm9yZWdyb3VuZElzQWN0aXZlIjpmYWxzZSwiSG9yaXpvbnRhbEFsaWdubWVudCI6MCwiVmVydGljYWxBbGlnbm1lbnQiOjAsIlNtYXJ0Rm9yZWdyb3VuZCI6bnVsbCwiQmFja2dyb3VuZEZpbGxUeXBlIjowLCJNYXJnaW4iOnsiJGlkIjoiNDExIiwiVG9wIjowLCJMZWZ0IjowLCJSaWdodCI6MCwiQm90dG9tIjowfSwiUGFkZGluZyI6eyIkaWQiOiI0MTIiLCJUb3AiOjAsIkxlZnQiOjAsIlJpZ2h0IjowLCJCb3R0b20iOjB9LCJCYWNrZ3JvdW5kIjp7IiRyZWYiOiIyMzIifSwiSXNWaXNpYmxlIjp0cnVlLCJXaWR0aCI6MC4wLCJIZWlnaHQiOjAuMCwiQm9yZGVyU3R5bGUiOnsiJGlkIjoiNDEzIiwiTGluZUNvbG9yIjpudWxsLCJMaW5lV2VpZ2h0IjowLjAsIkxpbmVUeXBlIjowLCJQYXJlbnRTdHlsZSI6bnVsbH0sIlBhcmVudFN0eWxlIjpudWxsfSwiRGF0ZVN0eWxlIjp7IiRpZCI6IjQxNCIsIkZvbnRTZXR0aW5ncyI6eyIkaWQiOiI0MTUiLCJGb250U2l6ZSI6MTAsIkZvbnROYW1lIjoiQ2FsaWJyaSIsIklzQm9sZCI6ZmFsc2UsIklzSXRhbGljIjpmYWxzZSwiSXNVbmRlcmxpbmVkIjpmYWxzZSwiUGFyZW50U3R5bGUiOm51bGx9LCJBdXRvU2l6ZSI6MCwiRm9yZWdyb3VuZCI6eyIkaWQiOiI0MTYiLCJDb2xvciI6eyIkaWQiOiI0MTciLCJBIjoyNTUsIlIiOjY4LCJHIjo4NCwiQiI6MTA2fX0sIk1heFdpZHRoIjoyMDAuMCwiTWF4SGVpZ2h0IjoiSW5maW5pdHkiLCJTbWFydEZvcmVncm91bmRJc0FjdGl2ZSI6ZmFsc2UsIkhvcml6b250YWxBbGlnbm1lbnQiOjIsIlZlcnRpY2FsQWxpZ25tZW50IjowLCJTbWFydEZvcmVncm91bmQiOm51bGwsIkJhY2tncm91bmRGaWxsVHlwZSI6MCwiTWFyZ2luIjp7IiRpZCI6IjQxOCIsIlRvcCI6MCwiTGVmdCI6MCwiUmlnaHQiOjAsIkJvdHRvbSI6MH0sIlBhZGRpbmciOnsiJGlkIjoiNDE5IiwiVG9wIjowLCJMZWZ0IjowLCJSaWdodCI6MCwiQm90dG9tIjowfSwiQmFja2dyb3VuZCI6eyIkcmVmIjoiMjQwIn0sIklzVmlzaWJsZSI6dHJ1ZSwiV2lkdGgiOjAuMCwiSGVpZ2h0IjowLjAsIkJvcmRlclN0eWxlIjp7IiRpZCI6IjQyMCIsIkxpbmVDb2xvciI6bnVsbCwiTGluZVdlaWdodCI6MC4wLCJMaW5lVHlwZSI6MCwiUGFyZW50U3R5bGUiOm51bGx9LCJQYXJlbnRTdHlsZSI6bnVsbH0sIkRhdGVGb3JtYXQiOnsiJGlkIjoiNDIxIiwiRm9ybWF0U3RyaW5nIjoiTU1NIGQiLCJTZXBhcmF0b3IiOiIvIiwiVXNlSW50ZXJuYXRpb25hbERhdGVGb3JtYXQiOmZhbHNlLCJEYXRlSXNWaXNpYmxlIjp0cnVlLCJUaW1lSXNWaXNpYmxlIjpmYWxzZSwiSG91ckRpZ2l0cyI6MSwiQW1QbURlc2lnbmF0b3IiOjIsIlRyaW0wME1pbnV0ZXMiOmZhbHNlLCJMYXN0S25vd25WaXNpYmlsaXR5U3RhdGUiOm51bGx9LCJJc1Zpc2libGUiOnRydWUsIlBhcmVudFN0eWxlIjpudWxsfSwiSW5kZXgiOjYsIlNtYXJ0RHVyYXRpb25BY3RpdmF0ZWQiOmZhbHNlLCJEYXRlRm9ybWF0Ijp7IiRyZWYiOiI0MjEifSwiSWQiOiIxMGU5MDlhOC05NmQxLTQ2MTgtYjUzOC02MzYyNWQ2OWFiNmYiLCJJbXBvcnRJZCI6bnVsbCwiVGl0bGUiOiJQcm90b3R5cGUgcm9vbSBkZWNvcmF0aW9uIiwiTm90ZSI6bnVsbCwiSHlwZXJsaW5rIjp7IiRpZCI6IjQyMiIsIkFkZHJlc3MiOiIiLCJTdWJBZGRyZXNzIjoiIn0sIklzQ2hhbmdlZCI6ZmFsc2UsIklzTmV3IjpmYWxzZX0sIkluZGV4IjowfV0sIk1pbGVzdG9uZXMiOltdfSx7IiRpZCI6IjQyMyIsIklkIjoiYzk0ZTIzMTktM2FhYi00MDI4LTgzNzEtZjVhYmYyNTFjZTM2IiwiSW5kZXgiOjcsIkhlYWRlclRleHQiOiJMZXZlbCBHZW5lcmF0aW9uIiwiU3R5bGUiOnsiJGlkIjoiNDI0IiwiSGVhZGVyU3R5bGUiOnsiJGlkIjoiNDI1IiwiVGV4dFN0eWxlIjp7IiRpZCI6IjQyNiIsIkZvbnRTZXR0aW5ncyI6eyIkaWQiOiI0MjciLCJGb250U2l6ZSI6MTIsIkZvbnROYW1lIjoiQ2FsaWJyaSIsIklzQm9sZCI6ZmFsc2UsIklzSXRhbGljIjpmYWxzZSwiSXNVbmRlcmxpbmVkIjpmYWxzZSwiUGFyZW50U3R5bGUiOm51bGx9LCJBdXRvU2l6ZSI6MCwiRm9yZWdyb3VuZCI6eyIkaWQiOiI0MjgiLCJDb2xvciI6eyIkaWQiOiI0MjkiLCJBIjoyNTUsIlIiOjg4LCJHIjozOSwiQiI6N319LCJNYXhXaWR0aCI6NTEuNDkzMzMzMzMzMzMzMzM5LCJNYXhIZWlnaHQiOjAuMCwiU21hcnRGb3JlZ3JvdW5kSXNBY3RpdmUiOmZhbHNlLCJIb3Jpem9udGFsQWxpZ25tZW50IjowLCJWZXJ0aWNhbEFsaWdubWVudCI6MCwiU21hcnRGb3JlZ3JvdW5kIjpudWxsLCJCYWNrZ3JvdW5kRmlsbFR5cGUiOjAsIk1hcmdpbiI6eyIkaWQiOiI0MzAiLCJUb3AiOjAsIkxlZnQiOjAsIlJpZ2h0IjowLCJCb3R0b20iOjB9LCJQYWRkaW5nIjp7IiRpZCI6IjQzMSIsIlRvcCI6MCwiTGVmdCI6MCwiUmlnaHQiOjAsIkJvdHRvbSI6MH0sIkJhY2tncm91bmQiOm51bGwsIklzVmlzaWJsZSI6ZmFsc2UsIldpZHRoIjowLjAsIkhlaWdodCI6MC4wLCJCb3JkZXJTdHlsZSI6bnVsbCwiUGFyZW50U3R5bGUiOm51bGx9LCJSZWN0YW5nbGVTdHlsZSI6eyIkaWQiOiI0MzIiLCJNYXJnaW4iOnsiJGlkIjoiNDMzIiwiVG9wIjowLCJMZWZ0IjowLCJSaWdodCI6MCwiQm90dG9tIjowfSwiUGFkZGluZyI6eyIkaWQiOiI0MzQiLCJUb3AiOjAsIkxlZnQiOjAsIlJpZ2h0IjowLCJCb3R0b20iOjB9LCJCYWNrZ3JvdW5kIjp7IiRpZCI6IjQzNSIsIkNvbG9yIjp7IiRpZCI6IjQzNiIsIkEiOjEyNywiUiI6MjM3LCJHIjoxMjUsIkIiOjQ5fX0sIklzVmlzaWJsZSI6ZmFsc2UsIldpZHRoIjowLjAsIkhlaWdodCI6MC4wLCJCb3JkZXJTdHlsZSI6eyIkaWQiOiI0MzciLCJMaW5lQ29sb3IiOnsiJGlkIjoiNDM4IiwiJHR5cGUiOiJOTFJFLkNvbW1vbi5Eb20uU29saWRDb2xvckJydXNoLCBOTFJFLkNvbW1vbiIsIkNvbG9yIjp7IiRpZCI6IjQzOSIsIkEiOjI1NSwiUiI6ODgsIkciOjM5LCJCIjo3fX0sIkxpbmVXZWlnaHQiOjAuMCwiTGluZVR5cGUiOjAsIlBhcmVudFN0eWxlIjpudWxsfSwiUGFyZW50U3R5bGUiOm51bGx9LCJNYXJnaW4iOnsiJGlkIjoiNDQwIiwiVG9wIjowLCJMZWZ0IjowLCJSaWdodCI6MCwiQm90dG9tIjowfSwiUGFkZGluZyI6eyIkaWQiOiI0NDEiLCJUb3AiOjAsIkxlZnQiOjAsIlJpZ2h0IjowLCJCb3R0b20iOjB9LCJCYWNrZ3JvdW5kIjpudWxsLCJJc1Zpc2libGUiOnRydWUsIldpZHRoIjowLjAsIkhlaWdodCI6MC4wLCJCb3JkZXJTdHlsZSI6bnVsbCwiUGFyZW50U3R5bGUiOm51bGx9LCJCYWNrZ3JvdW5kU3R5bGUiOnsiJGlkIjoiNDQyIiwiTWFyZ2luIjp7IiRpZCI6IjQ0MyIsIlRvcCI6MCwiTGVmdCI6MCwiUmlnaHQiOjAsIkJvdHRvbSI6MH0sIlBhZGRpbmciOnsiJGlkIjoiNDQ0IiwiVG9wIjowLCJMZWZ0IjowLCJSaWdodCI6MCwiQm90dG9tIjowfSwiQmFja2dyb3VuZCI6eyIkaWQiOiI0NDUiLCJDb2xvciI6eyIkaWQiOiI0NDYiLCJBIjozOCwiUiI6MjM3LCJHIjoxMjUsIkIiOjQ5fX0sIklzVmlzaWJsZSI6dHJ1ZSwiV2lkdGgiOjAuMCwiSGVpZ2h0IjowLjAsIkJvcmRlclN0eWxlIjp7IiRpZCI6IjQ0NyIsIkxpbmVDb2xvciI6eyIkaWQiOiI0NDgiLCIkdHlwZSI6Ik5MUkUuQ29tbW9uLkRvbS5Tb2xpZENvbG9yQnJ1c2gsIE5MUkUuQ29tbW9uIiwiQ29sb3IiOnsiJGlkIjoiNDQ5IiwiQSI6MjU1LCJSIjo4OCwiRyI6MzksIkIiOjd9fSwiTGluZVdlaWdodCI6MC4wLCJMaW5lVHlwZSI6MCwiUGFyZW50U3R5bGUiOm51bGx9LCJQYXJlbnRTdHlsZSI6bnVsbH0sIklzQWJvdmVUaW1lYmFuZCI6ZmFsc2UsIk1hcmdpbiI6eyIkaWQiOiI0NTAiLCJUb3AiOjAsIkxlZnQiOjAsIlJpZ2h0IjowLCJCb3R0b20iOjB9LCJQYWRkaW5nIjp7IiRpZCI6IjQ1MSIsIlRvcCI6MCwiTGVmdCI6MCwiUmlnaHQiOjAsIkJvdHRvbSI6MH0sIklzVmlzaWJsZSI6dHJ1ZSwiV2lkdGgiOjAuMCwiSGVpZ2h0IjowLjAsIkJvcmRlclN0eWxlIjpudWxsLCJQYXJlbnRTdHlsZSI6bnVsbH0sIlRhc2tzIjpbeyIkaWQiOiI0NTIiLCJfYXR0YWNoZWRNaWxlc3RvbmVzIjpbXSwiVGFza0RlZmluaXRpb24iOnsiJGlkIjoiNDUzIiwiR3JvdXBOYW1lIjpudWxsLCJTdGFydERhdGUiOiIyMDE5LTEyLTAzVDAwOjAwOjAwWiIsIkVuZERhdGUiOiIyMDIwLTAzLTMxVDIzOjU5OjAwWiIsIlBlcmNlbnRhZ2VDb21wbGV0ZSI6bnVsbCwiU3R5bGUiOnsiJGlkIjoiNDU0IiwiU2hhcGUiOjEsIlNoYXBlVGhpY2tuZXNzIjoxLCJEdXJhdGlvbkZvcm1hdCI6MCwiSW5jbHVkZU5vbldvcmtpbmdEYXlzSW5EdXJhdGlvbiI6ZmFsc2UsIlBlcmNlbnRhZ2VDb21wbGV0ZVN0eWxlIjp7IiRpZCI6IjQ1NSIsIkZvbnRTZXR0aW5ncyI6eyIkaWQiOiI0NTYiLCJGb250U2l6ZSI6MTAsIkZvbnROYW1lIjoiQ2FsaWJyaSIsIklzQm9sZCI6ZmFsc2UsIklzSXRhbGljIjpmYWxzZSwiSXNVbmRlcmxpbmVkIjpmYWxzZSwiUGFyZW50U3R5bGUiOm51bGx9LCJBdXRvU2l6ZSI6MCwiRm9yZWdyb3VuZCI6eyIkaWQiOiI0NTciLCJDb2xvciI6eyIkaWQiOiI0NTgiLCJBIjoyNTUsIlIiOjE5MiwiRyI6ODAsIkIiOjc3fX0sIk1heFdpZHRoIjoyMDAuMCwiTWF4SGVpZ2h0IjoiSW5maW5pdHkiLCJTbWFydEZvcmVncm91bmRJc0FjdGl2ZSI6ZmFsc2UsIkhvcml6b250YWxBbGlnbm1lbnQiOjEsIlZlcnRpY2FsQWxpZ25tZW50IjowLCJTbWFydEZvcmVncm91bmQiOm51bGwsIkJhY2tncm91bmRGaWxsVHlwZSI6MCwiTWFyZ2luIjp7IiRpZCI6IjQ1OSIsIlRvcCI6MCwiTGVmdCI6MCwiUmlnaHQiOjAsIkJvdHRvbSI6MH0sIlBhZGRpbmciOnsiJGlkIjoiNDYwIiwiVG9wIjowLCJMZWZ0IjowLCJSaWdodCI6MCwiQm90dG9tIjowfSwiQmFja2dyb3VuZCI6eyIkaWQiOiI0NjEiLCJDb2xvciI6eyIkaWQiOiI0NjIiLCJBIjo4OSwiUiI6MCwiRyI6MCwiQiI6MH19LCJJc1Zpc2libGUiOnRydWUsIldpZHRoIjowLjAsIkhlaWdodCI6MC4wLCJCb3JkZXJTdHlsZSI6eyIkaWQiOiI0NjMiLCJMaW5lQ29sb3IiOm51bGwsIkxpbmVXZWlnaHQiOjAuMCwiTGluZVR5cGUiOjAsIlBhcmVudFN0eWxlIjpudWxsfSwiUGFyZW50U3R5bGUiOm51bGx9LCJEdXJhdGlvblN0eWxlIjp7IiRpZCI6IjQ2NCIsIkZvbnRTZXR0aW5ncyI6eyIkaWQiOiI0NjUiLCJGb250U2l6ZSI6MTAsIkZvbnROYW1lIjoiQ2FsaWJyaSIsIklzQm9sZCI6ZmFsc2UsIklzSXRhbGljIjpmYWxzZSwiSXNVbmRlcmxpbmVkIjpmYWxzZSwiUGFyZW50U3R5bGUiOm51bGx9LCJBdXRvU2l6ZSI6MCwiRm9yZWdyb3VuZCI6eyIkaWQiOiI0NjYiLCJDb2xvciI6eyIkaWQiOiI0NjciLCJBIjoyNTUsIlIiOjIzNywiRyI6MTI1LCJCIjo0OX19LCJNYXhXaWR0aCI6MjAwLjAsIk1heEhlaWdodCI6IkluZmluaXR5IiwiU21hcnRGb3JlZ3JvdW5kSXNBY3RpdmUiOmZhbHNlLCJIb3Jpem9udGFsQWxpZ25tZW50IjowLCJWZXJ0aWNhbEFsaWdubWVudCI6MCwiU21hcnRGb3JlZ3JvdW5kIjpudWxsLCJCYWNrZ3JvdW5kRmlsbFR5cGUiOjAsIk1hcmdpbiI6eyIkaWQiOiI0NjgiLCJUb3AiOjAsIkxlZnQiOjAsIlJpZ2h0IjowLCJCb3R0b20iOjB9LCJQYWRkaW5nIjp7IiRpZCI6IjQ2OSIsIlRvcCI6MCwiTGVmdCI6MCwiUmlnaHQiOjAsIkJvdHRvbSI6MH0sIkJhY2tncm91bmQiOnsiJGlkIjoiNDcwIiwiQ29sb3IiOnsiJHJlZiI6IjQ2MiJ9fSwiSXNWaXNpYmxlIjp0cnVlLCJXaWR0aCI6MC4wLCJIZWlnaHQiOjAuMCwiQm9yZGVyU3R5bGUiOnsiJGlkIjoiNDcxIiwiTGluZUNvbG9yIjpudWxsLCJMaW5lV2VpZ2h0IjowLjAsIkxpbmVUeXBlIjowLCJQYXJlbnRTdHlsZSI6bnVsbH0sIlBhcmVudFN0eWxlIjpudWxsfSwiSG9yaXpvbnRhbENvbm5lY3RvclN0eWxlIjp7IiRpZCI6IjQ3MiIsIkxpbmVDb2xvciI6eyIkaWQiOiI0NzMiLCIkdHlwZSI6Ik5MUkUuQ29tbW9uLkRvbS5Tb2xpZENvbG9yQnJ1c2gsIE5MUkUuQ29tbW9uIiwiQ29sb3IiOnsiJGlkIjoiNDc0IiwiQSI6MjU1LCJSIjoyMDQsIkciOjIwNCwiQiI6MjA0fX0sIkxpbmVXZWlnaHQiOjEuMCwiTGluZVR5cGUiOjAsIlBhcmVudFN0eWxlIjpudWxsfSwiVmVydGljYWxDb25uZWN0b3JTdHlsZSI6eyIkaWQiOiI0NzUiLCJMaW5lQ29sb3IiOnsiJGlkIjoiNDc2IiwiJHR5cGUiOiJOTFJFLkNvbW1vbi5Eb20uU29saWRDb2xvckJydXNoLCBOTFJFLkNvbW1vbiIsIkNvbG9yIjp7IiRpZCI6IjQ3NyIsIkEiOjI1NSwiUiI6MjA0LCJHIjoyMDQsIkIiOjIwNH19LCJMaW5lV2VpZ2h0IjowLjAsIkxpbmVUeXBlIjowLCJQYXJlbnRTdHlsZSI6bnVsbH0sIk1hcmdpbiI6bnVsbCwiU3RhcnREYXRlUG9zaXRpb24iOjIsIkVuZERhdGVQb3NpdGlvbiI6MiwiRGF0ZUlzVmlzaWJsZSI6dHJ1ZSwiVGl0bGVQb3NpdGlvbiI6MywiRHVyYXRpb25Qb3NpdGlvbiI6NiwiUGVyY2VudGFnZUNvbXBsZXRlZFBvc2l0aW9uIjo2LCJTcGFjaW5nIjo1LCJJc0JlbG93VGltZWJhbmQiOnRydWUsIlBlcmNlbnRhZ2VDb21wbGV0ZVNoYXBlT3BhY2l0eSI6MzUsIlNoYXBlU3R5bGUiOnsiJGlkIjoiNDc4IiwiTWFyZ2luIjp7IiRpZCI6IjQ3OSIsIlRvcCI6MCwiTGVmdCI6NCwiUmlnaHQiOjQsIkJvdHRvbSI6MH0sIlBhZGRpbmciOnsiJGlkIjoiNDgwIiwiVG9wIjowLCJMZWZ0IjowLCJSaWdodCI6MCwiQm90dG9tIjowfSwiQmFja2dyb3VuZCI6eyIkaWQiOiI0ODEiLCJDb2xvciI6eyIkaWQiOiI0ODIiLCJBIjoyNTUsIlIiOjY4LCJHIjoxMTQsIkIiOjE5Nn19LCJJc1Zpc2libGUiOnRydWUsIldpZHRoIjowLjAsIkhlaWdodCI6MTYuMCwiQm9yZGVyU3R5bGUiOnsiJGlkIjoiNDgzIiwiTGluZUNvbG9yIjp7IiRpZCI6IjQ4NCIsIiR0eXBlIjoiTkxSRS5Db21tb24uRG9tLlNvbGlkQ29sb3JCcnVzaCwgTkxSRS5Db21tb24iLCJDb2xvciI6eyIkaWQiOiI0ODUiLCJBIjoyNTUsIlIiOjI1NSwiRyI6MCwiQiI6MH19LCJMaW5lV2VpZ2h0IjowLjAsIkxpbmVUeXBlIjowLCJQYXJlbnRTdHlsZSI6bnVsbH0sIlBhcmVudFN0eWxlIjpudWxsfSwiVGl0bGVTdHlsZSI6eyIkaWQiOiI0ODYiLCJGb250U2V0dGluZ3MiOnsiJGlkIjoiNDg3IiwiRm9udFNpemUiOjExLCJGb250TmFtZSI6IkNhbGlicmkiLCJJc0JvbGQiOnRydWUsIklzSXRhbGljIjpmYWxzZSwiSXNVbmRlcmxpbmVkIjpmYWxzZSwiUGFyZW50U3R5bGUiOm51bGx9LCJBdXRvU2l6ZSI6MCwiRm9yZWdyb3VuZCI6eyIkaWQiOiI0ODgiLCJDb2xvciI6eyIkaWQiOiI0ODkiLCJBIjoyNTUsIlIiOjAsIkciOjAsIkIiOjB9fSwiTWF4V2lkdGgiOjY2MC4wLCJNYXhIZWlnaHQiOiJJbmZpbml0eSIsIlNtYXJ0Rm9yZWdyb3VuZElzQWN0aXZlIjpmYWxzZSwiSG9yaXpvbnRhbEFsaWdubWVudCI6MiwiVmVydGljYWxBbGlnbm1lbnQiOjAsIlNtYXJ0Rm9yZWdyb3VuZCI6bnVsbCwiQmFja2dyb3VuZEZpbGxUeXBlIjowLCJNYXJnaW4iOnsiJGlkIjoiNDkwIiwiVG9wIjowLCJMZWZ0IjowLCJSaWdodCI6MCwiQm90dG9tIjowfSwiUGFkZGluZyI6eyIkaWQiOiI0OTEiLCJUb3AiOjAsIkxlZnQiOjAsIlJpZ2h0IjowLCJCb3R0b20iOjB9LCJCYWNrZ3JvdW5kIjp7IiRpZCI6IjQ5MiIsIkNvbG9yIjp7IiRyZWYiOiI0NjIifX0sIklzVmlzaWJsZSI6dHJ1ZSwiV2lkdGgiOjAuMCwiSGVpZ2h0IjowLjAsIkJvcmRlclN0eWxlIjp7IiRpZCI6IjQ5MyIsIkxpbmVDb2xvciI6bnVsbCwiTGluZVdlaWdodCI6MC4wLCJMaW5lVHlwZSI6MCwiUGFyZW50U3R5bGUiOm51bGx9LCJQYXJlbnRTdHlsZSI6bnVsbH0sIkRhdGVTdHlsZSI6eyIkaWQiOiI0OTQiLCJGb250U2V0dGluZ3MiOnsiJGlkIjoiNDk1IiwiRm9udFNpemUiOjEwLCJGb250TmFtZSI6IkNhbGlicmkiLCJJc0JvbGQiOmZhbHNlLCJJc0l0YWxpYyI6ZmFsc2UsIklzVW5kZXJsaW5lZCI6ZmFsc2UsIlBhcmVudFN0eWxlIjpudWxsfSwiQXV0b1NpemUiOjAsIkZvcmVncm91bmQiOnsiJGlkIjoiNDk2IiwiQ29sb3IiOnsiJGlkIjoiNDk3IiwiQSI6MjU1LCJSIjoyNTUsIkciOjI1NSwiQiI6MjU1fX0sIk1heFdpZHRoIjoyMDAuMCwiTWF4SGVpZ2h0IjoiSW5maW5pdHkiLCJTbWFydEZvcmVncm91bmRJc0FjdGl2ZSI6ZmFsc2UsIkhvcml6b250YWxBbGlnbm1lbnQiOjEsIlZlcnRpY2FsQWxpZ25tZW50IjowLCJTbWFydEZvcmVncm91bmQiOm51bGwsIkJhY2tncm91bmRGaWxsVHlwZSI6MCwiTWFyZ2luIjp7IiRpZCI6IjQ5OCIsIlRvcCI6MCwiTGVmdCI6MCwiUmlnaHQiOjAsIkJvdHRvbSI6MH0sIlBhZGRpbmciOnsiJGlkIjoiNDk5IiwiVG9wIjowLCJMZWZ0IjowLCJSaWdodCI6MCwiQm90dG9tIjowfSwiQmFja2dyb3VuZCI6eyIkaWQiOiI1MDAiLCJDb2xvciI6eyIkcmVmIjoiNDYyIn19LCJJc1Zpc2libGUiOnRydWUsIldpZHRoIjowLjAsIkhlaWdodCI6MC4wLCJCb3JkZXJTdHlsZSI6eyIkaWQiOiI1MDEiLCJMaW5lQ29sb3IiOm51bGwsIkxpbmVXZWlnaHQiOjAuMCwiTGluZVR5cGUiOjAsIlBhcmVudFN0eWxlIjpudWxsfSwiUGFyZW50U3R5bGUiOm51bGx9LCJEYXRlRm9ybWF0Ijp7IiRpZCI6IjUwMiIsIkZvcm1hdFN0cmluZyI6Ik1NTSBkIiwiU2VwYXJhdG9yIjoiLyIsIlVzZUludGVybmF0aW9uYWxEYXRlRm9ybWF0IjpmYWxzZSwiRGF0ZUlzVmlzaWJsZSI6dHJ1ZSwiVGltZUlzVmlzaWJsZSI6ZmFsc2UsIkhvdXJEaWdpdHMiOjEsIkFtUG1EZXNpZ25hdG9yIjoyLCJUcmltMDBNaW51dGVzIjpmYWxzZSwiTGFzdEtub3duVmlzaWJpbGl0eVN0YXRlIjpudWxsfSwiSXNWaXNpYmxlIjp0cnVlLCJQYXJlbnRTdHlsZSI6bnVsbH0sIkluZGV4Ijo4LCJTbWFydER1cmF0aW9uQWN0aXZhdGVkIjpmYWxzZSwiRGF0ZUZvcm1hdCI6eyIkcmVmIjoiNTAyIn0sIklkIjoiODY0NzlkZjgtYmM1My00ZmE4LWE4MzMtZjVhMDYyMDFiNmQwIiwiSW1wb3J0SWQiOm51bGwsIlRpdGxlIjoiTGV2ZWwgZ2VuZXJhdG9yIiwiTm90ZSI6bnVsbCwiSHlwZXJsaW5rIjp7IiRpZCI6IjUwMyIsIkFkZHJlc3MiOiIiLCJTdWJBZGRyZXNzIjoiIn0sIklzQ2hhbmdlZCI6ZmFsc2UsIklzTmV3IjpmYWxzZX0sIkluZGV4IjowfSx7IiRpZCI6IjUwNCIsIl9hdHRhY2hlZE1pbGVzdG9uZXMiOltdLCJUYXNrRGVmaW5pdGlvbiI6eyIkaWQiOiI1MDUiLCJHcm91cE5hbWUiOm51bGwsIlN0YXJ0RGF0ZSI6IjIwMTktMTItMDNUMDA6MDA6MDBaIiwiRW5kRGF0ZSI6IjIwMjAtMDMtMzFUMjM6NTk6MDBaIiwiUGVyY2VudGFnZUNvbXBsZXRlIjpudWxsLCJTdHlsZSI6eyIkaWQiOiI1MDYiLCJTaGFwZSI6MSwiU2hhcGVUaGlja25lc3MiOjEsIkR1cmF0aW9uRm9ybWF0IjowLCJJbmNsdWRlTm9uV29ya2luZ0RheXNJbkR1cmF0aW9uIjpmYWxzZSwiUGVyY2VudGFnZUNvbXBsZXRlU3R5bGUiOnsiJGlkIjoiNTA3IiwiRm9udFNldHRpbmdzIjp7IiRpZCI6IjUwOCIsIkZvbnRTaXplIjoxMCwiRm9udE5hbWUiOiJDYWxpYnJpIiwiSXNCb2xkIjpmYWxzZSwiSXNJdGFsaWMiOmZhbHNlLCJJc1VuZGVybGluZWQiOmZhbHNlLCJQYXJlbnRTdHlsZSI6bnVsbH0sIkF1dG9TaXplIjowLCJGb3JlZ3JvdW5kIjp7IiRpZCI6IjUwOSIsIkNvbG9yIjp7IiRpZCI6IjUxMCIsIkEiOjI1NSwiUiI6MTkyLCJHIjo4MCwiQiI6Nzd9fSwiTWF4V2lkdGgiOjIwMC4wLCJNYXhIZWlnaHQiOiJJbmZpbml0eSIsIlNtYXJ0Rm9yZWdyb3VuZElzQWN0aXZlIjpmYWxzZSwiSG9yaXpvbnRhbEFsaWdubWVudCI6MSwiVmVydGljYWxBbGlnbm1lbnQiOjAsIlNtYXJ0Rm9yZWdyb3VuZCI6bnVsbCwiQmFja2dyb3VuZEZpbGxUeXBlIjowLCJNYXJnaW4iOnsiJHJlZiI6IjQ1OSJ9LCJQYWRkaW5nIjp7IiRyZWYiOiI0NjAifSwiQmFja2dyb3VuZCI6eyIkcmVmIjoiNDYxIn0sIklzVmlzaWJsZSI6dHJ1ZSwiV2lkdGgiOjAuMCwiSGVpZ2h0IjowLjAsIkJvcmRlclN0eWxlIjp7IiRpZCI6IjUxMSIsIkxpbmVDb2xvciI6bnVsbCwiTGluZVdlaWdodCI6MC4wLCJMaW5lVHlwZSI6MCwiUGFyZW50U3R5bGUiOm51bGx9LCJQYXJlbnRTdHlsZSI6bnVsbH0sIkR1cmF0aW9uU3R5bGUiOnsiJGlkIjoiNTEyIiwiRm9udFNldHRpbmdzIjp7IiRpZCI6IjUxMyIsIkZvbnRTaXplIjoxMCwiRm9udE5hbWUiOiJDYWxpYnJpIiwiSXNCb2xkIjpmYWxzZSwiSXNJdGFsaWMiOmZhbHNlLCJJc1VuZGVybGluZWQiOmZhbHNlLCJQYXJlbnRTdHlsZSI6bnVsbH0sIkF1dG9TaXplIjowLCJGb3JlZ3JvdW5kIjp7IiRyZWYiOiI0NjYifSwiTWF4V2lkdGgiOjIwMC4wLCJNYXhIZWlnaHQiOiJJbmZpbml0eSIsIlNtYXJ0Rm9yZWdyb3VuZElzQWN0aXZlIjpmYWxzZSwiSG9yaXpvbnRhbEFsaWdubWVudCI6MCwiVmVydGljYWxBbGlnbm1lbnQiOjAsIlNtYXJ0Rm9yZWdyb3VuZCI6bnVsbCwiQmFja2dyb3VuZEZpbGxUeXBlIjowLCJNYXJnaW4iOnsiJHJlZiI6IjQ2OCJ9LCJQYWRkaW5nIjp7IiRyZWYiOiI0NjkifSwiQmFja2dyb3VuZCI6eyIkcmVmIjoiNDcwIn0sIklzVmlzaWJsZSI6dHJ1ZSwiV2lkdGgiOjAuMCwiSGVpZ2h0IjowLjAsIkJvcmRlclN0eWxlIjp7IiRpZCI6IjUxNCIsIkxpbmVDb2xvciI6bnVsbCwiTGluZVdlaWdodCI6MC4wLCJMaW5lVHlwZSI6MCwiUGFyZW50U3R5bGUiOm51bGx9LCJQYXJlbnRTdHlsZSI6bnVsbH0sIkhvcml6b250YWxDb25uZWN0b3JTdHlsZSI6eyIkaWQiOiI1MTUiLCJMaW5lQ29sb3IiOnsiJHJlZiI6IjQ3MyJ9LCJMaW5lV2VpZ2h0IjoxLjAsIkxpbmVUeXBlIjowLCJQYXJlbnRTdHlsZSI6bnVsbH0sIlZlcnRpY2FsQ29ubmVjdG9yU3R5bGUiOnsiJGlkIjoiNTE2IiwiTGluZUNvbG9yIjp7IiRyZWYiOiI0NzYifSwiTGluZVdlaWdodCI6MC4wLCJMaW5lVHlwZSI6MCwiUGFyZW50U3R5bGUiOm51bGx9LCJNYXJnaW4iOm51bGwsIlN0YXJ0RGF0ZVBvc2l0aW9uIjoyLCJFbmREYXRlUG9zaXRpb24iOjIsIkRhdGVJc1Zpc2libGUiOnRydWUsIlRpdGxlUG9zaXRpb24iOjMsIkR1cmF0aW9uUG9zaXRpb24iOjYsIlBlcmNlbnRhZ2VDb21wbGV0ZWRQb3NpdGlvbiI6NiwiU3BhY2luZyI6NSwiSXNCZWxvd1RpbWViYW5kIjp0cnVlLCJQZXJjZW50YWdlQ29tcGxldGVTaGFwZU9wYWNpdHkiOjM1LCJTaGFwZVN0eWxlIjp7IiRpZCI6IjUxNyIsIk1hcmdpbiI6eyIkcmVmIjoiNDc5In0sIlBhZGRpbmciOnsiJHJlZiI6IjQ4MCJ9LCJCYWNrZ3JvdW5kIjp7IiRpZCI6IjUxOCIsIkNvbG9yIjp7IiRpZCI6IjUxOSIsIkEiOjI1NSwiUiI6NjgsIkciOjExNCwiQiI6MTk2fX0sIklzVmlzaWJsZSI6dHJ1ZSwiV2lkdGgiOjAuMCwiSGVpZ2h0IjoxNi4wLCJCb3JkZXJTdHlsZSI6eyIkaWQiOiI1MjAiLCJMaW5lQ29sb3IiOnsiJHJlZiI6IjQ4NCJ9LCJMaW5lV2VpZ2h0IjowLjAsIkxpbmVUeXBlIjowLCJQYXJlbnRTdHlsZSI6bnVsbH0sIlBhcmVudFN0eWxlIjpudWxsfSwiVGl0bGVTdHlsZSI6eyIkaWQiOiI1MjEiLCJGb250U2V0dGluZ3MiOnsiJGlkIjoiNTIyIiwiRm9udFNpemUiOjExLCJGb250TmFtZSI6IkNhbGlicmkiLCJJc0JvbGQiOnRydWUsIklzSXRhbGljIjpmYWxzZSwiSXNVbmRlcmxpbmVkIjpmYWxzZSwiUGFyZW50U3R5bGUiOm51bGx9LCJBdXRvU2l6ZSI6MCwiRm9yZWdyb3VuZCI6eyIkaWQiOiI1MjMiLCJDb2xvciI6eyIkaWQiOiI1MjQiLCJBIjoyNTUsIlIiOjAsIkciOjAsIkIiOjB9fSwiTWF4V2lkdGgiOjY2MC4wLCJNYXhIZWlnaHQiOiJJbmZpbml0eSIsIlNtYXJ0Rm9yZWdyb3VuZElzQWN0aXZlIjpmYWxzZSwiSG9yaXpvbnRhbEFsaWdubWVudCI6MiwiVmVydGljYWxBbGlnbm1lbnQiOjAsIlNtYXJ0Rm9yZWdyb3VuZCI6bnVsbCwiQmFja2dyb3VuZEZpbGxUeXBlIjowLCJNYXJnaW4iOnsiJHJlZiI6IjQ5MCJ9LCJQYWRkaW5nIjp7IiRyZWYiOiI0OTEifSwiQmFja2dyb3VuZCI6eyIkcmVmIjoiNDkyIn0sIklzVmlzaWJsZSI6dHJ1ZSwiV2lkdGgiOjAuMCwiSGVpZ2h0IjowLjAsIkJvcmRlclN0eWxlIjp7IiRpZCI6IjUyNSIsIkxpbmVDb2xvciI6bnVsbCwiTGluZVdlaWdodCI6MC4wLCJMaW5lVHlwZSI6MCwiUGFyZW50U3R5bGUiOm51bGx9LCJQYXJlbnRTdHlsZSI6bnVsbH0sIkRhdGVTdHlsZSI6eyIkaWQiOiI1MjYiLCJGb250U2V0dGluZ3MiOnsiJGlkIjoiNTI3IiwiRm9udFNpemUiOjEwLCJGb250TmFtZSI6IkNhbGlicmkiLCJJc0JvbGQiOmZhbHNlLCJJc0l0YWxpYyI6ZmFsc2UsIklzVW5kZXJsaW5lZCI6ZmFsc2UsIlBhcmVudFN0eWxlIjpudWxsfSwiQXV0b1NpemUiOjAsIkZvcmVncm91bmQiOnsiJGlkIjoiNTI4IiwiQ29sb3IiOnsiJGlkIjoiNTI5IiwiQSI6MjU1LCJSIjoyNTUsIkciOjI1NSwiQiI6MjU1fX0sIk1heFdpZHRoIjoyMDAuMCwiTWF4SGVpZ2h0IjoiSW5maW5pdHkiLCJTbWFydEZvcmVncm91bmRJc0FjdGl2ZSI6ZmFsc2UsIkhvcml6b250YWxBbGlnbm1lbnQiOjEsIlZlcnRpY2FsQWxpZ25tZW50IjowLCJTbWFydEZvcmVncm91bmQiOm51bGwsIkJhY2tncm91bmRGaWxsVHlwZSI6MCwiTWFyZ2luIjp7IiRyZWYiOiI0OTgifSwiUGFkZGluZyI6eyIkcmVmIjoiNDk5In0sIkJhY2tncm91bmQiOnsiJHJlZiI6IjUwMCJ9LCJJc1Zpc2libGUiOnRydWUsIldpZHRoIjowLjAsIkhlaWdodCI6MC4wLCJCb3JkZXJTdHlsZSI6eyIkaWQiOiI1MzAiLCJMaW5lQ29sb3IiOm51bGwsIkxpbmVXZWlnaHQiOjAuMCwiTGluZVR5cGUiOjAsIlBhcmVudFN0eWxlIjpudWxsfSwiUGFyZW50U3R5bGUiOm51bGx9LCJEYXRlRm9ybWF0Ijp7IiRyZWYiOiI1MDIifSwiSXNWaXNpYmxlIjp0cnVlLCJQYXJlbnRTdHlsZSI6bnVsbH0sIkluZGV4Ijo5LCJTbWFydER1cmF0aW9uQWN0aXZhdGVkIjpmYWxzZSwiRGF0ZUZvcm1hdCI6eyIkcmVmIjoiNTAyIn0sIklkIjoiOTRiZWQ3YTMtMmY5Zi00MTBmLWE2YzUtODJjMGU0M2IxMTU2IiwiSW1wb3J0SWQiOm51bGwsIlRpdGxlIjoiUm9vbSBnZW5lcmF0b3IiLCJOb3RlIjpudWxsLCJIeXBlcmxpbmsiOnsiJGlkIjoiNTMxIiwiQWRkcmVzcyI6IiIsIlN1YkFkZHJlc3MiOiIifSwiSXNDaGFuZ2VkIjpmYWxzZSwiSXNOZXciOmZhbHNlfSwiSW5kZXgiOjB9XSwiTWlsZXN0b25lcyI6W119LHsiJGlkIjoiNTMyIiwiSWQiOiI2OGQ1NGMwMi1kODhjLTQzYmQtOGU1Ny0xOGFhNjhkYjA3YTkiLCJJbmRleCI6MTAsIkhlYWRlclRleHQiOiJHYW1lcGxheSIsIlN0eWxlIjp7IiRpZCI6IjUzMyIsIkhlYWRlclN0eWxlIjp7IiRpZCI6IjUzNCIsIlRleHRTdHlsZSI6eyIkaWQiOiI1MzUiLCJGb250U2V0dGluZ3MiOnsiJGlkIjoiNTM2IiwiRm9udFNpemUiOjEyLCJGb250TmFtZSI6IkNhbGlicmkiLCJJc0JvbGQiOmZhbHNlLCJJc0l0YWxpYyI6ZmFsc2UsIklzVW5kZXJsaW5lZCI6ZmFsc2UsIlBhcmVudFN0eWxlIjpudWxsfSwiQXV0b1NpemUiOjAsIkZvcmVncm91bmQiOnsiJGlkIjoiNTM3IiwiQ29sb3IiOnsiJGlkIjoiNTM4IiwiQSI6MjU1LCJSIjo1NSwiRyI6NTUsIkIiOjU1fX0sIk1heFdpZHRoIjo1MS40OTMzMzMzMzMzMzMzMzksIk1heEhlaWdodCI6MC4wLCJTbWFydEZvcmVncm91bmRJc0FjdGl2ZSI6ZmFsc2UsIkhvcml6b250YWxBbGlnbm1lbnQiOjAsIlZlcnRpY2FsQWxpZ25tZW50IjowLCJTbWFydEZvcmVncm91bmQiOm51bGwsIkJhY2tncm91bmRGaWxsVHlwZSI6MCwiTWFyZ2luIjp7IiRyZWYiOiI0MzAifSwiUGFkZGluZyI6eyIkcmVmIjoiNDMxIn0sIkJhY2tncm91bmQiOm51bGwsIklzVmlzaWJsZSI6ZmFsc2UsIldpZHRoIjowLjAsIkhlaWdodCI6MC4wLCJCb3JkZXJTdHlsZSI6bnVsbCwiUGFyZW50U3R5bGUiOm51bGx9LCJSZWN0YW5nbGVTdHlsZSI6eyIkaWQiOiI1MzkiLCJNYXJnaW4iOnsiJHJlZiI6IjQzMyJ9LCJQYWRkaW5nIjp7IiRyZWYiOiI0MzQifSwiQmFja2dyb3VuZCI6eyIkaWQiOiI1NDAiLCJDb2xvciI6eyIkaWQiOiI1NDEiLCJBIjoxMjcsIlIiOjE2NSwiRyI6MTY1LCJCIjoxNjV9fSwiSXNWaXNpYmxlIjpmYWxzZSwiV2lkdGgiOjAuMCwiSGVpZ2h0IjowLjAsIkJvcmRlclN0eWxlIjp7IiRpZCI6IjU0MiIsIkxpbmVDb2xvciI6eyIkaWQiOiI1NDMiLCIkdHlwZSI6Ik5MUkUuQ29tbW9uLkRvbS5Tb2xpZENvbG9yQnJ1c2gsIE5MUkUuQ29tbW9uIiwiQ29sb3IiOnsiJGlkIjoiNTQ0IiwiQSI6MjU1LCJSIjo1NSwiRyI6NTUsIkIiOjU1fX0sIkxpbmVXZWlnaHQiOjAuMCwiTGluZVR5cGUiOjAsIlBhcmVudFN0eWxlIjpudWxsfSwiUGFyZW50U3R5bGUiOm51bGx9LCJNYXJnaW4iOnsiJHJlZiI6IjQ0MCJ9LCJQYWRkaW5nIjp7IiRyZWYiOiI0NDEifSwiQmFja2dyb3VuZCI6bnVsbCwiSXNWaXNpYmxlIjp0cnVlLCJXaWR0aCI6MC4wLCJIZWlnaHQiOjAuMCwiQm9yZGVyU3R5bGUiOm51bGwsIlBhcmVudFN0eWxlIjpudWxsfSwiQmFja2dyb3VuZFN0eWxlIjp7IiRpZCI6IjU0NSIsIk1hcmdpbiI6eyIkcmVmIjoiNDQzIn0sIlBhZGRpbmciOnsiJHJlZiI6IjQ0NCJ9LCJCYWNrZ3JvdW5kIjp7IiRpZCI6IjU0NiIsIkNvbG9yIjp7IiRpZCI6IjU0NyIsIkEiOjM4LCJSIjoxNjUsIkciOjE2NSwiQiI6MTY1fX0sIklzVmlzaWJsZSI6dHJ1ZSwiV2lkdGgiOjAuMCwiSGVpZ2h0IjowLjAsIkJvcmRlclN0eWxlIjp7IiRpZCI6IjU0OCIsIkxpbmVDb2xvciI6eyIkaWQiOiI1NDkiLCIkdHlwZSI6Ik5MUkUuQ29tbW9uLkRvbS5Tb2xpZENvbG9yQnJ1c2gsIE5MUkUuQ29tbW9uIiwiQ29sb3IiOnsiJGlkIjoiNTUwIiwiQSI6MjU1LCJSIjo1NSwiRyI6NTUsIkIiOjU1fX0sIkxpbmVXZWlnaHQiOjAuMCwiTGluZVR5cGUiOjAsIlBhcmVudFN0eWxlIjpudWxsfSwiUGFyZW50U3R5bGUiOm51bGx9LCJJc0Fib3ZlVGltZWJhbmQiOmZhbHNlLCJNYXJnaW4iOnsiJHJlZiI6IjQ1MCJ9LCJQYWRkaW5nIjp7IiRyZWYiOiI0NTEifSwiSXNWaXNpYmxlIjp0cnVlLCJXaWR0aCI6MC4wLCJIZWlnaHQiOjAuMCwiQm9yZGVyU3R5bGUiOm51bGwsIlBhcmVudFN0eWxlIjpudWxsfSwiVGFza3MiOlt7IiRpZCI6IjU1MSIsIl9hdHRhY2hlZE1pbGVzdG9uZXMiOltdLCJUYXNrRGVmaW5pdGlvbiI6eyIkaWQiOiI1NTIiLCJHcm91cE5hbWUiOm51bGwsIlN0YXJ0RGF0ZSI6IjIwMjAtMDEtMDFUMDA6MDA6MDBaIiwiRW5kRGF0ZSI6IjIwMjAtMDMtMzFUMjM6NTk6MDBaIiwiUGVyY2VudGFnZUNvbXBsZXRlIjpudWxsLCJTdHlsZSI6eyIkaWQiOiI1NTMiLCJTaGFwZSI6MSwiU2hhcGVUaGlja25lc3MiOjEsIkR1cmF0aW9uRm9ybWF0IjowLCJJbmNsdWRlTm9uV29ya2luZ0RheXNJbkR1cmF0aW9uIjpmYWxzZSwiUGVyY2VudGFnZUNvbXBsZXRlU3R5bGUiOnsiJGlkIjoiNTU0IiwiRm9udFNldHRpbmdzIjp7IiRpZCI6IjU1NSIsIkZvbnRTaXplIjoxMCwiRm9udE5hbWUiOiJDYWxpYnJpIiwiSXNCb2xkIjpmYWxzZSwiSXNJdGFsaWMiOmZhbHNlLCJJc1VuZGVybGluZWQiOmZhbHNlLCJQYXJlbnRTdHlsZSI6bnVsbH0sIkF1dG9TaXplIjowLCJGb3JlZ3JvdW5kIjp7IiRpZCI6IjU1NiIsIkNvbG9yIjp7IiRpZCI6IjU1NyIsIkEiOjI1NSwiUiI6MTkyLCJHIjo4MCwiQiI6Nzd9fSwiTWF4V2lkdGgiOjIwMC4wLCJNYXhIZWlnaHQiOiJJbmZpbml0eSIsIlNtYXJ0Rm9yZWdyb3VuZElzQWN0aXZlIjpmYWxzZSwiSG9yaXpvbnRhbEFsaWdubWVudCI6MSwiVmVydGljYWxBbGlnbm1lbnQiOjAsIlNtYXJ0Rm9yZWdyb3VuZCI6bnVsbCwiQmFja2dyb3VuZEZpbGxUeXBlIjowLCJNYXJnaW4iOnsiJHJlZiI6IjQ1OSJ9LCJQYWRkaW5nIjp7IiRyZWYiOiI0NjAifSwiQmFja2dyb3VuZCI6eyIkcmVmIjoiNDYxIn0sIklzVmlzaWJsZSI6dHJ1ZSwiV2lkdGgiOjAuMCwiSGVpZ2h0IjowLjAsIkJvcmRlclN0eWxlIjp7IiRpZCI6IjU1OCIsIkxpbmVDb2xvciI6bnVsbCwiTGluZVdlaWdodCI6MC4wLCJMaW5lVHlwZSI6MCwiUGFyZW50U3R5bGUiOm51bGx9LCJQYXJlbnRTdHlsZSI6bnVsbH0sIkR1cmF0aW9uU3R5bGUiOnsiJGlkIjoiNTU5IiwiRm9udFNldHRpbmdzIjp7IiRpZCI6IjU2MCIsIkZvbnRTaXplIjoxMCwiRm9udE5hbWUiOiJDYWxpYnJpIiwiSXNCb2xkIjpmYWxzZSwiSXNJdGFsaWMiOmZhbHNlLCJJc1VuZGVybGluZWQiOmZhbHNlLCJQYXJlbnRTdHlsZSI6bnVsbH0sIkF1dG9TaXplIjowLCJGb3JlZ3JvdW5kIjp7IiRyZWYiOiI0NjYifSwiTWF4V2lkdGgiOjIwMC4wLCJNYXhIZWlnaHQiOiJJbmZpbml0eSIsIlNtYXJ0Rm9yZWdyb3VuZElzQWN0aXZlIjpmYWxzZSwiSG9yaXpvbnRhbEFsaWdubWVudCI6MCwiVmVydGljYWxBbGlnbm1lbnQiOjAsIlNtYXJ0Rm9yZWdyb3VuZCI6bnVsbCwiQmFja2dyb3VuZEZpbGxUeXBlIjowLCJNYXJnaW4iOnsiJHJlZiI6IjQ2OCJ9LCJQYWRkaW5nIjp7IiRyZWYiOiI0NjkifSwiQmFja2dyb3VuZCI6eyIkcmVmIjoiNDcwIn0sIklzVmlzaWJsZSI6dHJ1ZSwiV2lkdGgiOjAuMCwiSGVpZ2h0IjowLjAsIkJvcmRlclN0eWxlIjp7IiRpZCI6IjU2MSIsIkxpbmVDb2xvciI6bnVsbCwiTGluZVdlaWdodCI6MC4wLCJMaW5lVHlwZSI6MCwiUGFyZW50U3R5bGUiOm51bGx9LCJQYXJlbnRTdHlsZSI6bnVsbH0sIkhvcml6b250YWxDb25uZWN0b3JTdHlsZSI6eyIkaWQiOiI1NjIiLCJMaW5lQ29sb3IiOnsiJHJlZiI6IjQ3MyJ9LCJMaW5lV2VpZ2h0IjoxLjAsIkxpbmVUeXBlIjowLCJQYXJlbnRTdHlsZSI6bnVsbH0sIlZlcnRpY2FsQ29ubmVjdG9yU3R5bGUiOnsiJGlkIjoiNTYzIiwiTGluZUNvbG9yIjp7IiRyZWYiOiI0NzYifSwiTGluZVdlaWdodCI6MC4wLCJMaW5lVHlwZSI6MCwiUGFyZW50U3R5bGUiOm51bGx9LCJNYXJnaW4iOm51bGwsIlN0YXJ0RGF0ZVBvc2l0aW9uIjoyLCJFbmREYXRlUG9zaXRpb24iOjIsIkRhdGVJc1Zpc2libGUiOnRydWUsIlRpdGxlUG9zaXRpb24iOjMsIkR1cmF0aW9uUG9zaXRpb24iOjYsIlBlcmNlbnRhZ2VDb21wbGV0ZWRQb3NpdGlvbiI6NiwiU3BhY2luZyI6NSwiSXNCZWxvd1RpbWViYW5kIjp0cnVlLCJQZXJjZW50YWdlQ29tcGxldGVTaGFwZU9wYWNpdHkiOjM1LCJTaGFwZVN0eWxlIjp7IiRpZCI6IjU2NCIsIk1hcmdpbiI6eyIkcmVmIjoiNDc5In0sIlBhZGRpbmciOnsiJHJlZiI6IjQ4MCJ9LCJCYWNrZ3JvdW5kIjp7IiRpZCI6IjU2NSIsIkNvbG9yIjp7IiRpZCI6IjU2NiIsIkEiOjI1NSwiUiI6NjgsIkciOjExNCwiQiI6MTk2fX0sIklzVmlzaWJsZSI6dHJ1ZSwiV2lkdGgiOjAuMCwiSGVpZ2h0IjoxNi4wLCJCb3JkZXJTdHlsZSI6eyIkaWQiOiI1NjciLCJMaW5lQ29sb3IiOnsiJHJlZiI6IjQ4NCJ9LCJMaW5lV2VpZ2h0IjowLjAsIkxpbmVUeXBlIjowLCJQYXJlbnRTdHlsZSI6bnVsbH0sIlBhcmVudFN0eWxlIjpudWxsfSwiVGl0bGVTdHlsZSI6eyIkaWQiOiI1NjgiLCJGb250U2V0dGluZ3MiOnsiJGlkIjoiNTY5IiwiRm9udFNpemUiOjExLCJGb250TmFtZSI6IkNhbGlicmkiLCJJc0JvbGQiOnRydWUsIklzSXRhbGljIjpmYWxzZSwiSXNVbmRlcmxpbmVkIjpmYWxzZSwiUGFyZW50U3R5bGUiOm51bGx9LCJBdXRvU2l6ZSI6MCwiRm9yZWdyb3VuZCI6eyIkaWQiOiI1NzAiLCJDb2xvciI6eyIkaWQiOiI1NzEiLCJBIjoyNTUsIlIiOjAsIkciOjAsIkIiOjB9fSwiTWF4V2lkdGgiOjY2MC4wLCJNYXhIZWlnaHQiOiJJbmZpbml0eSIsIlNtYXJ0Rm9yZWdyb3VuZElzQWN0aXZlIjpmYWxzZSwiSG9yaXpvbnRhbEFsaWdubWVudCI6MiwiVmVydGljYWxBbGlnbm1lbnQiOjAsIlNtYXJ0Rm9yZWdyb3VuZCI6bnVsbCwiQmFja2dyb3VuZEZpbGxUeXBlIjowLCJNYXJnaW4iOnsiJHJlZiI6IjQ5MCJ9LCJQYWRkaW5nIjp7IiRyZWYiOiI0OTEifSwiQmFja2dyb3VuZCI6eyIkcmVmIjoiNDkyIn0sIklzVmlzaWJsZSI6dHJ1ZSwiV2lkdGgiOjAuMCwiSGVpZ2h0IjowLjAsIkJvcmRlclN0eWxlIjp7IiRpZCI6IjU3MiIsIkxpbmVDb2xvciI6bnVsbCwiTGluZVdlaWdodCI6MC4wLCJMaW5lVHlwZSI6MCwiUGFyZW50U3R5bGUiOm51bGx9LCJQYXJlbnRTdHlsZSI6bnVsbH0sIkRhdGVTdHlsZSI6eyIkaWQiOiI1NzMiLCJGb250U2V0dGluZ3MiOnsiJGlkIjoiNTc0IiwiRm9udFNpemUiOjEwLCJGb250TmFtZSI6IkNhbGlicmkiLCJJc0JvbGQiOmZhbHNlLCJJc0l0YWxpYyI6ZmFsc2UsIklzVW5kZXJsaW5lZCI6ZmFsc2UsIlBhcmVudFN0eWxlIjpudWxsfSwiQXV0b1NpemUiOjAsIkZvcmVncm91bmQiOnsiJGlkIjoiNTc1IiwiQ29sb3IiOnsiJGlkIjoiNTc2IiwiQSI6MjU1LCJSIjoyNTUsIkciOjI1NSwiQiI6MjU1fX0sIk1heFdpZHRoIjoyMDAuMCwiTWF4SGVpZ2h0IjoiSW5maW5pdHkiLCJTbWFydEZvcmVncm91bmRJc0FjdGl2ZSI6ZmFsc2UsIkhvcml6b250YWxBbGlnbm1lbnQiOjEsIlZlcnRpY2FsQWxpZ25tZW50IjowLCJTbWFydEZvcmVncm91bmQiOm51bGwsIkJhY2tncm91bmRGaWxsVHlwZSI6MCwiTWFyZ2luIjp7IiRyZWYiOiI0OTgifSwiUGFkZGluZyI6eyIkcmVmIjoiNDk5In0sIkJhY2tncm91bmQiOnsiJHJlZiI6IjUwMCJ9LCJJc1Zpc2libGUiOnRydWUsIldpZHRoIjowLjAsIkhlaWdodCI6MC4wLCJCb3JkZXJTdHlsZSI6eyIkaWQiOiI1NzciLCJMaW5lQ29sb3IiOm51bGwsIkxpbmVXZWlnaHQiOjAuMCwiTGluZVR5cGUiOjAsIlBhcmVudFN0eWxlIjpudWxsfSwiUGFyZW50U3R5bGUiOm51bGx9LCJEYXRlRm9ybWF0Ijp7IiRyZWYiOiI1MDIifSwiSXNWaXNpYmxlIjp0cnVlLCJQYXJlbnRTdHlsZSI6bnVsbH0sIkluZGV4IjoxMSwiU21hcnREdXJhdGlvbkFjdGl2YXRlZCI6ZmFsc2UsIkRhdGVGb3JtYXQiOnsiJHJlZiI6IjUwMiJ9LCJJZCI6ImE4OGU1ODc2LTQ0YTMtNGIyOC1iODQ1LTk5MjExMTM1YjI4MCIsIkltcG9ydElkIjpudWxsLCJUaXRsZSI6IkFkZCBnYW1lcGxheSIsIk5vdGUiOm51bGwsIkh5cGVybGluayI6eyIkaWQiOiI1NzgiLCJBZGRyZXNzIjoiIiwiU3ViQWRkcmVzcyI6IiJ9LCJJc0NoYW5nZWQiOmZhbHNlLCJJc05ldyI6ZmFsc2V9LCJJbmRleCI6MH1dLCJNaWxlc3RvbmVzIjpbXX0seyIkaWQiOiI1NzkiLCJJZCI6ImJjYjQ4Yzg5LTQ3MTQtNDkzMy05MTQwLTMwOWY4YTRmNmZlZSIsIkluZGV4IjoxMiwiSGVhZGVyVGV4dCI6IlJlcG9ydCIsIlN0eWxlIjp7IiRpZCI6IjU4MCIsIkhlYWRlclN0eWxlIjp7IiRpZCI6IjU4MSIsIlRleHRTdHlsZSI6eyIkaWQiOiI1ODIiLCJGb250U2V0dGluZ3MiOnsiJGlkIjoiNTgzIiwiRm9udFNpemUiOjEyLCJGb250TmFtZSI6IkNhbGlicmkiLCJJc0JvbGQiOmZhbHNlLCJJc0l0YWxpYyI6ZmFsc2UsIklzVW5kZXJsaW5lZCI6ZmFsc2UsIlBhcmVudFN0eWxlIjpudWxsfSwiQXV0b1NpemUiOjAsIkZvcmVncm91bmQiOnsiJGlkIjoiNTg0IiwiQ29sb3IiOnsiJGlkIjoiNTg1IiwiQSI6MjU1LCJSIjo4NSwiRyI6NjQsIkIiOjB9fSwiTWF4V2lkdGgiOjUxLjQ5MzMzMzMzMzMzMzMzOSwiTWF4SGVpZ2h0IjowLjAsIlNtYXJ0Rm9yZWdyb3VuZElzQWN0aXZlIjpmYWxzZSwiSG9yaXpvbnRhbEFsaWdubWVudCI6MCwiVmVydGljYWxBbGlnbm1lbnQiOjAsIlNtYXJ0Rm9yZWdyb3VuZCI6bnVsbCwiQmFja2dyb3VuZEZpbGxUeXBlIjowLCJNYXJnaW4iOnsiJHJlZiI6IjQzMCJ9LCJQYWRkaW5nIjp7IiRyZWYiOiI0MzEifSwiQmFja2dyb3VuZCI6bnVsbCwiSXNWaXNpYmxlIjpmYWxzZSwiV2lkdGgiOjAuMCwiSGVpZ2h0IjowLjAsIkJvcmRlclN0eWxlIjpudWxsLCJQYXJlbnRTdHlsZSI6bnVsbH0sIlJlY3RhbmdsZVN0eWxlIjp7IiRpZCI6IjU4NiIsIk1hcmdpbiI6eyIkcmVmIjoiNDMzIn0sIlBhZGRpbmciOnsiJHJlZiI6IjQzNCJ9LCJCYWNrZ3JvdW5kIjp7IiRpZCI6IjU4NyIsIkNvbG9yIjp7IiRpZCI6IjU4OCIsIkEiOjEyNywiUiI6MjU1LCJHIjoxOTIsIkIiOjB9fSwiSXNWaXNpYmxlIjpmYWxzZSwiV2lkdGgiOjAuMCwiSGVpZ2h0IjowLjAsIkJvcmRlclN0eWxlIjp7IiRpZCI6IjU4OSIsIkxpbmVDb2xvciI6eyIkaWQiOiI1OTAiLCIkdHlwZSI6Ik5MUkUuQ29tbW9uLkRvbS5Tb2xpZENvbG9yQnJ1c2gsIE5MUkUuQ29tbW9uIiwiQ29sb3IiOnsiJGlkIjoiNTkxIiwiQSI6MjU1LCJSIjo4NSwiRyI6NjQsIkIiOjB9fSwiTGluZVdlaWdodCI6MC4wLCJMaW5lVHlwZSI6MCwiUGFyZW50U3R5bGUiOm51bGx9LCJQYXJlbnRTdHlsZSI6bnVsbH0sIk1hcmdpbiI6eyIkcmVmIjoiNDQwIn0sIlBhZGRpbmciOnsiJHJlZiI6IjQ0MSJ9LCJCYWNrZ3JvdW5kIjpudWxsLCJJc1Zpc2libGUiOnRydWUsIldpZHRoIjowLjAsIkhlaWdodCI6MC4wLCJCb3JkZXJTdHlsZSI6bnVsbCwiUGFyZW50U3R5bGUiOm51bGx9LCJCYWNrZ3JvdW5kU3R5bGUiOnsiJGlkIjoiNTkyIiwiTWFyZ2luIjp7IiRyZWYiOiI0NDMifSwiUGFkZGluZyI6eyIkcmVmIjoiNDQ0In0sIkJhY2tncm91bmQiOnsiJGlkIjoiNTkzIiwiQ29sb3IiOnsiJGlkIjoiNTk0IiwiQSI6MzgsIlIiOjI1NSwiRyI6MTkyLCJCIjowfX0sIklzVmlzaWJsZSI6dHJ1ZSwiV2lkdGgiOjAuMCwiSGVpZ2h0IjowLjAsIkJvcmRlclN0eWxlIjp7IiRpZCI6IjU5NSIsIkxpbmVDb2xvciI6eyIkaWQiOiI1OTYiLCIkdHlwZSI6Ik5MUkUuQ29tbW9uLkRvbS5Tb2xpZENvbG9yQnJ1c2gsIE5MUkUuQ29tbW9uIiwiQ29sb3IiOnsiJGlkIjoiNTk3IiwiQSI6MjU1LCJSIjo4NSwiRyI6NjQsIkIiOjB9fSwiTGluZVdlaWdodCI6MC4wLCJMaW5lVHlwZSI6MCwiUGFyZW50U3R5bGUiOm51bGx9LCJQYXJlbnRTdHlsZSI6bnVsbH0sIklzQWJvdmVUaW1lYmFuZCI6ZmFsc2UsIk1hcmdpbiI6eyIkcmVmIjoiNDUwIn0sIlBhZGRpbmciOnsiJHJlZiI6IjQ1MSJ9LCJJc1Zpc2libGUiOnRydWUsIldpZHRoIjowLjAsIkhlaWdodCI6MC4wLCJCb3JkZXJTdHlsZSI6bnVsbCwiUGFyZW50U3R5bGUiOm51bGx9LCJUYXNrcyI6W3siJGlkIjoiNTk4IiwiX2F0dGFjaGVkTWlsZXN0b25lcyI6W10sIlRhc2tEZWZpbml0aW9uIjp7IiRpZCI6IjU5OSIsIkdyb3VwTmFtZSI6bnVsbCwiU3RhcnREYXRlIjoiMjAxOS0wOS0yOVQwMDowMDowMFoiLCJFbmREYXRlIjoiMjAxOS0xMi0xM1QyMzo1OTowMFoiLCJQZXJjZW50YWdlQ29tcGxldGUiOm51bGwsIlN0eWxlIjp7IiRpZCI6IjYwMCIsIlNoYXBlIjoxLCJTaGFwZVRoaWNrbmVzcyI6MSwiRHVyYXRpb25Gb3JtYXQiOjAsIkluY2x1ZGVOb25Xb3JraW5nRGF5c0luRHVyYXRpb24iOmZhbHNlLCJQZXJjZW50YWdlQ29tcGxldGVTdHlsZSI6eyIkaWQiOiI2MDEiLCJGb250U2V0dGluZ3MiOnsiJGlkIjoiNjAyIiwiRm9udFNpemUiOjEwLCJGb250TmFtZSI6IkNhbGlicmkiLCJJc0JvbGQiOmZhbHNlLCJJc0l0YWxpYyI6ZmFsc2UsIklzVW5kZXJsaW5lZCI6ZmFsc2UsIlBhcmVudFN0eWxlIjpudWxsfSwiQXV0b1NpemUiOjAsIkZvcmVncm91bmQiOnsiJGlkIjoiNjAzIiwiQ29sb3IiOnsiJGlkIjoiNjA0IiwiQSI6MjU1LCJSIjoxOTIsIkciOjgwLCJCIjo3N319LCJNYXhXaWR0aCI6MjAwLjAsIk1heEhlaWdodCI6IkluZmluaXR5IiwiU21hcnRGb3JlZ3JvdW5kSXNBY3RpdmUiOmZhbHNlLCJIb3Jpem9udGFsQWxpZ25tZW50IjoxLCJWZXJ0aWNhbEFsaWdubWVudCI6MCwiU21hcnRGb3JlZ3JvdW5kIjpudWxsLCJCYWNrZ3JvdW5kRmlsbFR5cGUiOjAsIk1hcmdpbiI6eyIkcmVmIjoiNDU5In0sIlBhZGRpbmciOnsiJHJlZiI6IjQ2MCJ9LCJCYWNrZ3JvdW5kIjp7IiRyZWYiOiI0NjEifSwiSXNWaXNpYmxlIjp0cnVlLCJXaWR0aCI6MC4wLCJIZWlnaHQiOjAuMCwiQm9yZGVyU3R5bGUiOnsiJGlkIjoiNjA1IiwiTGluZUNvbG9yIjpudWxsLCJMaW5lV2VpZ2h0IjowLjAsIkxpbmVUeXBlIjowLCJQYXJlbnRTdHlsZSI6bnVsbH0sIlBhcmVudFN0eWxlIjpudWxsfSwiRHVyYXRpb25TdHlsZSI6eyIkaWQiOiI2MDYiLCJGb250U2V0dGluZ3MiOnsiJGlkIjoiNjA3IiwiRm9udFNpemUiOjEwLCJGb250TmFtZSI6IkNhbGlicmkiLCJJc0JvbGQiOmZhbHNlLCJJc0l0YWxpYyI6ZmFsc2UsIklzVW5kZXJsaW5lZCI6ZmFsc2UsIlBhcmVudFN0eWxlIjpudWxsfSwiQXV0b1NpemUiOjAsIkZvcmVncm91bmQiOnsiJHJlZiI6IjQ2NiJ9LCJNYXhXaWR0aCI6MjAwLjAsIk1heEhlaWdodCI6IkluZmluaXR5IiwiU21hcnRGb3JlZ3JvdW5kSXNBY3RpdmUiOmZhbHNlLCJIb3Jpem9udGFsQWxpZ25tZW50IjowLCJWZXJ0aWNhbEFsaWdubWVudCI6MCwiU21hcnRGb3JlZ3JvdW5kIjpudWxsLCJCYWNrZ3JvdW5kRmlsbFR5cGUiOjAsIk1hcmdpbiI6eyIkcmVmIjoiNDY4In0sIlBhZGRpbmciOnsiJHJlZiI6IjQ2OSJ9LCJCYWNrZ3JvdW5kIjp7IiRyZWYiOiI0NzAifSwiSXNWaXNpYmxlIjp0cnVlLCJXaWR0aCI6MC4wLCJIZWlnaHQiOjAuMCwiQm9yZGVyU3R5bGUiOnsiJGlkIjoiNjA4IiwiTGluZUNvbG9yIjpudWxsLCJMaW5lV2VpZ2h0IjowLjAsIkxpbmVUeXBlIjowLCJQYXJlbnRTdHlsZSI6bnVsbH0sIlBhcmVudFN0eWxlIjpudWxsfSwiSG9yaXpvbnRhbENvbm5lY3RvclN0eWxlIjp7IiRpZCI6IjYwOSIsIkxpbmVDb2xvciI6eyIkcmVmIjoiNDczIn0sIkxpbmVXZWlnaHQiOjEuMCwiTGluZVR5cGUiOjAsIlBhcmVudFN0eWxlIjpudWxsfSwiVmVydGljYWxDb25uZWN0b3JTdHlsZSI6eyIkaWQiOiI2MTAiLCJMaW5lQ29sb3IiOnsiJHJlZiI6IjQ3NiJ9LCJMaW5lV2VpZ2h0IjowLjAsIkxpbmVUeXBlIjowLCJQYXJlbnRTdHlsZSI6bnVsbH0sIk1hcmdpbiI6bnVsbCwiU3RhcnREYXRlUG9zaXRpb24iOjIsIkVuZERhdGVQb3NpdGlvbiI6MiwiRGF0ZUlzVmlzaWJsZSI6dHJ1ZSwiVGl0bGVQb3NpdGlvbiI6NCwiRHVyYXRpb25Qb3NpdGlvbiI6NiwiUGVyY2VudGFnZUNvbXBsZXRlZFBvc2l0aW9uIjo2LCJTcGFjaW5nIjo1LCJJc0JlbG93VGltZWJhbmQiOnRydWUsIlBlcmNlbnRhZ2VDb21wbGV0ZVNoYXBlT3BhY2l0eSI6MzUsIlNoYXBlU3R5bGUiOnsiJGlkIjoiNjExIiwiTWFyZ2luIjp7IiRyZWYiOiI0NzkifSwiUGFkZGluZyI6eyIkcmVmIjoiNDgwIn0sIkJhY2tncm91bmQiOnsiJGlkIjoiNjEyIiwiQ29sb3IiOnsiJGlkIjoiNjEzIiwiQSI6MjU1LCJSIjo2OCwiRyI6MTE0LCJCIjoxOTZ9fSwiSXNWaXNpYmxlIjp0cnVlLCJXaWR0aCI6MC4wLCJIZWlnaHQiOjE2LjAsIkJvcmRlclN0eWxlIjp7IiRpZCI6IjYxNCIsIkxpbmVDb2xvciI6eyIkcmVmIjoiNDg0In0sIkxpbmVXZWlnaHQiOjAuMCwiTGluZVR5cGUiOjAsIlBhcmVudFN0eWxlIjpudWxsfSwiUGFyZW50U3R5bGUiOm51bGx9LCJUaXRsZVN0eWxlIjp7IiRpZCI6IjYxNSIsIkZvbnRTZXR0aW5ncyI6eyIkaWQiOiI2MTYiLCJGb250U2l6ZSI6MTEsIkZvbnROYW1lIjoiQ2FsaWJyaSIsIklzQm9sZCI6dHJ1ZSwiSXNJdGFsaWMiOmZhbHNlLCJJc1VuZGVybGluZWQiOmZhbHNlLCJQYXJlbnRTdHlsZSI6bnVsbH0sIkF1dG9TaXplIjowLCJGb3JlZ3JvdW5kIjp7IiRpZCI6IjYxNyIsIkNvbG9yIjp7IiRpZCI6IjYxOCIsIkEiOjI1NSwiUiI6MCwiRyI6MCwiQiI6MH19LCJNYXhXaWR0aCI6NjYwLjAsIk1heEhlaWdodCI6IkluZmluaXR5IiwiU21hcnRGb3JlZ3JvdW5kSXNBY3RpdmUiOmZhbHNlLCJIb3Jpem9udGFsQWxpZ25tZW50IjowLCJWZXJ0aWNhbEFsaWdubWVudCI6MCwiU21hcnRGb3JlZ3JvdW5kIjpudWxsLCJCYWNrZ3JvdW5kRmlsbFR5cGUiOjAsIk1hcmdpbiI6eyIkcmVmIjoiNDkwIn0sIlBhZGRpbmciOnsiJHJlZiI6IjQ5MSJ9LCJCYWNrZ3JvdW5kIjp7IiRyZWYiOiI0OTIifSwiSXNWaXNpYmxlIjp0cnVlLCJXaWR0aCI6MC4wLCJIZWlnaHQiOjAuMCwiQm9yZGVyU3R5bGUiOnsiJGlkIjoiNjE5IiwiTGluZUNvbG9yIjpudWxsLCJMaW5lV2VpZ2h0IjowLjAsIkxpbmVUeXBlIjowLCJQYXJlbnRTdHlsZSI6bnVsbH0sIlBhcmVudFN0eWxlIjpudWxsfSwiRGF0ZVN0eWxlIjp7IiRpZCI6IjYyMCIsIkZvbnRTZXR0aW5ncyI6eyIkaWQiOiI2MjEiLCJGb250U2l6ZSI6MTAsIkZvbnROYW1lIjoiQ2FsaWJyaSIsIklzQm9sZCI6ZmFsc2UsIklzSXRhbGljIjpmYWxzZSwiSXNVbmRlcmxpbmVkIjpmYWxzZSwiUGFyZW50U3R5bGUiOm51bGx9LCJBdXRvU2l6ZSI6MCwiRm9yZWdyb3VuZCI6eyIkaWQiOiI2MjIiLCJDb2xvciI6eyIkaWQiOiI2MjMiLCJBIjoyNTUsIlIiOjI1NSwiRyI6MjU1LCJCIjoyNTV9fSwiTWF4V2lkdGgiOjIwMC4wLCJNYXhIZWlnaHQiOiJJbmZpbml0eSIsIlNtYXJ0Rm9yZWdyb3VuZElzQWN0aXZlIjpmYWxzZSwiSG9yaXpvbnRhbEFsaWdubWVudCI6MSwiVmVydGljYWxBbGlnbm1lbnQiOjAsIlNtYXJ0Rm9yZWdyb3VuZCI6bnVsbCwiQmFja2dyb3VuZEZpbGxUeXBlIjowLCJNYXJnaW4iOnsiJHJlZiI6IjQ5OCJ9LCJQYWRkaW5nIjp7IiRyZWYiOiI0OTkifSwiQmFja2dyb3VuZCI6eyIkcmVmIjoiNTAwIn0sIklzVmlzaWJsZSI6dHJ1ZSwiV2lkdGgiOjAuMCwiSGVpZ2h0IjowLjAsIkJvcmRlclN0eWxlIjp7IiRpZCI6IjYyNCIsIkxpbmVDb2xvciI6bnVsbCwiTGluZVdlaWdodCI6MC4wLCJMaW5lVHlwZSI6MCwiUGFyZW50U3R5bGUiOm51bGx9LCJQYXJlbnRTdHlsZSI6bnVsbH0sIkRhdGVGb3JtYXQiOnsiJHJlZiI6IjUwMiJ9LCJJc1Zpc2libGUiOnRydWUsIlBhcmVudFN0eWxlIjpudWxsfSwiSW5kZXgiOjEzLCJTbWFydER1cmF0aW9uQWN0aXZhdGVkIjpmYWxzZSwiRGF0ZUZvcm1hdCI6eyIkcmVmIjoiNTAyIn0sIklkIjoiNGQ5NjdlMzEtZDk1Ny00NzQ4LTljYjEtYTc0NmI5NjYwN2Q1IiwiSW1wb3J0SWQiOm51bGwsIlRpdGxlIjoiUHJvZ3Jlc3MgcmVwb3J0IiwiTm90ZSI6bnVsbCwiSHlwZXJsaW5rIjp7IiRpZCI6IjYyNSIsIkFkZHJlc3MiOiIiLCJTdWJBZGRyZXNzIjoiIn0sIklzQ2hhbmdlZCI6ZmFsc2UsIklzTmV3IjpmYWxzZX0sIkluZGV4IjowfSx7IiRpZCI6IjYyNiIsIl9hdHRhY2hlZE1pbGVzdG9uZXMiOltdLCJUYXNrRGVmaW5pdGlvbiI6eyIkaWQiOiI2MjciLCJHcm91cE5hbWUiOm51bGwsIlN0YXJ0RGF0ZSI6IjIwMTktMDktMjlUMDA6MDA6MDBaIiwiRW5kRGF0ZSI6IjIwMjAtMDMtMzFUMjM6NTk6MDBaIiwiUGVyY2VudGFnZUNvbXBsZXRlIjpudWxsLCJTdHlsZSI6eyIkaWQiOiI2MjgiLCJTaGFwZSI6MSwiU2hhcGVUaGlja25lc3MiOjEsIkR1cmF0aW9uRm9ybWF0IjowLCJJbmNsdWRlTm9uV29ya2luZ0RheXNJbkR1cmF0aW9uIjpmYWxzZSwiUGVyY2VudGFnZUNvbXBsZXRlU3R5bGUiOnsiJGlkIjoiNjI5IiwiRm9udFNldHRpbmdzIjp7IiRpZCI6IjYzMCIsIkZvbnRTaXplIjoxMCwiRm9udE5hbWUiOiJDYWxpYnJpIiwiSXNCb2xkIjpmYWxzZSwiSXNJdGFsaWMiOmZhbHNlLCJJc1VuZGVybGluZWQiOmZhbHNlLCJQYXJlbnRTdHlsZSI6bnVsbH0sIkF1dG9TaXplIjowLCJGb3JlZ3JvdW5kIjp7IiRpZCI6IjYzMSIsIkNvbG9yIjp7IiRpZCI6IjYzMiIsIkEiOjI1NSwiUiI6MTkyLCJHIjo4MCwiQiI6Nzd9fSwiTWF4V2lkdGgiOjIwMC4wLCJNYXhIZWlnaHQiOiJJbmZpbml0eSIsIlNtYXJ0Rm9yZWdyb3VuZElzQWN0aXZlIjpmYWxzZSwiSG9yaXpvbnRhbEFsaWdubWVudCI6MSwiVmVydGljYWxBbGlnbm1lbnQiOjAsIlNtYXJ0Rm9yZWdyb3VuZCI6bnVsbCwiQmFja2dyb3VuZEZpbGxUeXBlIjowLCJNYXJnaW4iOnsiJHJlZiI6IjQ1OSJ9LCJQYWRkaW5nIjp7IiRyZWYiOiI0NjAifSwiQmFja2dyb3VuZCI6eyIkcmVmIjoiNDYxIn0sIklzVmlzaWJsZSI6dHJ1ZSwiV2lkdGgiOjAuMCwiSGVpZ2h0IjowLjAsIkJvcmRlclN0eWxlIjp7IiRpZCI6IjYzMyIsIkxpbmVDb2xvciI6bnVsbCwiTGluZVdlaWdodCI6MC4wLCJMaW5lVHlwZSI6MCwiUGFyZW50U3R5bGUiOm51bGx9LCJQYXJlbnRTdHlsZSI6bnVsbH0sIkR1cmF0aW9uU3R5bGUiOnsiJGlkIjoiNjM0IiwiRm9udFNldHRpbmdzIjp7IiRpZCI6IjYzNSIsIkZvbnRTaXplIjoxMCwiRm9udE5hbWUiOiJDYWxpYnJpIiwiSXNCb2xkIjpmYWxzZSwiSXNJdGFsaWMiOmZhbHNlLCJJc1VuZGVybGluZWQiOmZhbHNlLCJQYXJlbnRTdHlsZSI6bnVsbH0sIkF1dG9TaXplIjowLCJGb3JlZ3JvdW5kIjp7IiRyZWYiOiI0NjYifSwiTWF4V2lkdGgiOjIwMC4wLCJNYXhIZWlnaHQiOiJJbmZpbml0eSIsIlNtYXJ0Rm9yZWdyb3VuZElzQWN0aXZlIjpmYWxzZSwiSG9yaXpvbnRhbEFsaWdubWVudCI6MCwiVmVydGljYWxBbGlnbm1lbnQiOjAsIlNtYXJ0Rm9yZWdyb3VuZCI6bnVsbCwiQmFja2dyb3VuZEZpbGxUeXBlIjowLCJNYXJnaW4iOnsiJHJlZiI6IjQ2OCJ9LCJQYWRkaW5nIjp7IiRyZWYiOiI0NjkifSwiQmFja2dyb3VuZCI6eyIkcmVmIjoiNDcwIn0sIklzVmlzaWJsZSI6dHJ1ZSwiV2lkdGgiOjAuMCwiSGVpZ2h0IjowLjAsIkJvcmRlclN0eWxlIjp7IiRpZCI6IjYzNiIsIkxpbmVDb2xvciI6bnVsbCwiTGluZVdlaWdodCI6MC4wLCJMaW5lVHlwZSI6MCwiUGFyZW50U3R5bGUiOm51bGx9LCJQYXJlbnRTdHlsZSI6bnVsbH0sIkhvcml6b250YWxDb25uZWN0b3JTdHlsZSI6eyIkaWQiOiI2MzciLCJMaW5lQ29sb3IiOnsiJHJlZiI6IjQ3MyJ9LCJMaW5lV2VpZ2h0IjoxLjAsIkxpbmVUeXBlIjowLCJQYXJlbnRTdHlsZSI6bnVsbH0sIlZlcnRpY2FsQ29ubmVjdG9yU3R5bGUiOnsiJGlkIjoiNjM4IiwiTGluZUNvbG9yIjp7IiRyZWYiOiI0NzYifSwiTGluZVdlaWdodCI6MC4wLCJMaW5lVHlwZSI6MCwiUGFyZW50U3R5bGUiOm51bGx9LCJNYXJnaW4iOm51bGwsIlN0YXJ0RGF0ZVBvc2l0aW9uIjoyLCJFbmREYXRlUG9zaXRpb24iOjIsIkRhdGVJc1Zpc2libGUiOnRydWUsIlRpdGxlUG9zaXRpb24iOjMsIkR1cmF0aW9uUG9zaXRpb24iOjYsIlBlcmNlbnRhZ2VDb21wbGV0ZWRQb3NpdGlvbiI6NiwiU3BhY2luZyI6NSwiSXNCZWxvd1RpbWViYW5kIjp0cnVlLCJQZXJjZW50YWdlQ29tcGxldGVTaGFwZU9wYWNpdHkiOjM1LCJTaGFwZVN0eWxlIjp7IiRpZCI6IjYzOSIsIk1hcmdpbiI6eyIkcmVmIjoiNDc5In0sIlBhZGRpbmciOnsiJHJlZiI6IjQ4MCJ9LCJCYWNrZ3JvdW5kIjp7IiRpZCI6IjY0MCIsIkNvbG9yIjp7IiRpZCI6IjY0MSIsIkEiOjI1NSwiUiI6NjgsIkciOjExNCwiQiI6MTk2fX0sIklzVmlzaWJsZSI6dHJ1ZSwiV2lkdGgiOjAuMCwiSGVpZ2h0IjoxNi4wLCJCb3JkZXJTdHlsZSI6eyIkaWQiOiI2NDIiLCJMaW5lQ29sb3IiOnsiJHJlZiI6IjQ4NCJ9LCJMaW5lV2VpZ2h0IjowLjAsIkxpbmVUeXBlIjowLCJQYXJlbnRTdHlsZSI6bnVsbH0sIlBhcmVudFN0eWxlIjpudWxsfSwiVGl0bGVTdHlsZSI6eyIkaWQiOiI2NDMiLCJGb250U2V0dGluZ3MiOnsiJGlkIjoiNjQ0IiwiRm9udFNpemUiOjExLCJGb250TmFtZSI6IkNhbGlicmkiLCJJc0JvbGQiOnRydWUsIklzSXRhbGljIjpmYWxzZSwiSXNVbmRlcmxpbmVkIjpmYWxzZSwiUGFyZW50U3R5bGUiOm51bGx9LCJBdXRvU2l6ZSI6MCwiRm9yZWdyb3VuZCI6eyIkaWQiOiI2NDUiLCJDb2xvciI6eyIkaWQiOiI2NDYiLCJBIjoyNTUsIlIiOjAsIkciOjAsIkIiOjB9fSwiTWF4V2lkdGgiOjY2MC4wLCJNYXhIZWlnaHQiOiJJbmZpbml0eSIsIlNtYXJ0Rm9yZWdyb3VuZElzQWN0aXZlIjpmYWxzZSwiSG9yaXpvbnRhbEFsaWdubWVudCI6MiwiVmVydGljYWxBbGlnbm1lbnQiOjAsIlNtYXJ0Rm9yZWdyb3VuZCI6bnVsbCwiQmFja2dyb3VuZEZpbGxUeXBlIjowLCJNYXJnaW4iOnsiJHJlZiI6IjQ5MCJ9LCJQYWRkaW5nIjp7IiRyZWYiOiI0OTEifSwiQmFja2dyb3VuZCI6eyIkcmVmIjoiNDkyIn0sIklzVmlzaWJsZSI6dHJ1ZSwiV2lkdGgiOjAuMCwiSGVpZ2h0IjowLjAsIkJvcmRlclN0eWxlIjp7IiRpZCI6IjY0NyIsIkxpbmVDb2xvciI6bnVsbCwiTGluZVdlaWdodCI6MC4wLCJMaW5lVHlwZSI6MCwiUGFyZW50U3R5bGUiOm51bGx9LCJQYXJlbnRTdHlsZSI6bnVsbH0sIkRhdGVTdHlsZSI6eyIkaWQiOiI2NDgiLCJGb250U2V0dGluZ3MiOnsiJGlkIjoiNjQ5IiwiRm9udFNpemUiOjEwLCJGb250TmFtZSI6IkNhbGlicmkiLCJJc0JvbGQiOmZhbHNlLCJJc0l0YWxpYyI6ZmFsc2UsIklzVW5kZXJsaW5lZCI6ZmFsc2UsIlBhcmVudFN0eWxlIjpudWxsfSwiQXV0b1NpemUiOjAsIkZvcmVncm91bmQiOnsiJGlkIjoiNjUwIiwiQ29sb3IiOnsiJGlkIjoiNjUxIiwiQSI6MjU1LCJSIjoyNTUsIkciOjI1NSwiQiI6MjU1fX0sIk1heFdpZHRoIjoyMDAuMCwiTWF4SGVpZ2h0IjoiSW5maW5pdHkiLCJTbWFydEZvcmVncm91bmRJc0FjdGl2ZSI6ZmFsc2UsIkhvcml6b250YWxBbGlnbm1lbnQiOjEsIlZlcnRpY2FsQWxpZ25tZW50IjowLCJTbWFydEZvcmVncm91bmQiOm51bGwsIkJhY2tncm91bmRGaWxsVHlwZSI6MCwiTWFyZ2luIjp7IiRyZWYiOiI0OTgifSwiUGFkZGluZyI6eyIkcmVmIjoiNDk5In0sIkJhY2tncm91bmQiOnsiJHJlZiI6IjUwMCJ9LCJJc1Zpc2libGUiOnRydWUsIldpZHRoIjowLjAsIkhlaWdodCI6MC4wLCJCb3JkZXJTdHlsZSI6eyIkaWQiOiI2NTIiLCJMaW5lQ29sb3IiOm51bGwsIkxpbmVXZWlnaHQiOjAuMCwiTGluZVR5cGUiOjAsIlBhcmVudFN0eWxlIjpudWxsfSwiUGFyZW50U3R5bGUiOm51bGx9LCJEYXRlRm9ybWF0Ijp7IiRyZWYiOiI1MDIifSwiSXNWaXNpYmxlIjp0cnVlLCJQYXJlbnRTdHlsZSI6bnVsbH0sIkluZGV4IjoxNCwiU21hcnREdXJhdGlvbkFjdGl2YXRlZCI6ZmFsc2UsIkRhdGVGb3JtYXQiOnsiJHJlZiI6IjUwMiJ9LCJJZCI6IjgxMzBkNTQzLWVjNTgtNGQ0OC1hNzMwLTUyNzNjMjk1ODA5YSIsIkltcG9ydElkIjpudWxsLCJUaXRsZSI6IkZpbmFsIHJlcG9ydCIsIk5vdGUiOm51bGwsIkh5cGVybGluayI6eyIkaWQiOiI2NTMiLCJBZGRyZXNzIjoiIiwiU3ViQWRkcmVzcyI6IiJ9LCJJc0NoYW5nZWQiOmZhbHNlLCJJc05ldyI6ZmFsc2V9LCJJbmRleCI6MH1dLCJNaWxlc3RvbmVzIjpbXX1dLCJNc1Byb2plY3RJdGVtc1RyZWUiOnsiJGlkIjoiNjU0IiwiUm9vdCI6eyJJbXBvcnRJZCI6bnVsbCwiSXNJbXBvcnRlZCI6ZmFsc2UsIkNoaWxkcmVuIjpbXX19LCJNZXRhZGF0YSI6eyIkaWQiOiI2NTUiLCJSZWNlbnRDb2xvcnNDb2xsZWN0aW9uIjoiW10ifSwiU2V0dGluZ3MiOnsiJGlkIjoiNjU2IiwiSW1wYU9wdGlvbnMiOnsiJGlkIjoiNjU3IiwiTGVmdFRvUmlnaHQiOmZhbHNlLCJQYXlsb2FkT3B0aW9ucyI6Mn0sIlVzZUNvbXByZXNzaW9uIjpmYWxzZSwiQ29tcHJlc2lvblBlcmNlbnRhZ2UiOjUwLjAsIkluYWN0aXZlSW50ZXJ2YWxXaWR0aFRocmVzaG9sZCI6MzAuMCwiSW5hY3RpdmVJbnRlcnZhbFdpZHRoIjoxLjAsIlNwbGl0VGFza3MiOmZhbHNlLCJVc2VDbHVzdGVyIjpmYWxzZSwiRXBzaWxvbiI6NS4wLCJNaW5Qb2ludHNUb0Zvcm1BQ2x1c3RlciI6MiwiR2VuZXJhdGVJbnZpc2libGVTaGFwZXMiOmZhbHNlLCJTbWFydFRpbWVsaW5lVGFza1BlcmNlbnRhZ2VGaXQiOmZhbHNlfSwiSXNOZXciOmZhbHNlLCJJbXBvcnRUeXBlIjowLCJGaWxlUGF0aCI6bnVsbCwiVGltZUNvbmZpZ3VyYXRpb24iOnsiJGlkIjoiNjU4IiwiVXNlVGltZSI6ZmFsc2UsIldvcmtEYXlTdGFydCI6IjAwOjAwOjAwIiwiV29ya0RheUVuZCI6IjIzOjU5OjAwIn0sIkxhc3RVc2VkVGVtcGxhdGVJZCI6IjgyYTc3NjA2LWI2NGEtNDg1ZC1hZjQxLTFhZTM3OGM5YTVkNCJ9"/>
   <p:tag name="__MASTER" val="__part_0"/>
 </p:tagLst>
 </file>
@@ -16645,24 +16441,6 @@
 </file>
 
 <file path=ppt/tags/tag24.xml><?xml version="1.0" encoding="utf-8"?>
-<p:tagLst xmlns:a="http://schemas.openxmlformats.org/drawingml/2006/main" xmlns:r="http://schemas.openxmlformats.org/officeDocument/2006/relationships" xmlns:p="http://schemas.openxmlformats.org/presentationml/2006/main">
-  <p:tag name="OTLMARKERSHAPE" val="OTL"/>
-</p:tagLst>
-</file>
-
-<file path=ppt/tags/tag240.xml><?xml version="1.0" encoding="utf-8"?>
-<p:tagLst xmlns:a="http://schemas.openxmlformats.org/drawingml/2006/main" xmlns:r="http://schemas.openxmlformats.org/officeDocument/2006/relationships" xmlns:p="http://schemas.openxmlformats.org/presentationml/2006/main">
-  <p:tag name="OTLMARKERSHAPE" val="OTL"/>
-</p:tagLst>
-</file>
-
-<file path=ppt/tags/tag241.xml><?xml version="1.0" encoding="utf-8"?>
-<p:tagLst xmlns:a="http://schemas.openxmlformats.org/drawingml/2006/main" xmlns:r="http://schemas.openxmlformats.org/officeDocument/2006/relationships" xmlns:p="http://schemas.openxmlformats.org/presentationml/2006/main">
-  <p:tag name="OTLMARKERSHAPE" val="OTL"/>
-</p:tagLst>
-</file>
-
-<file path=ppt/tags/tag242.xml><?xml version="1.0" encoding="utf-8"?>
 <p:tagLst xmlns:a="http://schemas.openxmlformats.org/drawingml/2006/main" xmlns:r="http://schemas.openxmlformats.org/officeDocument/2006/relationships" xmlns:p="http://schemas.openxmlformats.org/presentationml/2006/main">
   <p:tag name="OTLMARKERSHAPE" val="OTL"/>
 </p:tagLst>

</xml_diff>